<commit_message>
Updated title font of character sheet.
</commit_message>
<xml_diff>
--- a/Ikaros CS.pptx
+++ b/Ikaros CS.pptx
@@ -548,7 +548,7 @@
           <a:p>
             <a:fld id="{08882BDC-A680-4764-9A15-E4D7289376AF}" type="datetimeFigureOut">
               <a:rPr lang="en-US" smtClean="0"/>
-              <a:t>5/23/2021</a:t>
+              <a:t>6/12/2021</a:t>
             </a:fld>
             <a:endParaRPr lang="en-US"/>
           </a:p>
@@ -858,7 +858,7 @@
           <a:p>
             <a:fld id="{08882BDC-A680-4764-9A15-E4D7289376AF}" type="datetimeFigureOut">
               <a:rPr lang="en-US" smtClean="0"/>
-              <a:t>5/23/2021</a:t>
+              <a:t>6/12/2021</a:t>
             </a:fld>
             <a:endParaRPr lang="en-US"/>
           </a:p>
@@ -1079,7 +1079,7 @@
           <a:p>
             <a:fld id="{08882BDC-A680-4764-9A15-E4D7289376AF}" type="datetimeFigureOut">
               <a:rPr lang="en-US" smtClean="0"/>
-              <a:t>5/23/2021</a:t>
+              <a:t>6/12/2021</a:t>
             </a:fld>
             <a:endParaRPr lang="en-US"/>
           </a:p>
@@ -1369,7 +1369,7 @@
           <a:p>
             <a:fld id="{08882BDC-A680-4764-9A15-E4D7289376AF}" type="datetimeFigureOut">
               <a:rPr lang="en-US" smtClean="0"/>
-              <a:t>5/23/2021</a:t>
+              <a:t>6/12/2021</a:t>
             </a:fld>
             <a:endParaRPr lang="en-US"/>
           </a:p>
@@ -1822,7 +1822,7 @@
           <a:p>
             <a:fld id="{08882BDC-A680-4764-9A15-E4D7289376AF}" type="datetimeFigureOut">
               <a:rPr lang="en-US" smtClean="0"/>
-              <a:t>5/23/2021</a:t>
+              <a:t>6/12/2021</a:t>
             </a:fld>
             <a:endParaRPr lang="en-US"/>
           </a:p>
@@ -2397,7 +2397,7 @@
           <a:p>
             <a:fld id="{08882BDC-A680-4764-9A15-E4D7289376AF}" type="datetimeFigureOut">
               <a:rPr lang="en-US" smtClean="0"/>
-              <a:t>5/23/2021</a:t>
+              <a:t>6/12/2021</a:t>
             </a:fld>
             <a:endParaRPr lang="en-US"/>
           </a:p>
@@ -3245,7 +3245,7 @@
           <a:p>
             <a:fld id="{08882BDC-A680-4764-9A15-E4D7289376AF}" type="datetimeFigureOut">
               <a:rPr lang="en-US" smtClean="0"/>
-              <a:t>5/23/2021</a:t>
+              <a:t>6/12/2021</a:t>
             </a:fld>
             <a:endParaRPr lang="en-US"/>
           </a:p>
@@ -3448,7 +3448,7 @@
           <a:p>
             <a:fld id="{08882BDC-A680-4764-9A15-E4D7289376AF}" type="datetimeFigureOut">
               <a:rPr lang="en-US" smtClean="0"/>
-              <a:t>5/23/2021</a:t>
+              <a:t>6/12/2021</a:t>
             </a:fld>
             <a:endParaRPr lang="en-US"/>
           </a:p>
@@ -3660,7 +3660,7 @@
           <a:p>
             <a:fld id="{08882BDC-A680-4764-9A15-E4D7289376AF}" type="datetimeFigureOut">
               <a:rPr lang="en-US" smtClean="0"/>
-              <a:t>5/23/2021</a:t>
+              <a:t>6/12/2021</a:t>
             </a:fld>
             <a:endParaRPr lang="en-US"/>
           </a:p>
@@ -3863,7 +3863,7 @@
           <a:p>
             <a:fld id="{08882BDC-A680-4764-9A15-E4D7289376AF}" type="datetimeFigureOut">
               <a:rPr lang="en-US" smtClean="0"/>
-              <a:t>5/23/2021</a:t>
+              <a:t>6/12/2021</a:t>
             </a:fld>
             <a:endParaRPr lang="en-US"/>
           </a:p>
@@ -4142,7 +4142,7 @@
           <a:p>
             <a:fld id="{08882BDC-A680-4764-9A15-E4D7289376AF}" type="datetimeFigureOut">
               <a:rPr lang="en-US" smtClean="0"/>
-              <a:t>5/23/2021</a:t>
+              <a:t>6/12/2021</a:t>
             </a:fld>
             <a:endParaRPr lang="en-US"/>
           </a:p>
@@ -4406,7 +4406,7 @@
           <a:p>
             <a:fld id="{08882BDC-A680-4764-9A15-E4D7289376AF}" type="datetimeFigureOut">
               <a:rPr lang="en-US" smtClean="0"/>
-              <a:t>5/23/2021</a:t>
+              <a:t>6/12/2021</a:t>
             </a:fld>
             <a:endParaRPr lang="en-US"/>
           </a:p>
@@ -4818,7 +4818,7 @@
           <a:p>
             <a:fld id="{08882BDC-A680-4764-9A15-E4D7289376AF}" type="datetimeFigureOut">
               <a:rPr lang="en-US" smtClean="0"/>
-              <a:t>5/23/2021</a:t>
+              <a:t>6/12/2021</a:t>
             </a:fld>
             <a:endParaRPr lang="en-US"/>
           </a:p>
@@ -4965,7 +4965,7 @@
           <a:p>
             <a:fld id="{08882BDC-A680-4764-9A15-E4D7289376AF}" type="datetimeFigureOut">
               <a:rPr lang="en-US" smtClean="0"/>
-              <a:t>5/23/2021</a:t>
+              <a:t>6/12/2021</a:t>
             </a:fld>
             <a:endParaRPr lang="en-US"/>
           </a:p>
@@ -5090,7 +5090,7 @@
           <a:p>
             <a:fld id="{08882BDC-A680-4764-9A15-E4D7289376AF}" type="datetimeFigureOut">
               <a:rPr lang="en-US" smtClean="0"/>
-              <a:t>5/23/2021</a:t>
+              <a:t>6/12/2021</a:t>
             </a:fld>
             <a:endParaRPr lang="en-US"/>
           </a:p>
@@ -5367,7 +5367,7 @@
           <a:p>
             <a:fld id="{08882BDC-A680-4764-9A15-E4D7289376AF}" type="datetimeFigureOut">
               <a:rPr lang="en-US" smtClean="0"/>
-              <a:t>5/23/2021</a:t>
+              <a:t>6/12/2021</a:t>
             </a:fld>
             <a:endParaRPr lang="en-US"/>
           </a:p>
@@ -5677,7 +5677,7 @@
           <a:p>
             <a:fld id="{08882BDC-A680-4764-9A15-E4D7289376AF}" type="datetimeFigureOut">
               <a:rPr lang="en-US" smtClean="0"/>
-              <a:t>5/23/2021</a:t>
+              <a:t>6/12/2021</a:t>
             </a:fld>
             <a:endParaRPr lang="en-US"/>
           </a:p>
@@ -5928,7 +5928,7 @@
           <a:p>
             <a:fld id="{08882BDC-A680-4764-9A15-E4D7289376AF}" type="datetimeFigureOut">
               <a:rPr lang="en-US" smtClean="0"/>
-              <a:t>5/23/2021</a:t>
+              <a:t>6/12/2021</a:t>
             </a:fld>
             <a:endParaRPr lang="en-US"/>
           </a:p>
@@ -6395,7 +6395,7 @@
           <p:nvPr>
             <p:extLst>
               <p:ext uri="{D42A27DB-BD31-4B8C-83A1-F6EECF244321}">
-                <p14:modId xmlns:p14="http://schemas.microsoft.com/office/powerpoint/2010/main" val="3645656866"/>
+                <p14:modId xmlns:p14="http://schemas.microsoft.com/office/powerpoint/2010/main" val="1782696620"/>
               </p:ext>
             </p:extLst>
           </p:nvPr>
@@ -6553,13 +6553,13 @@
                     <a:p>
                       <a:pPr algn="ctr"/>
                       <a:r>
-                        <a:rPr lang="en-US" b="1" dirty="0" err="1">
-                          <a:latin typeface="Harrington" panose="04040505050A02020702" pitchFamily="82" charset="0"/>
+                        <a:rPr lang="en-US" b="1">
+                          <a:latin typeface="HamletOrNot" panose="02000603090000020003" pitchFamily="2" charset="0"/>
                         </a:rPr>
-                        <a:t>Ikaros</a:t>
+                        <a:t>ikaros</a:t>
                       </a:r>
                       <a:endParaRPr lang="en-US" b="1" dirty="0">
-                        <a:latin typeface="Harrington" panose="04040505050A02020702" pitchFamily="82" charset="0"/>
+                        <a:latin typeface="HamletOrNot" panose="02000603090000020003" pitchFamily="2" charset="0"/>
                       </a:endParaRPr>
                     </a:p>
                   </a:txBody>
@@ -15174,7 +15174,7 @@
                     <a:lstStyle/>
                     <a:p>
                       <a:pPr algn="r"/>
-                      <a:endParaRPr lang="en-US" sz="1000">
+                      <a:endParaRPr lang="en-US" sz="1000" dirty="0">
                         <a:latin typeface="Candara" panose="020E0502030303020204" pitchFamily="34" charset="0"/>
                       </a:endParaRPr>
                     </a:p>

</xml_diff>

<commit_message>
Held item rules are now explicit.
</commit_message>
<xml_diff>
--- a/Ikaros CS.pptx
+++ b/Ikaros CS.pptx
@@ -113,16 +113,47 @@
 </p:presentation>
 </file>
 
-<file path=ppt/revisionInfo.xml><?xml version="1.0" encoding="utf-8"?>
-<p1510:revInfo xmlns:a="http://schemas.openxmlformats.org/drawingml/2006/main" xmlns:r="http://schemas.openxmlformats.org/officeDocument/2006/relationships" xmlns:p1510="http://schemas.microsoft.com/office/powerpoint/2015/10/main">
-  <p1510:revLst>
-    <p1510:client id="{C97A6D9C-BE04-4B14-9C06-10E95202842D}" v="2" dt="2021-12-23T20:51:36.340"/>
-  </p1510:revLst>
-</p1510:revInfo>
-</file>
-
 <file path=ppt/changesInfos/changesInfo1.xml><?xml version="1.0" encoding="utf-8"?>
 <pc:chgInfo xmlns:a="http://schemas.openxmlformats.org/drawingml/2006/main" xmlns:r="http://schemas.openxmlformats.org/officeDocument/2006/relationships" xmlns:ac="http://schemas.microsoft.com/office/drawing/2013/main/command" xmlns:pc="http://schemas.microsoft.com/office/powerpoint/2013/main/command">
+  <pc:docChgLst>
+    <pc:chgData name="Julia Pitts" userId="6e51b823a05a2cc0" providerId="LiveId" clId="{769B9876-0CC5-4952-8417-BD50DAB03C8C}"/>
+    <pc:docChg chg="modSld">
+      <pc:chgData name="Julia Pitts" userId="6e51b823a05a2cc0" providerId="LiveId" clId="{769B9876-0CC5-4952-8417-BD50DAB03C8C}" dt="2022-01-20T20:54:17.591" v="62" actId="20577"/>
+      <pc:docMkLst>
+        <pc:docMk/>
+      </pc:docMkLst>
+      <pc:sldChg chg="modSp mod">
+        <pc:chgData name="Julia Pitts" userId="6e51b823a05a2cc0" providerId="LiveId" clId="{769B9876-0CC5-4952-8417-BD50DAB03C8C}" dt="2022-01-20T20:53:53.935" v="19" actId="20577"/>
+        <pc:sldMkLst>
+          <pc:docMk/>
+          <pc:sldMk cId="1783378883" sldId="256"/>
+        </pc:sldMkLst>
+        <pc:graphicFrameChg chg="modGraphic">
+          <ac:chgData name="Julia Pitts" userId="6e51b823a05a2cc0" providerId="LiveId" clId="{769B9876-0CC5-4952-8417-BD50DAB03C8C}" dt="2022-01-20T20:53:53.935" v="19" actId="20577"/>
+          <ac:graphicFrameMkLst>
+            <pc:docMk/>
+            <pc:sldMk cId="1783378883" sldId="256"/>
+            <ac:graphicFrameMk id="6" creationId="{789FCB90-6945-4AC5-A88D-469FE3C21635}"/>
+          </ac:graphicFrameMkLst>
+        </pc:graphicFrameChg>
+      </pc:sldChg>
+      <pc:sldChg chg="modSp mod">
+        <pc:chgData name="Julia Pitts" userId="6e51b823a05a2cc0" providerId="LiveId" clId="{769B9876-0CC5-4952-8417-BD50DAB03C8C}" dt="2022-01-20T20:54:17.591" v="62" actId="20577"/>
+        <pc:sldMkLst>
+          <pc:docMk/>
+          <pc:sldMk cId="1661469233" sldId="257"/>
+        </pc:sldMkLst>
+        <pc:graphicFrameChg chg="modGraphic">
+          <ac:chgData name="Julia Pitts" userId="6e51b823a05a2cc0" providerId="LiveId" clId="{769B9876-0CC5-4952-8417-BD50DAB03C8C}" dt="2022-01-20T20:54:17.591" v="62" actId="20577"/>
+          <ac:graphicFrameMkLst>
+            <pc:docMk/>
+            <pc:sldMk cId="1661469233" sldId="257"/>
+            <ac:graphicFrameMk id="4" creationId="{54C5A4E1-B718-4E81-9087-7EFA5BA1AE72}"/>
+          </ac:graphicFrameMkLst>
+        </pc:graphicFrameChg>
+      </pc:sldChg>
+    </pc:docChg>
+  </pc:docChgLst>
   <pc:docChgLst>
     <pc:chgData name="Julia Pitts" userId="6e51b823a05a2cc0" providerId="LiveId" clId="{C8653743-8E63-4B2A-9A3D-E14EE72B3A33}"/>
     <pc:docChg chg="undo redo custSel addSld modSld">
@@ -572,7 +603,7 @@
           <a:p>
             <a:fld id="{08882BDC-A680-4764-9A15-E4D7289376AF}" type="datetimeFigureOut">
               <a:rPr lang="en-US" smtClean="0"/>
-              <a:t>12/23/2021</a:t>
+              <a:t>1/20/2022</a:t>
             </a:fld>
             <a:endParaRPr lang="en-US"/>
           </a:p>
@@ -882,7 +913,7 @@
           <a:p>
             <a:fld id="{08882BDC-A680-4764-9A15-E4D7289376AF}" type="datetimeFigureOut">
               <a:rPr lang="en-US" smtClean="0"/>
-              <a:t>12/23/2021</a:t>
+              <a:t>1/20/2022</a:t>
             </a:fld>
             <a:endParaRPr lang="en-US"/>
           </a:p>
@@ -1103,7 +1134,7 @@
           <a:p>
             <a:fld id="{08882BDC-A680-4764-9A15-E4D7289376AF}" type="datetimeFigureOut">
               <a:rPr lang="en-US" smtClean="0"/>
-              <a:t>12/23/2021</a:t>
+              <a:t>1/20/2022</a:t>
             </a:fld>
             <a:endParaRPr lang="en-US"/>
           </a:p>
@@ -1393,7 +1424,7 @@
           <a:p>
             <a:fld id="{08882BDC-A680-4764-9A15-E4D7289376AF}" type="datetimeFigureOut">
               <a:rPr lang="en-US" smtClean="0"/>
-              <a:t>12/23/2021</a:t>
+              <a:t>1/20/2022</a:t>
             </a:fld>
             <a:endParaRPr lang="en-US"/>
           </a:p>
@@ -1846,7 +1877,7 @@
           <a:p>
             <a:fld id="{08882BDC-A680-4764-9A15-E4D7289376AF}" type="datetimeFigureOut">
               <a:rPr lang="en-US" smtClean="0"/>
-              <a:t>12/23/2021</a:t>
+              <a:t>1/20/2022</a:t>
             </a:fld>
             <a:endParaRPr lang="en-US"/>
           </a:p>
@@ -2421,7 +2452,7 @@
           <a:p>
             <a:fld id="{08882BDC-A680-4764-9A15-E4D7289376AF}" type="datetimeFigureOut">
               <a:rPr lang="en-US" smtClean="0"/>
-              <a:t>12/23/2021</a:t>
+              <a:t>1/20/2022</a:t>
             </a:fld>
             <a:endParaRPr lang="en-US"/>
           </a:p>
@@ -3269,7 +3300,7 @@
           <a:p>
             <a:fld id="{08882BDC-A680-4764-9A15-E4D7289376AF}" type="datetimeFigureOut">
               <a:rPr lang="en-US" smtClean="0"/>
-              <a:t>12/23/2021</a:t>
+              <a:t>1/20/2022</a:t>
             </a:fld>
             <a:endParaRPr lang="en-US"/>
           </a:p>
@@ -3472,7 +3503,7 @@
           <a:p>
             <a:fld id="{08882BDC-A680-4764-9A15-E4D7289376AF}" type="datetimeFigureOut">
               <a:rPr lang="en-US" smtClean="0"/>
-              <a:t>12/23/2021</a:t>
+              <a:t>1/20/2022</a:t>
             </a:fld>
             <a:endParaRPr lang="en-US"/>
           </a:p>
@@ -3684,7 +3715,7 @@
           <a:p>
             <a:fld id="{08882BDC-A680-4764-9A15-E4D7289376AF}" type="datetimeFigureOut">
               <a:rPr lang="en-US" smtClean="0"/>
-              <a:t>12/23/2021</a:t>
+              <a:t>1/20/2022</a:t>
             </a:fld>
             <a:endParaRPr lang="en-US"/>
           </a:p>
@@ -3887,7 +3918,7 @@
           <a:p>
             <a:fld id="{08882BDC-A680-4764-9A15-E4D7289376AF}" type="datetimeFigureOut">
               <a:rPr lang="en-US" smtClean="0"/>
-              <a:t>12/23/2021</a:t>
+              <a:t>1/20/2022</a:t>
             </a:fld>
             <a:endParaRPr lang="en-US"/>
           </a:p>
@@ -4166,7 +4197,7 @@
           <a:p>
             <a:fld id="{08882BDC-A680-4764-9A15-E4D7289376AF}" type="datetimeFigureOut">
               <a:rPr lang="en-US" smtClean="0"/>
-              <a:t>12/23/2021</a:t>
+              <a:t>1/20/2022</a:t>
             </a:fld>
             <a:endParaRPr lang="en-US"/>
           </a:p>
@@ -4430,7 +4461,7 @@
           <a:p>
             <a:fld id="{08882BDC-A680-4764-9A15-E4D7289376AF}" type="datetimeFigureOut">
               <a:rPr lang="en-US" smtClean="0"/>
-              <a:t>12/23/2021</a:t>
+              <a:t>1/20/2022</a:t>
             </a:fld>
             <a:endParaRPr lang="en-US"/>
           </a:p>
@@ -4842,7 +4873,7 @@
           <a:p>
             <a:fld id="{08882BDC-A680-4764-9A15-E4D7289376AF}" type="datetimeFigureOut">
               <a:rPr lang="en-US" smtClean="0"/>
-              <a:t>12/23/2021</a:t>
+              <a:t>1/20/2022</a:t>
             </a:fld>
             <a:endParaRPr lang="en-US"/>
           </a:p>
@@ -4989,7 +5020,7 @@
           <a:p>
             <a:fld id="{08882BDC-A680-4764-9A15-E4D7289376AF}" type="datetimeFigureOut">
               <a:rPr lang="en-US" smtClean="0"/>
-              <a:t>12/23/2021</a:t>
+              <a:t>1/20/2022</a:t>
             </a:fld>
             <a:endParaRPr lang="en-US"/>
           </a:p>
@@ -5114,7 +5145,7 @@
           <a:p>
             <a:fld id="{08882BDC-A680-4764-9A15-E4D7289376AF}" type="datetimeFigureOut">
               <a:rPr lang="en-US" smtClean="0"/>
-              <a:t>12/23/2021</a:t>
+              <a:t>1/20/2022</a:t>
             </a:fld>
             <a:endParaRPr lang="en-US"/>
           </a:p>
@@ -5391,7 +5422,7 @@
           <a:p>
             <a:fld id="{08882BDC-A680-4764-9A15-E4D7289376AF}" type="datetimeFigureOut">
               <a:rPr lang="en-US" smtClean="0"/>
-              <a:t>12/23/2021</a:t>
+              <a:t>1/20/2022</a:t>
             </a:fld>
             <a:endParaRPr lang="en-US"/>
           </a:p>
@@ -5701,7 +5732,7 @@
           <a:p>
             <a:fld id="{08882BDC-A680-4764-9A15-E4D7289376AF}" type="datetimeFigureOut">
               <a:rPr lang="en-US" smtClean="0"/>
-              <a:t>12/23/2021</a:t>
+              <a:t>1/20/2022</a:t>
             </a:fld>
             <a:endParaRPr lang="en-US"/>
           </a:p>
@@ -5952,7 +5983,7 @@
           <a:p>
             <a:fld id="{08882BDC-A680-4764-9A15-E4D7289376AF}" type="datetimeFigureOut">
               <a:rPr lang="en-US" smtClean="0"/>
-              <a:t>12/23/2021</a:t>
+              <a:t>1/20/2022</a:t>
             </a:fld>
             <a:endParaRPr lang="en-US"/>
           </a:p>
@@ -6419,14 +6450,14 @@
           <p:nvPr>
             <p:extLst>
               <p:ext uri="{D42A27DB-BD31-4B8C-83A1-F6EECF244321}">
-                <p14:modId xmlns:p14="http://schemas.microsoft.com/office/powerpoint/2010/main" val="780838002"/>
+                <p14:modId xmlns:p14="http://schemas.microsoft.com/office/powerpoint/2010/main" val="3523407208"/>
               </p:ext>
             </p:extLst>
           </p:nvPr>
         </p:nvGraphicFramePr>
         <p:xfrm>
           <a:off x="262287" y="269457"/>
-          <a:ext cx="9707057" cy="6954087"/>
+          <a:ext cx="9707057" cy="6988621"/>
         </p:xfrm>
         <a:graphic>
           <a:graphicData uri="http://schemas.openxmlformats.org/drawingml/2006/table">
@@ -6702,15 +6733,15 @@
                     <a:lstStyle/>
                     <a:p>
                       <a:r>
-                        <a:rPr lang="en-US" sz="1000" kern="1200">
+                        <a:rPr lang="en-US" sz="1000" kern="1200" dirty="0">
                           <a:solidFill>
                             <a:schemeClr val="dk1"/>
                           </a:solidFill>
                           <a:latin typeface="Candara" panose="020E0502030303020204" pitchFamily="34" charset="0"/>
                         </a:rPr>
-                        <a:t>Weapon</a:t>
+                        <a:t>Weapon (held)</a:t>
                       </a:r>
-                      <a:endParaRPr lang="en-US" sz="1000" kern="1200">
+                      <a:endParaRPr lang="en-US" sz="1000" kern="1200" dirty="0">
                         <a:solidFill>
                           <a:schemeClr val="dk1"/>
                         </a:solidFill>
@@ -7182,15 +7213,15 @@
                     <a:lstStyle/>
                     <a:p>
                       <a:r>
-                        <a:rPr lang="en-US" sz="1000" kern="1200">
+                        <a:rPr lang="en-US" sz="1000" kern="1200" dirty="0">
                           <a:solidFill>
                             <a:schemeClr val="dk1"/>
                           </a:solidFill>
                           <a:latin typeface="Candara" panose="020E0502030303020204" pitchFamily="34" charset="0"/>
                         </a:rPr>
-                        <a:t>Weapon</a:t>
+                        <a:t>Weapon (held)</a:t>
                       </a:r>
-                      <a:endParaRPr lang="en-US" sz="1000" kern="1200">
+                      <a:endParaRPr lang="en-US" sz="1000" kern="1200" dirty="0">
                         <a:solidFill>
                           <a:schemeClr val="dk1"/>
                         </a:solidFill>
@@ -7765,15 +7796,15 @@
                     <a:lstStyle/>
                     <a:p>
                       <a:r>
-                        <a:rPr lang="en-US" sz="1000" kern="1200">
+                        <a:rPr lang="en-US" sz="1000" kern="1200" dirty="0">
                           <a:solidFill>
                             <a:schemeClr val="dk1"/>
                           </a:solidFill>
                           <a:latin typeface="Candara" panose="020E0502030303020204" pitchFamily="34" charset="0"/>
                         </a:rPr>
-                        <a:t>Weapon</a:t>
+                        <a:t>Weapon (bag)</a:t>
                       </a:r>
-                      <a:endParaRPr lang="en-US" sz="1000" kern="1200">
+                      <a:endParaRPr lang="en-US" sz="1000" kern="1200" dirty="0">
                         <a:solidFill>
                           <a:schemeClr val="dk1"/>
                         </a:solidFill>
@@ -15689,7 +15720,7 @@
           <p:nvPr>
             <p:extLst>
               <p:ext uri="{D42A27DB-BD31-4B8C-83A1-F6EECF244321}">
-                <p14:modId xmlns:p14="http://schemas.microsoft.com/office/powerpoint/2010/main" val="3007703268"/>
+                <p14:modId xmlns:p14="http://schemas.microsoft.com/office/powerpoint/2010/main" val="508574510"/>
               </p:ext>
             </p:extLst>
           </p:nvPr>
@@ -16231,6 +16262,30 @@
                         </a:rPr>
                         <a:t>Two Bulk 1 items on the belt, then another (5 + Might) worth of Bulk on the rest of the body. Armor worn counts against your maximum bulk!</a:t>
                       </a:r>
+                    </a:p>
+                    <a:p>
+                      <a:pPr algn="l"/>
+                      <a:endParaRPr lang="en-US" sz="1000" dirty="0">
+                        <a:latin typeface="Candara" panose="020E0502030303020204" pitchFamily="34" charset="0"/>
+                      </a:endParaRPr>
+                    </a:p>
+                    <a:p>
+                      <a:pPr algn="l"/>
+                      <a:r>
+                        <a:rPr lang="en-US" sz="1000" dirty="0">
+                          <a:latin typeface="Candara" panose="020E0502030303020204" pitchFamily="34" charset="0"/>
+                        </a:rPr>
+                        <a:t>Held items are on the front of </a:t>
+                      </a:r>
+                      <a:r>
+                        <a:rPr lang="en-US" sz="1000">
+                          <a:latin typeface="Candara" panose="020E0502030303020204" pitchFamily="34" charset="0"/>
+                        </a:rPr>
+                        <a:t>the sheet.</a:t>
+                      </a:r>
+                      <a:endParaRPr lang="en-US" sz="1000" dirty="0">
+                        <a:latin typeface="Candara" panose="020E0502030303020204" pitchFamily="34" charset="0"/>
+                      </a:endParaRPr>
                     </a:p>
                   </a:txBody>
                   <a:tcPr>

</xml_diff>

<commit_message>
Updates to character sheet.
</commit_message>
<xml_diff>
--- a/Ikaros CS.pptx
+++ b/Ikaros CS.pptx
@@ -113,23 +113,31 @@
 </p:presentation>
 </file>
 
+<file path=ppt/revisionInfo.xml><?xml version="1.0" encoding="utf-8"?>
+<p1510:revInfo xmlns:a="http://schemas.openxmlformats.org/drawingml/2006/main" xmlns:r="http://schemas.openxmlformats.org/officeDocument/2006/relationships" xmlns:p1510="http://schemas.microsoft.com/office/powerpoint/2015/10/main">
+  <p1510:revLst>
+    <p1510:client id="{769B9876-0CC5-4952-8417-BD50DAB03C8C}" v="50" dt="2022-01-29T23:01:44.645"/>
+  </p1510:revLst>
+</p1510:revInfo>
+</file>
+
 <file path=ppt/changesInfos/changesInfo1.xml><?xml version="1.0" encoding="utf-8"?>
 <pc:chgInfo xmlns:a="http://schemas.openxmlformats.org/drawingml/2006/main" xmlns:r="http://schemas.openxmlformats.org/officeDocument/2006/relationships" xmlns:ac="http://schemas.microsoft.com/office/drawing/2013/main/command" xmlns:pc="http://schemas.microsoft.com/office/powerpoint/2013/main/command">
   <pc:docChgLst>
     <pc:chgData name="Julia Pitts" userId="6e51b823a05a2cc0" providerId="LiveId" clId="{769B9876-0CC5-4952-8417-BD50DAB03C8C}"/>
-    <pc:docChg chg="modSld">
-      <pc:chgData name="Julia Pitts" userId="6e51b823a05a2cc0" providerId="LiveId" clId="{769B9876-0CC5-4952-8417-BD50DAB03C8C}" dt="2022-01-20T20:54:17.591" v="62" actId="20577"/>
+    <pc:docChg chg="undo redo custSel addSld delSld modSld">
+      <pc:chgData name="Julia Pitts" userId="6e51b823a05a2cc0" providerId="LiveId" clId="{769B9876-0CC5-4952-8417-BD50DAB03C8C}" dt="2022-01-29T23:01:37.411" v="736"/>
       <pc:docMkLst>
         <pc:docMk/>
       </pc:docMkLst>
       <pc:sldChg chg="modSp mod">
-        <pc:chgData name="Julia Pitts" userId="6e51b823a05a2cc0" providerId="LiveId" clId="{769B9876-0CC5-4952-8417-BD50DAB03C8C}" dt="2022-01-20T20:53:53.935" v="19" actId="20577"/>
+        <pc:chgData name="Julia Pitts" userId="6e51b823a05a2cc0" providerId="LiveId" clId="{769B9876-0CC5-4952-8417-BD50DAB03C8C}" dt="2022-01-29T23:01:37.411" v="736"/>
         <pc:sldMkLst>
           <pc:docMk/>
           <pc:sldMk cId="1783378883" sldId="256"/>
         </pc:sldMkLst>
-        <pc:graphicFrameChg chg="modGraphic">
-          <ac:chgData name="Julia Pitts" userId="6e51b823a05a2cc0" providerId="LiveId" clId="{769B9876-0CC5-4952-8417-BD50DAB03C8C}" dt="2022-01-20T20:53:53.935" v="19" actId="20577"/>
+        <pc:graphicFrameChg chg="mod modGraphic">
+          <ac:chgData name="Julia Pitts" userId="6e51b823a05a2cc0" providerId="LiveId" clId="{769B9876-0CC5-4952-8417-BD50DAB03C8C}" dt="2022-01-29T23:01:37.411" v="736"/>
           <ac:graphicFrameMkLst>
             <pc:docMk/>
             <pc:sldMk cId="1783378883" sldId="256"/>
@@ -138,19 +146,26 @@
         </pc:graphicFrameChg>
       </pc:sldChg>
       <pc:sldChg chg="modSp mod">
-        <pc:chgData name="Julia Pitts" userId="6e51b823a05a2cc0" providerId="LiveId" clId="{769B9876-0CC5-4952-8417-BD50DAB03C8C}" dt="2022-01-20T20:54:17.591" v="62" actId="20577"/>
+        <pc:chgData name="Julia Pitts" userId="6e51b823a05a2cc0" providerId="LiveId" clId="{769B9876-0CC5-4952-8417-BD50DAB03C8C}" dt="2022-01-29T22:53:35.990" v="442" actId="3064"/>
         <pc:sldMkLst>
           <pc:docMk/>
           <pc:sldMk cId="1661469233" sldId="257"/>
         </pc:sldMkLst>
-        <pc:graphicFrameChg chg="modGraphic">
-          <ac:chgData name="Julia Pitts" userId="6e51b823a05a2cc0" providerId="LiveId" clId="{769B9876-0CC5-4952-8417-BD50DAB03C8C}" dt="2022-01-20T20:54:17.591" v="62" actId="20577"/>
+        <pc:graphicFrameChg chg="mod modGraphic">
+          <ac:chgData name="Julia Pitts" userId="6e51b823a05a2cc0" providerId="LiveId" clId="{769B9876-0CC5-4952-8417-BD50DAB03C8C}" dt="2022-01-29T22:53:35.990" v="442" actId="3064"/>
           <ac:graphicFrameMkLst>
             <pc:docMk/>
             <pc:sldMk cId="1661469233" sldId="257"/>
             <ac:graphicFrameMk id="4" creationId="{54C5A4E1-B718-4E81-9087-7EFA5BA1AE72}"/>
           </ac:graphicFrameMkLst>
         </pc:graphicFrameChg>
+      </pc:sldChg>
+      <pc:sldChg chg="new add del">
+        <pc:chgData name="Julia Pitts" userId="6e51b823a05a2cc0" providerId="LiveId" clId="{769B9876-0CC5-4952-8417-BD50DAB03C8C}" dt="2022-01-29T22:57:53.959" v="669" actId="680"/>
+        <pc:sldMkLst>
+          <pc:docMk/>
+          <pc:sldMk cId="537560059" sldId="258"/>
+        </pc:sldMkLst>
       </pc:sldChg>
     </pc:docChg>
   </pc:docChgLst>
@@ -603,7 +618,7 @@
           <a:p>
             <a:fld id="{08882BDC-A680-4764-9A15-E4D7289376AF}" type="datetimeFigureOut">
               <a:rPr lang="en-US" smtClean="0"/>
-              <a:t>1/20/2022</a:t>
+              <a:t>1/29/2022</a:t>
             </a:fld>
             <a:endParaRPr lang="en-US"/>
           </a:p>
@@ -913,7 +928,7 @@
           <a:p>
             <a:fld id="{08882BDC-A680-4764-9A15-E4D7289376AF}" type="datetimeFigureOut">
               <a:rPr lang="en-US" smtClean="0"/>
-              <a:t>1/20/2022</a:t>
+              <a:t>1/29/2022</a:t>
             </a:fld>
             <a:endParaRPr lang="en-US"/>
           </a:p>
@@ -1134,7 +1149,7 @@
           <a:p>
             <a:fld id="{08882BDC-A680-4764-9A15-E4D7289376AF}" type="datetimeFigureOut">
               <a:rPr lang="en-US" smtClean="0"/>
-              <a:t>1/20/2022</a:t>
+              <a:t>1/29/2022</a:t>
             </a:fld>
             <a:endParaRPr lang="en-US"/>
           </a:p>
@@ -1424,7 +1439,7 @@
           <a:p>
             <a:fld id="{08882BDC-A680-4764-9A15-E4D7289376AF}" type="datetimeFigureOut">
               <a:rPr lang="en-US" smtClean="0"/>
-              <a:t>1/20/2022</a:t>
+              <a:t>1/29/2022</a:t>
             </a:fld>
             <a:endParaRPr lang="en-US"/>
           </a:p>
@@ -1877,7 +1892,7 @@
           <a:p>
             <a:fld id="{08882BDC-A680-4764-9A15-E4D7289376AF}" type="datetimeFigureOut">
               <a:rPr lang="en-US" smtClean="0"/>
-              <a:t>1/20/2022</a:t>
+              <a:t>1/29/2022</a:t>
             </a:fld>
             <a:endParaRPr lang="en-US"/>
           </a:p>
@@ -2452,7 +2467,7 @@
           <a:p>
             <a:fld id="{08882BDC-A680-4764-9A15-E4D7289376AF}" type="datetimeFigureOut">
               <a:rPr lang="en-US" smtClean="0"/>
-              <a:t>1/20/2022</a:t>
+              <a:t>1/29/2022</a:t>
             </a:fld>
             <a:endParaRPr lang="en-US"/>
           </a:p>
@@ -3300,7 +3315,7 @@
           <a:p>
             <a:fld id="{08882BDC-A680-4764-9A15-E4D7289376AF}" type="datetimeFigureOut">
               <a:rPr lang="en-US" smtClean="0"/>
-              <a:t>1/20/2022</a:t>
+              <a:t>1/29/2022</a:t>
             </a:fld>
             <a:endParaRPr lang="en-US"/>
           </a:p>
@@ -3503,7 +3518,7 @@
           <a:p>
             <a:fld id="{08882BDC-A680-4764-9A15-E4D7289376AF}" type="datetimeFigureOut">
               <a:rPr lang="en-US" smtClean="0"/>
-              <a:t>1/20/2022</a:t>
+              <a:t>1/29/2022</a:t>
             </a:fld>
             <a:endParaRPr lang="en-US"/>
           </a:p>
@@ -3715,7 +3730,7 @@
           <a:p>
             <a:fld id="{08882BDC-A680-4764-9A15-E4D7289376AF}" type="datetimeFigureOut">
               <a:rPr lang="en-US" smtClean="0"/>
-              <a:t>1/20/2022</a:t>
+              <a:t>1/29/2022</a:t>
             </a:fld>
             <a:endParaRPr lang="en-US"/>
           </a:p>
@@ -3918,7 +3933,7 @@
           <a:p>
             <a:fld id="{08882BDC-A680-4764-9A15-E4D7289376AF}" type="datetimeFigureOut">
               <a:rPr lang="en-US" smtClean="0"/>
-              <a:t>1/20/2022</a:t>
+              <a:t>1/29/2022</a:t>
             </a:fld>
             <a:endParaRPr lang="en-US"/>
           </a:p>
@@ -4197,7 +4212,7 @@
           <a:p>
             <a:fld id="{08882BDC-A680-4764-9A15-E4D7289376AF}" type="datetimeFigureOut">
               <a:rPr lang="en-US" smtClean="0"/>
-              <a:t>1/20/2022</a:t>
+              <a:t>1/29/2022</a:t>
             </a:fld>
             <a:endParaRPr lang="en-US"/>
           </a:p>
@@ -4461,7 +4476,7 @@
           <a:p>
             <a:fld id="{08882BDC-A680-4764-9A15-E4D7289376AF}" type="datetimeFigureOut">
               <a:rPr lang="en-US" smtClean="0"/>
-              <a:t>1/20/2022</a:t>
+              <a:t>1/29/2022</a:t>
             </a:fld>
             <a:endParaRPr lang="en-US"/>
           </a:p>
@@ -4873,7 +4888,7 @@
           <a:p>
             <a:fld id="{08882BDC-A680-4764-9A15-E4D7289376AF}" type="datetimeFigureOut">
               <a:rPr lang="en-US" smtClean="0"/>
-              <a:t>1/20/2022</a:t>
+              <a:t>1/29/2022</a:t>
             </a:fld>
             <a:endParaRPr lang="en-US"/>
           </a:p>
@@ -5020,7 +5035,7 @@
           <a:p>
             <a:fld id="{08882BDC-A680-4764-9A15-E4D7289376AF}" type="datetimeFigureOut">
               <a:rPr lang="en-US" smtClean="0"/>
-              <a:t>1/20/2022</a:t>
+              <a:t>1/29/2022</a:t>
             </a:fld>
             <a:endParaRPr lang="en-US"/>
           </a:p>
@@ -5145,7 +5160,7 @@
           <a:p>
             <a:fld id="{08882BDC-A680-4764-9A15-E4D7289376AF}" type="datetimeFigureOut">
               <a:rPr lang="en-US" smtClean="0"/>
-              <a:t>1/20/2022</a:t>
+              <a:t>1/29/2022</a:t>
             </a:fld>
             <a:endParaRPr lang="en-US"/>
           </a:p>
@@ -5422,7 +5437,7 @@
           <a:p>
             <a:fld id="{08882BDC-A680-4764-9A15-E4D7289376AF}" type="datetimeFigureOut">
               <a:rPr lang="en-US" smtClean="0"/>
-              <a:t>1/20/2022</a:t>
+              <a:t>1/29/2022</a:t>
             </a:fld>
             <a:endParaRPr lang="en-US"/>
           </a:p>
@@ -5732,7 +5747,7 @@
           <a:p>
             <a:fld id="{08882BDC-A680-4764-9A15-E4D7289376AF}" type="datetimeFigureOut">
               <a:rPr lang="en-US" smtClean="0"/>
-              <a:t>1/20/2022</a:t>
+              <a:t>1/29/2022</a:t>
             </a:fld>
             <a:endParaRPr lang="en-US"/>
           </a:p>
@@ -5983,7 +5998,7 @@
           <a:p>
             <a:fld id="{08882BDC-A680-4764-9A15-E4D7289376AF}" type="datetimeFigureOut">
               <a:rPr lang="en-US" smtClean="0"/>
-              <a:t>1/20/2022</a:t>
+              <a:t>1/29/2022</a:t>
             </a:fld>
             <a:endParaRPr lang="en-US"/>
           </a:p>
@@ -6450,14 +6465,14 @@
           <p:nvPr>
             <p:extLst>
               <p:ext uri="{D42A27DB-BD31-4B8C-83A1-F6EECF244321}">
-                <p14:modId xmlns:p14="http://schemas.microsoft.com/office/powerpoint/2010/main" val="3523407208"/>
+                <p14:modId xmlns:p14="http://schemas.microsoft.com/office/powerpoint/2010/main" val="3831775553"/>
               </p:ext>
             </p:extLst>
           </p:nvPr>
         </p:nvGraphicFramePr>
         <p:xfrm>
           <a:off x="262287" y="269457"/>
-          <a:ext cx="9707057" cy="6988621"/>
+          <a:ext cx="9311424" cy="6954087"/>
         </p:xfrm>
         <a:graphic>
           <a:graphicData uri="http://schemas.openxmlformats.org/drawingml/2006/table">
@@ -6473,28 +6488,28 @@
                     </a:ext>
                   </a:extLst>
                 </a:gridCol>
-                <a:gridCol w="420180">
+                <a:gridCol w="457200">
                   <a:extLst>
                     <a:ext uri="{9D8B030D-6E8A-4147-A177-3AD203B41FA5}">
                       <a16:colId xmlns:a16="http://schemas.microsoft.com/office/drawing/2014/main" val="2619768155"/>
                     </a:ext>
                   </a:extLst>
                 </a:gridCol>
-                <a:gridCol w="594102">
+                <a:gridCol w="457200">
                   <a:extLst>
                     <a:ext uri="{9D8B030D-6E8A-4147-A177-3AD203B41FA5}">
                       <a16:colId xmlns:a16="http://schemas.microsoft.com/office/drawing/2014/main" val="454913347"/>
                     </a:ext>
                   </a:extLst>
                 </a:gridCol>
-                <a:gridCol w="450180">
+                <a:gridCol w="182880">
                   <a:extLst>
                     <a:ext uri="{9D8B030D-6E8A-4147-A177-3AD203B41FA5}">
                       <a16:colId xmlns:a16="http://schemas.microsoft.com/office/drawing/2014/main" val="622742064"/>
                     </a:ext>
                   </a:extLst>
                 </a:gridCol>
-                <a:gridCol w="208280">
+                <a:gridCol w="182880">
                   <a:extLst>
                     <a:ext uri="{9D8B030D-6E8A-4147-A177-3AD203B41FA5}">
                       <a16:colId xmlns:a16="http://schemas.microsoft.com/office/drawing/2014/main" val="995290069"/>
@@ -6508,7 +6523,7 @@
                     </a:ext>
                   </a:extLst>
                 </a:gridCol>
-                <a:gridCol w="460251">
+                <a:gridCol w="457200">
                   <a:extLst>
                     <a:ext uri="{9D8B030D-6E8A-4147-A177-3AD203B41FA5}">
                       <a16:colId xmlns:a16="http://schemas.microsoft.com/office/drawing/2014/main" val="2321362093"/>
@@ -6608,7 +6623,7 @@
                     <a:p>
                       <a:pPr algn="ctr"/>
                       <a:r>
-                        <a:rPr lang="en-US" b="1">
+                        <a:rPr lang="en-US" b="1" dirty="0" err="1">
                           <a:latin typeface="HamletOrNot" panose="02000603090000020003" pitchFamily="2" charset="0"/>
                         </a:rPr>
                         <a:t>ikaros</a:t>
@@ -6739,7 +6754,7 @@
                           </a:solidFill>
                           <a:latin typeface="Candara" panose="020E0502030303020204" pitchFamily="34" charset="0"/>
                         </a:rPr>
-                        <a:t>Weapon (held)</a:t>
+                        <a:t>Weapon</a:t>
                       </a:r>
                       <a:endParaRPr lang="en-US" sz="1000" kern="1200" dirty="0">
                         <a:solidFill>
@@ -7128,6 +7143,9 @@
                     </a:p>
                   </a:txBody>
                   <a:tcPr anchor="b">
+                    <a:lnL w="12700" cmpd="sng">
+                      <a:noFill/>
+                    </a:lnL>
                     <a:lnB w="12700" cap="flat" cmpd="sng" algn="ctr">
                       <a:solidFill>
                         <a:schemeClr val="tx1"/>
@@ -7151,6 +7169,9 @@
                     </a:p>
                   </a:txBody>
                   <a:tcPr anchor="b">
+                    <a:lnL w="12700" cmpd="sng">
+                      <a:noFill/>
+                    </a:lnL>
                     <a:lnB w="12700" cap="flat" cmpd="sng" algn="ctr">
                       <a:solidFill>
                         <a:schemeClr val="tx1"/>
@@ -7174,6 +7195,9 @@
                     </a:p>
                   </a:txBody>
                   <a:tcPr anchor="b">
+                    <a:lnL w="12700" cmpd="sng">
+                      <a:noFill/>
+                    </a:lnL>
                     <a:lnB w="12700" cap="flat" cmpd="sng" algn="ctr">
                       <a:solidFill>
                         <a:schemeClr val="tx1"/>
@@ -7219,7 +7243,7 @@
                           </a:solidFill>
                           <a:latin typeface="Candara" panose="020E0502030303020204" pitchFamily="34" charset="0"/>
                         </a:rPr>
-                        <a:t>Weapon (held)</a:t>
+                        <a:t>Weapon</a:t>
                       </a:r>
                       <a:endParaRPr lang="en-US" sz="1000" kern="1200" dirty="0">
                         <a:solidFill>
@@ -7802,7 +7826,7 @@
                           </a:solidFill>
                           <a:latin typeface="Candara" panose="020E0502030303020204" pitchFamily="34" charset="0"/>
                         </a:rPr>
-                        <a:t>Weapon (bag)</a:t>
+                        <a:t>Weapon</a:t>
                       </a:r>
                       <a:endParaRPr lang="en-US" sz="1000" kern="1200" dirty="0">
                         <a:solidFill>
@@ -8716,116 +8740,117 @@
                     <a:bodyPr/>
                     <a:lstStyle/>
                     <a:p>
-                      <a:endParaRPr lang="en-US" sz="1000" dirty="0">
-                        <a:latin typeface="Candara" panose="020E0502030303020204" pitchFamily="34" charset="0"/>
-                      </a:endParaRPr>
-                    </a:p>
-                  </a:txBody>
-                  <a:tcPr anchor="b">
-                    <a:lnB w="12700" cap="flat" cmpd="sng" algn="ctr">
-                      <a:solidFill>
-                        <a:schemeClr val="tx1"/>
-                      </a:solidFill>
-                      <a:prstDash val="solid"/>
-                      <a:round/>
-                      <a:headEnd type="none" w="med" len="med"/>
-                      <a:tailEnd type="none" w="med" len="med"/>
-                    </a:lnB>
-                    <a:solidFill>
-                      <a:schemeClr val="bg1"/>
-                    </a:solidFill>
-                  </a:tcPr>
-                </a:tc>
-                <a:tc hMerge="1">
-                  <a:txBody>
-                    <a:bodyPr/>
-                    <a:lstStyle/>
-                    <a:p>
-                      <a:endParaRPr lang="en-US"/>
-                    </a:p>
-                  </a:txBody>
-                  <a:tcPr/>
-                </a:tc>
-                <a:tc hMerge="1">
-                  <a:txBody>
-                    <a:bodyPr/>
-                    <a:lstStyle/>
-                    <a:p>
-                      <a:endParaRPr lang="en-US"/>
-                    </a:p>
-                  </a:txBody>
-                  <a:tcPr anchor="b">
-                    <a:lnB w="12700" cap="flat" cmpd="sng" algn="ctr">
-                      <a:solidFill>
-                        <a:schemeClr val="tx1"/>
-                      </a:solidFill>
-                      <a:prstDash val="solid"/>
-                      <a:round/>
-                      <a:headEnd type="none" w="med" len="med"/>
-                      <a:tailEnd type="none" w="med" len="med"/>
-                    </a:lnB>
-                    <a:solidFill>
-                      <a:schemeClr val="bg1"/>
-                    </a:solidFill>
-                  </a:tcPr>
-                </a:tc>
-                <a:tc hMerge="1">
-                  <a:txBody>
-                    <a:bodyPr/>
-                    <a:lstStyle/>
-                    <a:p>
-                      <a:endParaRPr lang="en-US"/>
-                    </a:p>
-                  </a:txBody>
-                  <a:tcPr anchor="b">
-                    <a:lnB w="12700" cap="flat" cmpd="sng" algn="ctr">
-                      <a:solidFill>
-                        <a:schemeClr val="tx1"/>
-                      </a:solidFill>
-                      <a:prstDash val="solid"/>
-                      <a:round/>
-                      <a:headEnd type="none" w="med" len="med"/>
-                      <a:tailEnd type="none" w="med" len="med"/>
-                    </a:lnB>
-                    <a:solidFill>
-                      <a:schemeClr val="bg1"/>
-                    </a:solidFill>
-                  </a:tcPr>
-                </a:tc>
-                <a:tc hMerge="1">
-                  <a:txBody>
-                    <a:bodyPr/>
-                    <a:lstStyle/>
-                    <a:p>
-                      <a:endParaRPr lang="en-US"/>
-                    </a:p>
-                  </a:txBody>
-                  <a:tcPr anchor="b">
-                    <a:lnB w="12700" cap="flat" cmpd="sng" algn="ctr">
-                      <a:solidFill>
-                        <a:schemeClr val="tx1"/>
-                      </a:solidFill>
-                      <a:prstDash val="solid"/>
-                      <a:round/>
-                      <a:headEnd type="none" w="med" len="med"/>
-                      <a:tailEnd type="none" w="med" len="med"/>
-                    </a:lnB>
-                    <a:solidFill>
-                      <a:schemeClr val="bg1"/>
-                    </a:solidFill>
-                  </a:tcPr>
-                </a:tc>
-                <a:tc>
-                  <a:txBody>
-                    <a:bodyPr/>
-                    <a:lstStyle/>
-                    <a:p>
+                      <a:pPr algn="r"/>
                       <a:r>
-                        <a:rPr lang="en-US" sz="800" dirty="0">
+                        <a:rPr lang="en-US" sz="1000" dirty="0">
                           <a:latin typeface="Candara" panose="020E0502030303020204" pitchFamily="34" charset="0"/>
                         </a:rPr>
-                        <a:t>Used?</a:t>
+                        <a:t>Cost</a:t>
                       </a:r>
+                    </a:p>
+                  </a:txBody>
+                  <a:tcPr anchor="b">
+                    <a:lnB w="12700" cap="flat" cmpd="sng" algn="ctr">
+                      <a:solidFill>
+                        <a:schemeClr val="tx1"/>
+                      </a:solidFill>
+                      <a:prstDash val="solid"/>
+                      <a:round/>
+                      <a:headEnd type="none" w="med" len="med"/>
+                      <a:tailEnd type="none" w="med" len="med"/>
+                    </a:lnB>
+                    <a:solidFill>
+                      <a:schemeClr val="bg1"/>
+                    </a:solidFill>
+                  </a:tcPr>
+                </a:tc>
+                <a:tc hMerge="1">
+                  <a:txBody>
+                    <a:bodyPr/>
+                    <a:lstStyle/>
+                    <a:p>
+                      <a:endParaRPr lang="en-US"/>
+                    </a:p>
+                  </a:txBody>
+                  <a:tcPr/>
+                </a:tc>
+                <a:tc hMerge="1">
+                  <a:txBody>
+                    <a:bodyPr/>
+                    <a:lstStyle/>
+                    <a:p>
+                      <a:endParaRPr lang="en-US"/>
+                    </a:p>
+                  </a:txBody>
+                  <a:tcPr anchor="b">
+                    <a:lnB w="12700" cap="flat" cmpd="sng" algn="ctr">
+                      <a:solidFill>
+                        <a:schemeClr val="tx1"/>
+                      </a:solidFill>
+                      <a:prstDash val="solid"/>
+                      <a:round/>
+                      <a:headEnd type="none" w="med" len="med"/>
+                      <a:tailEnd type="none" w="med" len="med"/>
+                    </a:lnB>
+                    <a:solidFill>
+                      <a:schemeClr val="bg1"/>
+                    </a:solidFill>
+                  </a:tcPr>
+                </a:tc>
+                <a:tc hMerge="1">
+                  <a:txBody>
+                    <a:bodyPr/>
+                    <a:lstStyle/>
+                    <a:p>
+                      <a:endParaRPr lang="en-US"/>
+                    </a:p>
+                  </a:txBody>
+                  <a:tcPr anchor="b">
+                    <a:lnB w="12700" cap="flat" cmpd="sng" algn="ctr">
+                      <a:solidFill>
+                        <a:schemeClr val="tx1"/>
+                      </a:solidFill>
+                      <a:prstDash val="solid"/>
+                      <a:round/>
+                      <a:headEnd type="none" w="med" len="med"/>
+                      <a:tailEnd type="none" w="med" len="med"/>
+                    </a:lnB>
+                    <a:solidFill>
+                      <a:schemeClr val="bg1"/>
+                    </a:solidFill>
+                  </a:tcPr>
+                </a:tc>
+                <a:tc hMerge="1">
+                  <a:txBody>
+                    <a:bodyPr/>
+                    <a:lstStyle/>
+                    <a:p>
+                      <a:endParaRPr lang="en-US"/>
+                    </a:p>
+                  </a:txBody>
+                  <a:tcPr anchor="b">
+                    <a:lnB w="12700" cap="flat" cmpd="sng" algn="ctr">
+                      <a:solidFill>
+                        <a:schemeClr val="tx1"/>
+                      </a:solidFill>
+                      <a:prstDash val="solid"/>
+                      <a:round/>
+                      <a:headEnd type="none" w="med" len="med"/>
+                      <a:tailEnd type="none" w="med" len="med"/>
+                    </a:lnB>
+                    <a:solidFill>
+                      <a:schemeClr val="bg1"/>
+                    </a:solidFill>
+                  </a:tcPr>
+                </a:tc>
+                <a:tc>
+                  <a:txBody>
+                    <a:bodyPr/>
+                    <a:lstStyle/>
+                    <a:p>
+                      <a:endParaRPr lang="en-US" sz="800" dirty="0">
+                        <a:latin typeface="Candara" panose="020E0502030303020204" pitchFamily="34" charset="0"/>
+                      </a:endParaRPr>
                     </a:p>
                   </a:txBody>
                   <a:tcPr anchor="b">
@@ -9046,10 +9071,10 @@
                     <a:p>
                       <a:pPr algn="l"/>
                       <a:r>
-                        <a:rPr lang="en-US" sz="1000">
+                        <a:rPr lang="en-US" sz="1000" dirty="0">
                           <a:latin typeface="Candara" panose="020E0502030303020204" pitchFamily="34" charset="0"/>
                         </a:rPr>
-                        <a:t>Use to help or hinder. First use is free.</a:t>
+                        <a:t>Use to help or hinder.</a:t>
                       </a:r>
                     </a:p>
                   </a:txBody>
@@ -9135,9 +9160,13 @@
                     <a:bodyPr/>
                     <a:lstStyle/>
                     <a:p>
-                      <a:endParaRPr lang="en-US" sz="1000" dirty="0">
-                        <a:latin typeface="Candara" panose="020E0502030303020204" pitchFamily="34" charset="0"/>
-                      </a:endParaRPr>
+                      <a:pPr algn="r"/>
+                      <a:r>
+                        <a:rPr lang="en-US" sz="1000" dirty="0">
+                          <a:latin typeface="Candara" panose="020E0502030303020204" pitchFamily="34" charset="0"/>
+                        </a:rPr>
+                        <a:t>Cost</a:t>
+                      </a:r>
                     </a:p>
                   </a:txBody>
                   <a:tcPr anchor="b">
@@ -9292,44 +9321,41 @@
                         <a:tabLst/>
                         <a:defRPr/>
                       </a:pPr>
-                      <a:r>
-                        <a:rPr lang="en-US" sz="800" dirty="0">
-                          <a:latin typeface="Candara" panose="020E0502030303020204" pitchFamily="34" charset="0"/>
-                        </a:rPr>
-                        <a:t>Used?</a:t>
-                      </a:r>
-                    </a:p>
-                  </a:txBody>
-                  <a:tcPr anchor="b">
-                    <a:lnT w="12700" cap="flat" cmpd="sng" algn="ctr">
-                      <a:solidFill>
-                        <a:schemeClr val="tx1"/>
-                      </a:solidFill>
-                      <a:prstDash val="solid"/>
-                      <a:round/>
-                      <a:headEnd type="none" w="med" len="med"/>
-                      <a:tailEnd type="none" w="med" len="med"/>
-                    </a:lnT>
-                    <a:lnB w="12700" cap="flat" cmpd="sng" algn="ctr">
-                      <a:solidFill>
-                        <a:schemeClr val="tx1"/>
-                      </a:solidFill>
-                      <a:prstDash val="solid"/>
-                      <a:round/>
-                      <a:headEnd type="none" w="med" len="med"/>
-                      <a:tailEnd type="none" w="med" len="med"/>
-                    </a:lnB>
-                    <a:solidFill>
-                      <a:schemeClr val="bg1"/>
-                    </a:solidFill>
-                  </a:tcPr>
-                </a:tc>
-                <a:tc>
-                  <a:txBody>
-                    <a:bodyPr/>
-                    <a:lstStyle/>
-                    <a:p>
-                      <a:endParaRPr lang="en-US" sz="1000">
+                      <a:endParaRPr lang="en-US" sz="800" dirty="0">
+                        <a:latin typeface="Candara" panose="020E0502030303020204" pitchFamily="34" charset="0"/>
+                      </a:endParaRPr>
+                    </a:p>
+                  </a:txBody>
+                  <a:tcPr anchor="b">
+                    <a:lnT w="12700" cap="flat" cmpd="sng" algn="ctr">
+                      <a:solidFill>
+                        <a:schemeClr val="tx1"/>
+                      </a:solidFill>
+                      <a:prstDash val="solid"/>
+                      <a:round/>
+                      <a:headEnd type="none" w="med" len="med"/>
+                      <a:tailEnd type="none" w="med" len="med"/>
+                    </a:lnT>
+                    <a:lnB w="12700" cap="flat" cmpd="sng" algn="ctr">
+                      <a:solidFill>
+                        <a:schemeClr val="tx1"/>
+                      </a:solidFill>
+                      <a:prstDash val="solid"/>
+                      <a:round/>
+                      <a:headEnd type="none" w="med" len="med"/>
+                      <a:tailEnd type="none" w="med" len="med"/>
+                    </a:lnB>
+                    <a:solidFill>
+                      <a:schemeClr val="bg1"/>
+                    </a:solidFill>
+                  </a:tcPr>
+                </a:tc>
+                <a:tc>
+                  <a:txBody>
+                    <a:bodyPr/>
+                    <a:lstStyle/>
+                    <a:p>
+                      <a:endParaRPr lang="en-US" sz="1000" dirty="0">
                         <a:latin typeface="Candara" panose="020E0502030303020204" pitchFamily="34" charset="0"/>
                       </a:endParaRPr>
                     </a:p>
@@ -9702,9 +9728,13 @@
                     <a:bodyPr/>
                     <a:lstStyle/>
                     <a:p>
-                      <a:endParaRPr lang="en-US" sz="1000" dirty="0">
-                        <a:latin typeface="Candara" panose="020E0502030303020204" pitchFamily="34" charset="0"/>
-                      </a:endParaRPr>
+                      <a:pPr algn="r"/>
+                      <a:r>
+                        <a:rPr lang="en-US" sz="1000" dirty="0">
+                          <a:latin typeface="Candara" panose="020E0502030303020204" pitchFamily="34" charset="0"/>
+                        </a:rPr>
+                        <a:t>Cost</a:t>
+                      </a:r>
                     </a:p>
                   </a:txBody>
                   <a:tcPr anchor="b">
@@ -9782,15 +9812,23 @@
                     </a:p>
                   </a:txBody>
                   <a:tcPr>
-                    <a:lnT w="12700">
-                      <a:solidFill>
-                        <a:schemeClr val="tx1"/>
-                      </a:solidFill>
-                    </a:lnT>
-                    <a:lnB w="12700">
-                      <a:solidFill>
-                        <a:schemeClr val="tx1"/>
-                      </a:solidFill>
+                    <a:lnT w="12700" cap="flat" cmpd="sng" algn="ctr">
+                      <a:solidFill>
+                        <a:schemeClr val="tx1"/>
+                      </a:solidFill>
+                      <a:prstDash val="solid"/>
+                      <a:round/>
+                      <a:headEnd type="none" w="med" len="med"/>
+                      <a:tailEnd type="none" w="med" len="med"/>
+                    </a:lnT>
+                    <a:lnB w="12700" cap="flat" cmpd="sng" algn="ctr">
+                      <a:solidFill>
+                        <a:schemeClr val="tx1"/>
+                      </a:solidFill>
+                      <a:prstDash val="solid"/>
+                      <a:round/>
+                      <a:headEnd type="none" w="med" len="med"/>
+                      <a:tailEnd type="none" w="med" len="med"/>
                     </a:lnB>
                     <a:solidFill>
                       <a:schemeClr val="bg1"/>
@@ -9806,15 +9844,23 @@
                     </a:p>
                   </a:txBody>
                   <a:tcPr>
-                    <a:lnT w="12700">
-                      <a:solidFill>
-                        <a:schemeClr val="tx1"/>
-                      </a:solidFill>
-                    </a:lnT>
-                    <a:lnB w="12700">
-                      <a:solidFill>
-                        <a:schemeClr val="tx1"/>
-                      </a:solidFill>
+                    <a:lnT w="12700" cap="flat" cmpd="sng" algn="ctr">
+                      <a:solidFill>
+                        <a:schemeClr val="tx1"/>
+                      </a:solidFill>
+                      <a:prstDash val="solid"/>
+                      <a:round/>
+                      <a:headEnd type="none" w="med" len="med"/>
+                      <a:tailEnd type="none" w="med" len="med"/>
+                    </a:lnT>
+                    <a:lnB w="12700" cap="flat" cmpd="sng" algn="ctr">
+                      <a:solidFill>
+                        <a:schemeClr val="tx1"/>
+                      </a:solidFill>
+                      <a:prstDash val="solid"/>
+                      <a:round/>
+                      <a:headEnd type="none" w="med" len="med"/>
+                      <a:tailEnd type="none" w="med" len="med"/>
                     </a:lnB>
                     <a:solidFill>
                       <a:schemeClr val="bg1"/>
@@ -9843,61 +9889,58 @@
                         <a:tabLst/>
                         <a:defRPr/>
                       </a:pPr>
+                      <a:endParaRPr lang="en-US" sz="800" dirty="0">
+                        <a:latin typeface="Candara" panose="020E0502030303020204" pitchFamily="34" charset="0"/>
+                      </a:endParaRPr>
+                    </a:p>
+                  </a:txBody>
+                  <a:tcPr anchor="b">
+                    <a:lnT w="12700" cap="flat" cmpd="sng" algn="ctr">
+                      <a:solidFill>
+                        <a:schemeClr val="tx1"/>
+                      </a:solidFill>
+                      <a:prstDash val="solid"/>
+                      <a:round/>
+                      <a:headEnd type="none" w="med" len="med"/>
+                      <a:tailEnd type="none" w="med" len="med"/>
+                    </a:lnT>
+                    <a:lnB w="12700" cap="flat" cmpd="sng" algn="ctr">
+                      <a:solidFill>
+                        <a:schemeClr val="tx1"/>
+                      </a:solidFill>
+                      <a:prstDash val="solid"/>
+                      <a:round/>
+                      <a:headEnd type="none" w="med" len="med"/>
+                      <a:tailEnd type="none" w="med" len="med"/>
+                    </a:lnB>
+                    <a:solidFill>
+                      <a:schemeClr val="bg1"/>
+                    </a:solidFill>
+                  </a:tcPr>
+                </a:tc>
+                <a:tc>
+                  <a:txBody>
+                    <a:bodyPr/>
+                    <a:lstStyle/>
+                    <a:p>
+                      <a:endParaRPr lang="en-US" sz="1000">
+                        <a:latin typeface="Candara" panose="020E0502030303020204" pitchFamily="34" charset="0"/>
+                      </a:endParaRPr>
+                    </a:p>
+                  </a:txBody>
+                  <a:tcPr anchor="b">
+                    <a:solidFill>
+                      <a:schemeClr val="bg1"/>
+                    </a:solidFill>
+                  </a:tcPr>
+                </a:tc>
+                <a:tc gridSpan="3">
+                  <a:txBody>
+                    <a:bodyPr/>
+                    <a:lstStyle/>
+                    <a:p>
                       <a:r>
-                        <a:rPr lang="en-US" sz="800" dirty="0">
-                          <a:latin typeface="Candara" panose="020E0502030303020204" pitchFamily="34" charset="0"/>
-                        </a:rPr>
-                        <a:t>Used?</a:t>
-                      </a:r>
-                    </a:p>
-                  </a:txBody>
-                  <a:tcPr anchor="b">
-                    <a:lnT w="12700" cap="flat" cmpd="sng" algn="ctr">
-                      <a:solidFill>
-                        <a:schemeClr val="tx1"/>
-                      </a:solidFill>
-                      <a:prstDash val="solid"/>
-                      <a:round/>
-                      <a:headEnd type="none" w="med" len="med"/>
-                      <a:tailEnd type="none" w="med" len="med"/>
-                    </a:lnT>
-                    <a:lnB w="12700" cap="flat" cmpd="sng" algn="ctr">
-                      <a:solidFill>
-                        <a:schemeClr val="tx1"/>
-                      </a:solidFill>
-                      <a:prstDash val="solid"/>
-                      <a:round/>
-                      <a:headEnd type="none" w="med" len="med"/>
-                      <a:tailEnd type="none" w="med" len="med"/>
-                    </a:lnB>
-                    <a:solidFill>
-                      <a:schemeClr val="bg1"/>
-                    </a:solidFill>
-                  </a:tcPr>
-                </a:tc>
-                <a:tc>
-                  <a:txBody>
-                    <a:bodyPr/>
-                    <a:lstStyle/>
-                    <a:p>
-                      <a:endParaRPr lang="en-US" sz="1000">
-                        <a:latin typeface="Candara" panose="020E0502030303020204" pitchFamily="34" charset="0"/>
-                      </a:endParaRPr>
-                    </a:p>
-                  </a:txBody>
-                  <a:tcPr anchor="b">
-                    <a:solidFill>
-                      <a:schemeClr val="bg1"/>
-                    </a:solidFill>
-                  </a:tcPr>
-                </a:tc>
-                <a:tc gridSpan="3">
-                  <a:txBody>
-                    <a:bodyPr/>
-                    <a:lstStyle/>
-                    <a:p>
-                      <a:r>
-                        <a:rPr lang="en-US" sz="1000">
+                        <a:rPr lang="en-US" sz="1000" dirty="0">
                           <a:latin typeface="Candara" panose="020E0502030303020204" pitchFamily="34" charset="0"/>
                         </a:rPr>
                         <a:t>Fatigue:</a:t>
@@ -10042,7 +10085,7 @@
                     <a:lstStyle/>
                     <a:p>
                       <a:r>
-                        <a:rPr lang="en-US" sz="1000">
+                        <a:rPr lang="en-US" sz="1000" dirty="0">
                           <a:latin typeface="Candara" panose="020E0502030303020204" pitchFamily="34" charset="0"/>
                         </a:rPr>
                         <a:t>Desperation:</a:t>
@@ -10861,7 +10904,7 @@
                     <a:lstStyle/>
                     <a:p>
                       <a:pPr algn="r"/>
-                      <a:endParaRPr lang="en-US" sz="1000">
+                      <a:endParaRPr lang="en-US" sz="1000" dirty="0">
                         <a:latin typeface="Candara" panose="020E0502030303020204" pitchFamily="34" charset="0"/>
                       </a:endParaRPr>
                     </a:p>
@@ -11234,10 +11277,10 @@
                     <a:p>
                       <a:pPr algn="l"/>
                       <a:r>
-                        <a:rPr lang="en-US" sz="1000" b="0">
+                        <a:rPr lang="en-US" sz="1000" b="0" dirty="0">
                           <a:latin typeface="Candara" panose="020E0502030303020204" pitchFamily="34" charset="0"/>
                         </a:rPr>
-                        <a:t>2d6 + skill vs Target Num. Advantage caps at +2 and applies to the roll. Disadvantage caps at +2 and applies to the TN.</a:t>
+                        <a:t>2d6 + skill vs Target Num. Advantage and disadvantage cancel out 1 for 1, then cap at +2/-2.</a:t>
                       </a:r>
                     </a:p>
                   </a:txBody>
@@ -11353,7 +11396,7 @@
                     <a:lstStyle/>
                     <a:p>
                       <a:pPr algn="r"/>
-                      <a:endParaRPr lang="en-US" sz="1000">
+                      <a:endParaRPr lang="en-US" sz="1000" dirty="0">
                         <a:latin typeface="Candara" panose="020E0502030303020204" pitchFamily="34" charset="0"/>
                       </a:endParaRPr>
                     </a:p>
@@ -11407,7 +11450,7 @@
                     <a:bodyPr/>
                     <a:lstStyle/>
                     <a:p>
-                      <a:endParaRPr lang="en-US" sz="1000">
+                      <a:endParaRPr lang="en-US" sz="1000" dirty="0">
                         <a:latin typeface="Candara" panose="020E0502030303020204" pitchFamily="34" charset="0"/>
                       </a:endParaRPr>
                     </a:p>
@@ -11793,7 +11836,7 @@
                     <a:lstStyle/>
                     <a:p>
                       <a:pPr algn="r"/>
-                      <a:endParaRPr lang="en-US" sz="1000">
+                      <a:endParaRPr lang="en-US" sz="1000" dirty="0">
                         <a:latin typeface="Candara" panose="020E0502030303020204" pitchFamily="34" charset="0"/>
                       </a:endParaRPr>
                     </a:p>
@@ -11962,7 +12005,7 @@
                     <a:bodyPr/>
                     <a:lstStyle/>
                     <a:p>
-                      <a:endParaRPr lang="en-US" sz="1000">
+                      <a:endParaRPr lang="en-US" sz="1000" dirty="0">
                         <a:latin typeface="Candara" panose="020E0502030303020204" pitchFamily="34" charset="0"/>
                       </a:endParaRPr>
                     </a:p>
@@ -12399,28 +12442,25 @@
                     <a:p>
                       <a:pPr algn="r"/>
                       <a:r>
-                        <a:rPr lang="en-US" sz="1000">
+                        <a:rPr lang="en-US" sz="1000" dirty="0">
                           <a:latin typeface="Candara" panose="020E0502030303020204" pitchFamily="34" charset="0"/>
                         </a:rPr>
                         <a:t>Survival</a:t>
                       </a:r>
+                    </a:p>
+                  </a:txBody>
+                  <a:tcPr anchor="b">
+                    <a:solidFill>
+                      <a:schemeClr val="bg1"/>
+                    </a:solidFill>
+                  </a:tcPr>
+                </a:tc>
+                <a:tc>
+                  <a:txBody>
+                    <a:bodyPr/>
+                    <a:lstStyle/>
+                    <a:p>
                       <a:endParaRPr lang="en-US" sz="1000" dirty="0">
-                        <a:latin typeface="Candara" panose="020E0502030303020204" pitchFamily="34" charset="0"/>
-                      </a:endParaRPr>
-                    </a:p>
-                  </a:txBody>
-                  <a:tcPr anchor="b">
-                    <a:solidFill>
-                      <a:schemeClr val="bg1"/>
-                    </a:solidFill>
-                  </a:tcPr>
-                </a:tc>
-                <a:tc>
-                  <a:txBody>
-                    <a:bodyPr/>
-                    <a:lstStyle/>
-                    <a:p>
-                      <a:endParaRPr lang="en-US" sz="1000">
                         <a:latin typeface="Candara" panose="020E0502030303020204" pitchFamily="34" charset="0"/>
                       </a:endParaRPr>
                     </a:p>
@@ -12806,7 +12846,7 @@
                     <a:lstStyle/>
                     <a:p>
                       <a:pPr algn="r"/>
-                      <a:endParaRPr lang="en-US" sz="1000">
+                      <a:endParaRPr lang="en-US" sz="1000" dirty="0">
                         <a:latin typeface="Candara" panose="020E0502030303020204" pitchFamily="34" charset="0"/>
                       </a:endParaRPr>
                     </a:p>
@@ -12871,7 +12911,7 @@
                     <a:lstStyle/>
                     <a:p>
                       <a:pPr algn="r"/>
-                      <a:endParaRPr lang="en-US" sz="1000">
+                      <a:endParaRPr lang="en-US" sz="1000" dirty="0">
                         <a:latin typeface="Candara" panose="020E0502030303020204" pitchFamily="34" charset="0"/>
                       </a:endParaRPr>
                     </a:p>
@@ -12925,46 +12965,46 @@
                     <a:bodyPr/>
                     <a:lstStyle/>
                     <a:p>
+                      <a:endParaRPr lang="en-US" sz="1000" dirty="0">
+                        <a:latin typeface="Candara" panose="020E0502030303020204" pitchFamily="34" charset="0"/>
+                      </a:endParaRPr>
+                    </a:p>
+                  </a:txBody>
+                  <a:tcPr anchor="b">
+                    <a:lnT w="12700" cap="flat" cmpd="sng" algn="ctr">
+                      <a:solidFill>
+                        <a:schemeClr val="tx1"/>
+                      </a:solidFill>
+                      <a:prstDash val="solid"/>
+                      <a:round/>
+                      <a:headEnd type="none" w="med" len="med"/>
+                      <a:tailEnd type="none" w="med" len="med"/>
+                    </a:lnT>
+                    <a:lnB w="12700" cap="flat" cmpd="sng" algn="ctr">
+                      <a:solidFill>
+                        <a:schemeClr val="tx1"/>
+                      </a:solidFill>
+                      <a:prstDash val="solid"/>
+                      <a:round/>
+                      <a:headEnd type="none" w="med" len="med"/>
+                      <a:tailEnd type="none" w="med" len="med"/>
+                    </a:lnB>
+                    <a:solidFill>
+                      <a:schemeClr val="bg1"/>
+                    </a:solidFill>
+                  </a:tcPr>
+                </a:tc>
+                <a:tc>
+                  <a:txBody>
+                    <a:bodyPr/>
+                    <a:lstStyle/>
+                    <a:p>
                       <a:endParaRPr lang="en-US" sz="1000">
                         <a:latin typeface="Candara" panose="020E0502030303020204" pitchFamily="34" charset="0"/>
                       </a:endParaRPr>
                     </a:p>
                   </a:txBody>
                   <a:tcPr anchor="b">
-                    <a:lnT w="12700" cap="flat" cmpd="sng" algn="ctr">
-                      <a:solidFill>
-                        <a:schemeClr val="tx1"/>
-                      </a:solidFill>
-                      <a:prstDash val="solid"/>
-                      <a:round/>
-                      <a:headEnd type="none" w="med" len="med"/>
-                      <a:tailEnd type="none" w="med" len="med"/>
-                    </a:lnT>
-                    <a:lnB w="12700" cap="flat" cmpd="sng" algn="ctr">
-                      <a:solidFill>
-                        <a:schemeClr val="tx1"/>
-                      </a:solidFill>
-                      <a:prstDash val="solid"/>
-                      <a:round/>
-                      <a:headEnd type="none" w="med" len="med"/>
-                      <a:tailEnd type="none" w="med" len="med"/>
-                    </a:lnB>
-                    <a:solidFill>
-                      <a:schemeClr val="bg1"/>
-                    </a:solidFill>
-                  </a:tcPr>
-                </a:tc>
-                <a:tc>
-                  <a:txBody>
-                    <a:bodyPr/>
-                    <a:lstStyle/>
-                    <a:p>
-                      <a:endParaRPr lang="en-US" sz="1000">
-                        <a:latin typeface="Candara" panose="020E0502030303020204" pitchFamily="34" charset="0"/>
-                      </a:endParaRPr>
-                    </a:p>
-                  </a:txBody>
-                  <a:tcPr anchor="b">
                     <a:solidFill>
                       <a:schemeClr val="bg1"/>
                     </a:solidFill>
@@ -12975,7 +13015,7 @@
                     <a:bodyPr/>
                     <a:lstStyle/>
                     <a:p>
-                      <a:endParaRPr lang="en-US" sz="1000">
+                      <a:endParaRPr lang="en-US" sz="1000" dirty="0">
                         <a:latin typeface="Candara" panose="020E0502030303020204" pitchFamily="34" charset="0"/>
                       </a:endParaRPr>
                     </a:p>
@@ -13109,7 +13149,7 @@
                     <a:bodyPr/>
                     <a:lstStyle/>
                     <a:p>
-                      <a:endParaRPr lang="en-US" sz="1000">
+                      <a:endParaRPr lang="en-US" sz="1000" dirty="0">
                         <a:latin typeface="Candara" panose="020E0502030303020204" pitchFamily="34" charset="0"/>
                       </a:endParaRPr>
                     </a:p>
@@ -13431,17 +13471,20 @@
                     </a:p>
                   </a:txBody>
                   <a:tcPr anchor="b">
-                    <a:solidFill>
-                      <a:schemeClr val="bg1"/>
-                    </a:solidFill>
-                  </a:tcPr>
-                </a:tc>
-                <a:tc>
-                  <a:txBody>
-                    <a:bodyPr/>
-                    <a:lstStyle/>
-                    <a:p>
-                      <a:endParaRPr lang="en-US" sz="1000">
+                    <a:lnL w="12700" cmpd="sng">
+                      <a:noFill/>
+                    </a:lnL>
+                    <a:solidFill>
+                      <a:schemeClr val="bg1"/>
+                    </a:solidFill>
+                  </a:tcPr>
+                </a:tc>
+                <a:tc>
+                  <a:txBody>
+                    <a:bodyPr/>
+                    <a:lstStyle/>
+                    <a:p>
+                      <a:endParaRPr lang="en-US" sz="1000" dirty="0">
                         <a:latin typeface="Candara" panose="020E0502030303020204" pitchFamily="34" charset="0"/>
                       </a:endParaRPr>
                     </a:p>
@@ -13834,7 +13877,7 @@
                     <a:lstStyle/>
                     <a:p>
                       <a:pPr algn="r"/>
-                      <a:endParaRPr lang="en-US" sz="1000">
+                      <a:endParaRPr lang="en-US" sz="1000" dirty="0">
                         <a:latin typeface="Candara" panose="020E0502030303020204" pitchFamily="34" charset="0"/>
                       </a:endParaRPr>
                     </a:p>
@@ -14525,7 +14568,7 @@
                     <a:lstStyle/>
                     <a:p>
                       <a:pPr algn="l"/>
-                      <a:endParaRPr lang="en-US" sz="1000">
+                      <a:endParaRPr lang="en-US" sz="1000" dirty="0">
                         <a:latin typeface="Candara" panose="020E0502030303020204" pitchFamily="34" charset="0"/>
                       </a:endParaRPr>
                     </a:p>
@@ -15720,14 +15763,14 @@
           <p:nvPr>
             <p:extLst>
               <p:ext uri="{D42A27DB-BD31-4B8C-83A1-F6EECF244321}">
-                <p14:modId xmlns:p14="http://schemas.microsoft.com/office/powerpoint/2010/main" val="508574510"/>
+                <p14:modId xmlns:p14="http://schemas.microsoft.com/office/powerpoint/2010/main" val="2105983109"/>
               </p:ext>
             </p:extLst>
           </p:nvPr>
         </p:nvGraphicFramePr>
         <p:xfrm>
           <a:off x="0" y="0"/>
-          <a:ext cx="10067545" cy="7772400"/>
+          <a:ext cx="10093201" cy="7772400"/>
         </p:xfrm>
         <a:graphic>
           <a:graphicData uri="http://schemas.openxmlformats.org/drawingml/2006/table">
@@ -15736,21 +15779,21 @@
                 <a:tableStyleId>{5C22544A-7EE6-4342-B048-85BDC9FD1C3A}</a:tableStyleId>
               </a:tblPr>
               <a:tblGrid>
-                <a:gridCol w="457200">
+                <a:gridCol w="456952">
                   <a:extLst>
                     <a:ext uri="{9D8B030D-6E8A-4147-A177-3AD203B41FA5}">
                       <a16:colId xmlns:a16="http://schemas.microsoft.com/office/drawing/2014/main" val="1874856429"/>
                     </a:ext>
                   </a:extLst>
                 </a:gridCol>
-                <a:gridCol w="914400">
+                <a:gridCol w="913904">
                   <a:extLst>
                     <a:ext uri="{9D8B030D-6E8A-4147-A177-3AD203B41FA5}">
                       <a16:colId xmlns:a16="http://schemas.microsoft.com/office/drawing/2014/main" val="2513422332"/>
                     </a:ext>
                   </a:extLst>
                 </a:gridCol>
-                <a:gridCol w="745200">
+                <a:gridCol w="744796">
                   <a:extLst>
                     <a:ext uri="{9D8B030D-6E8A-4147-A177-3AD203B41FA5}">
                       <a16:colId xmlns:a16="http://schemas.microsoft.com/office/drawing/2014/main" val="1674740716"/>
@@ -15764,7 +15807,7 @@
                     </a:ext>
                   </a:extLst>
                 </a:gridCol>
-                <a:gridCol w="228600">
+                <a:gridCol w="257202">
                   <a:extLst>
                     <a:ext uri="{9D8B030D-6E8A-4147-A177-3AD203B41FA5}">
                       <a16:colId xmlns:a16="http://schemas.microsoft.com/office/drawing/2014/main" val="3634899011"/>
@@ -15778,28 +15821,28 @@
                     </a:ext>
                   </a:extLst>
                 </a:gridCol>
-                <a:gridCol w="923194">
+                <a:gridCol w="922692">
                   <a:extLst>
                     <a:ext uri="{9D8B030D-6E8A-4147-A177-3AD203B41FA5}">
                       <a16:colId xmlns:a16="http://schemas.microsoft.com/office/drawing/2014/main" val="3612141449"/>
                     </a:ext>
                   </a:extLst>
                 </a:gridCol>
-                <a:gridCol w="1015863">
+                <a:gridCol w="1015311">
                   <a:extLst>
                     <a:ext uri="{9D8B030D-6E8A-4147-A177-3AD203B41FA5}">
                       <a16:colId xmlns:a16="http://schemas.microsoft.com/office/drawing/2014/main" val="201885679"/>
                     </a:ext>
                   </a:extLst>
                 </a:gridCol>
-                <a:gridCol w="914400">
+                <a:gridCol w="913904">
                   <a:extLst>
                     <a:ext uri="{9D8B030D-6E8A-4147-A177-3AD203B41FA5}">
                       <a16:colId xmlns:a16="http://schemas.microsoft.com/office/drawing/2014/main" val="422781345"/>
                     </a:ext>
                   </a:extLst>
                 </a:gridCol>
-                <a:gridCol w="457200">
+                <a:gridCol w="456952">
                   <a:extLst>
                     <a:ext uri="{9D8B030D-6E8A-4147-A177-3AD203B41FA5}">
                       <a16:colId xmlns:a16="http://schemas.microsoft.com/office/drawing/2014/main" val="2958780628"/>
@@ -16110,9 +16153,12 @@
                     <a:bodyPr/>
                     <a:lstStyle/>
                     <a:p>
-                      <a:endParaRPr lang="en-US" sz="1000">
-                        <a:latin typeface="Candara" panose="020E0502030303020204" pitchFamily="34" charset="0"/>
-                      </a:endParaRPr>
+                      <a:r>
+                        <a:rPr lang="en-US" sz="1000" dirty="0">
+                          <a:latin typeface="Candara" panose="020E0502030303020204" pitchFamily="34" charset="0"/>
+                        </a:rPr>
+                        <a:t>1</a:t>
+                      </a:r>
                     </a:p>
                   </a:txBody>
                   <a:tcPr anchor="b">
@@ -16275,17 +16321,8 @@
                         <a:rPr lang="en-US" sz="1000" dirty="0">
                           <a:latin typeface="Candara" panose="020E0502030303020204" pitchFamily="34" charset="0"/>
                         </a:rPr>
-                        <a:t>Held items are on the front of </a:t>
+                        <a:t>Held items are on the front of the sheet.</a:t>
                       </a:r>
-                      <a:r>
-                        <a:rPr lang="en-US" sz="1000">
-                          <a:latin typeface="Candara" panose="020E0502030303020204" pitchFamily="34" charset="0"/>
-                        </a:rPr>
-                        <a:t>the sheet.</a:t>
-                      </a:r>
-                      <a:endParaRPr lang="en-US" sz="1000" dirty="0">
-                        <a:latin typeface="Candara" panose="020E0502030303020204" pitchFamily="34" charset="0"/>
-                      </a:endParaRPr>
                     </a:p>
                   </a:txBody>
                   <a:tcPr>
@@ -16420,9 +16457,12 @@
                     <a:bodyPr/>
                     <a:lstStyle/>
                     <a:p>
-                      <a:endParaRPr lang="en-US" sz="1000">
-                        <a:latin typeface="Candara" panose="020E0502030303020204" pitchFamily="34" charset="0"/>
-                      </a:endParaRPr>
+                      <a:r>
+                        <a:rPr lang="en-US" sz="1000" dirty="0">
+                          <a:latin typeface="Candara" panose="020E0502030303020204" pitchFamily="34" charset="0"/>
+                        </a:rPr>
+                        <a:t>2</a:t>
+                      </a:r>
                     </a:p>
                   </a:txBody>
                   <a:tcPr anchor="b">
@@ -16564,43 +16604,19 @@
                     <a:p>
                       <a:pPr algn="l"/>
                       <a:r>
-                        <a:rPr lang="en-US" sz="1000">
+                        <a:rPr lang="en-US" sz="1000" dirty="0">
                           <a:latin typeface="Candara" panose="020E0502030303020204" pitchFamily="34" charset="0"/>
                         </a:rPr>
-                        <a:t>Can hold up to (Sorcery skill level) spell slots in memory. The rest must be stored in </a:t>
+                        <a:t>Can hold up to (Sorcery skill level) spell slots in memory. The rest must be stored in spellbooks. Put “Storage: Mem” for spells in memory, then give each spellbook a short id, such as a number, symbol, </a:t>
                       </a:r>
                       <a:r>
-                        <a:rPr lang="en-US" sz="1000" err="1">
-                          <a:latin typeface="Candara" panose="020E0502030303020204" pitchFamily="34" charset="0"/>
-                        </a:rPr>
-                        <a:t>spellbooks</a:t>
-                      </a:r>
-                      <a:r>
-                        <a:rPr lang="en-US" sz="1000">
-                          <a:latin typeface="Candara" panose="020E0502030303020204" pitchFamily="34" charset="0"/>
-                        </a:rPr>
-                        <a:t>. Put “Storage: Mem” for spells in memory, then give each </a:t>
-                      </a:r>
-                      <a:r>
-                        <a:rPr lang="en-US" sz="1000" err="1">
-                          <a:latin typeface="Candara" panose="020E0502030303020204" pitchFamily="34" charset="0"/>
-                        </a:rPr>
-                        <a:t>spellbook</a:t>
-                      </a:r>
-                      <a:r>
-                        <a:rPr lang="en-US" sz="1000">
-                          <a:latin typeface="Candara" panose="020E0502030303020204" pitchFamily="34" charset="0"/>
-                        </a:rPr>
-                        <a:t> a short id, such as a number, symbol, </a:t>
-                      </a:r>
-                      <a:r>
-                        <a:rPr lang="en-US" sz="1000" err="1">
+                        <a:rPr lang="en-US" sz="1000" dirty="0" err="1">
                           <a:latin typeface="Candara" panose="020E0502030303020204" pitchFamily="34" charset="0"/>
                         </a:rPr>
                         <a:t>etc</a:t>
                       </a:r>
                       <a:r>
-                        <a:rPr lang="en-US" sz="1000">
+                        <a:rPr lang="en-US" sz="1000" dirty="0">
                           <a:latin typeface="Candara" panose="020E0502030303020204" pitchFamily="34" charset="0"/>
                         </a:rPr>
                         <a:t>, and put “Storage: &lt;id&gt;” on spells in books.</a:t>
@@ -16723,9 +16739,13 @@
                     <a:bodyPr/>
                     <a:lstStyle/>
                     <a:p>
-                      <a:endParaRPr lang="en-US" sz="1000" dirty="0">
-                        <a:latin typeface="Candara" panose="020E0502030303020204" pitchFamily="34" charset="0"/>
-                      </a:endParaRPr>
+                      <a:pPr algn="r"/>
+                      <a:r>
+                        <a:rPr lang="en-US" sz="1000" dirty="0">
+                          <a:latin typeface="Candara" panose="020E0502030303020204" pitchFamily="34" charset="0"/>
+                        </a:rPr>
+                        <a:t>1</a:t>
+                      </a:r>
                     </a:p>
                   </a:txBody>
                   <a:tcPr anchor="b">
@@ -16790,9 +16810,12 @@
                     <a:bodyPr/>
                     <a:lstStyle/>
                     <a:p>
-                      <a:endParaRPr lang="en-US" sz="1000">
-                        <a:latin typeface="Candara" panose="020E0502030303020204" pitchFamily="34" charset="0"/>
-                      </a:endParaRPr>
+                      <a:r>
+                        <a:rPr lang="en-US" sz="1000" dirty="0">
+                          <a:latin typeface="Candara" panose="020E0502030303020204" pitchFamily="34" charset="0"/>
+                        </a:rPr>
+                        <a:t>3</a:t>
+                      </a:r>
                     </a:p>
                   </a:txBody>
                   <a:tcPr anchor="b">
@@ -17014,9 +17037,13 @@
                     <a:bodyPr/>
                     <a:lstStyle/>
                     <a:p>
-                      <a:endParaRPr lang="en-US" sz="1000" dirty="0">
-                        <a:latin typeface="Candara" panose="020E0502030303020204" pitchFamily="34" charset="0"/>
-                      </a:endParaRPr>
+                      <a:pPr algn="r"/>
+                      <a:r>
+                        <a:rPr lang="en-US" sz="1000" dirty="0">
+                          <a:latin typeface="Candara" panose="020E0502030303020204" pitchFamily="34" charset="0"/>
+                        </a:rPr>
+                        <a:t>2</a:t>
+                      </a:r>
                     </a:p>
                   </a:txBody>
                   <a:tcPr anchor="b">
@@ -17081,9 +17108,12 @@
                     <a:bodyPr/>
                     <a:lstStyle/>
                     <a:p>
-                      <a:endParaRPr lang="en-US" sz="1000">
-                        <a:latin typeface="Candara" panose="020E0502030303020204" pitchFamily="34" charset="0"/>
-                      </a:endParaRPr>
+                      <a:r>
+                        <a:rPr lang="en-US" sz="1000" dirty="0">
+                          <a:latin typeface="Candara" panose="020E0502030303020204" pitchFamily="34" charset="0"/>
+                        </a:rPr>
+                        <a:t>4</a:t>
+                      </a:r>
                     </a:p>
                   </a:txBody>
                   <a:tcPr anchor="b">
@@ -17339,9 +17369,13 @@
                     <a:bodyPr/>
                     <a:lstStyle/>
                     <a:p>
-                      <a:endParaRPr lang="en-US" sz="1000" dirty="0">
-                        <a:latin typeface="Candara" panose="020E0502030303020204" pitchFamily="34" charset="0"/>
-                      </a:endParaRPr>
+                      <a:pPr algn="r"/>
+                      <a:r>
+                        <a:rPr lang="en-US" sz="1000" dirty="0">
+                          <a:latin typeface="Candara" panose="020E0502030303020204" pitchFamily="34" charset="0"/>
+                        </a:rPr>
+                        <a:t>3</a:t>
+                      </a:r>
                     </a:p>
                   </a:txBody>
                   <a:tcPr anchor="b">
@@ -17406,9 +17440,12 @@
                     <a:bodyPr/>
                     <a:lstStyle/>
                     <a:p>
-                      <a:endParaRPr lang="en-US" sz="1000">
-                        <a:latin typeface="Candara" panose="020E0502030303020204" pitchFamily="34" charset="0"/>
-                      </a:endParaRPr>
+                      <a:r>
+                        <a:rPr lang="en-US" sz="1000" dirty="0">
+                          <a:latin typeface="Candara" panose="020E0502030303020204" pitchFamily="34" charset="0"/>
+                        </a:rPr>
+                        <a:t>5</a:t>
+                      </a:r>
                     </a:p>
                   </a:txBody>
                   <a:tcPr anchor="b">
@@ -17630,9 +17667,13 @@
                     <a:bodyPr/>
                     <a:lstStyle/>
                     <a:p>
-                      <a:endParaRPr lang="en-US" sz="1000">
-                        <a:latin typeface="Candara" panose="020E0502030303020204" pitchFamily="34" charset="0"/>
-                      </a:endParaRPr>
+                      <a:pPr algn="r"/>
+                      <a:r>
+                        <a:rPr lang="en-US" sz="1000" dirty="0">
+                          <a:latin typeface="Candara" panose="020E0502030303020204" pitchFamily="34" charset="0"/>
+                        </a:rPr>
+                        <a:t>4</a:t>
+                      </a:r>
                     </a:p>
                   </a:txBody>
                   <a:tcPr anchor="b">
@@ -17697,9 +17738,12 @@
                     <a:bodyPr/>
                     <a:lstStyle/>
                     <a:p>
-                      <a:endParaRPr lang="en-US" sz="1000">
-                        <a:latin typeface="Candara" panose="020E0502030303020204" pitchFamily="34" charset="0"/>
-                      </a:endParaRPr>
+                      <a:r>
+                        <a:rPr lang="en-US" sz="1000" dirty="0">
+                          <a:latin typeface="Candara" panose="020E0502030303020204" pitchFamily="34" charset="0"/>
+                        </a:rPr>
+                        <a:t>6</a:t>
+                      </a:r>
                     </a:p>
                   </a:txBody>
                   <a:tcPr anchor="b">
@@ -17955,9 +17999,13 @@
                     <a:bodyPr/>
                     <a:lstStyle/>
                     <a:p>
-                      <a:endParaRPr lang="en-US" sz="1000" dirty="0">
-                        <a:latin typeface="Candara" panose="020E0502030303020204" pitchFamily="34" charset="0"/>
-                      </a:endParaRPr>
+                      <a:pPr algn="r"/>
+                      <a:r>
+                        <a:rPr lang="en-US" sz="1000" dirty="0">
+                          <a:latin typeface="Candara" panose="020E0502030303020204" pitchFamily="34" charset="0"/>
+                        </a:rPr>
+                        <a:t>5</a:t>
+                      </a:r>
                     </a:p>
                   </a:txBody>
                   <a:tcPr anchor="b">
@@ -18022,9 +18070,12 @@
                     <a:bodyPr/>
                     <a:lstStyle/>
                     <a:p>
-                      <a:endParaRPr lang="en-US" sz="1000">
-                        <a:latin typeface="Candara" panose="020E0502030303020204" pitchFamily="34" charset="0"/>
-                      </a:endParaRPr>
+                      <a:r>
+                        <a:rPr lang="en-US" sz="1000" dirty="0">
+                          <a:latin typeface="Candara" panose="020E0502030303020204" pitchFamily="34" charset="0"/>
+                        </a:rPr>
+                        <a:t>7</a:t>
+                      </a:r>
                     </a:p>
                   </a:txBody>
                   <a:tcPr anchor="b">
@@ -18246,9 +18297,13 @@
                     <a:bodyPr/>
                     <a:lstStyle/>
                     <a:p>
-                      <a:endParaRPr lang="en-US" sz="1000" dirty="0">
-                        <a:latin typeface="Candara" panose="020E0502030303020204" pitchFamily="34" charset="0"/>
-                      </a:endParaRPr>
+                      <a:pPr algn="r"/>
+                      <a:r>
+                        <a:rPr lang="en-US" sz="1000" dirty="0">
+                          <a:latin typeface="Candara" panose="020E0502030303020204" pitchFamily="34" charset="0"/>
+                        </a:rPr>
+                        <a:t>6</a:t>
+                      </a:r>
                     </a:p>
                   </a:txBody>
                   <a:tcPr anchor="b">
@@ -18313,9 +18368,12 @@
                     <a:bodyPr/>
                     <a:lstStyle/>
                     <a:p>
-                      <a:endParaRPr lang="en-US" sz="1000" dirty="0">
-                        <a:latin typeface="Candara" panose="020E0502030303020204" pitchFamily="34" charset="0"/>
-                      </a:endParaRPr>
+                      <a:r>
+                        <a:rPr lang="en-US" sz="1000" dirty="0">
+                          <a:latin typeface="Candara" panose="020E0502030303020204" pitchFamily="34" charset="0"/>
+                        </a:rPr>
+                        <a:t>8</a:t>
+                      </a:r>
                     </a:p>
                   </a:txBody>
                   <a:tcPr anchor="b">
@@ -18571,9 +18629,13 @@
                     <a:bodyPr/>
                     <a:lstStyle/>
                     <a:p>
-                      <a:endParaRPr lang="en-US" sz="1000" dirty="0">
-                        <a:latin typeface="Candara" panose="020E0502030303020204" pitchFamily="34" charset="0"/>
-                      </a:endParaRPr>
+                      <a:pPr algn="r"/>
+                      <a:r>
+                        <a:rPr lang="en-US" sz="1000" dirty="0">
+                          <a:latin typeface="Candara" panose="020E0502030303020204" pitchFamily="34" charset="0"/>
+                        </a:rPr>
+                        <a:t>7</a:t>
+                      </a:r>
                     </a:p>
                   </a:txBody>
                   <a:tcPr anchor="b">
@@ -18638,9 +18700,12 @@
                     <a:bodyPr/>
                     <a:lstStyle/>
                     <a:p>
-                      <a:endParaRPr lang="en-US" sz="1000" dirty="0">
-                        <a:latin typeface="Candara" panose="020E0502030303020204" pitchFamily="34" charset="0"/>
-                      </a:endParaRPr>
+                      <a:r>
+                        <a:rPr lang="en-US" sz="1000" dirty="0">
+                          <a:latin typeface="Candara" panose="020E0502030303020204" pitchFamily="34" charset="0"/>
+                        </a:rPr>
+                        <a:t>9</a:t>
+                      </a:r>
                     </a:p>
                   </a:txBody>
                   <a:tcPr anchor="b">
@@ -18862,9 +18927,13 @@
                     <a:bodyPr/>
                     <a:lstStyle/>
                     <a:p>
-                      <a:endParaRPr lang="en-US" sz="1000">
-                        <a:latin typeface="Candara" panose="020E0502030303020204" pitchFamily="34" charset="0"/>
-                      </a:endParaRPr>
+                      <a:pPr algn="r"/>
+                      <a:r>
+                        <a:rPr lang="en-US" sz="1000" dirty="0">
+                          <a:latin typeface="Candara" panose="020E0502030303020204" pitchFamily="34" charset="0"/>
+                        </a:rPr>
+                        <a:t>8</a:t>
+                      </a:r>
                     </a:p>
                   </a:txBody>
                   <a:tcPr anchor="b">
@@ -18929,9 +18998,12 @@
                     <a:bodyPr/>
                     <a:lstStyle/>
                     <a:p>
-                      <a:endParaRPr lang="en-US" sz="1000">
-                        <a:latin typeface="Candara" panose="020E0502030303020204" pitchFamily="34" charset="0"/>
-                      </a:endParaRPr>
+                      <a:r>
+                        <a:rPr lang="en-US" sz="1000" dirty="0">
+                          <a:latin typeface="Candara" panose="020E0502030303020204" pitchFamily="34" charset="0"/>
+                        </a:rPr>
+                        <a:t>10</a:t>
+                      </a:r>
                     </a:p>
                   </a:txBody>
                   <a:tcPr anchor="b">
@@ -19187,9 +19259,13 @@
                     <a:bodyPr/>
                     <a:lstStyle/>
                     <a:p>
-                      <a:endParaRPr lang="en-US" sz="1000" dirty="0">
-                        <a:latin typeface="Candara" panose="020E0502030303020204" pitchFamily="34" charset="0"/>
-                      </a:endParaRPr>
+                      <a:pPr algn="r"/>
+                      <a:r>
+                        <a:rPr lang="en-US" sz="1000" dirty="0">
+                          <a:latin typeface="Candara" panose="020E0502030303020204" pitchFamily="34" charset="0"/>
+                        </a:rPr>
+                        <a:t>9</a:t>
+                      </a:r>
                     </a:p>
                   </a:txBody>
                   <a:tcPr anchor="b">
@@ -19254,9 +19330,12 @@
                     <a:bodyPr/>
                     <a:lstStyle/>
                     <a:p>
-                      <a:endParaRPr lang="en-US" sz="1000" dirty="0">
-                        <a:latin typeface="Candara" panose="020E0502030303020204" pitchFamily="34" charset="0"/>
-                      </a:endParaRPr>
+                      <a:r>
+                        <a:rPr lang="en-US" sz="1000" dirty="0">
+                          <a:latin typeface="Candara" panose="020E0502030303020204" pitchFamily="34" charset="0"/>
+                        </a:rPr>
+                        <a:t>11</a:t>
+                      </a:r>
                     </a:p>
                   </a:txBody>
                   <a:tcPr anchor="b">
@@ -19478,9 +19557,13 @@
                     <a:bodyPr/>
                     <a:lstStyle/>
                     <a:p>
-                      <a:endParaRPr lang="en-US" sz="1000">
-                        <a:latin typeface="Candara" panose="020E0502030303020204" pitchFamily="34" charset="0"/>
-                      </a:endParaRPr>
+                      <a:pPr algn="r"/>
+                      <a:r>
+                        <a:rPr lang="en-US" sz="1000" dirty="0">
+                          <a:latin typeface="Candara" panose="020E0502030303020204" pitchFamily="34" charset="0"/>
+                        </a:rPr>
+                        <a:t>10</a:t>
+                      </a:r>
                     </a:p>
                   </a:txBody>
                   <a:tcPr anchor="b">
@@ -19545,9 +19628,12 @@
                     <a:bodyPr/>
                     <a:lstStyle/>
                     <a:p>
-                      <a:endParaRPr lang="en-US" sz="1000" dirty="0">
-                        <a:latin typeface="Candara" panose="020E0502030303020204" pitchFamily="34" charset="0"/>
-                      </a:endParaRPr>
+                      <a:r>
+                        <a:rPr lang="en-US" sz="1000" dirty="0">
+                          <a:latin typeface="Candara" panose="020E0502030303020204" pitchFamily="34" charset="0"/>
+                        </a:rPr>
+                        <a:t>12</a:t>
+                      </a:r>
                     </a:p>
                   </a:txBody>
                   <a:tcPr anchor="b">
@@ -19827,7 +19913,7 @@
                     <a:bodyPr/>
                     <a:lstStyle/>
                     <a:p>
-                      <a:endParaRPr lang="en-US" sz="1000">
+                      <a:endParaRPr lang="en-US" sz="1000" dirty="0">
                         <a:latin typeface="Candara" panose="020E0502030303020204" pitchFamily="34" charset="0"/>
                       </a:endParaRPr>
                     </a:p>
@@ -19855,7 +19941,17 @@
                       <a:endParaRPr lang="en-US"/>
                     </a:p>
                   </a:txBody>
-                  <a:tcPr/>
+                  <a:tcPr>
+                    <a:lnT w="12700" cap="flat" cmpd="sng" algn="ctr">
+                      <a:solidFill>
+                        <a:schemeClr val="tx1"/>
+                      </a:solidFill>
+                      <a:prstDash val="solid"/>
+                      <a:round/>
+                      <a:headEnd type="none" w="med" len="med"/>
+                      <a:tailEnd type="none" w="med" len="med"/>
+                    </a:lnT>
+                  </a:tcPr>
                 </a:tc>
                 <a:tc hMerge="1">
                   <a:txBody>
@@ -19928,7 +20024,7 @@
                     <a:bodyPr/>
                     <a:lstStyle/>
                     <a:p>
-                      <a:pPr algn="l"/>
+                      <a:pPr algn="ctr"/>
                       <a:r>
                         <a:rPr lang="en-US" sz="1600" b="1" kern="1200" dirty="0">
                           <a:solidFill>
@@ -20013,9 +20109,24 @@
                     </a:p>
                   </a:txBody>
                   <a:tcPr anchor="b">
-                    <a:lnL w="12700" cmpd="sng">
-                      <a:noFill/>
+                    <a:lnL w="12700" cap="flat" cmpd="sng" algn="ctr">
+                      <a:solidFill>
+                        <a:schemeClr val="tx1"/>
+                      </a:solidFill>
+                      <a:prstDash val="solid"/>
+                      <a:round/>
+                      <a:headEnd type="none" w="med" len="med"/>
+                      <a:tailEnd type="none" w="med" len="med"/>
                     </a:lnL>
+                    <a:lnT w="12700" cap="flat" cmpd="sng" algn="ctr">
+                      <a:solidFill>
+                        <a:schemeClr val="tx1"/>
+                      </a:solidFill>
+                      <a:prstDash val="solid"/>
+                      <a:round/>
+                      <a:headEnd type="none" w="med" len="med"/>
+                      <a:tailEnd type="none" w="med" len="med"/>
+                    </a:lnT>
                     <a:lnB w="12700" cap="flat" cmpd="sng" algn="ctr">
                       <a:solidFill>
                         <a:schemeClr val="tx1"/>
@@ -20079,23 +20190,23 @@
                     <a:lstStyle/>
                     <a:p>
                       <a:pPr algn="ctr"/>
-                      <a:endParaRPr lang="en-US" sz="1000">
-                        <a:latin typeface="Candara" panose="020E0502030303020204" pitchFamily="34" charset="0"/>
-                      </a:endParaRPr>
-                    </a:p>
-                  </a:txBody>
-                  <a:tcPr anchor="b">
-                    <a:solidFill>
-                      <a:schemeClr val="bg1"/>
-                    </a:solidFill>
-                  </a:tcPr>
-                </a:tc>
-                <a:tc>
-                  <a:txBody>
-                    <a:bodyPr/>
-                    <a:lstStyle/>
-                    <a:p>
-                      <a:endParaRPr lang="en-US" sz="1000">
+                      <a:endParaRPr lang="en-US" sz="1000" dirty="0">
+                        <a:latin typeface="Candara" panose="020E0502030303020204" pitchFamily="34" charset="0"/>
+                      </a:endParaRPr>
+                    </a:p>
+                  </a:txBody>
+                  <a:tcPr anchor="b">
+                    <a:solidFill>
+                      <a:schemeClr val="bg1"/>
+                    </a:solidFill>
+                  </a:tcPr>
+                </a:tc>
+                <a:tc>
+                  <a:txBody>
+                    <a:bodyPr/>
+                    <a:lstStyle/>
+                    <a:p>
+                      <a:endParaRPr lang="en-US" sz="1000" dirty="0">
                         <a:latin typeface="Candara" panose="020E0502030303020204" pitchFamily="34" charset="0"/>
                       </a:endParaRPr>
                     </a:p>
@@ -20118,7 +20229,7 @@
                     <a:bodyPr/>
                     <a:lstStyle/>
                     <a:p>
-                      <a:endParaRPr lang="en-US" sz="1000">
+                      <a:endParaRPr lang="en-US" sz="1000" dirty="0">
                         <a:latin typeface="Candara" panose="020E0502030303020204" pitchFamily="34" charset="0"/>
                       </a:endParaRPr>
                     </a:p>
@@ -20129,21 +20240,36 @@
                     </a:solidFill>
                   </a:tcPr>
                 </a:tc>
-                <a:tc>
-                  <a:txBody>
-                    <a:bodyPr/>
-                    <a:lstStyle/>
-                    <a:p>
-                      <a:pPr algn="l"/>
+                <a:tc rowSpan="2">
+                  <a:txBody>
+                    <a:bodyPr/>
+                    <a:lstStyle/>
+                    <a:p>
+                      <a:pPr algn="ctr"/>
+                      <a:r>
+                        <a:rPr lang="en-US" sz="1000" b="1" dirty="0">
+                          <a:latin typeface="Candara" panose="020E0502030303020204" pitchFamily="34" charset="0"/>
+                        </a:rPr>
+                        <a:t>XP earned</a:t>
+                      </a:r>
+                    </a:p>
+                    <a:p>
+                      <a:pPr algn="ctr"/>
+                      <a:endParaRPr lang="en-US" sz="1000" dirty="0">
+                        <a:latin typeface="Candara" panose="020E0502030303020204" pitchFamily="34" charset="0"/>
+                      </a:endParaRPr>
+                    </a:p>
+                    <a:p>
+                      <a:pPr algn="ctr"/>
                       <a:r>
                         <a:rPr lang="en-US" sz="1000" dirty="0">
                           <a:latin typeface="Candara" panose="020E0502030303020204" pitchFamily="34" charset="0"/>
                         </a:rPr>
-                        <a:t>XP: ____</a:t>
+                        <a:t>_________</a:t>
                       </a:r>
                     </a:p>
                   </a:txBody>
-                  <a:tcPr>
+                  <a:tcPr anchor="ctr" anchorCtr="1">
                     <a:lnR w="12700" cmpd="sng">
                       <a:noFill/>
                     </a:lnR>
@@ -20216,9 +20342,6 @@
                     </a:p>
                   </a:txBody>
                   <a:tcPr anchor="b">
-                    <a:lnL w="12700" cmpd="sng">
-                      <a:noFill/>
-                    </a:lnL>
                     <a:lnT w="12700" cap="flat" cmpd="sng" algn="ctr">
                       <a:solidFill>
                         <a:schemeClr val="tx1"/>
@@ -20300,7 +20423,7 @@
                     <a:lstStyle/>
                     <a:p>
                       <a:pPr algn="ctr"/>
-                      <a:endParaRPr lang="en-US" sz="1000">
+                      <a:endParaRPr lang="en-US" sz="1000" dirty="0">
                         <a:latin typeface="Candara" panose="020E0502030303020204" pitchFamily="34" charset="0"/>
                       </a:endParaRPr>
                     </a:p>
@@ -20350,13 +20473,13 @@
                     </a:solidFill>
                   </a:tcPr>
                 </a:tc>
-                <a:tc>
+                <a:tc vMerge="1">
                   <a:txBody>
                     <a:bodyPr/>
                     <a:lstStyle/>
                     <a:p>
                       <a:pPr algn="l"/>
-                      <a:endParaRPr lang="en-US" sz="1000">
+                      <a:endParaRPr lang="en-US" sz="1000" dirty="0">
                         <a:latin typeface="Candara" panose="020E0502030303020204" pitchFamily="34" charset="0"/>
                       </a:endParaRPr>
                     </a:p>
@@ -20434,9 +20557,6 @@
                     </a:p>
                   </a:txBody>
                   <a:tcPr anchor="b">
-                    <a:lnL w="12700" cmpd="sng">
-                      <a:noFill/>
-                    </a:lnL>
                     <a:lnT w="12700" cap="flat" cmpd="sng" algn="ctr">
                       <a:solidFill>
                         <a:schemeClr val="tx1"/>
@@ -20568,18 +20688,52 @@
                     </a:solidFill>
                   </a:tcPr>
                 </a:tc>
-                <a:tc>
-                  <a:txBody>
-                    <a:bodyPr/>
-                    <a:lstStyle/>
-                    <a:p>
-                      <a:pPr algn="l"/>
-                      <a:endParaRPr lang="en-US" sz="1000">
-                        <a:latin typeface="Candara" panose="020E0502030303020204" pitchFamily="34" charset="0"/>
-                      </a:endParaRPr>
-                    </a:p>
-                  </a:txBody>
-                  <a:tcPr>
+                <a:tc rowSpan="2">
+                  <a:txBody>
+                    <a:bodyPr/>
+                    <a:lstStyle/>
+                    <a:p>
+                      <a:pPr algn="ctr"/>
+                      <a:r>
+                        <a:rPr lang="en-US" sz="1000" b="1" dirty="0">
+                          <a:latin typeface="Candara" panose="020E0502030303020204" pitchFamily="34" charset="0"/>
+                        </a:rPr>
+                        <a:t>XP spent</a:t>
+                      </a:r>
+                    </a:p>
+                    <a:p>
+                      <a:pPr algn="ctr"/>
+                      <a:endParaRPr lang="en-US" sz="1000" dirty="0">
+                        <a:latin typeface="Candara" panose="020E0502030303020204" pitchFamily="34" charset="0"/>
+                      </a:endParaRPr>
+                    </a:p>
+                    <a:p>
+                      <a:pPr marL="0" marR="0" lvl="0" indent="0" algn="ctr" defTabSz="1005840" rtl="0" eaLnBrk="1" fontAlgn="auto" latinLnBrk="0" hangingPunct="1">
+                        <a:lnSpc>
+                          <a:spcPct val="100000"/>
+                        </a:lnSpc>
+                        <a:spcBef>
+                          <a:spcPts val="0"/>
+                        </a:spcBef>
+                        <a:spcAft>
+                          <a:spcPts val="0"/>
+                        </a:spcAft>
+                        <a:buClrTx/>
+                        <a:buSzTx/>
+                        <a:buFontTx/>
+                        <a:buNone/>
+                        <a:tabLst/>
+                        <a:defRPr/>
+                      </a:pPr>
+                      <a:r>
+                        <a:rPr lang="en-US" sz="1000" dirty="0">
+                          <a:latin typeface="Candara" panose="020E0502030303020204" pitchFamily="34" charset="0"/>
+                        </a:rPr>
+                        <a:t>_________</a:t>
+                      </a:r>
+                    </a:p>
+                  </a:txBody>
+                  <a:tcPr anchor="ctr" anchorCtr="1">
                     <a:lnR w="12700" cmpd="sng">
                       <a:noFill/>
                     </a:lnR>
@@ -20593,7 +20747,7 @@
                     <a:bodyPr/>
                     <a:lstStyle/>
                     <a:p>
-                      <a:endParaRPr lang="en-US" sz="1000">
+                      <a:endParaRPr lang="en-US" sz="1000" dirty="0">
                         <a:latin typeface="Candara" panose="020E0502030303020204" pitchFamily="34" charset="0"/>
                       </a:endParaRPr>
                     </a:p>
@@ -20652,9 +20806,6 @@
                     </a:p>
                   </a:txBody>
                   <a:tcPr anchor="b">
-                    <a:lnL w="12700" cmpd="sng">
-                      <a:noFill/>
-                    </a:lnL>
                     <a:lnT w="12700" cap="flat" cmpd="sng" algn="ctr">
                       <a:solidFill>
                         <a:schemeClr val="tx1"/>
@@ -20786,13 +20937,13 @@
                     </a:solidFill>
                   </a:tcPr>
                 </a:tc>
-                <a:tc>
+                <a:tc vMerge="1">
                   <a:txBody>
                     <a:bodyPr/>
                     <a:lstStyle/>
                     <a:p>
                       <a:pPr algn="l"/>
-                      <a:endParaRPr lang="en-US" sz="1000">
+                      <a:endParaRPr lang="en-US" sz="1000" dirty="0">
                         <a:latin typeface="Candara" panose="020E0502030303020204" pitchFamily="34" charset="0"/>
                       </a:endParaRPr>
                     </a:p>
@@ -20811,7 +20962,7 @@
                     <a:bodyPr/>
                     <a:lstStyle/>
                     <a:p>
-                      <a:endParaRPr lang="en-US" sz="1000">
+                      <a:endParaRPr lang="en-US" sz="1000" dirty="0">
                         <a:latin typeface="Candara" panose="020E0502030303020204" pitchFamily="34" charset="0"/>
                       </a:endParaRPr>
                     </a:p>
@@ -20870,9 +21021,6 @@
                     </a:p>
                   </a:txBody>
                   <a:tcPr anchor="b">
-                    <a:lnL w="12700" cmpd="sng">
-                      <a:noFill/>
-                    </a:lnL>
                     <a:lnT w="12700" cap="flat" cmpd="sng" algn="ctr">
                       <a:solidFill>
                         <a:schemeClr val="tx1"/>
@@ -21009,7 +21157,7 @@
                     <a:bodyPr/>
                     <a:lstStyle/>
                     <a:p>
-                      <a:endParaRPr lang="en-US" sz="1000">
+                      <a:endParaRPr lang="en-US" sz="1000" dirty="0">
                         <a:latin typeface="Candara" panose="020E0502030303020204" pitchFamily="34" charset="0"/>
                       </a:endParaRPr>
                     </a:p>

</xml_diff>

<commit_message>
Added held items back.
</commit_message>
<xml_diff>
--- a/Ikaros CS.pptx
+++ b/Ikaros CS.pptx
@@ -126,18 +126,18 @@
   <pc:docChgLst>
     <pc:chgData name="Julia Pitts" userId="6e51b823a05a2cc0" providerId="LiveId" clId="{769B9876-0CC5-4952-8417-BD50DAB03C8C}"/>
     <pc:docChg chg="undo redo custSel addSld delSld modSld">
-      <pc:chgData name="Julia Pitts" userId="6e51b823a05a2cc0" providerId="LiveId" clId="{769B9876-0CC5-4952-8417-BD50DAB03C8C}" dt="2022-01-29T23:01:37.411" v="736"/>
+      <pc:chgData name="Julia Pitts" userId="6e51b823a05a2cc0" providerId="LiveId" clId="{769B9876-0CC5-4952-8417-BD50DAB03C8C}" dt="2022-01-29T23:19:59.653" v="756" actId="20577"/>
       <pc:docMkLst>
         <pc:docMk/>
       </pc:docMkLst>
       <pc:sldChg chg="modSp mod">
-        <pc:chgData name="Julia Pitts" userId="6e51b823a05a2cc0" providerId="LiveId" clId="{769B9876-0CC5-4952-8417-BD50DAB03C8C}" dt="2022-01-29T23:01:37.411" v="736"/>
+        <pc:chgData name="Julia Pitts" userId="6e51b823a05a2cc0" providerId="LiveId" clId="{769B9876-0CC5-4952-8417-BD50DAB03C8C}" dt="2022-01-29T23:19:59.653" v="756" actId="20577"/>
         <pc:sldMkLst>
           <pc:docMk/>
           <pc:sldMk cId="1783378883" sldId="256"/>
         </pc:sldMkLst>
         <pc:graphicFrameChg chg="mod modGraphic">
-          <ac:chgData name="Julia Pitts" userId="6e51b823a05a2cc0" providerId="LiveId" clId="{769B9876-0CC5-4952-8417-BD50DAB03C8C}" dt="2022-01-29T23:01:37.411" v="736"/>
+          <ac:chgData name="Julia Pitts" userId="6e51b823a05a2cc0" providerId="LiveId" clId="{769B9876-0CC5-4952-8417-BD50DAB03C8C}" dt="2022-01-29T23:19:59.653" v="756" actId="20577"/>
           <ac:graphicFrameMkLst>
             <pc:docMk/>
             <pc:sldMk cId="1783378883" sldId="256"/>
@@ -6465,14 +6465,14 @@
           <p:nvPr>
             <p:extLst>
               <p:ext uri="{D42A27DB-BD31-4B8C-83A1-F6EECF244321}">
-                <p14:modId xmlns:p14="http://schemas.microsoft.com/office/powerpoint/2010/main" val="3831775553"/>
+                <p14:modId xmlns:p14="http://schemas.microsoft.com/office/powerpoint/2010/main" val="644290269"/>
               </p:ext>
             </p:extLst>
           </p:nvPr>
         </p:nvGraphicFramePr>
         <p:xfrm>
           <a:off x="262287" y="269457"/>
-          <a:ext cx="9311424" cy="6954087"/>
+          <a:ext cx="9311424" cy="6988621"/>
         </p:xfrm>
         <a:graphic>
           <a:graphicData uri="http://schemas.openxmlformats.org/drawingml/2006/table">
@@ -6756,14 +6756,19 @@
                         </a:rPr>
                         <a:t>Weapon</a:t>
                       </a:r>
-                      <a:endParaRPr lang="en-US" sz="1000" kern="1200" dirty="0">
-                        <a:solidFill>
-                          <a:schemeClr val="dk1"/>
-                        </a:solidFill>
-                        <a:latin typeface="Candara" panose="020E0502030303020204" pitchFamily="34" charset="0"/>
-                        <a:ea typeface="+mn-ea"/>
-                        <a:cs typeface="+mn-cs"/>
-                      </a:endParaRPr>
+                    </a:p>
+                    <a:p>
+                      <a:r>
+                        <a:rPr lang="en-US" sz="1000" kern="1200" dirty="0">
+                          <a:solidFill>
+                            <a:schemeClr val="dk1"/>
+                          </a:solidFill>
+                          <a:latin typeface="Candara" panose="020E0502030303020204" pitchFamily="34" charset="0"/>
+                          <a:ea typeface="+mn-ea"/>
+                          <a:cs typeface="+mn-cs"/>
+                        </a:rPr>
+                        <a:t>(held)</a:t>
+                      </a:r>
                     </a:p>
                   </a:txBody>
                   <a:tcPr anchor="b">
@@ -7245,14 +7250,19 @@
                         </a:rPr>
                         <a:t>Weapon</a:t>
                       </a:r>
-                      <a:endParaRPr lang="en-US" sz="1000" kern="1200" dirty="0">
-                        <a:solidFill>
-                          <a:schemeClr val="dk1"/>
-                        </a:solidFill>
-                        <a:latin typeface="Candara" panose="020E0502030303020204" pitchFamily="34" charset="0"/>
-                        <a:ea typeface="+mn-ea"/>
-                        <a:cs typeface="+mn-cs"/>
-                      </a:endParaRPr>
+                    </a:p>
+                    <a:p>
+                      <a:r>
+                        <a:rPr lang="en-US" sz="1000" kern="1200" dirty="0">
+                          <a:solidFill>
+                            <a:schemeClr val="dk1"/>
+                          </a:solidFill>
+                          <a:latin typeface="Candara" panose="020E0502030303020204" pitchFamily="34" charset="0"/>
+                          <a:ea typeface="+mn-ea"/>
+                          <a:cs typeface="+mn-cs"/>
+                        </a:rPr>
+                        <a:t>(held)</a:t>
+                      </a:r>
                     </a:p>
                   </a:txBody>
                   <a:tcPr anchor="b">
@@ -7827,6 +7837,19 @@
                           <a:latin typeface="Candara" panose="020E0502030303020204" pitchFamily="34" charset="0"/>
                         </a:rPr>
                         <a:t>Weapon</a:t>
+                      </a:r>
+                    </a:p>
+                    <a:p>
+                      <a:r>
+                        <a:rPr lang="en-US" sz="1000" kern="1200">
+                          <a:solidFill>
+                            <a:schemeClr val="dk1"/>
+                          </a:solidFill>
+                          <a:latin typeface="Candara" panose="020E0502030303020204" pitchFamily="34" charset="0"/>
+                          <a:ea typeface="+mn-ea"/>
+                          <a:cs typeface="+mn-cs"/>
+                        </a:rPr>
+                        <a:t>(bag)</a:t>
                       </a:r>
                       <a:endParaRPr lang="en-US" sz="1000" kern="1200" dirty="0">
                         <a:solidFill>

</xml_diff>

<commit_message>
Updated cash yet again.
</commit_message>
<xml_diff>
--- a/Ikaros CS.pptx
+++ b/Ikaros CS.pptx
@@ -116,7 +116,7 @@
 <file path=ppt/revisionInfo.xml><?xml version="1.0" encoding="utf-8"?>
 <p1510:revInfo xmlns:a="http://schemas.openxmlformats.org/drawingml/2006/main" xmlns:r="http://schemas.openxmlformats.org/officeDocument/2006/relationships" xmlns:p1510="http://schemas.microsoft.com/office/powerpoint/2015/10/main">
   <p1510:revLst>
-    <p1510:client id="{769B9876-0CC5-4952-8417-BD50DAB03C8C}" v="50" dt="2022-01-29T23:01:44.645"/>
+    <p1510:client id="{769B9876-0CC5-4952-8417-BD50DAB03C8C}" v="55" dt="2022-01-30T00:17:27.123"/>
   </p1510:revLst>
 </p1510:revInfo>
 </file>
@@ -126,7 +126,7 @@
   <pc:docChgLst>
     <pc:chgData name="Julia Pitts" userId="6e51b823a05a2cc0" providerId="LiveId" clId="{769B9876-0CC5-4952-8417-BD50DAB03C8C}"/>
     <pc:docChg chg="undo redo custSel addSld delSld modSld">
-      <pc:chgData name="Julia Pitts" userId="6e51b823a05a2cc0" providerId="LiveId" clId="{769B9876-0CC5-4952-8417-BD50DAB03C8C}" dt="2022-01-29T23:19:59.653" v="756" actId="20577"/>
+      <pc:chgData name="Julia Pitts" userId="6e51b823a05a2cc0" providerId="LiveId" clId="{769B9876-0CC5-4952-8417-BD50DAB03C8C}" dt="2022-01-30T00:17:26.588" v="859" actId="6549"/>
       <pc:docMkLst>
         <pc:docMk/>
       </pc:docMkLst>
@@ -146,13 +146,13 @@
         </pc:graphicFrameChg>
       </pc:sldChg>
       <pc:sldChg chg="modSp mod">
-        <pc:chgData name="Julia Pitts" userId="6e51b823a05a2cc0" providerId="LiveId" clId="{769B9876-0CC5-4952-8417-BD50DAB03C8C}" dt="2022-01-29T22:53:35.990" v="442" actId="3064"/>
+        <pc:chgData name="Julia Pitts" userId="6e51b823a05a2cc0" providerId="LiveId" clId="{769B9876-0CC5-4952-8417-BD50DAB03C8C}" dt="2022-01-30T00:17:26.588" v="859" actId="6549"/>
         <pc:sldMkLst>
           <pc:docMk/>
           <pc:sldMk cId="1661469233" sldId="257"/>
         </pc:sldMkLst>
         <pc:graphicFrameChg chg="mod modGraphic">
-          <ac:chgData name="Julia Pitts" userId="6e51b823a05a2cc0" providerId="LiveId" clId="{769B9876-0CC5-4952-8417-BD50DAB03C8C}" dt="2022-01-29T22:53:35.990" v="442" actId="3064"/>
+          <ac:chgData name="Julia Pitts" userId="6e51b823a05a2cc0" providerId="LiveId" clId="{769B9876-0CC5-4952-8417-BD50DAB03C8C}" dt="2022-01-30T00:17:26.588" v="859" actId="6549"/>
           <ac:graphicFrameMkLst>
             <pc:docMk/>
             <pc:sldMk cId="1661469233" sldId="257"/>
@@ -15786,7 +15786,7 @@
           <p:nvPr>
             <p:extLst>
               <p:ext uri="{D42A27DB-BD31-4B8C-83A1-F6EECF244321}">
-                <p14:modId xmlns:p14="http://schemas.microsoft.com/office/powerpoint/2010/main" val="2105983109"/>
+                <p14:modId xmlns:p14="http://schemas.microsoft.com/office/powerpoint/2010/main" val="1174256287"/>
               </p:ext>
             </p:extLst>
           </p:nvPr>
@@ -16324,6 +16324,36 @@
                     <a:bodyPr/>
                     <a:lstStyle/>
                     <a:p>
+                      <a:pPr algn="ctr"/>
+                      <a:r>
+                        <a:rPr lang="en-US" sz="1000" b="1" dirty="0">
+                          <a:latin typeface="Candara" panose="020E0502030303020204" pitchFamily="34" charset="0"/>
+                        </a:rPr>
+                        <a:t>Cash</a:t>
+                      </a:r>
+                    </a:p>
+                    <a:p>
+                      <a:pPr algn="ctr"/>
+                      <a:endParaRPr lang="en-US" sz="1000" dirty="0">
+                        <a:latin typeface="Candara" panose="020E0502030303020204" pitchFamily="34" charset="0"/>
+                      </a:endParaRPr>
+                    </a:p>
+                    <a:p>
+                      <a:pPr algn="ctr"/>
+                      <a:r>
+                        <a:rPr lang="en-US" sz="1000" dirty="0">
+                          <a:latin typeface="Candara" panose="020E0502030303020204" pitchFamily="34" charset="0"/>
+                        </a:rPr>
+                        <a:t>_________</a:t>
+                      </a:r>
+                    </a:p>
+                    <a:p>
+                      <a:pPr algn="l"/>
+                      <a:endParaRPr lang="en-US" sz="1000" dirty="0">
+                        <a:latin typeface="Candara" panose="020E0502030303020204" pitchFamily="34" charset="0"/>
+                      </a:endParaRPr>
+                    </a:p>
+                    <a:p>
                       <a:pPr algn="l"/>
                       <a:r>
                         <a:rPr lang="en-US" sz="1000" dirty="0">
@@ -16345,6 +16375,21 @@
                           <a:latin typeface="Candara" panose="020E0502030303020204" pitchFamily="34" charset="0"/>
                         </a:rPr>
                         <a:t>Held items are on the front of the sheet.</a:t>
+                      </a:r>
+                    </a:p>
+                    <a:p>
+                      <a:pPr algn="l"/>
+                      <a:endParaRPr lang="en-US" sz="1000" dirty="0">
+                        <a:latin typeface="Candara" panose="020E0502030303020204" pitchFamily="34" charset="0"/>
+                      </a:endParaRPr>
+                    </a:p>
+                    <a:p>
+                      <a:pPr algn="l"/>
+                      <a:r>
+                        <a:rPr lang="en-US" sz="1000" dirty="0">
+                          <a:latin typeface="Candara" panose="020E0502030303020204" pitchFamily="34" charset="0"/>
+                        </a:rPr>
+                        <a:t>First 250 cash is free, 1 Bulk per 250 (rounded up) after.</a:t>
                       </a:r>
                     </a:p>
                   </a:txBody>

</xml_diff>

<commit_message>
Added Cantrip to the spell list.
</commit_message>
<xml_diff>
--- a/Ikaros CS.pptx
+++ b/Ikaros CS.pptx
@@ -116,7 +116,7 @@
 <file path=ppt/revisionInfo.xml><?xml version="1.0" encoding="utf-8"?>
 <p1510:revInfo xmlns:a="http://schemas.openxmlformats.org/drawingml/2006/main" xmlns:r="http://schemas.openxmlformats.org/officeDocument/2006/relationships" xmlns:p1510="http://schemas.microsoft.com/office/powerpoint/2015/10/main">
   <p1510:revLst>
-    <p1510:client id="{769B9876-0CC5-4952-8417-BD50DAB03C8C}" v="55" dt="2022-01-30T00:17:27.123"/>
+    <p1510:client id="{769B9876-0CC5-4952-8417-BD50DAB03C8C}" v="58" dt="2022-02-07T01:19:12.035"/>
   </p1510:revLst>
 </p1510:revInfo>
 </file>
@@ -126,7 +126,7 @@
   <pc:docChgLst>
     <pc:chgData name="Julia Pitts" userId="6e51b823a05a2cc0" providerId="LiveId" clId="{769B9876-0CC5-4952-8417-BD50DAB03C8C}"/>
     <pc:docChg chg="undo redo custSel addSld delSld modSld">
-      <pc:chgData name="Julia Pitts" userId="6e51b823a05a2cc0" providerId="LiveId" clId="{769B9876-0CC5-4952-8417-BD50DAB03C8C}" dt="2022-01-30T00:17:26.588" v="859" actId="6549"/>
+      <pc:chgData name="Julia Pitts" userId="6e51b823a05a2cc0" providerId="LiveId" clId="{769B9876-0CC5-4952-8417-BD50DAB03C8C}" dt="2022-02-07T01:23:54.040" v="922" actId="404"/>
       <pc:docMkLst>
         <pc:docMk/>
       </pc:docMkLst>
@@ -146,13 +146,13 @@
         </pc:graphicFrameChg>
       </pc:sldChg>
       <pc:sldChg chg="modSp mod">
-        <pc:chgData name="Julia Pitts" userId="6e51b823a05a2cc0" providerId="LiveId" clId="{769B9876-0CC5-4952-8417-BD50DAB03C8C}" dt="2022-01-30T00:17:26.588" v="859" actId="6549"/>
+        <pc:chgData name="Julia Pitts" userId="6e51b823a05a2cc0" providerId="LiveId" clId="{769B9876-0CC5-4952-8417-BD50DAB03C8C}" dt="2022-02-07T01:23:54.040" v="922" actId="404"/>
         <pc:sldMkLst>
           <pc:docMk/>
           <pc:sldMk cId="1661469233" sldId="257"/>
         </pc:sldMkLst>
         <pc:graphicFrameChg chg="mod modGraphic">
-          <ac:chgData name="Julia Pitts" userId="6e51b823a05a2cc0" providerId="LiveId" clId="{769B9876-0CC5-4952-8417-BD50DAB03C8C}" dt="2022-01-30T00:17:26.588" v="859" actId="6549"/>
+          <ac:chgData name="Julia Pitts" userId="6e51b823a05a2cc0" providerId="LiveId" clId="{769B9876-0CC5-4952-8417-BD50DAB03C8C}" dt="2022-02-07T01:23:54.040" v="922" actId="404"/>
           <ac:graphicFrameMkLst>
             <pc:docMk/>
             <pc:sldMk cId="1661469233" sldId="257"/>
@@ -618,7 +618,7 @@
           <a:p>
             <a:fld id="{08882BDC-A680-4764-9A15-E4D7289376AF}" type="datetimeFigureOut">
               <a:rPr lang="en-US" smtClean="0"/>
-              <a:t>1/29/2022</a:t>
+              <a:t>2/6/2022</a:t>
             </a:fld>
             <a:endParaRPr lang="en-US"/>
           </a:p>
@@ -928,7 +928,7 @@
           <a:p>
             <a:fld id="{08882BDC-A680-4764-9A15-E4D7289376AF}" type="datetimeFigureOut">
               <a:rPr lang="en-US" smtClean="0"/>
-              <a:t>1/29/2022</a:t>
+              <a:t>2/6/2022</a:t>
             </a:fld>
             <a:endParaRPr lang="en-US"/>
           </a:p>
@@ -1149,7 +1149,7 @@
           <a:p>
             <a:fld id="{08882BDC-A680-4764-9A15-E4D7289376AF}" type="datetimeFigureOut">
               <a:rPr lang="en-US" smtClean="0"/>
-              <a:t>1/29/2022</a:t>
+              <a:t>2/6/2022</a:t>
             </a:fld>
             <a:endParaRPr lang="en-US"/>
           </a:p>
@@ -1439,7 +1439,7 @@
           <a:p>
             <a:fld id="{08882BDC-A680-4764-9A15-E4D7289376AF}" type="datetimeFigureOut">
               <a:rPr lang="en-US" smtClean="0"/>
-              <a:t>1/29/2022</a:t>
+              <a:t>2/6/2022</a:t>
             </a:fld>
             <a:endParaRPr lang="en-US"/>
           </a:p>
@@ -1892,7 +1892,7 @@
           <a:p>
             <a:fld id="{08882BDC-A680-4764-9A15-E4D7289376AF}" type="datetimeFigureOut">
               <a:rPr lang="en-US" smtClean="0"/>
-              <a:t>1/29/2022</a:t>
+              <a:t>2/6/2022</a:t>
             </a:fld>
             <a:endParaRPr lang="en-US"/>
           </a:p>
@@ -2467,7 +2467,7 @@
           <a:p>
             <a:fld id="{08882BDC-A680-4764-9A15-E4D7289376AF}" type="datetimeFigureOut">
               <a:rPr lang="en-US" smtClean="0"/>
-              <a:t>1/29/2022</a:t>
+              <a:t>2/6/2022</a:t>
             </a:fld>
             <a:endParaRPr lang="en-US"/>
           </a:p>
@@ -3315,7 +3315,7 @@
           <a:p>
             <a:fld id="{08882BDC-A680-4764-9A15-E4D7289376AF}" type="datetimeFigureOut">
               <a:rPr lang="en-US" smtClean="0"/>
-              <a:t>1/29/2022</a:t>
+              <a:t>2/6/2022</a:t>
             </a:fld>
             <a:endParaRPr lang="en-US"/>
           </a:p>
@@ -3518,7 +3518,7 @@
           <a:p>
             <a:fld id="{08882BDC-A680-4764-9A15-E4D7289376AF}" type="datetimeFigureOut">
               <a:rPr lang="en-US" smtClean="0"/>
-              <a:t>1/29/2022</a:t>
+              <a:t>2/6/2022</a:t>
             </a:fld>
             <a:endParaRPr lang="en-US"/>
           </a:p>
@@ -3730,7 +3730,7 @@
           <a:p>
             <a:fld id="{08882BDC-A680-4764-9A15-E4D7289376AF}" type="datetimeFigureOut">
               <a:rPr lang="en-US" smtClean="0"/>
-              <a:t>1/29/2022</a:t>
+              <a:t>2/6/2022</a:t>
             </a:fld>
             <a:endParaRPr lang="en-US"/>
           </a:p>
@@ -3933,7 +3933,7 @@
           <a:p>
             <a:fld id="{08882BDC-A680-4764-9A15-E4D7289376AF}" type="datetimeFigureOut">
               <a:rPr lang="en-US" smtClean="0"/>
-              <a:t>1/29/2022</a:t>
+              <a:t>2/6/2022</a:t>
             </a:fld>
             <a:endParaRPr lang="en-US"/>
           </a:p>
@@ -4212,7 +4212,7 @@
           <a:p>
             <a:fld id="{08882BDC-A680-4764-9A15-E4D7289376AF}" type="datetimeFigureOut">
               <a:rPr lang="en-US" smtClean="0"/>
-              <a:t>1/29/2022</a:t>
+              <a:t>2/6/2022</a:t>
             </a:fld>
             <a:endParaRPr lang="en-US"/>
           </a:p>
@@ -4476,7 +4476,7 @@
           <a:p>
             <a:fld id="{08882BDC-A680-4764-9A15-E4D7289376AF}" type="datetimeFigureOut">
               <a:rPr lang="en-US" smtClean="0"/>
-              <a:t>1/29/2022</a:t>
+              <a:t>2/6/2022</a:t>
             </a:fld>
             <a:endParaRPr lang="en-US"/>
           </a:p>
@@ -4888,7 +4888,7 @@
           <a:p>
             <a:fld id="{08882BDC-A680-4764-9A15-E4D7289376AF}" type="datetimeFigureOut">
               <a:rPr lang="en-US" smtClean="0"/>
-              <a:t>1/29/2022</a:t>
+              <a:t>2/6/2022</a:t>
             </a:fld>
             <a:endParaRPr lang="en-US"/>
           </a:p>
@@ -5035,7 +5035,7 @@
           <a:p>
             <a:fld id="{08882BDC-A680-4764-9A15-E4D7289376AF}" type="datetimeFigureOut">
               <a:rPr lang="en-US" smtClean="0"/>
-              <a:t>1/29/2022</a:t>
+              <a:t>2/6/2022</a:t>
             </a:fld>
             <a:endParaRPr lang="en-US"/>
           </a:p>
@@ -5160,7 +5160,7 @@
           <a:p>
             <a:fld id="{08882BDC-A680-4764-9A15-E4D7289376AF}" type="datetimeFigureOut">
               <a:rPr lang="en-US" smtClean="0"/>
-              <a:t>1/29/2022</a:t>
+              <a:t>2/6/2022</a:t>
             </a:fld>
             <a:endParaRPr lang="en-US"/>
           </a:p>
@@ -5437,7 +5437,7 @@
           <a:p>
             <a:fld id="{08882BDC-A680-4764-9A15-E4D7289376AF}" type="datetimeFigureOut">
               <a:rPr lang="en-US" smtClean="0"/>
-              <a:t>1/29/2022</a:t>
+              <a:t>2/6/2022</a:t>
             </a:fld>
             <a:endParaRPr lang="en-US"/>
           </a:p>
@@ -5747,7 +5747,7 @@
           <a:p>
             <a:fld id="{08882BDC-A680-4764-9A15-E4D7289376AF}" type="datetimeFigureOut">
               <a:rPr lang="en-US" smtClean="0"/>
-              <a:t>1/29/2022</a:t>
+              <a:t>2/6/2022</a:t>
             </a:fld>
             <a:endParaRPr lang="en-US"/>
           </a:p>
@@ -5998,7 +5998,7 @@
           <a:p>
             <a:fld id="{08882BDC-A680-4764-9A15-E4D7289376AF}" type="datetimeFigureOut">
               <a:rPr lang="en-US" smtClean="0"/>
-              <a:t>1/29/2022</a:t>
+              <a:t>2/6/2022</a:t>
             </a:fld>
             <a:endParaRPr lang="en-US"/>
           </a:p>
@@ -15786,7 +15786,7 @@
           <p:nvPr>
             <p:extLst>
               <p:ext uri="{D42A27DB-BD31-4B8C-83A1-F6EECF244321}">
-                <p14:modId xmlns:p14="http://schemas.microsoft.com/office/powerpoint/2010/main" val="1174256287"/>
+                <p14:modId xmlns:p14="http://schemas.microsoft.com/office/powerpoint/2010/main" val="1069723579"/>
               </p:ext>
             </p:extLst>
           </p:nvPr>
@@ -15837,10 +15837,17 @@
                     </a:ext>
                   </a:extLst>
                 </a:gridCol>
-                <a:gridCol w="1608816">
+                <a:gridCol w="316129">
                   <a:extLst>
                     <a:ext uri="{9D8B030D-6E8A-4147-A177-3AD203B41FA5}">
                       <a16:colId xmlns:a16="http://schemas.microsoft.com/office/drawing/2014/main" val="822597698"/>
+                    </a:ext>
+                  </a:extLst>
+                </a:gridCol>
+                <a:gridCol w="1292687">
+                  <a:extLst>
+                    <a:ext uri="{9D8B030D-6E8A-4147-A177-3AD203B41FA5}">
+                      <a16:colId xmlns:a16="http://schemas.microsoft.com/office/drawing/2014/main" val="4052597680"/>
                     </a:ext>
                   </a:extLst>
                 </a:gridCol>
@@ -15951,7 +15958,7 @@
                     </a:solidFill>
                   </a:tcPr>
                 </a:tc>
-                <a:tc gridSpan="3">
+                <a:tc gridSpan="4">
                   <a:txBody>
                     <a:bodyPr/>
                     <a:lstStyle/>
@@ -15966,6 +15973,16 @@
                       <a:schemeClr val="bg1"/>
                     </a:solidFill>
                   </a:tcPr>
+                </a:tc>
+                <a:tc hMerge="1">
+                  <a:txBody>
+                    <a:bodyPr/>
+                    <a:lstStyle/>
+                    <a:p>
+                      <a:endParaRPr lang="en-US"/>
+                    </a:p>
+                  </a:txBody>
+                  <a:tcPr/>
                 </a:tc>
                 <a:tc hMerge="1">
                   <a:txBody>
@@ -16204,12 +16221,16 @@
                     <a:bodyPr/>
                     <a:lstStyle/>
                     <a:p>
+                      <a:pPr algn="ctr"/>
                       <a:r>
-                        <a:rPr lang="en-US" sz="1000">
+                        <a:rPr lang="en-US" sz="1200" i="1" dirty="0">
                           <a:latin typeface="Candara" panose="020E0502030303020204" pitchFamily="34" charset="0"/>
                         </a:rPr>
-                        <a:t>Complexity:</a:t>
+                        <a:t>Cantrip</a:t>
                       </a:r>
+                      <a:endParaRPr lang="en-US" sz="1600" i="1" dirty="0">
+                        <a:latin typeface="Candara" panose="020E0502030303020204" pitchFamily="34" charset="0"/>
+                      </a:endParaRPr>
                     </a:p>
                   </a:txBody>
                   <a:tcPr anchor="b">
@@ -16233,10 +16254,53 @@
                     <a:lstStyle/>
                     <a:p>
                       <a:r>
-                        <a:rPr lang="en-US" sz="1000">
+                        <a:rPr lang="en-US" sz="1000" dirty="0">
                           <a:latin typeface="Candara" panose="020E0502030303020204" pitchFamily="34" charset="0"/>
                         </a:rPr>
-                        <a:t>Storage:</a:t>
+                        <a:t>Complexity: </a:t>
+                      </a:r>
+                      <a:r>
+                        <a:rPr lang="en-US" sz="1000" i="1" dirty="0">
+                          <a:latin typeface="Candara" panose="020E0502030303020204" pitchFamily="34" charset="0"/>
+                        </a:rPr>
+                        <a:t>0</a:t>
+                      </a:r>
+                      <a:endParaRPr lang="en-US" sz="1000" i="1" dirty="0">
+                        <a:latin typeface="Pristina" panose="03060402040406080204" pitchFamily="66" charset="0"/>
+                      </a:endParaRPr>
+                    </a:p>
+                  </a:txBody>
+                  <a:tcPr anchor="b">
+                    <a:lnB w="12700" cap="flat" cmpd="sng" algn="ctr">
+                      <a:solidFill>
+                        <a:schemeClr val="tx1"/>
+                      </a:solidFill>
+                      <a:prstDash val="solid"/>
+                      <a:round/>
+                      <a:headEnd type="none" w="med" len="med"/>
+                      <a:tailEnd type="none" w="med" len="med"/>
+                    </a:lnB>
+                    <a:solidFill>
+                      <a:schemeClr val="bg1"/>
+                    </a:solidFill>
+                  </a:tcPr>
+                </a:tc>
+                <a:tc>
+                  <a:txBody>
+                    <a:bodyPr/>
+                    <a:lstStyle/>
+                    <a:p>
+                      <a:r>
+                        <a:rPr lang="en-US" sz="1000" dirty="0">
+                          <a:latin typeface="Candara" panose="020E0502030303020204" pitchFamily="34" charset="0"/>
+                        </a:rPr>
+                        <a:t>Storage: </a:t>
+                      </a:r>
+                      <a:r>
+                        <a:rPr lang="en-US" sz="1000" i="1" dirty="0">
+                          <a:latin typeface="Candara" panose="020E0502030303020204" pitchFamily="34" charset="0"/>
+                        </a:rPr>
+                        <a:t>mem</a:t>
                       </a:r>
                     </a:p>
                   </a:txBody>
@@ -16458,7 +16522,7 @@
                     <a:bodyPr/>
                     <a:lstStyle/>
                     <a:p>
-                      <a:endParaRPr lang="en-US" sz="1000">
+                      <a:endParaRPr lang="en-US" sz="1000" dirty="0">
                         <a:latin typeface="Candara" panose="020E0502030303020204" pitchFamily="34" charset="0"/>
                       </a:endParaRPr>
                     </a:p>
@@ -16520,7 +16584,7 @@
                     </a:solidFill>
                   </a:tcPr>
                 </a:tc>
-                <a:tc>
+                <a:tc gridSpan="2">
                   <a:txBody>
                     <a:bodyPr/>
                     <a:lstStyle/>
@@ -16556,6 +16620,687 @@
                       <a:schemeClr val="bg1"/>
                     </a:solidFill>
                   </a:tcPr>
+                </a:tc>
+                <a:tc hMerge="1">
+                  <a:txBody>
+                    <a:bodyPr/>
+                    <a:lstStyle/>
+                    <a:p>
+                      <a:endParaRPr lang="en-US"/>
+                    </a:p>
+                  </a:txBody>
+                  <a:tcPr/>
+                </a:tc>
+                <a:tc>
+                  <a:txBody>
+                    <a:bodyPr/>
+                    <a:lstStyle/>
+                    <a:p>
+                      <a:pPr marL="0" marR="0" lvl="0" indent="0" algn="l" defTabSz="1005840" rtl="0" eaLnBrk="1" fontAlgn="auto" latinLnBrk="0" hangingPunct="1">
+                        <a:lnSpc>
+                          <a:spcPct val="100000"/>
+                        </a:lnSpc>
+                        <a:spcBef>
+                          <a:spcPts val="0"/>
+                        </a:spcBef>
+                        <a:spcAft>
+                          <a:spcPts val="0"/>
+                        </a:spcAft>
+                        <a:buClrTx/>
+                        <a:buSzTx/>
+                        <a:buFontTx/>
+                        <a:buNone/>
+                        <a:tabLst/>
+                        <a:defRPr/>
+                      </a:pPr>
+                      <a:r>
+                        <a:rPr lang="en-US" sz="1000" dirty="0">
+                          <a:latin typeface="Candara" panose="020E0502030303020204" pitchFamily="34" charset="0"/>
+                        </a:rPr>
+                        <a:t>Complexity:</a:t>
+                      </a:r>
+                    </a:p>
+                  </a:txBody>
+                  <a:tcPr anchor="b">
+                    <a:lnT w="12700" cap="flat" cmpd="sng" algn="ctr">
+                      <a:solidFill>
+                        <a:schemeClr val="tx1"/>
+                      </a:solidFill>
+                      <a:prstDash val="solid"/>
+                      <a:round/>
+                      <a:headEnd type="none" w="med" len="med"/>
+                      <a:tailEnd type="none" w="med" len="med"/>
+                    </a:lnT>
+                    <a:lnB w="12700" cap="flat" cmpd="sng" algn="ctr">
+                      <a:solidFill>
+                        <a:schemeClr val="tx1"/>
+                      </a:solidFill>
+                      <a:prstDash val="solid"/>
+                      <a:round/>
+                      <a:headEnd type="none" w="med" len="med"/>
+                      <a:tailEnd type="none" w="med" len="med"/>
+                    </a:lnB>
+                    <a:solidFill>
+                      <a:schemeClr val="bg1"/>
+                    </a:solidFill>
+                  </a:tcPr>
+                </a:tc>
+                <a:tc>
+                  <a:txBody>
+                    <a:bodyPr/>
+                    <a:lstStyle/>
+                    <a:p>
+                      <a:pPr marL="0" marR="0" lvl="0" indent="0" algn="l" defTabSz="1005840" rtl="0" eaLnBrk="1" fontAlgn="auto" latinLnBrk="0" hangingPunct="1">
+                        <a:lnSpc>
+                          <a:spcPct val="100000"/>
+                        </a:lnSpc>
+                        <a:spcBef>
+                          <a:spcPts val="0"/>
+                        </a:spcBef>
+                        <a:spcAft>
+                          <a:spcPts val="0"/>
+                        </a:spcAft>
+                        <a:buClrTx/>
+                        <a:buSzTx/>
+                        <a:buFontTx/>
+                        <a:buNone/>
+                        <a:tabLst/>
+                        <a:defRPr/>
+                      </a:pPr>
+                      <a:r>
+                        <a:rPr lang="en-US" sz="1000">
+                          <a:latin typeface="Candara" panose="020E0502030303020204" pitchFamily="34" charset="0"/>
+                        </a:rPr>
+                        <a:t>Storage:</a:t>
+                      </a:r>
+                    </a:p>
+                  </a:txBody>
+                  <a:tcPr anchor="b">
+                    <a:lnT w="12700" cap="flat" cmpd="sng" algn="ctr">
+                      <a:solidFill>
+                        <a:schemeClr val="tx1"/>
+                      </a:solidFill>
+                      <a:prstDash val="solid"/>
+                      <a:round/>
+                      <a:headEnd type="none" w="med" len="med"/>
+                      <a:tailEnd type="none" w="med" len="med"/>
+                    </a:lnT>
+                    <a:lnB w="12700" cap="flat" cmpd="sng" algn="ctr">
+                      <a:solidFill>
+                        <a:schemeClr val="tx1"/>
+                      </a:solidFill>
+                      <a:prstDash val="solid"/>
+                      <a:round/>
+                      <a:headEnd type="none" w="med" len="med"/>
+                      <a:tailEnd type="none" w="med" len="med"/>
+                    </a:lnB>
+                    <a:solidFill>
+                      <a:schemeClr val="bg1"/>
+                    </a:solidFill>
+                  </a:tcPr>
+                </a:tc>
+                <a:tc rowSpan="11">
+                  <a:txBody>
+                    <a:bodyPr/>
+                    <a:lstStyle/>
+                    <a:p>
+                      <a:pPr algn="l"/>
+                      <a:r>
+                        <a:rPr lang="en-US" sz="1000" dirty="0">
+                          <a:latin typeface="Candara" panose="020E0502030303020204" pitchFamily="34" charset="0"/>
+                        </a:rPr>
+                        <a:t>Can hold up to (Sorcery skill level) spell slots in memory. The rest must be stored in spellbooks. Put “Storage: Mem” for spells in memory, then give each spellbook a short id, such as a number, symbol, </a:t>
+                      </a:r>
+                      <a:r>
+                        <a:rPr lang="en-US" sz="1000" dirty="0" err="1">
+                          <a:latin typeface="Candara" panose="020E0502030303020204" pitchFamily="34" charset="0"/>
+                        </a:rPr>
+                        <a:t>etc</a:t>
+                      </a:r>
+                      <a:r>
+                        <a:rPr lang="en-US" sz="1000" dirty="0">
+                          <a:latin typeface="Candara" panose="020E0502030303020204" pitchFamily="34" charset="0"/>
+                        </a:rPr>
+                        <a:t>, and put “Storage: &lt;id&gt;” on spells in books.</a:t>
+                      </a:r>
+                    </a:p>
+                  </a:txBody>
+                  <a:tcPr>
+                    <a:solidFill>
+                      <a:schemeClr val="bg1"/>
+                    </a:solidFill>
+                  </a:tcPr>
+                </a:tc>
+                <a:tc>
+                  <a:txBody>
+                    <a:bodyPr/>
+                    <a:lstStyle/>
+                    <a:p>
+                      <a:endParaRPr lang="en-US" sz="1000">
+                        <a:latin typeface="Candara" panose="020E0502030303020204" pitchFamily="34" charset="0"/>
+                      </a:endParaRPr>
+                    </a:p>
+                  </a:txBody>
+                  <a:tcPr>
+                    <a:solidFill>
+                      <a:schemeClr val="bg1"/>
+                    </a:solidFill>
+                  </a:tcPr>
+                </a:tc>
+                <a:extLst>
+                  <a:ext uri="{0D108BD9-81ED-4DB2-BD59-A6C34878D82A}">
+                    <a16:rowId xmlns:a16="http://schemas.microsoft.com/office/drawing/2014/main" val="3308085518"/>
+                  </a:ext>
+                </a:extLst>
+              </a:tr>
+              <a:tr h="388620">
+                <a:tc>
+                  <a:txBody>
+                    <a:bodyPr/>
+                    <a:lstStyle/>
+                    <a:p>
+                      <a:endParaRPr lang="en-US" sz="1000">
+                        <a:latin typeface="Candara" panose="020E0502030303020204" pitchFamily="34" charset="0"/>
+                      </a:endParaRPr>
+                    </a:p>
+                  </a:txBody>
+                  <a:tcPr>
+                    <a:solidFill>
+                      <a:schemeClr val="bg1"/>
+                    </a:solidFill>
+                  </a:tcPr>
+                </a:tc>
+                <a:tc vMerge="1">
+                  <a:txBody>
+                    <a:bodyPr/>
+                    <a:lstStyle/>
+                    <a:p>
+                      <a:pPr algn="ctr"/>
+                      <a:endParaRPr lang="en-US" sz="1600"/>
+                    </a:p>
+                  </a:txBody>
+                  <a:tcPr anchor="b">
+                    <a:lnR w="12700" cmpd="sng">
+                      <a:noFill/>
+                    </a:lnR>
+                  </a:tcPr>
+                </a:tc>
+                <a:tc>
+                  <a:txBody>
+                    <a:bodyPr/>
+                    <a:lstStyle/>
+                    <a:p>
+                      <a:r>
+                        <a:rPr lang="en-US" sz="1000" dirty="0">
+                          <a:latin typeface="Candara" panose="020E0502030303020204" pitchFamily="34" charset="0"/>
+                        </a:rPr>
+                        <a:t>Body</a:t>
+                      </a:r>
+                    </a:p>
+                  </a:txBody>
+                  <a:tcPr anchor="b">
+                    <a:lnL w="12700" cmpd="sng">
+                      <a:noFill/>
+                    </a:lnL>
+                    <a:lnR w="12700" cmpd="sng">
+                      <a:noFill/>
+                    </a:lnR>
+                    <a:lnT w="12700" cap="flat" cmpd="sng" algn="ctr">
+                      <a:solidFill>
+                        <a:schemeClr val="tx1"/>
+                      </a:solidFill>
+                      <a:prstDash val="solid"/>
+                      <a:round/>
+                      <a:headEnd type="none" w="med" len="med"/>
+                      <a:tailEnd type="none" w="med" len="med"/>
+                    </a:lnT>
+                    <a:lnB w="12700" cap="flat" cmpd="sng" algn="ctr">
+                      <a:solidFill>
+                        <a:schemeClr val="tx1"/>
+                      </a:solidFill>
+                      <a:prstDash val="solid"/>
+                      <a:round/>
+                      <a:headEnd type="none" w="med" len="med"/>
+                      <a:tailEnd type="none" w="med" len="med"/>
+                    </a:lnB>
+                    <a:lnTlToBr w="12700" cmpd="sng">
+                      <a:noFill/>
+                      <a:prstDash val="solid"/>
+                    </a:lnTlToBr>
+                    <a:lnBlToTr w="12700" cmpd="sng">
+                      <a:noFill/>
+                      <a:prstDash val="solid"/>
+                    </a:lnBlToTr>
+                    <a:solidFill>
+                      <a:schemeClr val="bg1"/>
+                    </a:solidFill>
+                  </a:tcPr>
+                </a:tc>
+                <a:tc>
+                  <a:txBody>
+                    <a:bodyPr/>
+                    <a:lstStyle/>
+                    <a:p>
+                      <a:pPr algn="r"/>
+                      <a:r>
+                        <a:rPr lang="en-US" sz="1000" dirty="0">
+                          <a:latin typeface="Candara" panose="020E0502030303020204" pitchFamily="34" charset="0"/>
+                        </a:rPr>
+                        <a:t>1</a:t>
+                      </a:r>
+                    </a:p>
+                  </a:txBody>
+                  <a:tcPr anchor="b">
+                    <a:lnL w="12700" cmpd="sng">
+                      <a:noFill/>
+                    </a:lnL>
+                    <a:lnR w="12700" cmpd="sng">
+                      <a:noFill/>
+                    </a:lnR>
+                    <a:lnT w="12700" cap="flat" cmpd="sng" algn="ctr">
+                      <a:solidFill>
+                        <a:schemeClr val="tx1"/>
+                      </a:solidFill>
+                      <a:prstDash val="solid"/>
+                      <a:round/>
+                      <a:headEnd type="none" w="med" len="med"/>
+                      <a:tailEnd type="none" w="med" len="med"/>
+                    </a:lnT>
+                    <a:lnB w="12700" cap="flat" cmpd="sng" algn="ctr">
+                      <a:solidFill>
+                        <a:schemeClr val="tx1"/>
+                      </a:solidFill>
+                      <a:prstDash val="solid"/>
+                      <a:round/>
+                      <a:headEnd type="none" w="med" len="med"/>
+                      <a:tailEnd type="none" w="med" len="med"/>
+                    </a:lnB>
+                    <a:lnTlToBr w="12700" cmpd="sng">
+                      <a:noFill/>
+                      <a:prstDash val="solid"/>
+                    </a:lnTlToBr>
+                    <a:lnBlToTr w="12700" cmpd="sng">
+                      <a:noFill/>
+                      <a:prstDash val="solid"/>
+                    </a:lnBlToTr>
+                    <a:solidFill>
+                      <a:schemeClr val="bg1"/>
+                    </a:solidFill>
+                  </a:tcPr>
+                </a:tc>
+                <a:tc>
+                  <a:txBody>
+                    <a:bodyPr/>
+                    <a:lstStyle/>
+                    <a:p>
+                      <a:endParaRPr lang="en-US" sz="1000">
+                        <a:latin typeface="Candara" panose="020E0502030303020204" pitchFamily="34" charset="0"/>
+                      </a:endParaRPr>
+                    </a:p>
+                  </a:txBody>
+                  <a:tcPr anchor="b">
+                    <a:lnL w="12700" cmpd="sng">
+                      <a:noFill/>
+                    </a:lnL>
+                    <a:solidFill>
+                      <a:schemeClr val="bg1"/>
+                    </a:solidFill>
+                  </a:tcPr>
+                </a:tc>
+                <a:tc gridSpan="2">
+                  <a:txBody>
+                    <a:bodyPr/>
+                    <a:lstStyle/>
+                    <a:p>
+                      <a:r>
+                        <a:rPr lang="en-US" sz="1000" dirty="0">
+                          <a:latin typeface="Candara" panose="020E0502030303020204" pitchFamily="34" charset="0"/>
+                        </a:rPr>
+                        <a:t>3</a:t>
+                      </a:r>
+                    </a:p>
+                  </a:txBody>
+                  <a:tcPr anchor="b">
+                    <a:lnT w="12700" cap="flat" cmpd="sng" algn="ctr">
+                      <a:solidFill>
+                        <a:schemeClr val="tx1"/>
+                      </a:solidFill>
+                      <a:prstDash val="solid"/>
+                      <a:round/>
+                      <a:headEnd type="none" w="med" len="med"/>
+                      <a:tailEnd type="none" w="med" len="med"/>
+                    </a:lnT>
+                    <a:lnB w="12700" cap="flat" cmpd="sng" algn="ctr">
+                      <a:solidFill>
+                        <a:schemeClr val="tx1"/>
+                      </a:solidFill>
+                      <a:prstDash val="solid"/>
+                      <a:round/>
+                      <a:headEnd type="none" w="med" len="med"/>
+                      <a:tailEnd type="none" w="med" len="med"/>
+                    </a:lnB>
+                    <a:solidFill>
+                      <a:schemeClr val="bg1"/>
+                    </a:solidFill>
+                  </a:tcPr>
+                </a:tc>
+                <a:tc hMerge="1">
+                  <a:txBody>
+                    <a:bodyPr/>
+                    <a:lstStyle/>
+                    <a:p>
+                      <a:endParaRPr lang="en-US"/>
+                    </a:p>
+                  </a:txBody>
+                  <a:tcPr/>
+                </a:tc>
+                <a:tc>
+                  <a:txBody>
+                    <a:bodyPr/>
+                    <a:lstStyle/>
+                    <a:p>
+                      <a:r>
+                        <a:rPr lang="en-US" sz="1000">
+                          <a:latin typeface="Candara" panose="020E0502030303020204" pitchFamily="34" charset="0"/>
+                        </a:rPr>
+                        <a:t>Complexity:</a:t>
+                      </a:r>
+                    </a:p>
+                  </a:txBody>
+                  <a:tcPr anchor="b">
+                    <a:lnT w="12700" cap="flat" cmpd="sng" algn="ctr">
+                      <a:solidFill>
+                        <a:schemeClr val="tx1"/>
+                      </a:solidFill>
+                      <a:prstDash val="solid"/>
+                      <a:round/>
+                      <a:headEnd type="none" w="med" len="med"/>
+                      <a:tailEnd type="none" w="med" len="med"/>
+                    </a:lnT>
+                    <a:lnB w="12700" cap="flat" cmpd="sng" algn="ctr">
+                      <a:solidFill>
+                        <a:schemeClr val="tx1"/>
+                      </a:solidFill>
+                      <a:prstDash val="solid"/>
+                      <a:round/>
+                      <a:headEnd type="none" w="med" len="med"/>
+                      <a:tailEnd type="none" w="med" len="med"/>
+                    </a:lnB>
+                    <a:solidFill>
+                      <a:schemeClr val="bg1"/>
+                    </a:solidFill>
+                  </a:tcPr>
+                </a:tc>
+                <a:tc>
+                  <a:txBody>
+                    <a:bodyPr/>
+                    <a:lstStyle/>
+                    <a:p>
+                      <a:r>
+                        <a:rPr lang="en-US" sz="1000">
+                          <a:latin typeface="Candara" panose="020E0502030303020204" pitchFamily="34" charset="0"/>
+                        </a:rPr>
+                        <a:t>Storage:</a:t>
+                      </a:r>
+                    </a:p>
+                  </a:txBody>
+                  <a:tcPr anchor="b">
+                    <a:lnT w="12700" cap="flat" cmpd="sng" algn="ctr">
+                      <a:solidFill>
+                        <a:schemeClr val="tx1"/>
+                      </a:solidFill>
+                      <a:prstDash val="solid"/>
+                      <a:round/>
+                      <a:headEnd type="none" w="med" len="med"/>
+                      <a:tailEnd type="none" w="med" len="med"/>
+                    </a:lnT>
+                    <a:lnB w="12700" cap="flat" cmpd="sng" algn="ctr">
+                      <a:solidFill>
+                        <a:schemeClr val="tx1"/>
+                      </a:solidFill>
+                      <a:prstDash val="solid"/>
+                      <a:round/>
+                      <a:headEnd type="none" w="med" len="med"/>
+                      <a:tailEnd type="none" w="med" len="med"/>
+                    </a:lnB>
+                    <a:solidFill>
+                      <a:schemeClr val="bg1"/>
+                    </a:solidFill>
+                  </a:tcPr>
+                </a:tc>
+                <a:tc vMerge="1">
+                  <a:txBody>
+                    <a:bodyPr/>
+                    <a:lstStyle/>
+                    <a:p>
+                      <a:pPr algn="ctr"/>
+                      <a:endParaRPr lang="en-US" sz="1600"/>
+                    </a:p>
+                  </a:txBody>
+                  <a:tcPr anchor="b"/>
+                </a:tc>
+                <a:tc>
+                  <a:txBody>
+                    <a:bodyPr/>
+                    <a:lstStyle/>
+                    <a:p>
+                      <a:endParaRPr lang="en-US" sz="1000">
+                        <a:latin typeface="Candara" panose="020E0502030303020204" pitchFamily="34" charset="0"/>
+                      </a:endParaRPr>
+                    </a:p>
+                  </a:txBody>
+                  <a:tcPr>
+                    <a:solidFill>
+                      <a:schemeClr val="bg1"/>
+                    </a:solidFill>
+                  </a:tcPr>
+                </a:tc>
+                <a:extLst>
+                  <a:ext uri="{0D108BD9-81ED-4DB2-BD59-A6C34878D82A}">
+                    <a16:rowId xmlns:a16="http://schemas.microsoft.com/office/drawing/2014/main" val="456179138"/>
+                  </a:ext>
+                </a:extLst>
+              </a:tr>
+              <a:tr h="388620">
+                <a:tc>
+                  <a:txBody>
+                    <a:bodyPr/>
+                    <a:lstStyle/>
+                    <a:p>
+                      <a:endParaRPr lang="en-US" sz="1000">
+                        <a:latin typeface="Candara" panose="020E0502030303020204" pitchFamily="34" charset="0"/>
+                      </a:endParaRPr>
+                    </a:p>
+                  </a:txBody>
+                  <a:tcPr>
+                    <a:solidFill>
+                      <a:schemeClr val="bg1"/>
+                    </a:solidFill>
+                  </a:tcPr>
+                </a:tc>
+                <a:tc vMerge="1">
+                  <a:txBody>
+                    <a:bodyPr/>
+                    <a:lstStyle/>
+                    <a:p>
+                      <a:pPr algn="ctr"/>
+                      <a:endParaRPr lang="en-US" sz="1600"/>
+                    </a:p>
+                  </a:txBody>
+                  <a:tcPr anchor="b">
+                    <a:lnR w="12700" cmpd="sng">
+                      <a:noFill/>
+                    </a:lnR>
+                  </a:tcPr>
+                </a:tc>
+                <a:tc>
+                  <a:txBody>
+                    <a:bodyPr/>
+                    <a:lstStyle/>
+                    <a:p>
+                      <a:r>
+                        <a:rPr lang="en-US" sz="1000">
+                          <a:latin typeface="Candara" panose="020E0502030303020204" pitchFamily="34" charset="0"/>
+                        </a:rPr>
+                        <a:t>Body</a:t>
+                      </a:r>
+                    </a:p>
+                  </a:txBody>
+                  <a:tcPr anchor="b">
+                    <a:lnL w="12700" cmpd="sng">
+                      <a:noFill/>
+                    </a:lnL>
+                    <a:lnR w="12700" cmpd="sng">
+                      <a:noFill/>
+                    </a:lnR>
+                    <a:lnT w="12700" cap="flat" cmpd="sng" algn="ctr">
+                      <a:solidFill>
+                        <a:schemeClr val="tx1"/>
+                      </a:solidFill>
+                      <a:prstDash val="solid"/>
+                      <a:round/>
+                      <a:headEnd type="none" w="med" len="med"/>
+                      <a:tailEnd type="none" w="med" len="med"/>
+                    </a:lnT>
+                    <a:lnB w="12700" cap="flat" cmpd="sng" algn="ctr">
+                      <a:solidFill>
+                        <a:schemeClr val="tx1"/>
+                      </a:solidFill>
+                      <a:prstDash val="solid"/>
+                      <a:round/>
+                      <a:headEnd type="none" w="med" len="med"/>
+                      <a:tailEnd type="none" w="med" len="med"/>
+                    </a:lnB>
+                    <a:lnTlToBr w="12700" cmpd="sng">
+                      <a:noFill/>
+                      <a:prstDash val="solid"/>
+                    </a:lnTlToBr>
+                    <a:lnBlToTr w="12700" cmpd="sng">
+                      <a:noFill/>
+                      <a:prstDash val="solid"/>
+                    </a:lnBlToTr>
+                    <a:solidFill>
+                      <a:schemeClr val="bg1"/>
+                    </a:solidFill>
+                  </a:tcPr>
+                </a:tc>
+                <a:tc>
+                  <a:txBody>
+                    <a:bodyPr/>
+                    <a:lstStyle/>
+                    <a:p>
+                      <a:pPr algn="r"/>
+                      <a:r>
+                        <a:rPr lang="en-US" sz="1000" dirty="0">
+                          <a:latin typeface="Candara" panose="020E0502030303020204" pitchFamily="34" charset="0"/>
+                        </a:rPr>
+                        <a:t>2</a:t>
+                      </a:r>
+                    </a:p>
+                  </a:txBody>
+                  <a:tcPr anchor="b">
+                    <a:lnL w="12700" cmpd="sng">
+                      <a:noFill/>
+                    </a:lnL>
+                    <a:lnR w="12700" cmpd="sng">
+                      <a:noFill/>
+                    </a:lnR>
+                    <a:lnT w="12700" cap="flat" cmpd="sng" algn="ctr">
+                      <a:solidFill>
+                        <a:schemeClr val="tx1"/>
+                      </a:solidFill>
+                      <a:prstDash val="solid"/>
+                      <a:round/>
+                      <a:headEnd type="none" w="med" len="med"/>
+                      <a:tailEnd type="none" w="med" len="med"/>
+                    </a:lnT>
+                    <a:lnB w="12700" cap="flat" cmpd="sng" algn="ctr">
+                      <a:solidFill>
+                        <a:schemeClr val="tx1"/>
+                      </a:solidFill>
+                      <a:prstDash val="solid"/>
+                      <a:round/>
+                      <a:headEnd type="none" w="med" len="med"/>
+                      <a:tailEnd type="none" w="med" len="med"/>
+                    </a:lnB>
+                    <a:lnTlToBr w="12700" cmpd="sng">
+                      <a:noFill/>
+                      <a:prstDash val="solid"/>
+                    </a:lnTlToBr>
+                    <a:lnBlToTr w="12700" cmpd="sng">
+                      <a:noFill/>
+                      <a:prstDash val="solid"/>
+                    </a:lnBlToTr>
+                    <a:solidFill>
+                      <a:schemeClr val="bg1"/>
+                    </a:solidFill>
+                  </a:tcPr>
+                </a:tc>
+                <a:tc>
+                  <a:txBody>
+                    <a:bodyPr/>
+                    <a:lstStyle/>
+                    <a:p>
+                      <a:endParaRPr lang="en-US" sz="1000">
+                        <a:latin typeface="Candara" panose="020E0502030303020204" pitchFamily="34" charset="0"/>
+                      </a:endParaRPr>
+                    </a:p>
+                  </a:txBody>
+                  <a:tcPr anchor="b">
+                    <a:lnL w="12700" cmpd="sng">
+                      <a:noFill/>
+                    </a:lnL>
+                    <a:solidFill>
+                      <a:schemeClr val="bg1"/>
+                    </a:solidFill>
+                  </a:tcPr>
+                </a:tc>
+                <a:tc gridSpan="2">
+                  <a:txBody>
+                    <a:bodyPr/>
+                    <a:lstStyle/>
+                    <a:p>
+                      <a:r>
+                        <a:rPr lang="en-US" sz="1000" dirty="0">
+                          <a:latin typeface="Candara" panose="020E0502030303020204" pitchFamily="34" charset="0"/>
+                        </a:rPr>
+                        <a:t>4</a:t>
+                      </a:r>
+                    </a:p>
+                  </a:txBody>
+                  <a:tcPr anchor="b">
+                    <a:lnT w="12700" cap="flat" cmpd="sng" algn="ctr">
+                      <a:solidFill>
+                        <a:schemeClr val="tx1"/>
+                      </a:solidFill>
+                      <a:prstDash val="solid"/>
+                      <a:round/>
+                      <a:headEnd type="none" w="med" len="med"/>
+                      <a:tailEnd type="none" w="med" len="med"/>
+                    </a:lnT>
+                    <a:lnB w="12700" cap="flat" cmpd="sng" algn="ctr">
+                      <a:solidFill>
+                        <a:schemeClr val="tx1"/>
+                      </a:solidFill>
+                      <a:prstDash val="solid"/>
+                      <a:round/>
+                      <a:headEnd type="none" w="med" len="med"/>
+                      <a:tailEnd type="none" w="med" len="med"/>
+                    </a:lnB>
+                    <a:solidFill>
+                      <a:schemeClr val="bg1"/>
+                    </a:solidFill>
+                  </a:tcPr>
+                </a:tc>
+                <a:tc hMerge="1">
+                  <a:txBody>
+                    <a:bodyPr/>
+                    <a:lstStyle/>
+                    <a:p>
+                      <a:endParaRPr lang="en-US"/>
+                    </a:p>
+                  </a:txBody>
+                  <a:tcPr/>
                 </a:tc>
                 <a:tc>
                   <a:txBody>
@@ -16665,37 +17410,16 @@
                     </a:solidFill>
                   </a:tcPr>
                 </a:tc>
-                <a:tc rowSpan="11">
-                  <a:txBody>
-                    <a:bodyPr/>
-                    <a:lstStyle/>
-                    <a:p>
-                      <a:pPr algn="l"/>
-                      <a:r>
-                        <a:rPr lang="en-US" sz="1000" dirty="0">
-                          <a:latin typeface="Candara" panose="020E0502030303020204" pitchFamily="34" charset="0"/>
-                        </a:rPr>
-                        <a:t>Can hold up to (Sorcery skill level) spell slots in memory. The rest must be stored in spellbooks. Put “Storage: Mem” for spells in memory, then give each spellbook a short id, such as a number, symbol, </a:t>
-                      </a:r>
-                      <a:r>
-                        <a:rPr lang="en-US" sz="1000" dirty="0" err="1">
-                          <a:latin typeface="Candara" panose="020E0502030303020204" pitchFamily="34" charset="0"/>
-                        </a:rPr>
-                        <a:t>etc</a:t>
-                      </a:r>
-                      <a:r>
-                        <a:rPr lang="en-US" sz="1000" dirty="0">
-                          <a:latin typeface="Candara" panose="020E0502030303020204" pitchFamily="34" charset="0"/>
-                        </a:rPr>
-                        <a:t>, and put “Storage: &lt;id&gt;” on spells in books.</a:t>
-                      </a:r>
-                    </a:p>
-                  </a:txBody>
-                  <a:tcPr>
-                    <a:solidFill>
-                      <a:schemeClr val="bg1"/>
-                    </a:solidFill>
-                  </a:tcPr>
+                <a:tc vMerge="1">
+                  <a:txBody>
+                    <a:bodyPr/>
+                    <a:lstStyle/>
+                    <a:p>
+                      <a:pPr algn="ctr"/>
+                      <a:endParaRPr lang="en-US" sz="1600"/>
+                    </a:p>
+                  </a:txBody>
+                  <a:tcPr anchor="b"/>
                 </a:tc>
                 <a:tc>
                   <a:txBody>
@@ -16715,7 +17439,7 @@
                 </a:tc>
                 <a:extLst>
                   <a:ext uri="{0D108BD9-81ED-4DB2-BD59-A6C34878D82A}">
-                    <a16:rowId xmlns:a16="http://schemas.microsoft.com/office/drawing/2014/main" val="3308085518"/>
+                    <a16:rowId xmlns:a16="http://schemas.microsoft.com/office/drawing/2014/main" val="3199399334"/>
                   </a:ext>
                 </a:extLst>
               </a:tr>
@@ -16757,7 +17481,7 @@
                     <a:lstStyle/>
                     <a:p>
                       <a:r>
-                        <a:rPr lang="en-US" sz="1000" dirty="0">
+                        <a:rPr lang="en-US" sz="1000">
                           <a:latin typeface="Candara" panose="020E0502030303020204" pitchFamily="34" charset="0"/>
                         </a:rPr>
                         <a:t>Body</a:t>
@@ -16808,76 +17532,6 @@
                     <a:lstStyle/>
                     <a:p>
                       <a:pPr algn="r"/>
-                      <a:r>
-                        <a:rPr lang="en-US" sz="1000" dirty="0">
-                          <a:latin typeface="Candara" panose="020E0502030303020204" pitchFamily="34" charset="0"/>
-                        </a:rPr>
-                        <a:t>1</a:t>
-                      </a:r>
-                    </a:p>
-                  </a:txBody>
-                  <a:tcPr anchor="b">
-                    <a:lnL w="12700" cmpd="sng">
-                      <a:noFill/>
-                    </a:lnL>
-                    <a:lnR w="12700" cmpd="sng">
-                      <a:noFill/>
-                    </a:lnR>
-                    <a:lnT w="12700" cap="flat" cmpd="sng" algn="ctr">
-                      <a:solidFill>
-                        <a:schemeClr val="tx1"/>
-                      </a:solidFill>
-                      <a:prstDash val="solid"/>
-                      <a:round/>
-                      <a:headEnd type="none" w="med" len="med"/>
-                      <a:tailEnd type="none" w="med" len="med"/>
-                    </a:lnT>
-                    <a:lnB w="12700" cap="flat" cmpd="sng" algn="ctr">
-                      <a:solidFill>
-                        <a:schemeClr val="tx1"/>
-                      </a:solidFill>
-                      <a:prstDash val="solid"/>
-                      <a:round/>
-                      <a:headEnd type="none" w="med" len="med"/>
-                      <a:tailEnd type="none" w="med" len="med"/>
-                    </a:lnB>
-                    <a:lnTlToBr w="12700" cmpd="sng">
-                      <a:noFill/>
-                      <a:prstDash val="solid"/>
-                    </a:lnTlToBr>
-                    <a:lnBlToTr w="12700" cmpd="sng">
-                      <a:noFill/>
-                      <a:prstDash val="solid"/>
-                    </a:lnBlToTr>
-                    <a:solidFill>
-                      <a:schemeClr val="bg1"/>
-                    </a:solidFill>
-                  </a:tcPr>
-                </a:tc>
-                <a:tc>
-                  <a:txBody>
-                    <a:bodyPr/>
-                    <a:lstStyle/>
-                    <a:p>
-                      <a:endParaRPr lang="en-US" sz="1000">
-                        <a:latin typeface="Candara" panose="020E0502030303020204" pitchFamily="34" charset="0"/>
-                      </a:endParaRPr>
-                    </a:p>
-                  </a:txBody>
-                  <a:tcPr anchor="b">
-                    <a:lnL w="12700" cmpd="sng">
-                      <a:noFill/>
-                    </a:lnL>
-                    <a:solidFill>
-                      <a:schemeClr val="bg1"/>
-                    </a:solidFill>
-                  </a:tcPr>
-                </a:tc>
-                <a:tc>
-                  <a:txBody>
-                    <a:bodyPr/>
-                    <a:lstStyle/>
-                    <a:p>
                       <a:r>
                         <a:rPr lang="en-US" sz="1000" dirty="0">
                           <a:latin typeface="Candara" panose="020E0502030303020204" pitchFamily="34" charset="0"/>
@@ -16887,28 +17541,108 @@
                     </a:p>
                   </a:txBody>
                   <a:tcPr anchor="b">
-                    <a:lnT w="12700" cap="flat" cmpd="sng" algn="ctr">
-                      <a:solidFill>
-                        <a:schemeClr val="tx1"/>
-                      </a:solidFill>
-                      <a:prstDash val="solid"/>
-                      <a:round/>
-                      <a:headEnd type="none" w="med" len="med"/>
-                      <a:tailEnd type="none" w="med" len="med"/>
-                    </a:lnT>
-                    <a:lnB w="12700" cap="flat" cmpd="sng" algn="ctr">
-                      <a:solidFill>
-                        <a:schemeClr val="tx1"/>
-                      </a:solidFill>
-                      <a:prstDash val="solid"/>
-                      <a:round/>
-                      <a:headEnd type="none" w="med" len="med"/>
-                      <a:tailEnd type="none" w="med" len="med"/>
-                    </a:lnB>
-                    <a:solidFill>
-                      <a:schemeClr val="bg1"/>
-                    </a:solidFill>
-                  </a:tcPr>
+                    <a:lnL w="12700" cmpd="sng">
+                      <a:noFill/>
+                    </a:lnL>
+                    <a:lnR w="12700" cmpd="sng">
+                      <a:noFill/>
+                    </a:lnR>
+                    <a:lnT w="12700" cap="flat" cmpd="sng" algn="ctr">
+                      <a:solidFill>
+                        <a:schemeClr val="tx1"/>
+                      </a:solidFill>
+                      <a:prstDash val="solid"/>
+                      <a:round/>
+                      <a:headEnd type="none" w="med" len="med"/>
+                      <a:tailEnd type="none" w="med" len="med"/>
+                    </a:lnT>
+                    <a:lnB w="12700" cap="flat" cmpd="sng" algn="ctr">
+                      <a:solidFill>
+                        <a:schemeClr val="tx1"/>
+                      </a:solidFill>
+                      <a:prstDash val="solid"/>
+                      <a:round/>
+                      <a:headEnd type="none" w="med" len="med"/>
+                      <a:tailEnd type="none" w="med" len="med"/>
+                    </a:lnB>
+                    <a:lnTlToBr w="12700" cmpd="sng">
+                      <a:noFill/>
+                      <a:prstDash val="solid"/>
+                    </a:lnTlToBr>
+                    <a:lnBlToTr w="12700" cmpd="sng">
+                      <a:noFill/>
+                      <a:prstDash val="solid"/>
+                    </a:lnBlToTr>
+                    <a:solidFill>
+                      <a:schemeClr val="bg1"/>
+                    </a:solidFill>
+                  </a:tcPr>
+                </a:tc>
+                <a:tc>
+                  <a:txBody>
+                    <a:bodyPr/>
+                    <a:lstStyle/>
+                    <a:p>
+                      <a:endParaRPr lang="en-US" sz="1000">
+                        <a:latin typeface="Candara" panose="020E0502030303020204" pitchFamily="34" charset="0"/>
+                      </a:endParaRPr>
+                    </a:p>
+                  </a:txBody>
+                  <a:tcPr anchor="b">
+                    <a:lnL w="12700" cmpd="sng">
+                      <a:noFill/>
+                    </a:lnL>
+                    <a:solidFill>
+                      <a:schemeClr val="bg1"/>
+                    </a:solidFill>
+                  </a:tcPr>
+                </a:tc>
+                <a:tc gridSpan="2">
+                  <a:txBody>
+                    <a:bodyPr/>
+                    <a:lstStyle/>
+                    <a:p>
+                      <a:r>
+                        <a:rPr lang="en-US" sz="1000" dirty="0">
+                          <a:latin typeface="Candara" panose="020E0502030303020204" pitchFamily="34" charset="0"/>
+                        </a:rPr>
+                        <a:t>5</a:t>
+                      </a:r>
+                    </a:p>
+                  </a:txBody>
+                  <a:tcPr anchor="b">
+                    <a:lnT w="12700" cap="flat" cmpd="sng" algn="ctr">
+                      <a:solidFill>
+                        <a:schemeClr val="tx1"/>
+                      </a:solidFill>
+                      <a:prstDash val="solid"/>
+                      <a:round/>
+                      <a:headEnd type="none" w="med" len="med"/>
+                      <a:tailEnd type="none" w="med" len="med"/>
+                    </a:lnT>
+                    <a:lnB w="12700" cap="flat" cmpd="sng" algn="ctr">
+                      <a:solidFill>
+                        <a:schemeClr val="tx1"/>
+                      </a:solidFill>
+                      <a:prstDash val="solid"/>
+                      <a:round/>
+                      <a:headEnd type="none" w="med" len="med"/>
+                      <a:tailEnd type="none" w="med" len="med"/>
+                    </a:lnB>
+                    <a:solidFill>
+                      <a:schemeClr val="bg1"/>
+                    </a:solidFill>
+                  </a:tcPr>
+                </a:tc>
+                <a:tc hMerge="1">
+                  <a:txBody>
+                    <a:bodyPr/>
+                    <a:lstStyle/>
+                    <a:p>
+                      <a:endParaRPr lang="en-US"/>
+                    </a:p>
+                  </a:txBody>
+                  <a:tcPr/>
                 </a:tc>
                 <a:tc>
                   <a:txBody>
@@ -17013,7 +17747,7 @@
                 </a:tc>
                 <a:extLst>
                   <a:ext uri="{0D108BD9-81ED-4DB2-BD59-A6C34878D82A}">
-                    <a16:rowId xmlns:a16="http://schemas.microsoft.com/office/drawing/2014/main" val="456179138"/>
+                    <a16:rowId xmlns:a16="http://schemas.microsoft.com/office/drawing/2014/main" val="755606437"/>
                   </a:ext>
                 </a:extLst>
               </a:tr>
@@ -17110,7 +17844,7 @@
                         <a:rPr lang="en-US" sz="1000" dirty="0">
                           <a:latin typeface="Candara" panose="020E0502030303020204" pitchFamily="34" charset="0"/>
                         </a:rPr>
-                        <a:t>2</a:t>
+                        <a:t>4</a:t>
                       </a:r>
                     </a:p>
                   </a:txBody>
@@ -17171,7 +17905,7 @@
                     </a:solidFill>
                   </a:tcPr>
                 </a:tc>
-                <a:tc>
+                <a:tc gridSpan="2">
                   <a:txBody>
                     <a:bodyPr/>
                     <a:lstStyle/>
@@ -17180,7 +17914,7 @@
                         <a:rPr lang="en-US" sz="1000" dirty="0">
                           <a:latin typeface="Candara" panose="020E0502030303020204" pitchFamily="34" charset="0"/>
                         </a:rPr>
-                        <a:t>4</a:t>
+                        <a:t>6</a:t>
                       </a:r>
                     </a:p>
                   </a:txBody>
@@ -17207,6 +17941,16 @@
                       <a:schemeClr val="bg1"/>
                     </a:solidFill>
                   </a:tcPr>
+                </a:tc>
+                <a:tc hMerge="1">
+                  <a:txBody>
+                    <a:bodyPr/>
+                    <a:lstStyle/>
+                    <a:p>
+                      <a:endParaRPr lang="en-US"/>
+                    </a:p>
+                  </a:txBody>
+                  <a:tcPr/>
                 </a:tc>
                 <a:tc>
                   <a:txBody>
@@ -17345,7 +18089,7 @@
                 </a:tc>
                 <a:extLst>
                   <a:ext uri="{0D108BD9-81ED-4DB2-BD59-A6C34878D82A}">
-                    <a16:rowId xmlns:a16="http://schemas.microsoft.com/office/drawing/2014/main" val="3199399334"/>
+                    <a16:rowId xmlns:a16="http://schemas.microsoft.com/office/drawing/2014/main" val="2918878414"/>
                   </a:ext>
                 </a:extLst>
               </a:tr>
@@ -17442,7 +18186,7 @@
                         <a:rPr lang="en-US" sz="1000" dirty="0">
                           <a:latin typeface="Candara" panose="020E0502030303020204" pitchFamily="34" charset="0"/>
                         </a:rPr>
-                        <a:t>3</a:t>
+                        <a:t>5</a:t>
                       </a:r>
                     </a:p>
                   </a:txBody>
@@ -17489,7 +18233,7 @@
                     <a:bodyPr/>
                     <a:lstStyle/>
                     <a:p>
-                      <a:endParaRPr lang="en-US" sz="1000">
+                      <a:endParaRPr lang="en-US" sz="1000" dirty="0">
                         <a:latin typeface="Candara" panose="020E0502030303020204" pitchFamily="34" charset="0"/>
                       </a:endParaRPr>
                     </a:p>
@@ -17503,7 +18247,7 @@
                     </a:solidFill>
                   </a:tcPr>
                 </a:tc>
-                <a:tc>
+                <a:tc gridSpan="2">
                   <a:txBody>
                     <a:bodyPr/>
                     <a:lstStyle/>
@@ -17512,7 +18256,7 @@
                         <a:rPr lang="en-US" sz="1000" dirty="0">
                           <a:latin typeface="Candara" panose="020E0502030303020204" pitchFamily="34" charset="0"/>
                         </a:rPr>
-                        <a:t>5</a:t>
+                        <a:t>7</a:t>
                       </a:r>
                     </a:p>
                   </a:txBody>
@@ -17539,6 +18283,16 @@
                       <a:schemeClr val="bg1"/>
                     </a:solidFill>
                   </a:tcPr>
+                </a:tc>
+                <a:tc hMerge="1">
+                  <a:txBody>
+                    <a:bodyPr/>
+                    <a:lstStyle/>
+                    <a:p>
+                      <a:endParaRPr lang="en-US"/>
+                    </a:p>
+                  </a:txBody>
+                  <a:tcPr/>
                 </a:tc>
                 <a:tc>
                   <a:txBody>
@@ -17643,7 +18397,7 @@
                 </a:tc>
                 <a:extLst>
                   <a:ext uri="{0D108BD9-81ED-4DB2-BD59-A6C34878D82A}">
-                    <a16:rowId xmlns:a16="http://schemas.microsoft.com/office/drawing/2014/main" val="755606437"/>
+                    <a16:rowId xmlns:a16="http://schemas.microsoft.com/office/drawing/2014/main" val="2895485498"/>
                   </a:ext>
                 </a:extLst>
               </a:tr>
@@ -17740,7 +18494,7 @@
                         <a:rPr lang="en-US" sz="1000" dirty="0">
                           <a:latin typeface="Candara" panose="020E0502030303020204" pitchFamily="34" charset="0"/>
                         </a:rPr>
-                        <a:t>4</a:t>
+                        <a:t>6</a:t>
                       </a:r>
                     </a:p>
                   </a:txBody>
@@ -17801,7 +18555,7 @@
                     </a:solidFill>
                   </a:tcPr>
                 </a:tc>
-                <a:tc>
+                <a:tc gridSpan="2">
                   <a:txBody>
                     <a:bodyPr/>
                     <a:lstStyle/>
@@ -17810,7 +18564,7 @@
                         <a:rPr lang="en-US" sz="1000" dirty="0">
                           <a:latin typeface="Candara" panose="020E0502030303020204" pitchFamily="34" charset="0"/>
                         </a:rPr>
-                        <a:t>6</a:t>
+                        <a:t>8</a:t>
                       </a:r>
                     </a:p>
                   </a:txBody>
@@ -17837,6 +18591,16 @@
                       <a:schemeClr val="bg1"/>
                     </a:solidFill>
                   </a:tcPr>
+                </a:tc>
+                <a:tc hMerge="1">
+                  <a:txBody>
+                    <a:bodyPr/>
+                    <a:lstStyle/>
+                    <a:p>
+                      <a:endParaRPr lang="en-US"/>
+                    </a:p>
+                  </a:txBody>
+                  <a:tcPr/>
                 </a:tc>
                 <a:tc>
                   <a:txBody>
@@ -17975,7 +18739,7 @@
                 </a:tc>
                 <a:extLst>
                   <a:ext uri="{0D108BD9-81ED-4DB2-BD59-A6C34878D82A}">
-                    <a16:rowId xmlns:a16="http://schemas.microsoft.com/office/drawing/2014/main" val="2918878414"/>
+                    <a16:rowId xmlns:a16="http://schemas.microsoft.com/office/drawing/2014/main" val="705682689"/>
                   </a:ext>
                 </a:extLst>
               </a:tr>
@@ -18072,7 +18836,7 @@
                         <a:rPr lang="en-US" sz="1000" dirty="0">
                           <a:latin typeface="Candara" panose="020E0502030303020204" pitchFamily="34" charset="0"/>
                         </a:rPr>
-                        <a:t>5</a:t>
+                        <a:t>7</a:t>
                       </a:r>
                     </a:p>
                   </a:txBody>
@@ -18119,7 +18883,7 @@
                     <a:bodyPr/>
                     <a:lstStyle/>
                     <a:p>
-                      <a:endParaRPr lang="en-US" sz="1000" dirty="0">
+                      <a:endParaRPr lang="en-US" sz="1000">
                         <a:latin typeface="Candara" panose="020E0502030303020204" pitchFamily="34" charset="0"/>
                       </a:endParaRPr>
                     </a:p>
@@ -18133,7 +18897,7 @@
                     </a:solidFill>
                   </a:tcPr>
                 </a:tc>
-                <a:tc>
+                <a:tc gridSpan="2">
                   <a:txBody>
                     <a:bodyPr/>
                     <a:lstStyle/>
@@ -18142,7 +18906,7 @@
                         <a:rPr lang="en-US" sz="1000" dirty="0">
                           <a:latin typeface="Candara" panose="020E0502030303020204" pitchFamily="34" charset="0"/>
                         </a:rPr>
-                        <a:t>7</a:t>
+                        <a:t>9</a:t>
                       </a:r>
                     </a:p>
                   </a:txBody>
@@ -18169,6 +18933,666 @@
                       <a:schemeClr val="bg1"/>
                     </a:solidFill>
                   </a:tcPr>
+                </a:tc>
+                <a:tc hMerge="1">
+                  <a:txBody>
+                    <a:bodyPr/>
+                    <a:lstStyle/>
+                    <a:p>
+                      <a:endParaRPr lang="en-US"/>
+                    </a:p>
+                  </a:txBody>
+                  <a:tcPr/>
+                </a:tc>
+                <a:tc>
+                  <a:txBody>
+                    <a:bodyPr/>
+                    <a:lstStyle/>
+                    <a:p>
+                      <a:r>
+                        <a:rPr lang="en-US" sz="1000" dirty="0">
+                          <a:latin typeface="Candara" panose="020E0502030303020204" pitchFamily="34" charset="0"/>
+                        </a:rPr>
+                        <a:t>Complexity:</a:t>
+                      </a:r>
+                    </a:p>
+                  </a:txBody>
+                  <a:tcPr anchor="b">
+                    <a:lnT w="12700" cap="flat" cmpd="sng" algn="ctr">
+                      <a:solidFill>
+                        <a:schemeClr val="tx1"/>
+                      </a:solidFill>
+                      <a:prstDash val="solid"/>
+                      <a:round/>
+                      <a:headEnd type="none" w="med" len="med"/>
+                      <a:tailEnd type="none" w="med" len="med"/>
+                    </a:lnT>
+                    <a:lnB w="12700" cap="flat" cmpd="sng" algn="ctr">
+                      <a:solidFill>
+                        <a:schemeClr val="tx1"/>
+                      </a:solidFill>
+                      <a:prstDash val="solid"/>
+                      <a:round/>
+                      <a:headEnd type="none" w="med" len="med"/>
+                      <a:tailEnd type="none" w="med" len="med"/>
+                    </a:lnB>
+                    <a:solidFill>
+                      <a:schemeClr val="bg1"/>
+                    </a:solidFill>
+                  </a:tcPr>
+                </a:tc>
+                <a:tc>
+                  <a:txBody>
+                    <a:bodyPr/>
+                    <a:lstStyle/>
+                    <a:p>
+                      <a:r>
+                        <a:rPr lang="en-US" sz="1000">
+                          <a:latin typeface="Candara" panose="020E0502030303020204" pitchFamily="34" charset="0"/>
+                        </a:rPr>
+                        <a:t>Storage:</a:t>
+                      </a:r>
+                    </a:p>
+                  </a:txBody>
+                  <a:tcPr anchor="b">
+                    <a:lnT w="12700" cap="flat" cmpd="sng" algn="ctr">
+                      <a:solidFill>
+                        <a:schemeClr val="tx1"/>
+                      </a:solidFill>
+                      <a:prstDash val="solid"/>
+                      <a:round/>
+                      <a:headEnd type="none" w="med" len="med"/>
+                      <a:tailEnd type="none" w="med" len="med"/>
+                    </a:lnT>
+                    <a:lnB w="12700" cap="flat" cmpd="sng" algn="ctr">
+                      <a:solidFill>
+                        <a:schemeClr val="tx1"/>
+                      </a:solidFill>
+                      <a:prstDash val="solid"/>
+                      <a:round/>
+                      <a:headEnd type="none" w="med" len="med"/>
+                      <a:tailEnd type="none" w="med" len="med"/>
+                    </a:lnB>
+                    <a:solidFill>
+                      <a:schemeClr val="bg1"/>
+                    </a:solidFill>
+                  </a:tcPr>
+                </a:tc>
+                <a:tc vMerge="1">
+                  <a:txBody>
+                    <a:bodyPr/>
+                    <a:lstStyle/>
+                    <a:p>
+                      <a:pPr algn="ctr"/>
+                      <a:endParaRPr lang="en-US" sz="1600"/>
+                    </a:p>
+                  </a:txBody>
+                  <a:tcPr anchor="b"/>
+                </a:tc>
+                <a:tc>
+                  <a:txBody>
+                    <a:bodyPr/>
+                    <a:lstStyle/>
+                    <a:p>
+                      <a:endParaRPr lang="en-US" sz="1000">
+                        <a:latin typeface="Candara" panose="020E0502030303020204" pitchFamily="34" charset="0"/>
+                      </a:endParaRPr>
+                    </a:p>
+                  </a:txBody>
+                  <a:tcPr>
+                    <a:solidFill>
+                      <a:schemeClr val="bg1"/>
+                    </a:solidFill>
+                  </a:tcPr>
+                </a:tc>
+                <a:extLst>
+                  <a:ext uri="{0D108BD9-81ED-4DB2-BD59-A6C34878D82A}">
+                    <a16:rowId xmlns:a16="http://schemas.microsoft.com/office/drawing/2014/main" val="1485602186"/>
+                  </a:ext>
+                </a:extLst>
+              </a:tr>
+              <a:tr h="388620">
+                <a:tc>
+                  <a:txBody>
+                    <a:bodyPr/>
+                    <a:lstStyle/>
+                    <a:p>
+                      <a:endParaRPr lang="en-US" sz="1000">
+                        <a:latin typeface="Candara" panose="020E0502030303020204" pitchFamily="34" charset="0"/>
+                      </a:endParaRPr>
+                    </a:p>
+                  </a:txBody>
+                  <a:tcPr>
+                    <a:solidFill>
+                      <a:schemeClr val="bg1"/>
+                    </a:solidFill>
+                  </a:tcPr>
+                </a:tc>
+                <a:tc vMerge="1">
+                  <a:txBody>
+                    <a:bodyPr/>
+                    <a:lstStyle/>
+                    <a:p>
+                      <a:pPr algn="ctr"/>
+                      <a:endParaRPr lang="en-US" sz="1600"/>
+                    </a:p>
+                  </a:txBody>
+                  <a:tcPr anchor="b">
+                    <a:lnR w="12700" cmpd="sng">
+                      <a:noFill/>
+                    </a:lnR>
+                  </a:tcPr>
+                </a:tc>
+                <a:tc>
+                  <a:txBody>
+                    <a:bodyPr/>
+                    <a:lstStyle/>
+                    <a:p>
+                      <a:r>
+                        <a:rPr lang="en-US" sz="1000">
+                          <a:latin typeface="Candara" panose="020E0502030303020204" pitchFamily="34" charset="0"/>
+                        </a:rPr>
+                        <a:t>Body</a:t>
+                      </a:r>
+                    </a:p>
+                  </a:txBody>
+                  <a:tcPr anchor="b">
+                    <a:lnL w="12700" cmpd="sng">
+                      <a:noFill/>
+                    </a:lnL>
+                    <a:lnR w="12700" cmpd="sng">
+                      <a:noFill/>
+                    </a:lnR>
+                    <a:lnT w="12700" cap="flat" cmpd="sng" algn="ctr">
+                      <a:solidFill>
+                        <a:schemeClr val="tx1"/>
+                      </a:solidFill>
+                      <a:prstDash val="solid"/>
+                      <a:round/>
+                      <a:headEnd type="none" w="med" len="med"/>
+                      <a:tailEnd type="none" w="med" len="med"/>
+                    </a:lnT>
+                    <a:lnB w="12700" cap="flat" cmpd="sng" algn="ctr">
+                      <a:solidFill>
+                        <a:schemeClr val="tx1"/>
+                      </a:solidFill>
+                      <a:prstDash val="solid"/>
+                      <a:round/>
+                      <a:headEnd type="none" w="med" len="med"/>
+                      <a:tailEnd type="none" w="med" len="med"/>
+                    </a:lnB>
+                    <a:lnTlToBr w="12700" cmpd="sng">
+                      <a:noFill/>
+                      <a:prstDash val="solid"/>
+                    </a:lnTlToBr>
+                    <a:lnBlToTr w="12700" cmpd="sng">
+                      <a:noFill/>
+                      <a:prstDash val="solid"/>
+                    </a:lnBlToTr>
+                    <a:solidFill>
+                      <a:schemeClr val="bg1"/>
+                    </a:solidFill>
+                  </a:tcPr>
+                </a:tc>
+                <a:tc>
+                  <a:txBody>
+                    <a:bodyPr/>
+                    <a:lstStyle/>
+                    <a:p>
+                      <a:pPr algn="r"/>
+                      <a:r>
+                        <a:rPr lang="en-US" sz="1000" dirty="0">
+                          <a:latin typeface="Candara" panose="020E0502030303020204" pitchFamily="34" charset="0"/>
+                        </a:rPr>
+                        <a:t>8</a:t>
+                      </a:r>
+                    </a:p>
+                  </a:txBody>
+                  <a:tcPr anchor="b">
+                    <a:lnL w="12700" cmpd="sng">
+                      <a:noFill/>
+                    </a:lnL>
+                    <a:lnR w="12700" cmpd="sng">
+                      <a:noFill/>
+                    </a:lnR>
+                    <a:lnT w="12700" cap="flat" cmpd="sng" algn="ctr">
+                      <a:solidFill>
+                        <a:schemeClr val="tx1"/>
+                      </a:solidFill>
+                      <a:prstDash val="solid"/>
+                      <a:round/>
+                      <a:headEnd type="none" w="med" len="med"/>
+                      <a:tailEnd type="none" w="med" len="med"/>
+                    </a:lnT>
+                    <a:lnB w="12700" cap="flat" cmpd="sng" algn="ctr">
+                      <a:solidFill>
+                        <a:schemeClr val="tx1"/>
+                      </a:solidFill>
+                      <a:prstDash val="solid"/>
+                      <a:round/>
+                      <a:headEnd type="none" w="med" len="med"/>
+                      <a:tailEnd type="none" w="med" len="med"/>
+                    </a:lnB>
+                    <a:lnTlToBr w="12700" cmpd="sng">
+                      <a:noFill/>
+                      <a:prstDash val="solid"/>
+                    </a:lnTlToBr>
+                    <a:lnBlToTr w="12700" cmpd="sng">
+                      <a:noFill/>
+                      <a:prstDash val="solid"/>
+                    </a:lnBlToTr>
+                    <a:solidFill>
+                      <a:schemeClr val="bg1"/>
+                    </a:solidFill>
+                  </a:tcPr>
+                </a:tc>
+                <a:tc>
+                  <a:txBody>
+                    <a:bodyPr/>
+                    <a:lstStyle/>
+                    <a:p>
+                      <a:endParaRPr lang="en-US" sz="1000">
+                        <a:latin typeface="Candara" panose="020E0502030303020204" pitchFamily="34" charset="0"/>
+                      </a:endParaRPr>
+                    </a:p>
+                  </a:txBody>
+                  <a:tcPr anchor="b">
+                    <a:lnL w="12700" cmpd="sng">
+                      <a:noFill/>
+                    </a:lnL>
+                    <a:solidFill>
+                      <a:schemeClr val="bg1"/>
+                    </a:solidFill>
+                  </a:tcPr>
+                </a:tc>
+                <a:tc gridSpan="2">
+                  <a:txBody>
+                    <a:bodyPr/>
+                    <a:lstStyle/>
+                    <a:p>
+                      <a:r>
+                        <a:rPr lang="en-US" sz="1000" dirty="0">
+                          <a:latin typeface="Candara" panose="020E0502030303020204" pitchFamily="34" charset="0"/>
+                        </a:rPr>
+                        <a:t>10</a:t>
+                      </a:r>
+                    </a:p>
+                  </a:txBody>
+                  <a:tcPr anchor="b">
+                    <a:lnT w="12700" cap="flat" cmpd="sng" algn="ctr">
+                      <a:solidFill>
+                        <a:schemeClr val="tx1"/>
+                      </a:solidFill>
+                      <a:prstDash val="solid"/>
+                      <a:round/>
+                      <a:headEnd type="none" w="med" len="med"/>
+                      <a:tailEnd type="none" w="med" len="med"/>
+                    </a:lnT>
+                    <a:lnB w="12700" cap="flat" cmpd="sng" algn="ctr">
+                      <a:solidFill>
+                        <a:schemeClr val="tx1"/>
+                      </a:solidFill>
+                      <a:prstDash val="solid"/>
+                      <a:round/>
+                      <a:headEnd type="none" w="med" len="med"/>
+                      <a:tailEnd type="none" w="med" len="med"/>
+                    </a:lnB>
+                    <a:solidFill>
+                      <a:schemeClr val="bg1"/>
+                    </a:solidFill>
+                  </a:tcPr>
+                </a:tc>
+                <a:tc hMerge="1">
+                  <a:txBody>
+                    <a:bodyPr/>
+                    <a:lstStyle/>
+                    <a:p>
+                      <a:endParaRPr lang="en-US"/>
+                    </a:p>
+                  </a:txBody>
+                  <a:tcPr/>
+                </a:tc>
+                <a:tc>
+                  <a:txBody>
+                    <a:bodyPr/>
+                    <a:lstStyle/>
+                    <a:p>
+                      <a:pPr marL="0" marR="0" lvl="0" indent="0" algn="l" defTabSz="1005840" rtl="0" eaLnBrk="1" fontAlgn="auto" latinLnBrk="0" hangingPunct="1">
+                        <a:lnSpc>
+                          <a:spcPct val="100000"/>
+                        </a:lnSpc>
+                        <a:spcBef>
+                          <a:spcPts val="0"/>
+                        </a:spcBef>
+                        <a:spcAft>
+                          <a:spcPts val="0"/>
+                        </a:spcAft>
+                        <a:buClrTx/>
+                        <a:buSzTx/>
+                        <a:buFontTx/>
+                        <a:buNone/>
+                        <a:tabLst/>
+                        <a:defRPr/>
+                      </a:pPr>
+                      <a:r>
+                        <a:rPr lang="en-US" sz="1000" dirty="0">
+                          <a:latin typeface="Candara" panose="020E0502030303020204" pitchFamily="34" charset="0"/>
+                        </a:rPr>
+                        <a:t>Complexity:</a:t>
+                      </a:r>
+                    </a:p>
+                  </a:txBody>
+                  <a:tcPr anchor="b">
+                    <a:lnT w="12700" cap="flat" cmpd="sng" algn="ctr">
+                      <a:solidFill>
+                        <a:schemeClr val="tx1"/>
+                      </a:solidFill>
+                      <a:prstDash val="solid"/>
+                      <a:round/>
+                      <a:headEnd type="none" w="med" len="med"/>
+                      <a:tailEnd type="none" w="med" len="med"/>
+                    </a:lnT>
+                    <a:lnB w="12700" cap="flat" cmpd="sng" algn="ctr">
+                      <a:solidFill>
+                        <a:schemeClr val="tx1"/>
+                      </a:solidFill>
+                      <a:prstDash val="solid"/>
+                      <a:round/>
+                      <a:headEnd type="none" w="med" len="med"/>
+                      <a:tailEnd type="none" w="med" len="med"/>
+                    </a:lnB>
+                    <a:solidFill>
+                      <a:schemeClr val="bg1"/>
+                    </a:solidFill>
+                  </a:tcPr>
+                </a:tc>
+                <a:tc>
+                  <a:txBody>
+                    <a:bodyPr/>
+                    <a:lstStyle/>
+                    <a:p>
+                      <a:pPr marL="0" marR="0" lvl="0" indent="0" algn="l" defTabSz="1005840" rtl="0" eaLnBrk="1" fontAlgn="auto" latinLnBrk="0" hangingPunct="1">
+                        <a:lnSpc>
+                          <a:spcPct val="100000"/>
+                        </a:lnSpc>
+                        <a:spcBef>
+                          <a:spcPts val="0"/>
+                        </a:spcBef>
+                        <a:spcAft>
+                          <a:spcPts val="0"/>
+                        </a:spcAft>
+                        <a:buClrTx/>
+                        <a:buSzTx/>
+                        <a:buFontTx/>
+                        <a:buNone/>
+                        <a:tabLst/>
+                        <a:defRPr/>
+                      </a:pPr>
+                      <a:r>
+                        <a:rPr lang="en-US" sz="1000" dirty="0">
+                          <a:latin typeface="Candara" panose="020E0502030303020204" pitchFamily="34" charset="0"/>
+                        </a:rPr>
+                        <a:t>Storage:</a:t>
+                      </a:r>
+                    </a:p>
+                  </a:txBody>
+                  <a:tcPr anchor="b">
+                    <a:lnT w="12700" cap="flat" cmpd="sng" algn="ctr">
+                      <a:solidFill>
+                        <a:schemeClr val="tx1"/>
+                      </a:solidFill>
+                      <a:prstDash val="solid"/>
+                      <a:round/>
+                      <a:headEnd type="none" w="med" len="med"/>
+                      <a:tailEnd type="none" w="med" len="med"/>
+                    </a:lnT>
+                    <a:lnB w="12700" cap="flat" cmpd="sng" algn="ctr">
+                      <a:solidFill>
+                        <a:schemeClr val="tx1"/>
+                      </a:solidFill>
+                      <a:prstDash val="solid"/>
+                      <a:round/>
+                      <a:headEnd type="none" w="med" len="med"/>
+                      <a:tailEnd type="none" w="med" len="med"/>
+                    </a:lnB>
+                    <a:solidFill>
+                      <a:schemeClr val="bg1"/>
+                    </a:solidFill>
+                  </a:tcPr>
+                </a:tc>
+                <a:tc vMerge="1">
+                  <a:txBody>
+                    <a:bodyPr/>
+                    <a:lstStyle/>
+                    <a:p>
+                      <a:pPr algn="ctr"/>
+                      <a:endParaRPr lang="en-US" sz="1600"/>
+                    </a:p>
+                  </a:txBody>
+                  <a:tcPr anchor="b"/>
+                </a:tc>
+                <a:tc>
+                  <a:txBody>
+                    <a:bodyPr/>
+                    <a:lstStyle/>
+                    <a:p>
+                      <a:endParaRPr lang="en-US" sz="1000">
+                        <a:latin typeface="Candara" panose="020E0502030303020204" pitchFamily="34" charset="0"/>
+                      </a:endParaRPr>
+                    </a:p>
+                  </a:txBody>
+                  <a:tcPr>
+                    <a:solidFill>
+                      <a:schemeClr val="bg1"/>
+                    </a:solidFill>
+                  </a:tcPr>
+                </a:tc>
+                <a:extLst>
+                  <a:ext uri="{0D108BD9-81ED-4DB2-BD59-A6C34878D82A}">
+                    <a16:rowId xmlns:a16="http://schemas.microsoft.com/office/drawing/2014/main" val="15700670"/>
+                  </a:ext>
+                </a:extLst>
+              </a:tr>
+              <a:tr h="388620">
+                <a:tc>
+                  <a:txBody>
+                    <a:bodyPr/>
+                    <a:lstStyle/>
+                    <a:p>
+                      <a:endParaRPr lang="en-US" sz="1000" dirty="0">
+                        <a:latin typeface="Candara" panose="020E0502030303020204" pitchFamily="34" charset="0"/>
+                      </a:endParaRPr>
+                    </a:p>
+                  </a:txBody>
+                  <a:tcPr>
+                    <a:solidFill>
+                      <a:schemeClr val="bg1"/>
+                    </a:solidFill>
+                  </a:tcPr>
+                </a:tc>
+                <a:tc vMerge="1">
+                  <a:txBody>
+                    <a:bodyPr/>
+                    <a:lstStyle/>
+                    <a:p>
+                      <a:pPr algn="ctr"/>
+                      <a:endParaRPr lang="en-US" sz="1600"/>
+                    </a:p>
+                  </a:txBody>
+                  <a:tcPr anchor="b">
+                    <a:lnR w="12700" cmpd="sng">
+                      <a:noFill/>
+                    </a:lnR>
+                  </a:tcPr>
+                </a:tc>
+                <a:tc>
+                  <a:txBody>
+                    <a:bodyPr/>
+                    <a:lstStyle/>
+                    <a:p>
+                      <a:r>
+                        <a:rPr lang="en-US" sz="1000">
+                          <a:latin typeface="Candara" panose="020E0502030303020204" pitchFamily="34" charset="0"/>
+                        </a:rPr>
+                        <a:t>Body</a:t>
+                      </a:r>
+                    </a:p>
+                  </a:txBody>
+                  <a:tcPr anchor="b">
+                    <a:lnL w="12700" cmpd="sng">
+                      <a:noFill/>
+                    </a:lnL>
+                    <a:lnR w="12700" cmpd="sng">
+                      <a:noFill/>
+                    </a:lnR>
+                    <a:lnT w="12700" cap="flat" cmpd="sng" algn="ctr">
+                      <a:solidFill>
+                        <a:schemeClr val="tx1"/>
+                      </a:solidFill>
+                      <a:prstDash val="solid"/>
+                      <a:round/>
+                      <a:headEnd type="none" w="med" len="med"/>
+                      <a:tailEnd type="none" w="med" len="med"/>
+                    </a:lnT>
+                    <a:lnB w="12700" cap="flat" cmpd="sng" algn="ctr">
+                      <a:solidFill>
+                        <a:schemeClr val="tx1"/>
+                      </a:solidFill>
+                      <a:prstDash val="solid"/>
+                      <a:round/>
+                      <a:headEnd type="none" w="med" len="med"/>
+                      <a:tailEnd type="none" w="med" len="med"/>
+                    </a:lnB>
+                    <a:lnTlToBr w="12700" cmpd="sng">
+                      <a:noFill/>
+                      <a:prstDash val="solid"/>
+                    </a:lnTlToBr>
+                    <a:lnBlToTr w="12700" cmpd="sng">
+                      <a:noFill/>
+                      <a:prstDash val="solid"/>
+                    </a:lnBlToTr>
+                    <a:solidFill>
+                      <a:schemeClr val="bg1"/>
+                    </a:solidFill>
+                  </a:tcPr>
+                </a:tc>
+                <a:tc>
+                  <a:txBody>
+                    <a:bodyPr/>
+                    <a:lstStyle/>
+                    <a:p>
+                      <a:pPr algn="r"/>
+                      <a:r>
+                        <a:rPr lang="en-US" sz="1000" dirty="0">
+                          <a:latin typeface="Candara" panose="020E0502030303020204" pitchFamily="34" charset="0"/>
+                        </a:rPr>
+                        <a:t>9</a:t>
+                      </a:r>
+                    </a:p>
+                  </a:txBody>
+                  <a:tcPr anchor="b">
+                    <a:lnL w="12700" cmpd="sng">
+                      <a:noFill/>
+                    </a:lnL>
+                    <a:lnR w="12700" cmpd="sng">
+                      <a:noFill/>
+                    </a:lnR>
+                    <a:lnT w="12700" cap="flat" cmpd="sng" algn="ctr">
+                      <a:solidFill>
+                        <a:schemeClr val="tx1"/>
+                      </a:solidFill>
+                      <a:prstDash val="solid"/>
+                      <a:round/>
+                      <a:headEnd type="none" w="med" len="med"/>
+                      <a:tailEnd type="none" w="med" len="med"/>
+                    </a:lnT>
+                    <a:lnB w="12700" cap="flat" cmpd="sng" algn="ctr">
+                      <a:solidFill>
+                        <a:schemeClr val="tx1"/>
+                      </a:solidFill>
+                      <a:prstDash val="solid"/>
+                      <a:round/>
+                      <a:headEnd type="none" w="med" len="med"/>
+                      <a:tailEnd type="none" w="med" len="med"/>
+                    </a:lnB>
+                    <a:lnTlToBr w="12700" cmpd="sng">
+                      <a:noFill/>
+                      <a:prstDash val="solid"/>
+                    </a:lnTlToBr>
+                    <a:lnBlToTr w="12700" cmpd="sng">
+                      <a:noFill/>
+                      <a:prstDash val="solid"/>
+                    </a:lnBlToTr>
+                    <a:solidFill>
+                      <a:schemeClr val="bg1"/>
+                    </a:solidFill>
+                  </a:tcPr>
+                </a:tc>
+                <a:tc>
+                  <a:txBody>
+                    <a:bodyPr/>
+                    <a:lstStyle/>
+                    <a:p>
+                      <a:endParaRPr lang="en-US" sz="1000">
+                        <a:latin typeface="Candara" panose="020E0502030303020204" pitchFamily="34" charset="0"/>
+                      </a:endParaRPr>
+                    </a:p>
+                  </a:txBody>
+                  <a:tcPr anchor="b">
+                    <a:lnL w="12700" cmpd="sng">
+                      <a:noFill/>
+                    </a:lnL>
+                    <a:solidFill>
+                      <a:schemeClr val="bg1"/>
+                    </a:solidFill>
+                  </a:tcPr>
+                </a:tc>
+                <a:tc gridSpan="2">
+                  <a:txBody>
+                    <a:bodyPr/>
+                    <a:lstStyle/>
+                    <a:p>
+                      <a:r>
+                        <a:rPr lang="en-US" sz="1000" dirty="0">
+                          <a:latin typeface="Candara" panose="020E0502030303020204" pitchFamily="34" charset="0"/>
+                        </a:rPr>
+                        <a:t>11</a:t>
+                      </a:r>
+                    </a:p>
+                  </a:txBody>
+                  <a:tcPr anchor="b">
+                    <a:lnT w="12700" cap="flat" cmpd="sng" algn="ctr">
+                      <a:solidFill>
+                        <a:schemeClr val="tx1"/>
+                      </a:solidFill>
+                      <a:prstDash val="solid"/>
+                      <a:round/>
+                      <a:headEnd type="none" w="med" len="med"/>
+                      <a:tailEnd type="none" w="med" len="med"/>
+                    </a:lnT>
+                    <a:lnB w="12700" cap="flat" cmpd="sng" algn="ctr">
+                      <a:solidFill>
+                        <a:schemeClr val="tx1"/>
+                      </a:solidFill>
+                      <a:prstDash val="solid"/>
+                      <a:round/>
+                      <a:headEnd type="none" w="med" len="med"/>
+                      <a:tailEnd type="none" w="med" len="med"/>
+                    </a:lnB>
+                    <a:solidFill>
+                      <a:schemeClr val="bg1"/>
+                    </a:solidFill>
+                  </a:tcPr>
+                </a:tc>
+                <a:tc hMerge="1">
+                  <a:txBody>
+                    <a:bodyPr/>
+                    <a:lstStyle/>
+                    <a:p>
+                      <a:endParaRPr lang="en-US"/>
+                    </a:p>
+                  </a:txBody>
+                  <a:tcPr/>
                 </a:tc>
                 <a:tc>
                   <a:txBody>
@@ -18213,7 +19637,7 @@
                     <a:lstStyle/>
                     <a:p>
                       <a:r>
-                        <a:rPr lang="en-US" sz="1000">
+                        <a:rPr lang="en-US" sz="1000" dirty="0">
                           <a:latin typeface="Candara" panose="020E0502030303020204" pitchFamily="34" charset="0"/>
                         </a:rPr>
                         <a:t>Storage:</a:t>
@@ -18273,7 +19697,7 @@
                 </a:tc>
                 <a:extLst>
                   <a:ext uri="{0D108BD9-81ED-4DB2-BD59-A6C34878D82A}">
-                    <a16:rowId xmlns:a16="http://schemas.microsoft.com/office/drawing/2014/main" val="2895485498"/>
+                    <a16:rowId xmlns:a16="http://schemas.microsoft.com/office/drawing/2014/main" val="678925714"/>
                   </a:ext>
                 </a:extLst>
               </a:tr>
@@ -18370,7 +19794,7 @@
                         <a:rPr lang="en-US" sz="1000" dirty="0">
                           <a:latin typeface="Candara" panose="020E0502030303020204" pitchFamily="34" charset="0"/>
                         </a:rPr>
-                        <a:t>6</a:t>
+                        <a:t>10</a:t>
                       </a:r>
                     </a:p>
                   </a:txBody>
@@ -18431,7 +19855,7 @@
                     </a:solidFill>
                   </a:tcPr>
                 </a:tc>
-                <a:tc>
+                <a:tc gridSpan="2">
                   <a:txBody>
                     <a:bodyPr/>
                     <a:lstStyle/>
@@ -18440,7 +19864,7 @@
                         <a:rPr lang="en-US" sz="1000" dirty="0">
                           <a:latin typeface="Candara" panose="020E0502030303020204" pitchFamily="34" charset="0"/>
                         </a:rPr>
-                        <a:t>8</a:t>
+                        <a:t>12</a:t>
                       </a:r>
                     </a:p>
                   </a:txBody>
@@ -18467,6 +19891,16 @@
                       <a:schemeClr val="bg1"/>
                     </a:solidFill>
                   </a:tcPr>
+                </a:tc>
+                <a:tc hMerge="1">
+                  <a:txBody>
+                    <a:bodyPr/>
+                    <a:lstStyle/>
+                    <a:p>
+                      <a:endParaRPr lang="en-US"/>
+                    </a:p>
+                  </a:txBody>
+                  <a:tcPr/>
                 </a:tc>
                 <a:tc>
                   <a:txBody>
@@ -18545,1266 +19979,6 @@
                         <a:defRPr/>
                       </a:pPr>
                       <a:r>
-                        <a:rPr lang="en-US" sz="1000">
-                          <a:latin typeface="Candara" panose="020E0502030303020204" pitchFamily="34" charset="0"/>
-                        </a:rPr>
-                        <a:t>Storage:</a:t>
-                      </a:r>
-                    </a:p>
-                  </a:txBody>
-                  <a:tcPr anchor="b">
-                    <a:lnT w="12700" cap="flat" cmpd="sng" algn="ctr">
-                      <a:solidFill>
-                        <a:schemeClr val="tx1"/>
-                      </a:solidFill>
-                      <a:prstDash val="solid"/>
-                      <a:round/>
-                      <a:headEnd type="none" w="med" len="med"/>
-                      <a:tailEnd type="none" w="med" len="med"/>
-                    </a:lnT>
-                    <a:lnB w="12700" cap="flat" cmpd="sng" algn="ctr">
-                      <a:solidFill>
-                        <a:schemeClr val="tx1"/>
-                      </a:solidFill>
-                      <a:prstDash val="solid"/>
-                      <a:round/>
-                      <a:headEnd type="none" w="med" len="med"/>
-                      <a:tailEnd type="none" w="med" len="med"/>
-                    </a:lnB>
-                    <a:solidFill>
-                      <a:schemeClr val="bg1"/>
-                    </a:solidFill>
-                  </a:tcPr>
-                </a:tc>
-                <a:tc vMerge="1">
-                  <a:txBody>
-                    <a:bodyPr/>
-                    <a:lstStyle/>
-                    <a:p>
-                      <a:pPr algn="ctr"/>
-                      <a:endParaRPr lang="en-US" sz="1600"/>
-                    </a:p>
-                  </a:txBody>
-                  <a:tcPr anchor="b"/>
-                </a:tc>
-                <a:tc>
-                  <a:txBody>
-                    <a:bodyPr/>
-                    <a:lstStyle/>
-                    <a:p>
-                      <a:endParaRPr lang="en-US" sz="1000">
-                        <a:latin typeface="Candara" panose="020E0502030303020204" pitchFamily="34" charset="0"/>
-                      </a:endParaRPr>
-                    </a:p>
-                  </a:txBody>
-                  <a:tcPr>
-                    <a:solidFill>
-                      <a:schemeClr val="bg1"/>
-                    </a:solidFill>
-                  </a:tcPr>
-                </a:tc>
-                <a:extLst>
-                  <a:ext uri="{0D108BD9-81ED-4DB2-BD59-A6C34878D82A}">
-                    <a16:rowId xmlns:a16="http://schemas.microsoft.com/office/drawing/2014/main" val="705682689"/>
-                  </a:ext>
-                </a:extLst>
-              </a:tr>
-              <a:tr h="388620">
-                <a:tc>
-                  <a:txBody>
-                    <a:bodyPr/>
-                    <a:lstStyle/>
-                    <a:p>
-                      <a:endParaRPr lang="en-US" sz="1000">
-                        <a:latin typeface="Candara" panose="020E0502030303020204" pitchFamily="34" charset="0"/>
-                      </a:endParaRPr>
-                    </a:p>
-                  </a:txBody>
-                  <a:tcPr>
-                    <a:solidFill>
-                      <a:schemeClr val="bg1"/>
-                    </a:solidFill>
-                  </a:tcPr>
-                </a:tc>
-                <a:tc vMerge="1">
-                  <a:txBody>
-                    <a:bodyPr/>
-                    <a:lstStyle/>
-                    <a:p>
-                      <a:pPr algn="ctr"/>
-                      <a:endParaRPr lang="en-US" sz="1600"/>
-                    </a:p>
-                  </a:txBody>
-                  <a:tcPr anchor="b">
-                    <a:lnR w="12700" cmpd="sng">
-                      <a:noFill/>
-                    </a:lnR>
-                  </a:tcPr>
-                </a:tc>
-                <a:tc>
-                  <a:txBody>
-                    <a:bodyPr/>
-                    <a:lstStyle/>
-                    <a:p>
-                      <a:r>
-                        <a:rPr lang="en-US" sz="1000">
-                          <a:latin typeface="Candara" panose="020E0502030303020204" pitchFamily="34" charset="0"/>
-                        </a:rPr>
-                        <a:t>Body</a:t>
-                      </a:r>
-                    </a:p>
-                  </a:txBody>
-                  <a:tcPr anchor="b">
-                    <a:lnL w="12700" cmpd="sng">
-                      <a:noFill/>
-                    </a:lnL>
-                    <a:lnR w="12700" cmpd="sng">
-                      <a:noFill/>
-                    </a:lnR>
-                    <a:lnT w="12700" cap="flat" cmpd="sng" algn="ctr">
-                      <a:solidFill>
-                        <a:schemeClr val="tx1"/>
-                      </a:solidFill>
-                      <a:prstDash val="solid"/>
-                      <a:round/>
-                      <a:headEnd type="none" w="med" len="med"/>
-                      <a:tailEnd type="none" w="med" len="med"/>
-                    </a:lnT>
-                    <a:lnB w="12700" cap="flat" cmpd="sng" algn="ctr">
-                      <a:solidFill>
-                        <a:schemeClr val="tx1"/>
-                      </a:solidFill>
-                      <a:prstDash val="solid"/>
-                      <a:round/>
-                      <a:headEnd type="none" w="med" len="med"/>
-                      <a:tailEnd type="none" w="med" len="med"/>
-                    </a:lnB>
-                    <a:lnTlToBr w="12700" cmpd="sng">
-                      <a:noFill/>
-                      <a:prstDash val="solid"/>
-                    </a:lnTlToBr>
-                    <a:lnBlToTr w="12700" cmpd="sng">
-                      <a:noFill/>
-                      <a:prstDash val="solid"/>
-                    </a:lnBlToTr>
-                    <a:solidFill>
-                      <a:schemeClr val="bg1"/>
-                    </a:solidFill>
-                  </a:tcPr>
-                </a:tc>
-                <a:tc>
-                  <a:txBody>
-                    <a:bodyPr/>
-                    <a:lstStyle/>
-                    <a:p>
-                      <a:pPr algn="r"/>
-                      <a:r>
-                        <a:rPr lang="en-US" sz="1000" dirty="0">
-                          <a:latin typeface="Candara" panose="020E0502030303020204" pitchFamily="34" charset="0"/>
-                        </a:rPr>
-                        <a:t>7</a:t>
-                      </a:r>
-                    </a:p>
-                  </a:txBody>
-                  <a:tcPr anchor="b">
-                    <a:lnL w="12700" cmpd="sng">
-                      <a:noFill/>
-                    </a:lnL>
-                    <a:lnR w="12700" cmpd="sng">
-                      <a:noFill/>
-                    </a:lnR>
-                    <a:lnT w="12700" cap="flat" cmpd="sng" algn="ctr">
-                      <a:solidFill>
-                        <a:schemeClr val="tx1"/>
-                      </a:solidFill>
-                      <a:prstDash val="solid"/>
-                      <a:round/>
-                      <a:headEnd type="none" w="med" len="med"/>
-                      <a:tailEnd type="none" w="med" len="med"/>
-                    </a:lnT>
-                    <a:lnB w="12700" cap="flat" cmpd="sng" algn="ctr">
-                      <a:solidFill>
-                        <a:schemeClr val="tx1"/>
-                      </a:solidFill>
-                      <a:prstDash val="solid"/>
-                      <a:round/>
-                      <a:headEnd type="none" w="med" len="med"/>
-                      <a:tailEnd type="none" w="med" len="med"/>
-                    </a:lnB>
-                    <a:lnTlToBr w="12700" cmpd="sng">
-                      <a:noFill/>
-                      <a:prstDash val="solid"/>
-                    </a:lnTlToBr>
-                    <a:lnBlToTr w="12700" cmpd="sng">
-                      <a:noFill/>
-                      <a:prstDash val="solid"/>
-                    </a:lnBlToTr>
-                    <a:solidFill>
-                      <a:schemeClr val="bg1"/>
-                    </a:solidFill>
-                  </a:tcPr>
-                </a:tc>
-                <a:tc>
-                  <a:txBody>
-                    <a:bodyPr/>
-                    <a:lstStyle/>
-                    <a:p>
-                      <a:endParaRPr lang="en-US" sz="1000">
-                        <a:latin typeface="Candara" panose="020E0502030303020204" pitchFamily="34" charset="0"/>
-                      </a:endParaRPr>
-                    </a:p>
-                  </a:txBody>
-                  <a:tcPr anchor="b">
-                    <a:lnL w="12700" cmpd="sng">
-                      <a:noFill/>
-                    </a:lnL>
-                    <a:solidFill>
-                      <a:schemeClr val="bg1"/>
-                    </a:solidFill>
-                  </a:tcPr>
-                </a:tc>
-                <a:tc>
-                  <a:txBody>
-                    <a:bodyPr/>
-                    <a:lstStyle/>
-                    <a:p>
-                      <a:r>
-                        <a:rPr lang="en-US" sz="1000" dirty="0">
-                          <a:latin typeface="Candara" panose="020E0502030303020204" pitchFamily="34" charset="0"/>
-                        </a:rPr>
-                        <a:t>9</a:t>
-                      </a:r>
-                    </a:p>
-                  </a:txBody>
-                  <a:tcPr anchor="b">
-                    <a:lnT w="12700" cap="flat" cmpd="sng" algn="ctr">
-                      <a:solidFill>
-                        <a:schemeClr val="tx1"/>
-                      </a:solidFill>
-                      <a:prstDash val="solid"/>
-                      <a:round/>
-                      <a:headEnd type="none" w="med" len="med"/>
-                      <a:tailEnd type="none" w="med" len="med"/>
-                    </a:lnT>
-                    <a:lnB w="12700" cap="flat" cmpd="sng" algn="ctr">
-                      <a:solidFill>
-                        <a:schemeClr val="tx1"/>
-                      </a:solidFill>
-                      <a:prstDash val="solid"/>
-                      <a:round/>
-                      <a:headEnd type="none" w="med" len="med"/>
-                      <a:tailEnd type="none" w="med" len="med"/>
-                    </a:lnB>
-                    <a:solidFill>
-                      <a:schemeClr val="bg1"/>
-                    </a:solidFill>
-                  </a:tcPr>
-                </a:tc>
-                <a:tc>
-                  <a:txBody>
-                    <a:bodyPr/>
-                    <a:lstStyle/>
-                    <a:p>
-                      <a:r>
-                        <a:rPr lang="en-US" sz="1000" dirty="0">
-                          <a:latin typeface="Candara" panose="020E0502030303020204" pitchFamily="34" charset="0"/>
-                        </a:rPr>
-                        <a:t>Complexity:</a:t>
-                      </a:r>
-                    </a:p>
-                  </a:txBody>
-                  <a:tcPr anchor="b">
-                    <a:lnT w="12700" cap="flat" cmpd="sng" algn="ctr">
-                      <a:solidFill>
-                        <a:schemeClr val="tx1"/>
-                      </a:solidFill>
-                      <a:prstDash val="solid"/>
-                      <a:round/>
-                      <a:headEnd type="none" w="med" len="med"/>
-                      <a:tailEnd type="none" w="med" len="med"/>
-                    </a:lnT>
-                    <a:lnB w="12700" cap="flat" cmpd="sng" algn="ctr">
-                      <a:solidFill>
-                        <a:schemeClr val="tx1"/>
-                      </a:solidFill>
-                      <a:prstDash val="solid"/>
-                      <a:round/>
-                      <a:headEnd type="none" w="med" len="med"/>
-                      <a:tailEnd type="none" w="med" len="med"/>
-                    </a:lnB>
-                    <a:solidFill>
-                      <a:schemeClr val="bg1"/>
-                    </a:solidFill>
-                  </a:tcPr>
-                </a:tc>
-                <a:tc>
-                  <a:txBody>
-                    <a:bodyPr/>
-                    <a:lstStyle/>
-                    <a:p>
-                      <a:r>
-                        <a:rPr lang="en-US" sz="1000">
-                          <a:latin typeface="Candara" panose="020E0502030303020204" pitchFamily="34" charset="0"/>
-                        </a:rPr>
-                        <a:t>Storage:</a:t>
-                      </a:r>
-                    </a:p>
-                  </a:txBody>
-                  <a:tcPr anchor="b">
-                    <a:lnT w="12700" cap="flat" cmpd="sng" algn="ctr">
-                      <a:solidFill>
-                        <a:schemeClr val="tx1"/>
-                      </a:solidFill>
-                      <a:prstDash val="solid"/>
-                      <a:round/>
-                      <a:headEnd type="none" w="med" len="med"/>
-                      <a:tailEnd type="none" w="med" len="med"/>
-                    </a:lnT>
-                    <a:lnB w="12700" cap="flat" cmpd="sng" algn="ctr">
-                      <a:solidFill>
-                        <a:schemeClr val="tx1"/>
-                      </a:solidFill>
-                      <a:prstDash val="solid"/>
-                      <a:round/>
-                      <a:headEnd type="none" w="med" len="med"/>
-                      <a:tailEnd type="none" w="med" len="med"/>
-                    </a:lnB>
-                    <a:solidFill>
-                      <a:schemeClr val="bg1"/>
-                    </a:solidFill>
-                  </a:tcPr>
-                </a:tc>
-                <a:tc vMerge="1">
-                  <a:txBody>
-                    <a:bodyPr/>
-                    <a:lstStyle/>
-                    <a:p>
-                      <a:pPr algn="ctr"/>
-                      <a:endParaRPr lang="en-US" sz="1600"/>
-                    </a:p>
-                  </a:txBody>
-                  <a:tcPr anchor="b"/>
-                </a:tc>
-                <a:tc>
-                  <a:txBody>
-                    <a:bodyPr/>
-                    <a:lstStyle/>
-                    <a:p>
-                      <a:endParaRPr lang="en-US" sz="1000">
-                        <a:latin typeface="Candara" panose="020E0502030303020204" pitchFamily="34" charset="0"/>
-                      </a:endParaRPr>
-                    </a:p>
-                  </a:txBody>
-                  <a:tcPr>
-                    <a:solidFill>
-                      <a:schemeClr val="bg1"/>
-                    </a:solidFill>
-                  </a:tcPr>
-                </a:tc>
-                <a:extLst>
-                  <a:ext uri="{0D108BD9-81ED-4DB2-BD59-A6C34878D82A}">
-                    <a16:rowId xmlns:a16="http://schemas.microsoft.com/office/drawing/2014/main" val="1485602186"/>
-                  </a:ext>
-                </a:extLst>
-              </a:tr>
-              <a:tr h="388620">
-                <a:tc>
-                  <a:txBody>
-                    <a:bodyPr/>
-                    <a:lstStyle/>
-                    <a:p>
-                      <a:endParaRPr lang="en-US" sz="1000">
-                        <a:latin typeface="Candara" panose="020E0502030303020204" pitchFamily="34" charset="0"/>
-                      </a:endParaRPr>
-                    </a:p>
-                  </a:txBody>
-                  <a:tcPr>
-                    <a:solidFill>
-                      <a:schemeClr val="bg1"/>
-                    </a:solidFill>
-                  </a:tcPr>
-                </a:tc>
-                <a:tc vMerge="1">
-                  <a:txBody>
-                    <a:bodyPr/>
-                    <a:lstStyle/>
-                    <a:p>
-                      <a:pPr algn="ctr"/>
-                      <a:endParaRPr lang="en-US" sz="1600"/>
-                    </a:p>
-                  </a:txBody>
-                  <a:tcPr anchor="b">
-                    <a:lnR w="12700" cmpd="sng">
-                      <a:noFill/>
-                    </a:lnR>
-                  </a:tcPr>
-                </a:tc>
-                <a:tc>
-                  <a:txBody>
-                    <a:bodyPr/>
-                    <a:lstStyle/>
-                    <a:p>
-                      <a:r>
-                        <a:rPr lang="en-US" sz="1000">
-                          <a:latin typeface="Candara" panose="020E0502030303020204" pitchFamily="34" charset="0"/>
-                        </a:rPr>
-                        <a:t>Body</a:t>
-                      </a:r>
-                    </a:p>
-                  </a:txBody>
-                  <a:tcPr anchor="b">
-                    <a:lnL w="12700" cmpd="sng">
-                      <a:noFill/>
-                    </a:lnL>
-                    <a:lnR w="12700" cmpd="sng">
-                      <a:noFill/>
-                    </a:lnR>
-                    <a:lnT w="12700" cap="flat" cmpd="sng" algn="ctr">
-                      <a:solidFill>
-                        <a:schemeClr val="tx1"/>
-                      </a:solidFill>
-                      <a:prstDash val="solid"/>
-                      <a:round/>
-                      <a:headEnd type="none" w="med" len="med"/>
-                      <a:tailEnd type="none" w="med" len="med"/>
-                    </a:lnT>
-                    <a:lnB w="12700" cap="flat" cmpd="sng" algn="ctr">
-                      <a:solidFill>
-                        <a:schemeClr val="tx1"/>
-                      </a:solidFill>
-                      <a:prstDash val="solid"/>
-                      <a:round/>
-                      <a:headEnd type="none" w="med" len="med"/>
-                      <a:tailEnd type="none" w="med" len="med"/>
-                    </a:lnB>
-                    <a:lnTlToBr w="12700" cmpd="sng">
-                      <a:noFill/>
-                      <a:prstDash val="solid"/>
-                    </a:lnTlToBr>
-                    <a:lnBlToTr w="12700" cmpd="sng">
-                      <a:noFill/>
-                      <a:prstDash val="solid"/>
-                    </a:lnBlToTr>
-                    <a:solidFill>
-                      <a:schemeClr val="bg1"/>
-                    </a:solidFill>
-                  </a:tcPr>
-                </a:tc>
-                <a:tc>
-                  <a:txBody>
-                    <a:bodyPr/>
-                    <a:lstStyle/>
-                    <a:p>
-                      <a:pPr algn="r"/>
-                      <a:r>
-                        <a:rPr lang="en-US" sz="1000" dirty="0">
-                          <a:latin typeface="Candara" panose="020E0502030303020204" pitchFamily="34" charset="0"/>
-                        </a:rPr>
-                        <a:t>8</a:t>
-                      </a:r>
-                    </a:p>
-                  </a:txBody>
-                  <a:tcPr anchor="b">
-                    <a:lnL w="12700" cmpd="sng">
-                      <a:noFill/>
-                    </a:lnL>
-                    <a:lnR w="12700" cmpd="sng">
-                      <a:noFill/>
-                    </a:lnR>
-                    <a:lnT w="12700" cap="flat" cmpd="sng" algn="ctr">
-                      <a:solidFill>
-                        <a:schemeClr val="tx1"/>
-                      </a:solidFill>
-                      <a:prstDash val="solid"/>
-                      <a:round/>
-                      <a:headEnd type="none" w="med" len="med"/>
-                      <a:tailEnd type="none" w="med" len="med"/>
-                    </a:lnT>
-                    <a:lnB w="12700" cap="flat" cmpd="sng" algn="ctr">
-                      <a:solidFill>
-                        <a:schemeClr val="tx1"/>
-                      </a:solidFill>
-                      <a:prstDash val="solid"/>
-                      <a:round/>
-                      <a:headEnd type="none" w="med" len="med"/>
-                      <a:tailEnd type="none" w="med" len="med"/>
-                    </a:lnB>
-                    <a:lnTlToBr w="12700" cmpd="sng">
-                      <a:noFill/>
-                      <a:prstDash val="solid"/>
-                    </a:lnTlToBr>
-                    <a:lnBlToTr w="12700" cmpd="sng">
-                      <a:noFill/>
-                      <a:prstDash val="solid"/>
-                    </a:lnBlToTr>
-                    <a:solidFill>
-                      <a:schemeClr val="bg1"/>
-                    </a:solidFill>
-                  </a:tcPr>
-                </a:tc>
-                <a:tc>
-                  <a:txBody>
-                    <a:bodyPr/>
-                    <a:lstStyle/>
-                    <a:p>
-                      <a:endParaRPr lang="en-US" sz="1000">
-                        <a:latin typeface="Candara" panose="020E0502030303020204" pitchFamily="34" charset="0"/>
-                      </a:endParaRPr>
-                    </a:p>
-                  </a:txBody>
-                  <a:tcPr anchor="b">
-                    <a:lnL w="12700" cmpd="sng">
-                      <a:noFill/>
-                    </a:lnL>
-                    <a:solidFill>
-                      <a:schemeClr val="bg1"/>
-                    </a:solidFill>
-                  </a:tcPr>
-                </a:tc>
-                <a:tc>
-                  <a:txBody>
-                    <a:bodyPr/>
-                    <a:lstStyle/>
-                    <a:p>
-                      <a:r>
-                        <a:rPr lang="en-US" sz="1000" dirty="0">
-                          <a:latin typeface="Candara" panose="020E0502030303020204" pitchFamily="34" charset="0"/>
-                        </a:rPr>
-                        <a:t>10</a:t>
-                      </a:r>
-                    </a:p>
-                  </a:txBody>
-                  <a:tcPr anchor="b">
-                    <a:lnT w="12700" cap="flat" cmpd="sng" algn="ctr">
-                      <a:solidFill>
-                        <a:schemeClr val="tx1"/>
-                      </a:solidFill>
-                      <a:prstDash val="solid"/>
-                      <a:round/>
-                      <a:headEnd type="none" w="med" len="med"/>
-                      <a:tailEnd type="none" w="med" len="med"/>
-                    </a:lnT>
-                    <a:lnB w="12700" cap="flat" cmpd="sng" algn="ctr">
-                      <a:solidFill>
-                        <a:schemeClr val="tx1"/>
-                      </a:solidFill>
-                      <a:prstDash val="solid"/>
-                      <a:round/>
-                      <a:headEnd type="none" w="med" len="med"/>
-                      <a:tailEnd type="none" w="med" len="med"/>
-                    </a:lnB>
-                    <a:solidFill>
-                      <a:schemeClr val="bg1"/>
-                    </a:solidFill>
-                  </a:tcPr>
-                </a:tc>
-                <a:tc>
-                  <a:txBody>
-                    <a:bodyPr/>
-                    <a:lstStyle/>
-                    <a:p>
-                      <a:pPr marL="0" marR="0" lvl="0" indent="0" algn="l" defTabSz="1005840" rtl="0" eaLnBrk="1" fontAlgn="auto" latinLnBrk="0" hangingPunct="1">
-                        <a:lnSpc>
-                          <a:spcPct val="100000"/>
-                        </a:lnSpc>
-                        <a:spcBef>
-                          <a:spcPts val="0"/>
-                        </a:spcBef>
-                        <a:spcAft>
-                          <a:spcPts val="0"/>
-                        </a:spcAft>
-                        <a:buClrTx/>
-                        <a:buSzTx/>
-                        <a:buFontTx/>
-                        <a:buNone/>
-                        <a:tabLst/>
-                        <a:defRPr/>
-                      </a:pPr>
-                      <a:r>
-                        <a:rPr lang="en-US" sz="1000" dirty="0">
-                          <a:latin typeface="Candara" panose="020E0502030303020204" pitchFamily="34" charset="0"/>
-                        </a:rPr>
-                        <a:t>Complexity:</a:t>
-                      </a:r>
-                    </a:p>
-                  </a:txBody>
-                  <a:tcPr anchor="b">
-                    <a:lnT w="12700" cap="flat" cmpd="sng" algn="ctr">
-                      <a:solidFill>
-                        <a:schemeClr val="tx1"/>
-                      </a:solidFill>
-                      <a:prstDash val="solid"/>
-                      <a:round/>
-                      <a:headEnd type="none" w="med" len="med"/>
-                      <a:tailEnd type="none" w="med" len="med"/>
-                    </a:lnT>
-                    <a:lnB w="12700" cap="flat" cmpd="sng" algn="ctr">
-                      <a:solidFill>
-                        <a:schemeClr val="tx1"/>
-                      </a:solidFill>
-                      <a:prstDash val="solid"/>
-                      <a:round/>
-                      <a:headEnd type="none" w="med" len="med"/>
-                      <a:tailEnd type="none" w="med" len="med"/>
-                    </a:lnB>
-                    <a:solidFill>
-                      <a:schemeClr val="bg1"/>
-                    </a:solidFill>
-                  </a:tcPr>
-                </a:tc>
-                <a:tc>
-                  <a:txBody>
-                    <a:bodyPr/>
-                    <a:lstStyle/>
-                    <a:p>
-                      <a:pPr marL="0" marR="0" lvl="0" indent="0" algn="l" defTabSz="1005840" rtl="0" eaLnBrk="1" fontAlgn="auto" latinLnBrk="0" hangingPunct="1">
-                        <a:lnSpc>
-                          <a:spcPct val="100000"/>
-                        </a:lnSpc>
-                        <a:spcBef>
-                          <a:spcPts val="0"/>
-                        </a:spcBef>
-                        <a:spcAft>
-                          <a:spcPts val="0"/>
-                        </a:spcAft>
-                        <a:buClrTx/>
-                        <a:buSzTx/>
-                        <a:buFontTx/>
-                        <a:buNone/>
-                        <a:tabLst/>
-                        <a:defRPr/>
-                      </a:pPr>
-                      <a:r>
-                        <a:rPr lang="en-US" sz="1000" dirty="0">
-                          <a:latin typeface="Candara" panose="020E0502030303020204" pitchFamily="34" charset="0"/>
-                        </a:rPr>
-                        <a:t>Storage:</a:t>
-                      </a:r>
-                    </a:p>
-                  </a:txBody>
-                  <a:tcPr anchor="b">
-                    <a:lnT w="12700" cap="flat" cmpd="sng" algn="ctr">
-                      <a:solidFill>
-                        <a:schemeClr val="tx1"/>
-                      </a:solidFill>
-                      <a:prstDash val="solid"/>
-                      <a:round/>
-                      <a:headEnd type="none" w="med" len="med"/>
-                      <a:tailEnd type="none" w="med" len="med"/>
-                    </a:lnT>
-                    <a:lnB w="12700" cap="flat" cmpd="sng" algn="ctr">
-                      <a:solidFill>
-                        <a:schemeClr val="tx1"/>
-                      </a:solidFill>
-                      <a:prstDash val="solid"/>
-                      <a:round/>
-                      <a:headEnd type="none" w="med" len="med"/>
-                      <a:tailEnd type="none" w="med" len="med"/>
-                    </a:lnB>
-                    <a:solidFill>
-                      <a:schemeClr val="bg1"/>
-                    </a:solidFill>
-                  </a:tcPr>
-                </a:tc>
-                <a:tc vMerge="1">
-                  <a:txBody>
-                    <a:bodyPr/>
-                    <a:lstStyle/>
-                    <a:p>
-                      <a:pPr algn="ctr"/>
-                      <a:endParaRPr lang="en-US" sz="1600"/>
-                    </a:p>
-                  </a:txBody>
-                  <a:tcPr anchor="b"/>
-                </a:tc>
-                <a:tc>
-                  <a:txBody>
-                    <a:bodyPr/>
-                    <a:lstStyle/>
-                    <a:p>
-                      <a:endParaRPr lang="en-US" sz="1000">
-                        <a:latin typeface="Candara" panose="020E0502030303020204" pitchFamily="34" charset="0"/>
-                      </a:endParaRPr>
-                    </a:p>
-                  </a:txBody>
-                  <a:tcPr>
-                    <a:solidFill>
-                      <a:schemeClr val="bg1"/>
-                    </a:solidFill>
-                  </a:tcPr>
-                </a:tc>
-                <a:extLst>
-                  <a:ext uri="{0D108BD9-81ED-4DB2-BD59-A6C34878D82A}">
-                    <a16:rowId xmlns:a16="http://schemas.microsoft.com/office/drawing/2014/main" val="15700670"/>
-                  </a:ext>
-                </a:extLst>
-              </a:tr>
-              <a:tr h="388620">
-                <a:tc>
-                  <a:txBody>
-                    <a:bodyPr/>
-                    <a:lstStyle/>
-                    <a:p>
-                      <a:endParaRPr lang="en-US" sz="1000" dirty="0">
-                        <a:latin typeface="Candara" panose="020E0502030303020204" pitchFamily="34" charset="0"/>
-                      </a:endParaRPr>
-                    </a:p>
-                  </a:txBody>
-                  <a:tcPr>
-                    <a:solidFill>
-                      <a:schemeClr val="bg1"/>
-                    </a:solidFill>
-                  </a:tcPr>
-                </a:tc>
-                <a:tc vMerge="1">
-                  <a:txBody>
-                    <a:bodyPr/>
-                    <a:lstStyle/>
-                    <a:p>
-                      <a:pPr algn="ctr"/>
-                      <a:endParaRPr lang="en-US" sz="1600"/>
-                    </a:p>
-                  </a:txBody>
-                  <a:tcPr anchor="b">
-                    <a:lnR w="12700" cmpd="sng">
-                      <a:noFill/>
-                    </a:lnR>
-                  </a:tcPr>
-                </a:tc>
-                <a:tc>
-                  <a:txBody>
-                    <a:bodyPr/>
-                    <a:lstStyle/>
-                    <a:p>
-                      <a:r>
-                        <a:rPr lang="en-US" sz="1000">
-                          <a:latin typeface="Candara" panose="020E0502030303020204" pitchFamily="34" charset="0"/>
-                        </a:rPr>
-                        <a:t>Body</a:t>
-                      </a:r>
-                    </a:p>
-                  </a:txBody>
-                  <a:tcPr anchor="b">
-                    <a:lnL w="12700" cmpd="sng">
-                      <a:noFill/>
-                    </a:lnL>
-                    <a:lnR w="12700" cmpd="sng">
-                      <a:noFill/>
-                    </a:lnR>
-                    <a:lnT w="12700" cap="flat" cmpd="sng" algn="ctr">
-                      <a:solidFill>
-                        <a:schemeClr val="tx1"/>
-                      </a:solidFill>
-                      <a:prstDash val="solid"/>
-                      <a:round/>
-                      <a:headEnd type="none" w="med" len="med"/>
-                      <a:tailEnd type="none" w="med" len="med"/>
-                    </a:lnT>
-                    <a:lnB w="12700" cap="flat" cmpd="sng" algn="ctr">
-                      <a:solidFill>
-                        <a:schemeClr val="tx1"/>
-                      </a:solidFill>
-                      <a:prstDash val="solid"/>
-                      <a:round/>
-                      <a:headEnd type="none" w="med" len="med"/>
-                      <a:tailEnd type="none" w="med" len="med"/>
-                    </a:lnB>
-                    <a:lnTlToBr w="12700" cmpd="sng">
-                      <a:noFill/>
-                      <a:prstDash val="solid"/>
-                    </a:lnTlToBr>
-                    <a:lnBlToTr w="12700" cmpd="sng">
-                      <a:noFill/>
-                      <a:prstDash val="solid"/>
-                    </a:lnBlToTr>
-                    <a:solidFill>
-                      <a:schemeClr val="bg1"/>
-                    </a:solidFill>
-                  </a:tcPr>
-                </a:tc>
-                <a:tc>
-                  <a:txBody>
-                    <a:bodyPr/>
-                    <a:lstStyle/>
-                    <a:p>
-                      <a:pPr algn="r"/>
-                      <a:r>
-                        <a:rPr lang="en-US" sz="1000" dirty="0">
-                          <a:latin typeface="Candara" panose="020E0502030303020204" pitchFamily="34" charset="0"/>
-                        </a:rPr>
-                        <a:t>9</a:t>
-                      </a:r>
-                    </a:p>
-                  </a:txBody>
-                  <a:tcPr anchor="b">
-                    <a:lnL w="12700" cmpd="sng">
-                      <a:noFill/>
-                    </a:lnL>
-                    <a:lnR w="12700" cmpd="sng">
-                      <a:noFill/>
-                    </a:lnR>
-                    <a:lnT w="12700" cap="flat" cmpd="sng" algn="ctr">
-                      <a:solidFill>
-                        <a:schemeClr val="tx1"/>
-                      </a:solidFill>
-                      <a:prstDash val="solid"/>
-                      <a:round/>
-                      <a:headEnd type="none" w="med" len="med"/>
-                      <a:tailEnd type="none" w="med" len="med"/>
-                    </a:lnT>
-                    <a:lnB w="12700" cap="flat" cmpd="sng" algn="ctr">
-                      <a:solidFill>
-                        <a:schemeClr val="tx1"/>
-                      </a:solidFill>
-                      <a:prstDash val="solid"/>
-                      <a:round/>
-                      <a:headEnd type="none" w="med" len="med"/>
-                      <a:tailEnd type="none" w="med" len="med"/>
-                    </a:lnB>
-                    <a:lnTlToBr w="12700" cmpd="sng">
-                      <a:noFill/>
-                      <a:prstDash val="solid"/>
-                    </a:lnTlToBr>
-                    <a:lnBlToTr w="12700" cmpd="sng">
-                      <a:noFill/>
-                      <a:prstDash val="solid"/>
-                    </a:lnBlToTr>
-                    <a:solidFill>
-                      <a:schemeClr val="bg1"/>
-                    </a:solidFill>
-                  </a:tcPr>
-                </a:tc>
-                <a:tc>
-                  <a:txBody>
-                    <a:bodyPr/>
-                    <a:lstStyle/>
-                    <a:p>
-                      <a:endParaRPr lang="en-US" sz="1000">
-                        <a:latin typeface="Candara" panose="020E0502030303020204" pitchFamily="34" charset="0"/>
-                      </a:endParaRPr>
-                    </a:p>
-                  </a:txBody>
-                  <a:tcPr anchor="b">
-                    <a:lnL w="12700" cmpd="sng">
-                      <a:noFill/>
-                    </a:lnL>
-                    <a:solidFill>
-                      <a:schemeClr val="bg1"/>
-                    </a:solidFill>
-                  </a:tcPr>
-                </a:tc>
-                <a:tc>
-                  <a:txBody>
-                    <a:bodyPr/>
-                    <a:lstStyle/>
-                    <a:p>
-                      <a:r>
-                        <a:rPr lang="en-US" sz="1000" dirty="0">
-                          <a:latin typeface="Candara" panose="020E0502030303020204" pitchFamily="34" charset="0"/>
-                        </a:rPr>
-                        <a:t>11</a:t>
-                      </a:r>
-                    </a:p>
-                  </a:txBody>
-                  <a:tcPr anchor="b">
-                    <a:lnT w="12700" cap="flat" cmpd="sng" algn="ctr">
-                      <a:solidFill>
-                        <a:schemeClr val="tx1"/>
-                      </a:solidFill>
-                      <a:prstDash val="solid"/>
-                      <a:round/>
-                      <a:headEnd type="none" w="med" len="med"/>
-                      <a:tailEnd type="none" w="med" len="med"/>
-                    </a:lnT>
-                    <a:lnB w="12700" cap="flat" cmpd="sng" algn="ctr">
-                      <a:solidFill>
-                        <a:schemeClr val="tx1"/>
-                      </a:solidFill>
-                      <a:prstDash val="solid"/>
-                      <a:round/>
-                      <a:headEnd type="none" w="med" len="med"/>
-                      <a:tailEnd type="none" w="med" len="med"/>
-                    </a:lnB>
-                    <a:solidFill>
-                      <a:schemeClr val="bg1"/>
-                    </a:solidFill>
-                  </a:tcPr>
-                </a:tc>
-                <a:tc>
-                  <a:txBody>
-                    <a:bodyPr/>
-                    <a:lstStyle/>
-                    <a:p>
-                      <a:r>
-                        <a:rPr lang="en-US" sz="1000">
-                          <a:latin typeface="Candara" panose="020E0502030303020204" pitchFamily="34" charset="0"/>
-                        </a:rPr>
-                        <a:t>Complexity:</a:t>
-                      </a:r>
-                    </a:p>
-                  </a:txBody>
-                  <a:tcPr anchor="b">
-                    <a:lnT w="12700" cap="flat" cmpd="sng" algn="ctr">
-                      <a:solidFill>
-                        <a:schemeClr val="tx1"/>
-                      </a:solidFill>
-                      <a:prstDash val="solid"/>
-                      <a:round/>
-                      <a:headEnd type="none" w="med" len="med"/>
-                      <a:tailEnd type="none" w="med" len="med"/>
-                    </a:lnT>
-                    <a:lnB w="12700" cap="flat" cmpd="sng" algn="ctr">
-                      <a:solidFill>
-                        <a:schemeClr val="tx1"/>
-                      </a:solidFill>
-                      <a:prstDash val="solid"/>
-                      <a:round/>
-                      <a:headEnd type="none" w="med" len="med"/>
-                      <a:tailEnd type="none" w="med" len="med"/>
-                    </a:lnB>
-                    <a:solidFill>
-                      <a:schemeClr val="bg1"/>
-                    </a:solidFill>
-                  </a:tcPr>
-                </a:tc>
-                <a:tc>
-                  <a:txBody>
-                    <a:bodyPr/>
-                    <a:lstStyle/>
-                    <a:p>
-                      <a:r>
-                        <a:rPr lang="en-US" sz="1000" dirty="0">
-                          <a:latin typeface="Candara" panose="020E0502030303020204" pitchFamily="34" charset="0"/>
-                        </a:rPr>
-                        <a:t>Storage:</a:t>
-                      </a:r>
-                    </a:p>
-                  </a:txBody>
-                  <a:tcPr anchor="b">
-                    <a:lnT w="12700" cap="flat" cmpd="sng" algn="ctr">
-                      <a:solidFill>
-                        <a:schemeClr val="tx1"/>
-                      </a:solidFill>
-                      <a:prstDash val="solid"/>
-                      <a:round/>
-                      <a:headEnd type="none" w="med" len="med"/>
-                      <a:tailEnd type="none" w="med" len="med"/>
-                    </a:lnT>
-                    <a:lnB w="12700" cap="flat" cmpd="sng" algn="ctr">
-                      <a:solidFill>
-                        <a:schemeClr val="tx1"/>
-                      </a:solidFill>
-                      <a:prstDash val="solid"/>
-                      <a:round/>
-                      <a:headEnd type="none" w="med" len="med"/>
-                      <a:tailEnd type="none" w="med" len="med"/>
-                    </a:lnB>
-                    <a:solidFill>
-                      <a:schemeClr val="bg1"/>
-                    </a:solidFill>
-                  </a:tcPr>
-                </a:tc>
-                <a:tc vMerge="1">
-                  <a:txBody>
-                    <a:bodyPr/>
-                    <a:lstStyle/>
-                    <a:p>
-                      <a:pPr algn="ctr"/>
-                      <a:endParaRPr lang="en-US" sz="1600"/>
-                    </a:p>
-                  </a:txBody>
-                  <a:tcPr anchor="b"/>
-                </a:tc>
-                <a:tc>
-                  <a:txBody>
-                    <a:bodyPr/>
-                    <a:lstStyle/>
-                    <a:p>
-                      <a:endParaRPr lang="en-US" sz="1000">
-                        <a:latin typeface="Candara" panose="020E0502030303020204" pitchFamily="34" charset="0"/>
-                      </a:endParaRPr>
-                    </a:p>
-                  </a:txBody>
-                  <a:tcPr>
-                    <a:solidFill>
-                      <a:schemeClr val="bg1"/>
-                    </a:solidFill>
-                  </a:tcPr>
-                </a:tc>
-                <a:extLst>
-                  <a:ext uri="{0D108BD9-81ED-4DB2-BD59-A6C34878D82A}">
-                    <a16:rowId xmlns:a16="http://schemas.microsoft.com/office/drawing/2014/main" val="678925714"/>
-                  </a:ext>
-                </a:extLst>
-              </a:tr>
-              <a:tr h="388620">
-                <a:tc>
-                  <a:txBody>
-                    <a:bodyPr/>
-                    <a:lstStyle/>
-                    <a:p>
-                      <a:endParaRPr lang="en-US" sz="1000">
-                        <a:latin typeface="Candara" panose="020E0502030303020204" pitchFamily="34" charset="0"/>
-                      </a:endParaRPr>
-                    </a:p>
-                  </a:txBody>
-                  <a:tcPr>
-                    <a:solidFill>
-                      <a:schemeClr val="bg1"/>
-                    </a:solidFill>
-                  </a:tcPr>
-                </a:tc>
-                <a:tc vMerge="1">
-                  <a:txBody>
-                    <a:bodyPr/>
-                    <a:lstStyle/>
-                    <a:p>
-                      <a:pPr algn="ctr"/>
-                      <a:endParaRPr lang="en-US" sz="1600"/>
-                    </a:p>
-                  </a:txBody>
-                  <a:tcPr anchor="b">
-                    <a:lnR w="12700" cmpd="sng">
-                      <a:noFill/>
-                    </a:lnR>
-                  </a:tcPr>
-                </a:tc>
-                <a:tc>
-                  <a:txBody>
-                    <a:bodyPr/>
-                    <a:lstStyle/>
-                    <a:p>
-                      <a:r>
-                        <a:rPr lang="en-US" sz="1000">
-                          <a:latin typeface="Candara" panose="020E0502030303020204" pitchFamily="34" charset="0"/>
-                        </a:rPr>
-                        <a:t>Body</a:t>
-                      </a:r>
-                    </a:p>
-                  </a:txBody>
-                  <a:tcPr anchor="b">
-                    <a:lnL w="12700" cmpd="sng">
-                      <a:noFill/>
-                    </a:lnL>
-                    <a:lnR w="12700" cmpd="sng">
-                      <a:noFill/>
-                    </a:lnR>
-                    <a:lnT w="12700" cap="flat" cmpd="sng" algn="ctr">
-                      <a:solidFill>
-                        <a:schemeClr val="tx1"/>
-                      </a:solidFill>
-                      <a:prstDash val="solid"/>
-                      <a:round/>
-                      <a:headEnd type="none" w="med" len="med"/>
-                      <a:tailEnd type="none" w="med" len="med"/>
-                    </a:lnT>
-                    <a:lnB w="12700" cap="flat" cmpd="sng" algn="ctr">
-                      <a:solidFill>
-                        <a:schemeClr val="tx1"/>
-                      </a:solidFill>
-                      <a:prstDash val="solid"/>
-                      <a:round/>
-                      <a:headEnd type="none" w="med" len="med"/>
-                      <a:tailEnd type="none" w="med" len="med"/>
-                    </a:lnB>
-                    <a:lnTlToBr w="12700" cmpd="sng">
-                      <a:noFill/>
-                      <a:prstDash val="solid"/>
-                    </a:lnTlToBr>
-                    <a:lnBlToTr w="12700" cmpd="sng">
-                      <a:noFill/>
-                      <a:prstDash val="solid"/>
-                    </a:lnBlToTr>
-                    <a:solidFill>
-                      <a:schemeClr val="bg1"/>
-                    </a:solidFill>
-                  </a:tcPr>
-                </a:tc>
-                <a:tc>
-                  <a:txBody>
-                    <a:bodyPr/>
-                    <a:lstStyle/>
-                    <a:p>
-                      <a:pPr algn="r"/>
-                      <a:r>
-                        <a:rPr lang="en-US" sz="1000" dirty="0">
-                          <a:latin typeface="Candara" panose="020E0502030303020204" pitchFamily="34" charset="0"/>
-                        </a:rPr>
-                        <a:t>10</a:t>
-                      </a:r>
-                    </a:p>
-                  </a:txBody>
-                  <a:tcPr anchor="b">
-                    <a:lnL w="12700" cmpd="sng">
-                      <a:noFill/>
-                    </a:lnL>
-                    <a:lnR w="12700" cmpd="sng">
-                      <a:noFill/>
-                    </a:lnR>
-                    <a:lnT w="12700" cap="flat" cmpd="sng" algn="ctr">
-                      <a:solidFill>
-                        <a:schemeClr val="tx1"/>
-                      </a:solidFill>
-                      <a:prstDash val="solid"/>
-                      <a:round/>
-                      <a:headEnd type="none" w="med" len="med"/>
-                      <a:tailEnd type="none" w="med" len="med"/>
-                    </a:lnT>
-                    <a:lnB w="12700" cap="flat" cmpd="sng" algn="ctr">
-                      <a:solidFill>
-                        <a:schemeClr val="tx1"/>
-                      </a:solidFill>
-                      <a:prstDash val="solid"/>
-                      <a:round/>
-                      <a:headEnd type="none" w="med" len="med"/>
-                      <a:tailEnd type="none" w="med" len="med"/>
-                    </a:lnB>
-                    <a:lnTlToBr w="12700" cmpd="sng">
-                      <a:noFill/>
-                      <a:prstDash val="solid"/>
-                    </a:lnTlToBr>
-                    <a:lnBlToTr w="12700" cmpd="sng">
-                      <a:noFill/>
-                      <a:prstDash val="solid"/>
-                    </a:lnBlToTr>
-                    <a:solidFill>
-                      <a:schemeClr val="bg1"/>
-                    </a:solidFill>
-                  </a:tcPr>
-                </a:tc>
-                <a:tc>
-                  <a:txBody>
-                    <a:bodyPr/>
-                    <a:lstStyle/>
-                    <a:p>
-                      <a:endParaRPr lang="en-US" sz="1000">
-                        <a:latin typeface="Candara" panose="020E0502030303020204" pitchFamily="34" charset="0"/>
-                      </a:endParaRPr>
-                    </a:p>
-                  </a:txBody>
-                  <a:tcPr anchor="b">
-                    <a:lnL w="12700" cmpd="sng">
-                      <a:noFill/>
-                    </a:lnL>
-                    <a:solidFill>
-                      <a:schemeClr val="bg1"/>
-                    </a:solidFill>
-                  </a:tcPr>
-                </a:tc>
-                <a:tc>
-                  <a:txBody>
-                    <a:bodyPr/>
-                    <a:lstStyle/>
-                    <a:p>
-                      <a:r>
-                        <a:rPr lang="en-US" sz="1000" dirty="0">
-                          <a:latin typeface="Candara" panose="020E0502030303020204" pitchFamily="34" charset="0"/>
-                        </a:rPr>
-                        <a:t>12</a:t>
-                      </a:r>
-                    </a:p>
-                  </a:txBody>
-                  <a:tcPr anchor="b">
-                    <a:lnT w="12700" cap="flat" cmpd="sng" algn="ctr">
-                      <a:solidFill>
-                        <a:schemeClr val="tx1"/>
-                      </a:solidFill>
-                      <a:prstDash val="solid"/>
-                      <a:round/>
-                      <a:headEnd type="none" w="med" len="med"/>
-                      <a:tailEnd type="none" w="med" len="med"/>
-                    </a:lnT>
-                    <a:lnB w="12700" cap="flat" cmpd="sng" algn="ctr">
-                      <a:solidFill>
-                        <a:schemeClr val="tx1"/>
-                      </a:solidFill>
-                      <a:prstDash val="solid"/>
-                      <a:round/>
-                      <a:headEnd type="none" w="med" len="med"/>
-                      <a:tailEnd type="none" w="med" len="med"/>
-                    </a:lnB>
-                    <a:solidFill>
-                      <a:schemeClr val="bg1"/>
-                    </a:solidFill>
-                  </a:tcPr>
-                </a:tc>
-                <a:tc>
-                  <a:txBody>
-                    <a:bodyPr/>
-                    <a:lstStyle/>
-                    <a:p>
-                      <a:pPr marL="0" marR="0" lvl="0" indent="0" algn="l" defTabSz="1005840" rtl="0" eaLnBrk="1" fontAlgn="auto" latinLnBrk="0" hangingPunct="1">
-                        <a:lnSpc>
-                          <a:spcPct val="100000"/>
-                        </a:lnSpc>
-                        <a:spcBef>
-                          <a:spcPts val="0"/>
-                        </a:spcBef>
-                        <a:spcAft>
-                          <a:spcPts val="0"/>
-                        </a:spcAft>
-                        <a:buClrTx/>
-                        <a:buSzTx/>
-                        <a:buFontTx/>
-                        <a:buNone/>
-                        <a:tabLst/>
-                        <a:defRPr/>
-                      </a:pPr>
-                      <a:r>
-                        <a:rPr lang="en-US" sz="1000">
-                          <a:latin typeface="Candara" panose="020E0502030303020204" pitchFamily="34" charset="0"/>
-                        </a:rPr>
-                        <a:t>Complexity:</a:t>
-                      </a:r>
-                    </a:p>
-                  </a:txBody>
-                  <a:tcPr anchor="b">
-                    <a:lnT w="12700" cap="flat" cmpd="sng" algn="ctr">
-                      <a:solidFill>
-                        <a:schemeClr val="tx1"/>
-                      </a:solidFill>
-                      <a:prstDash val="solid"/>
-                      <a:round/>
-                      <a:headEnd type="none" w="med" len="med"/>
-                      <a:tailEnd type="none" w="med" len="med"/>
-                    </a:lnT>
-                    <a:lnB w="12700" cap="flat" cmpd="sng" algn="ctr">
-                      <a:solidFill>
-                        <a:schemeClr val="tx1"/>
-                      </a:solidFill>
-                      <a:prstDash val="solid"/>
-                      <a:round/>
-                      <a:headEnd type="none" w="med" len="med"/>
-                      <a:tailEnd type="none" w="med" len="med"/>
-                    </a:lnB>
-                    <a:solidFill>
-                      <a:schemeClr val="bg1"/>
-                    </a:solidFill>
-                  </a:tcPr>
-                </a:tc>
-                <a:tc>
-                  <a:txBody>
-                    <a:bodyPr/>
-                    <a:lstStyle/>
-                    <a:p>
-                      <a:pPr marL="0" marR="0" lvl="0" indent="0" algn="l" defTabSz="1005840" rtl="0" eaLnBrk="1" fontAlgn="auto" latinLnBrk="0" hangingPunct="1">
-                        <a:lnSpc>
-                          <a:spcPct val="100000"/>
-                        </a:lnSpc>
-                        <a:spcBef>
-                          <a:spcPts val="0"/>
-                        </a:spcBef>
-                        <a:spcAft>
-                          <a:spcPts val="0"/>
-                        </a:spcAft>
-                        <a:buClrTx/>
-                        <a:buSzTx/>
-                        <a:buFontTx/>
-                        <a:buNone/>
-                        <a:tabLst/>
-                        <a:defRPr/>
-                      </a:pPr>
-                      <a:r>
                         <a:rPr lang="en-US" sz="1000" dirty="0">
                           <a:latin typeface="Candara" panose="020E0502030303020204" pitchFamily="34" charset="0"/>
                         </a:rPr>
@@ -19976,7 +20150,7 @@
                     </a:solidFill>
                   </a:tcPr>
                 </a:tc>
-                <a:tc gridSpan="3">
+                <a:tc gridSpan="4">
                   <a:txBody>
                     <a:bodyPr/>
                     <a:lstStyle/>
@@ -20000,6 +20174,16 @@
                       <a:schemeClr val="bg1"/>
                     </a:solidFill>
                   </a:tcPr>
+                </a:tc>
+                <a:tc hMerge="1">
+                  <a:txBody>
+                    <a:bodyPr/>
+                    <a:lstStyle/>
+                    <a:p>
+                      <a:endParaRPr lang="en-US"/>
+                    </a:p>
+                  </a:txBody>
+                  <a:tcPr/>
                 </a:tc>
                 <a:tc hMerge="1">
                   <a:txBody>
@@ -20115,7 +20299,7 @@
                     </a:solidFill>
                   </a:tcPr>
                 </a:tc>
-                <a:tc gridSpan="6">
+                <a:tc gridSpan="7">
                   <a:txBody>
                     <a:bodyPr/>
                     <a:lstStyle/>
@@ -20231,6 +20415,16 @@
                       <a:schemeClr val="bg1"/>
                     </a:solidFill>
                   </a:tcPr>
+                </a:tc>
+                <a:tc hMerge="1">
+                  <a:txBody>
+                    <a:bodyPr/>
+                    <a:lstStyle/>
+                    <a:p>
+                      <a:endParaRPr lang="en-US"/>
+                    </a:p>
+                  </a:txBody>
+                  <a:tcPr/>
                 </a:tc>
                 <a:tc hMerge="1">
                   <a:txBody>
@@ -20346,7 +20540,7 @@
                     </a:solidFill>
                   </a:tcPr>
                 </a:tc>
-                <a:tc gridSpan="6">
+                <a:tc gridSpan="7">
                   <a:txBody>
                     <a:bodyPr/>
                     <a:lstStyle/>
@@ -20464,6 +20658,16 @@
                       <a:schemeClr val="bg1"/>
                     </a:solidFill>
                   </a:tcPr>
+                </a:tc>
+                <a:tc hMerge="1">
+                  <a:txBody>
+                    <a:bodyPr/>
+                    <a:lstStyle/>
+                    <a:p>
+                      <a:endParaRPr lang="en-US"/>
+                    </a:p>
+                  </a:txBody>
+                  <a:tcPr/>
                 </a:tc>
                 <a:tc hMerge="1">
                   <a:txBody>
@@ -20561,7 +20765,7 @@
                     </a:solidFill>
                   </a:tcPr>
                 </a:tc>
-                <a:tc gridSpan="6">
+                <a:tc gridSpan="7">
                   <a:txBody>
                     <a:bodyPr/>
                     <a:lstStyle/>
@@ -20679,6 +20883,16 @@
                       <a:schemeClr val="bg1"/>
                     </a:solidFill>
                   </a:tcPr>
+                </a:tc>
+                <a:tc hMerge="1">
+                  <a:txBody>
+                    <a:bodyPr/>
+                    <a:lstStyle/>
+                    <a:p>
+                      <a:endParaRPr lang="en-US"/>
+                    </a:p>
+                  </a:txBody>
+                  <a:tcPr/>
                 </a:tc>
                 <a:tc hMerge="1">
                   <a:txBody>
@@ -20810,7 +21024,7 @@
                     </a:solidFill>
                   </a:tcPr>
                 </a:tc>
-                <a:tc gridSpan="6">
+                <a:tc gridSpan="7">
                   <a:txBody>
                     <a:bodyPr/>
                     <a:lstStyle/>
@@ -20928,6 +21142,16 @@
                       <a:schemeClr val="bg1"/>
                     </a:solidFill>
                   </a:tcPr>
+                </a:tc>
+                <a:tc hMerge="1">
+                  <a:txBody>
+                    <a:bodyPr/>
+                    <a:lstStyle/>
+                    <a:p>
+                      <a:endParaRPr lang="en-US"/>
+                    </a:p>
+                  </a:txBody>
+                  <a:tcPr/>
                 </a:tc>
                 <a:tc hMerge="1">
                   <a:txBody>
@@ -21025,7 +21249,7 @@
                     </a:solidFill>
                   </a:tcPr>
                 </a:tc>
-                <a:tc gridSpan="6">
+                <a:tc gridSpan="7">
                   <a:txBody>
                     <a:bodyPr/>
                     <a:lstStyle/>
@@ -21143,6 +21367,16 @@
                       <a:schemeClr val="bg1"/>
                     </a:solidFill>
                   </a:tcPr>
+                </a:tc>
+                <a:tc hMerge="1">
+                  <a:txBody>
+                    <a:bodyPr/>
+                    <a:lstStyle/>
+                    <a:p>
+                      <a:endParaRPr lang="en-US"/>
+                    </a:p>
+                  </a:txBody>
+                  <a:tcPr/>
                 </a:tc>
                 <a:tc hMerge="1">
                   <a:txBody>
@@ -21296,7 +21530,7 @@
                     </a:solidFill>
                   </a:tcPr>
                 </a:tc>
-                <a:tc gridSpan="3">
+                <a:tc gridSpan="4">
                   <a:txBody>
                     <a:bodyPr/>
                     <a:lstStyle/>
@@ -21320,6 +21554,16 @@
                       <a:schemeClr val="bg1"/>
                     </a:solidFill>
                   </a:tcPr>
+                </a:tc>
+                <a:tc hMerge="1">
+                  <a:txBody>
+                    <a:bodyPr/>
+                    <a:lstStyle/>
+                    <a:p>
+                      <a:endParaRPr lang="en-US"/>
+                    </a:p>
+                  </a:txBody>
+                  <a:tcPr/>
                 </a:tc>
                 <a:tc hMerge="1">
                   <a:txBody>

</xml_diff>

<commit_message>
Added more detail to the character sheet.
</commit_message>
<xml_diff>
--- a/Ikaros CS.pptx
+++ b/Ikaros CS.pptx
@@ -116,7 +116,7 @@
 <file path=ppt/revisionInfo.xml><?xml version="1.0" encoding="utf-8"?>
 <p1510:revInfo xmlns:a="http://schemas.openxmlformats.org/drawingml/2006/main" xmlns:r="http://schemas.openxmlformats.org/officeDocument/2006/relationships" xmlns:p1510="http://schemas.microsoft.com/office/powerpoint/2015/10/main">
   <p1510:revLst>
-    <p1510:client id="{769B9876-0CC5-4952-8417-BD50DAB03C8C}" v="58" dt="2022-02-07T01:19:12.035"/>
+    <p1510:client id="{A72746DB-4E80-4EE8-A51F-7126717A5AEE}" v="20" dt="2022-03-03T07:43:16.883"/>
   </p1510:revLst>
 </p1510:revInfo>
 </file>
@@ -291,6 +291,45 @@
             <pc:docMk/>
             <pc:sldMk cId="1783378883" sldId="256"/>
             <ac:graphicFrameMk id="6" creationId="{789FCB90-6945-4AC5-A88D-469FE3C21635}"/>
+          </ac:graphicFrameMkLst>
+        </pc:graphicFrameChg>
+      </pc:sldChg>
+    </pc:docChg>
+  </pc:docChgLst>
+  <pc:docChgLst>
+    <pc:chgData name="Julia Pitts" userId="6e51b823a05a2cc0" providerId="LiveId" clId="{A72746DB-4E80-4EE8-A51F-7126717A5AEE}"/>
+    <pc:docChg chg="undo custSel modSld">
+      <pc:chgData name="Julia Pitts" userId="6e51b823a05a2cc0" providerId="LiveId" clId="{A72746DB-4E80-4EE8-A51F-7126717A5AEE}" dt="2022-03-03T07:43:08.059" v="862" actId="14734"/>
+      <pc:docMkLst>
+        <pc:docMk/>
+      </pc:docMkLst>
+      <pc:sldChg chg="modSp mod">
+        <pc:chgData name="Julia Pitts" userId="6e51b823a05a2cc0" providerId="LiveId" clId="{A72746DB-4E80-4EE8-A51F-7126717A5AEE}" dt="2022-03-03T07:29:59.647" v="47" actId="122"/>
+        <pc:sldMkLst>
+          <pc:docMk/>
+          <pc:sldMk cId="1783378883" sldId="256"/>
+        </pc:sldMkLst>
+        <pc:graphicFrameChg chg="modGraphic">
+          <ac:chgData name="Julia Pitts" userId="6e51b823a05a2cc0" providerId="LiveId" clId="{A72746DB-4E80-4EE8-A51F-7126717A5AEE}" dt="2022-03-03T07:29:59.647" v="47" actId="122"/>
+          <ac:graphicFrameMkLst>
+            <pc:docMk/>
+            <pc:sldMk cId="1783378883" sldId="256"/>
+            <ac:graphicFrameMk id="6" creationId="{789FCB90-6945-4AC5-A88D-469FE3C21635}"/>
+          </ac:graphicFrameMkLst>
+        </pc:graphicFrameChg>
+      </pc:sldChg>
+      <pc:sldChg chg="modSp mod">
+        <pc:chgData name="Julia Pitts" userId="6e51b823a05a2cc0" providerId="LiveId" clId="{A72746DB-4E80-4EE8-A51F-7126717A5AEE}" dt="2022-03-03T07:43:08.059" v="862" actId="14734"/>
+        <pc:sldMkLst>
+          <pc:docMk/>
+          <pc:sldMk cId="1661469233" sldId="257"/>
+        </pc:sldMkLst>
+        <pc:graphicFrameChg chg="mod modGraphic">
+          <ac:chgData name="Julia Pitts" userId="6e51b823a05a2cc0" providerId="LiveId" clId="{A72746DB-4E80-4EE8-A51F-7126717A5AEE}" dt="2022-03-03T07:43:08.059" v="862" actId="14734"/>
+          <ac:graphicFrameMkLst>
+            <pc:docMk/>
+            <pc:sldMk cId="1661469233" sldId="257"/>
+            <ac:graphicFrameMk id="4" creationId="{54C5A4E1-B718-4E81-9087-7EFA5BA1AE72}"/>
           </ac:graphicFrameMkLst>
         </pc:graphicFrameChg>
       </pc:sldChg>
@@ -618,7 +657,7 @@
           <a:p>
             <a:fld id="{08882BDC-A680-4764-9A15-E4D7289376AF}" type="datetimeFigureOut">
               <a:rPr lang="en-US" smtClean="0"/>
-              <a:t>2/6/2022</a:t>
+              <a:t>3/2/2022</a:t>
             </a:fld>
             <a:endParaRPr lang="en-US"/>
           </a:p>
@@ -928,7 +967,7 @@
           <a:p>
             <a:fld id="{08882BDC-A680-4764-9A15-E4D7289376AF}" type="datetimeFigureOut">
               <a:rPr lang="en-US" smtClean="0"/>
-              <a:t>2/6/2022</a:t>
+              <a:t>3/2/2022</a:t>
             </a:fld>
             <a:endParaRPr lang="en-US"/>
           </a:p>
@@ -1149,7 +1188,7 @@
           <a:p>
             <a:fld id="{08882BDC-A680-4764-9A15-E4D7289376AF}" type="datetimeFigureOut">
               <a:rPr lang="en-US" smtClean="0"/>
-              <a:t>2/6/2022</a:t>
+              <a:t>3/2/2022</a:t>
             </a:fld>
             <a:endParaRPr lang="en-US"/>
           </a:p>
@@ -1439,7 +1478,7 @@
           <a:p>
             <a:fld id="{08882BDC-A680-4764-9A15-E4D7289376AF}" type="datetimeFigureOut">
               <a:rPr lang="en-US" smtClean="0"/>
-              <a:t>2/6/2022</a:t>
+              <a:t>3/2/2022</a:t>
             </a:fld>
             <a:endParaRPr lang="en-US"/>
           </a:p>
@@ -1892,7 +1931,7 @@
           <a:p>
             <a:fld id="{08882BDC-A680-4764-9A15-E4D7289376AF}" type="datetimeFigureOut">
               <a:rPr lang="en-US" smtClean="0"/>
-              <a:t>2/6/2022</a:t>
+              <a:t>3/2/2022</a:t>
             </a:fld>
             <a:endParaRPr lang="en-US"/>
           </a:p>
@@ -2467,7 +2506,7 @@
           <a:p>
             <a:fld id="{08882BDC-A680-4764-9A15-E4D7289376AF}" type="datetimeFigureOut">
               <a:rPr lang="en-US" smtClean="0"/>
-              <a:t>2/6/2022</a:t>
+              <a:t>3/2/2022</a:t>
             </a:fld>
             <a:endParaRPr lang="en-US"/>
           </a:p>
@@ -3315,7 +3354,7 @@
           <a:p>
             <a:fld id="{08882BDC-A680-4764-9A15-E4D7289376AF}" type="datetimeFigureOut">
               <a:rPr lang="en-US" smtClean="0"/>
-              <a:t>2/6/2022</a:t>
+              <a:t>3/2/2022</a:t>
             </a:fld>
             <a:endParaRPr lang="en-US"/>
           </a:p>
@@ -3518,7 +3557,7 @@
           <a:p>
             <a:fld id="{08882BDC-A680-4764-9A15-E4D7289376AF}" type="datetimeFigureOut">
               <a:rPr lang="en-US" smtClean="0"/>
-              <a:t>2/6/2022</a:t>
+              <a:t>3/2/2022</a:t>
             </a:fld>
             <a:endParaRPr lang="en-US"/>
           </a:p>
@@ -3730,7 +3769,7 @@
           <a:p>
             <a:fld id="{08882BDC-A680-4764-9A15-E4D7289376AF}" type="datetimeFigureOut">
               <a:rPr lang="en-US" smtClean="0"/>
-              <a:t>2/6/2022</a:t>
+              <a:t>3/2/2022</a:t>
             </a:fld>
             <a:endParaRPr lang="en-US"/>
           </a:p>
@@ -3933,7 +3972,7 @@
           <a:p>
             <a:fld id="{08882BDC-A680-4764-9A15-E4D7289376AF}" type="datetimeFigureOut">
               <a:rPr lang="en-US" smtClean="0"/>
-              <a:t>2/6/2022</a:t>
+              <a:t>3/2/2022</a:t>
             </a:fld>
             <a:endParaRPr lang="en-US"/>
           </a:p>
@@ -4212,7 +4251,7 @@
           <a:p>
             <a:fld id="{08882BDC-A680-4764-9A15-E4D7289376AF}" type="datetimeFigureOut">
               <a:rPr lang="en-US" smtClean="0"/>
-              <a:t>2/6/2022</a:t>
+              <a:t>3/2/2022</a:t>
             </a:fld>
             <a:endParaRPr lang="en-US"/>
           </a:p>
@@ -4476,7 +4515,7 @@
           <a:p>
             <a:fld id="{08882BDC-A680-4764-9A15-E4D7289376AF}" type="datetimeFigureOut">
               <a:rPr lang="en-US" smtClean="0"/>
-              <a:t>2/6/2022</a:t>
+              <a:t>3/2/2022</a:t>
             </a:fld>
             <a:endParaRPr lang="en-US"/>
           </a:p>
@@ -4888,7 +4927,7 @@
           <a:p>
             <a:fld id="{08882BDC-A680-4764-9A15-E4D7289376AF}" type="datetimeFigureOut">
               <a:rPr lang="en-US" smtClean="0"/>
-              <a:t>2/6/2022</a:t>
+              <a:t>3/2/2022</a:t>
             </a:fld>
             <a:endParaRPr lang="en-US"/>
           </a:p>
@@ -5035,7 +5074,7 @@
           <a:p>
             <a:fld id="{08882BDC-A680-4764-9A15-E4D7289376AF}" type="datetimeFigureOut">
               <a:rPr lang="en-US" smtClean="0"/>
-              <a:t>2/6/2022</a:t>
+              <a:t>3/2/2022</a:t>
             </a:fld>
             <a:endParaRPr lang="en-US"/>
           </a:p>
@@ -5160,7 +5199,7 @@
           <a:p>
             <a:fld id="{08882BDC-A680-4764-9A15-E4D7289376AF}" type="datetimeFigureOut">
               <a:rPr lang="en-US" smtClean="0"/>
-              <a:t>2/6/2022</a:t>
+              <a:t>3/2/2022</a:t>
             </a:fld>
             <a:endParaRPr lang="en-US"/>
           </a:p>
@@ -5437,7 +5476,7 @@
           <a:p>
             <a:fld id="{08882BDC-A680-4764-9A15-E4D7289376AF}" type="datetimeFigureOut">
               <a:rPr lang="en-US" smtClean="0"/>
-              <a:t>2/6/2022</a:t>
+              <a:t>3/2/2022</a:t>
             </a:fld>
             <a:endParaRPr lang="en-US"/>
           </a:p>
@@ -5747,7 +5786,7 @@
           <a:p>
             <a:fld id="{08882BDC-A680-4764-9A15-E4D7289376AF}" type="datetimeFigureOut">
               <a:rPr lang="en-US" smtClean="0"/>
-              <a:t>2/6/2022</a:t>
+              <a:t>3/2/2022</a:t>
             </a:fld>
             <a:endParaRPr lang="en-US"/>
           </a:p>
@@ -5998,7 +6037,7 @@
           <a:p>
             <a:fld id="{08882BDC-A680-4764-9A15-E4D7289376AF}" type="datetimeFigureOut">
               <a:rPr lang="en-US" smtClean="0"/>
-              <a:t>2/6/2022</a:t>
+              <a:t>3/2/2022</a:t>
             </a:fld>
             <a:endParaRPr lang="en-US"/>
           </a:p>
@@ -6465,7 +6504,7 @@
           <p:nvPr>
             <p:extLst>
               <p:ext uri="{D42A27DB-BD31-4B8C-83A1-F6EECF244321}">
-                <p14:modId xmlns:p14="http://schemas.microsoft.com/office/powerpoint/2010/main" val="644290269"/>
+                <p14:modId xmlns:p14="http://schemas.microsoft.com/office/powerpoint/2010/main" val="3843742725"/>
               </p:ext>
             </p:extLst>
           </p:nvPr>
@@ -6968,6 +7007,7 @@
                     <a:bodyPr/>
                     <a:lstStyle/>
                     <a:p>
+                      <a:pPr algn="ctr"/>
                       <a:r>
                         <a:rPr lang="en-US" sz="1600" b="1" kern="1200" dirty="0">
                           <a:solidFill>
@@ -9638,6 +9678,7 @@
                     <a:bodyPr/>
                     <a:lstStyle/>
                     <a:p>
+                      <a:pPr algn="ctr"/>
                       <a:r>
                         <a:rPr lang="en-US" sz="1600" b="1" kern="1200" dirty="0">
                           <a:solidFill>
@@ -10254,7 +10295,7 @@
                     <a:p>
                       <a:pPr algn="l"/>
                       <a:r>
-                        <a:rPr lang="en-US" sz="1000">
+                        <a:rPr lang="en-US" sz="1000" dirty="0">
                           <a:latin typeface="Candara" panose="020E0502030303020204" pitchFamily="34" charset="0"/>
                         </a:rPr>
                         <a:t>Physical resilience is 10 + (2 x Might).</a:t>
@@ -10262,14 +10303,14 @@
                     </a:p>
                     <a:p>
                       <a:pPr algn="l"/>
-                      <a:endParaRPr lang="en-US" sz="1000">
+                      <a:endParaRPr lang="en-US" sz="1000" dirty="0">
                         <a:latin typeface="Candara" panose="020E0502030303020204" pitchFamily="34" charset="0"/>
                       </a:endParaRPr>
                     </a:p>
                     <a:p>
                       <a:pPr algn="l"/>
                       <a:r>
-                        <a:rPr lang="en-US" sz="1000">
+                        <a:rPr lang="en-US" sz="1000" dirty="0">
                           <a:latin typeface="Candara" panose="020E0502030303020204" pitchFamily="34" charset="0"/>
                         </a:rPr>
                         <a:t>Mental resilience is 10 + (2 x Willpower).</a:t>
@@ -10277,14 +10318,14 @@
                     </a:p>
                     <a:p>
                       <a:pPr algn="l"/>
-                      <a:endParaRPr lang="en-US" sz="1000">
+                      <a:endParaRPr lang="en-US" sz="1000" dirty="0">
                         <a:latin typeface="Candara" panose="020E0502030303020204" pitchFamily="34" charset="0"/>
                       </a:endParaRPr>
                     </a:p>
                     <a:p>
                       <a:pPr algn="l"/>
                       <a:r>
-                        <a:rPr lang="en-US" sz="1000">
+                        <a:rPr lang="en-US" sz="1000" dirty="0">
                           <a:latin typeface="Candara" panose="020E0502030303020204" pitchFamily="34" charset="0"/>
                         </a:rPr>
                         <a:t>Filling half a pool gives a stacking -1 to all rolls. Each crit gives a stacking -1 to all rolls.</a:t>
@@ -14146,7 +14187,7 @@
                     <a:bodyPr/>
                     <a:lstStyle/>
                     <a:p>
-                      <a:endParaRPr lang="en-US" sz="1000">
+                      <a:endParaRPr lang="en-US" sz="1000" dirty="0">
                         <a:latin typeface="Candara" panose="020E0502030303020204" pitchFamily="34" charset="0"/>
                       </a:endParaRPr>
                     </a:p>
@@ -15786,14 +15827,14 @@
           <p:nvPr>
             <p:extLst>
               <p:ext uri="{D42A27DB-BD31-4B8C-83A1-F6EECF244321}">
-                <p14:modId xmlns:p14="http://schemas.microsoft.com/office/powerpoint/2010/main" val="1069723579"/>
+                <p14:modId xmlns:p14="http://schemas.microsoft.com/office/powerpoint/2010/main" val="718383503"/>
               </p:ext>
             </p:extLst>
           </p:nvPr>
         </p:nvGraphicFramePr>
         <p:xfrm>
           <a:off x="0" y="0"/>
-          <a:ext cx="10093201" cy="7772400"/>
+          <a:ext cx="10070154" cy="7785100"/>
         </p:xfrm>
         <a:graphic>
           <a:graphicData uri="http://schemas.openxmlformats.org/drawingml/2006/table">
@@ -15802,77 +15843,84 @@
                 <a:tableStyleId>{5C22544A-7EE6-4342-B048-85BDC9FD1C3A}</a:tableStyleId>
               </a:tblPr>
               <a:tblGrid>
-                <a:gridCol w="456952">
+                <a:gridCol w="455881">
                   <a:extLst>
                     <a:ext uri="{9D8B030D-6E8A-4147-A177-3AD203B41FA5}">
                       <a16:colId xmlns:a16="http://schemas.microsoft.com/office/drawing/2014/main" val="1874856429"/>
                     </a:ext>
                   </a:extLst>
                 </a:gridCol>
-                <a:gridCol w="913904">
+                <a:gridCol w="911763">
                   <a:extLst>
                     <a:ext uri="{9D8B030D-6E8A-4147-A177-3AD203B41FA5}">
                       <a16:colId xmlns:a16="http://schemas.microsoft.com/office/drawing/2014/main" val="2513422332"/>
                     </a:ext>
                   </a:extLst>
                 </a:gridCol>
-                <a:gridCol w="744796">
+                <a:gridCol w="743050">
                   <a:extLst>
                     <a:ext uri="{9D8B030D-6E8A-4147-A177-3AD203B41FA5}">
                       <a16:colId xmlns:a16="http://schemas.microsoft.com/office/drawing/2014/main" val="1674740716"/>
                     </a:ext>
                   </a:extLst>
                 </a:gridCol>
-                <a:gridCol w="2802672">
+                <a:gridCol w="2796104">
                   <a:extLst>
                     <a:ext uri="{9D8B030D-6E8A-4147-A177-3AD203B41FA5}">
                       <a16:colId xmlns:a16="http://schemas.microsoft.com/office/drawing/2014/main" val="2614246170"/>
                     </a:ext>
                   </a:extLst>
                 </a:gridCol>
-                <a:gridCol w="257202">
+                <a:gridCol w="257203">
                   <a:extLst>
                     <a:ext uri="{9D8B030D-6E8A-4147-A177-3AD203B41FA5}">
                       <a16:colId xmlns:a16="http://schemas.microsoft.com/office/drawing/2014/main" val="3634899011"/>
                     </a:ext>
                   </a:extLst>
                 </a:gridCol>
-                <a:gridCol w="316129">
+                <a:gridCol w="315389">
                   <a:extLst>
                     <a:ext uri="{9D8B030D-6E8A-4147-A177-3AD203B41FA5}">
                       <a16:colId xmlns:a16="http://schemas.microsoft.com/office/drawing/2014/main" val="822597698"/>
                     </a:ext>
                   </a:extLst>
                 </a:gridCol>
-                <a:gridCol w="1292687">
+                <a:gridCol w="1021258">
                   <a:extLst>
                     <a:ext uri="{9D8B030D-6E8A-4147-A177-3AD203B41FA5}">
                       <a16:colId xmlns:a16="http://schemas.microsoft.com/office/drawing/2014/main" val="4052597680"/>
                     </a:ext>
                   </a:extLst>
                 </a:gridCol>
-                <a:gridCol w="922692">
+                <a:gridCol w="268400">
+                  <a:extLst>
+                    <a:ext uri="{9D8B030D-6E8A-4147-A177-3AD203B41FA5}">
+                      <a16:colId xmlns:a16="http://schemas.microsoft.com/office/drawing/2014/main" val="3776355269"/>
+                    </a:ext>
+                  </a:extLst>
+                </a:gridCol>
+                <a:gridCol w="920530">
                   <a:extLst>
                     <a:ext uri="{9D8B030D-6E8A-4147-A177-3AD203B41FA5}">
                       <a16:colId xmlns:a16="http://schemas.microsoft.com/office/drawing/2014/main" val="3612141449"/>
                     </a:ext>
                   </a:extLst>
                 </a:gridCol>
-                <a:gridCol w="1015311">
+                <a:gridCol w="1012932">
                   <a:extLst>
                     <a:ext uri="{9D8B030D-6E8A-4147-A177-3AD203B41FA5}">
                       <a16:colId xmlns:a16="http://schemas.microsoft.com/office/drawing/2014/main" val="201885679"/>
                     </a:ext>
                   </a:extLst>
                 </a:gridCol>
-                <a:gridCol w="913904">
+                <a:gridCol w="911763">
                   <a:extLst>
                     <a:ext uri="{9D8B030D-6E8A-4147-A177-3AD203B41FA5}">
                       <a16:colId xmlns:a16="http://schemas.microsoft.com/office/drawing/2014/main" val="422781345"/>
                     </a:ext>
                   </a:extLst>
                 </a:gridCol>
-                <a:gridCol w="456952">
+                <a:gridCol w="455881">
                   <a:extLst>
                     <a:ext uri="{9D8B030D-6E8A-4147-A177-3AD203B41FA5}">
                       <a16:colId xmlns:a16="http://schemas.microsoft.com/office/drawing/2014/main" val="2958780628"/>
@@ -15958,7 +16006,7 @@
                     </a:solidFill>
                   </a:tcPr>
                 </a:tc>
-                <a:tc gridSpan="4">
+                <a:tc gridSpan="5">
                   <a:txBody>
                     <a:bodyPr/>
                     <a:lstStyle/>
@@ -16004,12 +16052,22 @@
                   </a:txBody>
                   <a:tcPr/>
                 </a:tc>
+                <a:tc hMerge="1">
+                  <a:txBody>
+                    <a:bodyPr/>
+                    <a:lstStyle/>
+                    <a:p>
+                      <a:endParaRPr lang="en-US"/>
+                    </a:p>
+                  </a:txBody>
+                  <a:tcPr/>
+                </a:tc>
                 <a:tc>
                   <a:txBody>
                     <a:bodyPr/>
                     <a:lstStyle/>
                     <a:p>
-                      <a:endParaRPr lang="en-US" sz="1000">
+                      <a:endParaRPr lang="en-US" sz="1000" dirty="0">
                         <a:latin typeface="Candara" panose="020E0502030303020204" pitchFamily="34" charset="0"/>
                       </a:endParaRPr>
                     </a:p>
@@ -16216,7 +16274,7 @@
                     </a:solidFill>
                   </a:tcPr>
                 </a:tc>
-                <a:tc>
+                <a:tc gridSpan="2">
                   <a:txBody>
                     <a:bodyPr/>
                     <a:lstStyle/>
@@ -16228,6 +16286,32 @@
                         </a:rPr>
                         <a:t>Cantrip</a:t>
                       </a:r>
+                      <a:endParaRPr lang="en-US" sz="1600" i="1" dirty="0">
+                        <a:latin typeface="Candara" panose="020E0502030303020204" pitchFamily="34" charset="0"/>
+                      </a:endParaRPr>
+                    </a:p>
+                  </a:txBody>
+                  <a:tcPr anchor="b">
+                    <a:lnB w="12700" cap="flat" cmpd="sng" algn="ctr">
+                      <a:solidFill>
+                        <a:schemeClr val="tx1"/>
+                      </a:solidFill>
+                      <a:prstDash val="solid"/>
+                      <a:round/>
+                      <a:headEnd type="none" w="med" len="med"/>
+                      <a:tailEnd type="none" w="med" len="med"/>
+                    </a:lnB>
+                    <a:solidFill>
+                      <a:schemeClr val="bg1"/>
+                    </a:solidFill>
+                  </a:tcPr>
+                </a:tc>
+                <a:tc hMerge="1">
+                  <a:txBody>
+                    <a:bodyPr/>
+                    <a:lstStyle/>
+                    <a:p>
+                      <a:pPr algn="ctr"/>
                       <a:endParaRPr lang="en-US" sz="1600" i="1" dirty="0">
                         <a:latin typeface="Candara" panose="020E0502030303020204" pitchFamily="34" charset="0"/>
                       </a:endParaRPr>
@@ -16584,7 +16668,7 @@
                     </a:solidFill>
                   </a:tcPr>
                 </a:tc>
-                <a:tc gridSpan="2">
+                <a:tc gridSpan="3">
                   <a:txBody>
                     <a:bodyPr/>
                     <a:lstStyle/>
@@ -16630,6 +16714,40 @@
                     </a:p>
                   </a:txBody>
                   <a:tcPr/>
+                </a:tc>
+                <a:tc hMerge="1">
+                  <a:txBody>
+                    <a:bodyPr/>
+                    <a:lstStyle/>
+                    <a:p>
+                      <a:endParaRPr lang="en-US" sz="1000" dirty="0">
+                        <a:latin typeface="Candara" panose="020E0502030303020204" pitchFamily="34" charset="0"/>
+                      </a:endParaRPr>
+                    </a:p>
+                  </a:txBody>
+                  <a:tcPr anchor="b">
+                    <a:lnT w="12700" cap="flat" cmpd="sng" algn="ctr">
+                      <a:solidFill>
+                        <a:schemeClr val="tx1"/>
+                      </a:solidFill>
+                      <a:prstDash val="solid"/>
+                      <a:round/>
+                      <a:headEnd type="none" w="med" len="med"/>
+                      <a:tailEnd type="none" w="med" len="med"/>
+                    </a:lnT>
+                    <a:lnB w="12700" cap="flat" cmpd="sng" algn="ctr">
+                      <a:solidFill>
+                        <a:schemeClr val="tx1"/>
+                      </a:solidFill>
+                      <a:prstDash val="solid"/>
+                      <a:round/>
+                      <a:headEnd type="none" w="med" len="med"/>
+                      <a:tailEnd type="none" w="med" len="med"/>
+                    </a:lnB>
+                    <a:solidFill>
+                      <a:schemeClr val="bg1"/>
+                    </a:solidFill>
+                  </a:tcPr>
                 </a:tc>
                 <a:tc>
                   <a:txBody>
@@ -16947,7 +17065,7 @@
                     </a:solidFill>
                   </a:tcPr>
                 </a:tc>
-                <a:tc gridSpan="2">
+                <a:tc gridSpan="3">
                   <a:txBody>
                     <a:bodyPr/>
                     <a:lstStyle/>
@@ -16993,6 +17111,40 @@
                     </a:p>
                   </a:txBody>
                   <a:tcPr/>
+                </a:tc>
+                <a:tc hMerge="1">
+                  <a:txBody>
+                    <a:bodyPr/>
+                    <a:lstStyle/>
+                    <a:p>
+                      <a:endParaRPr lang="en-US" sz="1000" dirty="0">
+                        <a:latin typeface="Candara" panose="020E0502030303020204" pitchFamily="34" charset="0"/>
+                      </a:endParaRPr>
+                    </a:p>
+                  </a:txBody>
+                  <a:tcPr anchor="b">
+                    <a:lnT w="12700" cap="flat" cmpd="sng" algn="ctr">
+                      <a:solidFill>
+                        <a:schemeClr val="tx1"/>
+                      </a:solidFill>
+                      <a:prstDash val="solid"/>
+                      <a:round/>
+                      <a:headEnd type="none" w="med" len="med"/>
+                      <a:tailEnd type="none" w="med" len="med"/>
+                    </a:lnT>
+                    <a:lnB w="12700" cap="flat" cmpd="sng" algn="ctr">
+                      <a:solidFill>
+                        <a:schemeClr val="tx1"/>
+                      </a:solidFill>
+                      <a:prstDash val="solid"/>
+                      <a:round/>
+                      <a:headEnd type="none" w="med" len="med"/>
+                      <a:tailEnd type="none" w="med" len="med"/>
+                    </a:lnB>
+                    <a:solidFill>
+                      <a:schemeClr val="bg1"/>
+                    </a:solidFill>
+                  </a:tcPr>
                 </a:tc>
                 <a:tc>
                   <a:txBody>
@@ -17255,7 +17407,7 @@
                     </a:solidFill>
                   </a:tcPr>
                 </a:tc>
-                <a:tc gridSpan="2">
+                <a:tc gridSpan="3">
                   <a:txBody>
                     <a:bodyPr/>
                     <a:lstStyle/>
@@ -17301,6 +17453,40 @@
                     </a:p>
                   </a:txBody>
                   <a:tcPr/>
+                </a:tc>
+                <a:tc hMerge="1">
+                  <a:txBody>
+                    <a:bodyPr/>
+                    <a:lstStyle/>
+                    <a:p>
+                      <a:endParaRPr lang="en-US" sz="1000" dirty="0">
+                        <a:latin typeface="Candara" panose="020E0502030303020204" pitchFamily="34" charset="0"/>
+                      </a:endParaRPr>
+                    </a:p>
+                  </a:txBody>
+                  <a:tcPr anchor="b">
+                    <a:lnT w="12700" cap="flat" cmpd="sng" algn="ctr">
+                      <a:solidFill>
+                        <a:schemeClr val="tx1"/>
+                      </a:solidFill>
+                      <a:prstDash val="solid"/>
+                      <a:round/>
+                      <a:headEnd type="none" w="med" len="med"/>
+                      <a:tailEnd type="none" w="med" len="med"/>
+                    </a:lnT>
+                    <a:lnB w="12700" cap="flat" cmpd="sng" algn="ctr">
+                      <a:solidFill>
+                        <a:schemeClr val="tx1"/>
+                      </a:solidFill>
+                      <a:prstDash val="solid"/>
+                      <a:round/>
+                      <a:headEnd type="none" w="med" len="med"/>
+                      <a:tailEnd type="none" w="med" len="med"/>
+                    </a:lnB>
+                    <a:solidFill>
+                      <a:schemeClr val="bg1"/>
+                    </a:solidFill>
+                  </a:tcPr>
                 </a:tc>
                 <a:tc>
                   <a:txBody>
@@ -17597,7 +17783,7 @@
                     </a:solidFill>
                   </a:tcPr>
                 </a:tc>
-                <a:tc gridSpan="2">
+                <a:tc gridSpan="3">
                   <a:txBody>
                     <a:bodyPr/>
                     <a:lstStyle/>
@@ -17643,6 +17829,40 @@
                     </a:p>
                   </a:txBody>
                   <a:tcPr/>
+                </a:tc>
+                <a:tc hMerge="1">
+                  <a:txBody>
+                    <a:bodyPr/>
+                    <a:lstStyle/>
+                    <a:p>
+                      <a:endParaRPr lang="en-US" sz="1000" dirty="0">
+                        <a:latin typeface="Candara" panose="020E0502030303020204" pitchFamily="34" charset="0"/>
+                      </a:endParaRPr>
+                    </a:p>
+                  </a:txBody>
+                  <a:tcPr anchor="b">
+                    <a:lnT w="12700" cap="flat" cmpd="sng" algn="ctr">
+                      <a:solidFill>
+                        <a:schemeClr val="tx1"/>
+                      </a:solidFill>
+                      <a:prstDash val="solid"/>
+                      <a:round/>
+                      <a:headEnd type="none" w="med" len="med"/>
+                      <a:tailEnd type="none" w="med" len="med"/>
+                    </a:lnT>
+                    <a:lnB w="12700" cap="flat" cmpd="sng" algn="ctr">
+                      <a:solidFill>
+                        <a:schemeClr val="tx1"/>
+                      </a:solidFill>
+                      <a:prstDash val="solid"/>
+                      <a:round/>
+                      <a:headEnd type="none" w="med" len="med"/>
+                      <a:tailEnd type="none" w="med" len="med"/>
+                    </a:lnB>
+                    <a:solidFill>
+                      <a:schemeClr val="bg1"/>
+                    </a:solidFill>
+                  </a:tcPr>
                 </a:tc>
                 <a:tc>
                   <a:txBody>
@@ -17905,7 +18125,7 @@
                     </a:solidFill>
                   </a:tcPr>
                 </a:tc>
-                <a:tc gridSpan="2">
+                <a:tc gridSpan="3">
                   <a:txBody>
                     <a:bodyPr/>
                     <a:lstStyle/>
@@ -17951,6 +18171,40 @@
                     </a:p>
                   </a:txBody>
                   <a:tcPr/>
+                </a:tc>
+                <a:tc hMerge="1">
+                  <a:txBody>
+                    <a:bodyPr/>
+                    <a:lstStyle/>
+                    <a:p>
+                      <a:endParaRPr lang="en-US" sz="1000" dirty="0">
+                        <a:latin typeface="Candara" panose="020E0502030303020204" pitchFamily="34" charset="0"/>
+                      </a:endParaRPr>
+                    </a:p>
+                  </a:txBody>
+                  <a:tcPr anchor="b">
+                    <a:lnT w="12700" cap="flat" cmpd="sng" algn="ctr">
+                      <a:solidFill>
+                        <a:schemeClr val="tx1"/>
+                      </a:solidFill>
+                      <a:prstDash val="solid"/>
+                      <a:round/>
+                      <a:headEnd type="none" w="med" len="med"/>
+                      <a:tailEnd type="none" w="med" len="med"/>
+                    </a:lnT>
+                    <a:lnB w="12700" cap="flat" cmpd="sng" algn="ctr">
+                      <a:solidFill>
+                        <a:schemeClr val="tx1"/>
+                      </a:solidFill>
+                      <a:prstDash val="solid"/>
+                      <a:round/>
+                      <a:headEnd type="none" w="med" len="med"/>
+                      <a:tailEnd type="none" w="med" len="med"/>
+                    </a:lnB>
+                    <a:solidFill>
+                      <a:schemeClr val="bg1"/>
+                    </a:solidFill>
+                  </a:tcPr>
                 </a:tc>
                 <a:tc>
                   <a:txBody>
@@ -18247,7 +18501,7 @@
                     </a:solidFill>
                   </a:tcPr>
                 </a:tc>
-                <a:tc gridSpan="2">
+                <a:tc gridSpan="3">
                   <a:txBody>
                     <a:bodyPr/>
                     <a:lstStyle/>
@@ -18293,6 +18547,40 @@
                     </a:p>
                   </a:txBody>
                   <a:tcPr/>
+                </a:tc>
+                <a:tc hMerge="1">
+                  <a:txBody>
+                    <a:bodyPr/>
+                    <a:lstStyle/>
+                    <a:p>
+                      <a:endParaRPr lang="en-US" sz="1000" dirty="0">
+                        <a:latin typeface="Candara" panose="020E0502030303020204" pitchFamily="34" charset="0"/>
+                      </a:endParaRPr>
+                    </a:p>
+                  </a:txBody>
+                  <a:tcPr anchor="b">
+                    <a:lnT w="12700" cap="flat" cmpd="sng" algn="ctr">
+                      <a:solidFill>
+                        <a:schemeClr val="tx1"/>
+                      </a:solidFill>
+                      <a:prstDash val="solid"/>
+                      <a:round/>
+                      <a:headEnd type="none" w="med" len="med"/>
+                      <a:tailEnd type="none" w="med" len="med"/>
+                    </a:lnT>
+                    <a:lnB w="12700" cap="flat" cmpd="sng" algn="ctr">
+                      <a:solidFill>
+                        <a:schemeClr val="tx1"/>
+                      </a:solidFill>
+                      <a:prstDash val="solid"/>
+                      <a:round/>
+                      <a:headEnd type="none" w="med" len="med"/>
+                      <a:tailEnd type="none" w="med" len="med"/>
+                    </a:lnB>
+                    <a:solidFill>
+                      <a:schemeClr val="bg1"/>
+                    </a:solidFill>
+                  </a:tcPr>
                 </a:tc>
                 <a:tc>
                   <a:txBody>
@@ -18555,7 +18843,7 @@
                     </a:solidFill>
                   </a:tcPr>
                 </a:tc>
-                <a:tc gridSpan="2">
+                <a:tc gridSpan="3">
                   <a:txBody>
                     <a:bodyPr/>
                     <a:lstStyle/>
@@ -18601,6 +18889,40 @@
                     </a:p>
                   </a:txBody>
                   <a:tcPr/>
+                </a:tc>
+                <a:tc hMerge="1">
+                  <a:txBody>
+                    <a:bodyPr/>
+                    <a:lstStyle/>
+                    <a:p>
+                      <a:endParaRPr lang="en-US" sz="1000" dirty="0">
+                        <a:latin typeface="Candara" panose="020E0502030303020204" pitchFamily="34" charset="0"/>
+                      </a:endParaRPr>
+                    </a:p>
+                  </a:txBody>
+                  <a:tcPr anchor="b">
+                    <a:lnT w="12700" cap="flat" cmpd="sng" algn="ctr">
+                      <a:solidFill>
+                        <a:schemeClr val="tx1"/>
+                      </a:solidFill>
+                      <a:prstDash val="solid"/>
+                      <a:round/>
+                      <a:headEnd type="none" w="med" len="med"/>
+                      <a:tailEnd type="none" w="med" len="med"/>
+                    </a:lnT>
+                    <a:lnB w="12700" cap="flat" cmpd="sng" algn="ctr">
+                      <a:solidFill>
+                        <a:schemeClr val="tx1"/>
+                      </a:solidFill>
+                      <a:prstDash val="solid"/>
+                      <a:round/>
+                      <a:headEnd type="none" w="med" len="med"/>
+                      <a:tailEnd type="none" w="med" len="med"/>
+                    </a:lnB>
+                    <a:solidFill>
+                      <a:schemeClr val="bg1"/>
+                    </a:solidFill>
+                  </a:tcPr>
                 </a:tc>
                 <a:tc>
                   <a:txBody>
@@ -18897,7 +19219,7 @@
                     </a:solidFill>
                   </a:tcPr>
                 </a:tc>
-                <a:tc gridSpan="2">
+                <a:tc gridSpan="3">
                   <a:txBody>
                     <a:bodyPr/>
                     <a:lstStyle/>
@@ -18943,6 +19265,40 @@
                     </a:p>
                   </a:txBody>
                   <a:tcPr/>
+                </a:tc>
+                <a:tc hMerge="1">
+                  <a:txBody>
+                    <a:bodyPr/>
+                    <a:lstStyle/>
+                    <a:p>
+                      <a:endParaRPr lang="en-US" sz="1000" dirty="0">
+                        <a:latin typeface="Candara" panose="020E0502030303020204" pitchFamily="34" charset="0"/>
+                      </a:endParaRPr>
+                    </a:p>
+                  </a:txBody>
+                  <a:tcPr anchor="b">
+                    <a:lnT w="12700" cap="flat" cmpd="sng" algn="ctr">
+                      <a:solidFill>
+                        <a:schemeClr val="tx1"/>
+                      </a:solidFill>
+                      <a:prstDash val="solid"/>
+                      <a:round/>
+                      <a:headEnd type="none" w="med" len="med"/>
+                      <a:tailEnd type="none" w="med" len="med"/>
+                    </a:lnT>
+                    <a:lnB w="12700" cap="flat" cmpd="sng" algn="ctr">
+                      <a:solidFill>
+                        <a:schemeClr val="tx1"/>
+                      </a:solidFill>
+                      <a:prstDash val="solid"/>
+                      <a:round/>
+                      <a:headEnd type="none" w="med" len="med"/>
+                      <a:tailEnd type="none" w="med" len="med"/>
+                    </a:lnB>
+                    <a:solidFill>
+                      <a:schemeClr val="bg1"/>
+                    </a:solidFill>
+                  </a:tcPr>
                 </a:tc>
                 <a:tc>
                   <a:txBody>
@@ -19205,7 +19561,7 @@
                     </a:solidFill>
                   </a:tcPr>
                 </a:tc>
-                <a:tc gridSpan="2">
+                <a:tc gridSpan="3">
                   <a:txBody>
                     <a:bodyPr/>
                     <a:lstStyle/>
@@ -19251,6 +19607,40 @@
                     </a:p>
                   </a:txBody>
                   <a:tcPr/>
+                </a:tc>
+                <a:tc hMerge="1">
+                  <a:txBody>
+                    <a:bodyPr/>
+                    <a:lstStyle/>
+                    <a:p>
+                      <a:endParaRPr lang="en-US" sz="1000" dirty="0">
+                        <a:latin typeface="Candara" panose="020E0502030303020204" pitchFamily="34" charset="0"/>
+                      </a:endParaRPr>
+                    </a:p>
+                  </a:txBody>
+                  <a:tcPr anchor="b">
+                    <a:lnT w="12700" cap="flat" cmpd="sng" algn="ctr">
+                      <a:solidFill>
+                        <a:schemeClr val="tx1"/>
+                      </a:solidFill>
+                      <a:prstDash val="solid"/>
+                      <a:round/>
+                      <a:headEnd type="none" w="med" len="med"/>
+                      <a:tailEnd type="none" w="med" len="med"/>
+                    </a:lnT>
+                    <a:lnB w="12700" cap="flat" cmpd="sng" algn="ctr">
+                      <a:solidFill>
+                        <a:schemeClr val="tx1"/>
+                      </a:solidFill>
+                      <a:prstDash val="solid"/>
+                      <a:round/>
+                      <a:headEnd type="none" w="med" len="med"/>
+                      <a:tailEnd type="none" w="med" len="med"/>
+                    </a:lnB>
+                    <a:solidFill>
+                      <a:schemeClr val="bg1"/>
+                    </a:solidFill>
+                  </a:tcPr>
                 </a:tc>
                 <a:tc>
                   <a:txBody>
@@ -19547,7 +19937,7 @@
                     </a:solidFill>
                   </a:tcPr>
                 </a:tc>
-                <a:tc gridSpan="2">
+                <a:tc gridSpan="3">
                   <a:txBody>
                     <a:bodyPr/>
                     <a:lstStyle/>
@@ -19593,6 +19983,40 @@
                     </a:p>
                   </a:txBody>
                   <a:tcPr/>
+                </a:tc>
+                <a:tc hMerge="1">
+                  <a:txBody>
+                    <a:bodyPr/>
+                    <a:lstStyle/>
+                    <a:p>
+                      <a:endParaRPr lang="en-US" sz="1000" dirty="0">
+                        <a:latin typeface="Candara" panose="020E0502030303020204" pitchFamily="34" charset="0"/>
+                      </a:endParaRPr>
+                    </a:p>
+                  </a:txBody>
+                  <a:tcPr anchor="b">
+                    <a:lnT w="12700" cap="flat" cmpd="sng" algn="ctr">
+                      <a:solidFill>
+                        <a:schemeClr val="tx1"/>
+                      </a:solidFill>
+                      <a:prstDash val="solid"/>
+                      <a:round/>
+                      <a:headEnd type="none" w="med" len="med"/>
+                      <a:tailEnd type="none" w="med" len="med"/>
+                    </a:lnT>
+                    <a:lnB w="12700" cap="flat" cmpd="sng" algn="ctr">
+                      <a:solidFill>
+                        <a:schemeClr val="tx1"/>
+                      </a:solidFill>
+                      <a:prstDash val="solid"/>
+                      <a:round/>
+                      <a:headEnd type="none" w="med" len="med"/>
+                      <a:tailEnd type="none" w="med" len="med"/>
+                    </a:lnB>
+                    <a:solidFill>
+                      <a:schemeClr val="bg1"/>
+                    </a:solidFill>
+                  </a:tcPr>
                 </a:tc>
                 <a:tc>
                   <a:txBody>
@@ -19855,7 +20279,7 @@
                     </a:solidFill>
                   </a:tcPr>
                 </a:tc>
-                <a:tc gridSpan="2">
+                <a:tc gridSpan="3">
                   <a:txBody>
                     <a:bodyPr/>
                     <a:lstStyle/>
@@ -19901,6 +20325,40 @@
                     </a:p>
                   </a:txBody>
                   <a:tcPr/>
+                </a:tc>
+                <a:tc hMerge="1">
+                  <a:txBody>
+                    <a:bodyPr/>
+                    <a:lstStyle/>
+                    <a:p>
+                      <a:endParaRPr lang="en-US" sz="1000" dirty="0">
+                        <a:latin typeface="Candara" panose="020E0502030303020204" pitchFamily="34" charset="0"/>
+                      </a:endParaRPr>
+                    </a:p>
+                  </a:txBody>
+                  <a:tcPr anchor="b">
+                    <a:lnT w="12700" cap="flat" cmpd="sng" algn="ctr">
+                      <a:solidFill>
+                        <a:schemeClr val="tx1"/>
+                      </a:solidFill>
+                      <a:prstDash val="solid"/>
+                      <a:round/>
+                      <a:headEnd type="none" w="med" len="med"/>
+                      <a:tailEnd type="none" w="med" len="med"/>
+                    </a:lnT>
+                    <a:lnB w="12700" cap="flat" cmpd="sng" algn="ctr">
+                      <a:solidFill>
+                        <a:schemeClr val="tx1"/>
+                      </a:solidFill>
+                      <a:prstDash val="solid"/>
+                      <a:round/>
+                      <a:headEnd type="none" w="med" len="med"/>
+                      <a:tailEnd type="none" w="med" len="med"/>
+                    </a:lnB>
+                    <a:solidFill>
+                      <a:schemeClr val="bg1"/>
+                    </a:solidFill>
+                  </a:tcPr>
                 </a:tc>
                 <a:tc>
                   <a:txBody>
@@ -19925,7 +20383,7 @@
                         <a:defRPr/>
                       </a:pPr>
                       <a:r>
-                        <a:rPr lang="en-US" sz="1000">
+                        <a:rPr lang="en-US" sz="1000" dirty="0">
                           <a:latin typeface="Candara" panose="020E0502030303020204" pitchFamily="34" charset="0"/>
                         </a:rPr>
                         <a:t>Complexity:</a:t>
@@ -20150,7 +20608,7 @@
                     </a:solidFill>
                   </a:tcPr>
                 </a:tc>
-                <a:tc gridSpan="4">
+                <a:tc gridSpan="5">
                   <a:txBody>
                     <a:bodyPr/>
                     <a:lstStyle/>
@@ -20174,6 +20632,16 @@
                       <a:schemeClr val="bg1"/>
                     </a:solidFill>
                   </a:tcPr>
+                </a:tc>
+                <a:tc hMerge="1">
+                  <a:txBody>
+                    <a:bodyPr/>
+                    <a:lstStyle/>
+                    <a:p>
+                      <a:endParaRPr lang="en-US"/>
+                    </a:p>
+                  </a:txBody>
+                  <a:tcPr/>
                 </a:tc>
                 <a:tc hMerge="1">
                   <a:txBody>
@@ -20254,8 +20722,8 @@
                   </a:ext>
                 </a:extLst>
               </a:tr>
-              <a:tr h="388620">
-                <a:tc>
+              <a:tr h="323850">
+                <a:tc rowSpan="2">
                   <a:txBody>
                     <a:bodyPr/>
                     <a:lstStyle/>
@@ -20271,7 +20739,7 @@
                     </a:solidFill>
                   </a:tcPr>
                 </a:tc>
-                <a:tc>
+                <a:tc rowSpan="2">
                   <a:txBody>
                     <a:bodyPr/>
                     <a:lstStyle/>
@@ -20299,7 +20767,7 @@
                     </a:solidFill>
                   </a:tcPr>
                 </a:tc>
-                <a:tc gridSpan="7">
+                <a:tc gridSpan="5">
                   <a:txBody>
                     <a:bodyPr/>
                     <a:lstStyle/>
@@ -20421,32 +20889,342 @@
                     <a:bodyPr/>
                     <a:lstStyle/>
                     <a:p>
+                      <a:pPr algn="ctr"/>
+                      <a:r>
+                        <a:rPr lang="en-US" sz="1600" b="1" kern="1200" dirty="0">
+                          <a:solidFill>
+                            <a:schemeClr val="dk1"/>
+                          </a:solidFill>
+                          <a:latin typeface="Centaur" panose="02030504050205020304" pitchFamily="18" charset="0"/>
+                          <a:ea typeface="+mn-ea"/>
+                          <a:cs typeface="+mn-cs"/>
+                        </a:rPr>
+                        <a:t>Adventuring schedule</a:t>
+                      </a:r>
+                    </a:p>
+                    <a:p>
+                      <a:r>
+                        <a:rPr lang="en-US" sz="1000" b="0" kern="1200" dirty="0">
+                          <a:solidFill>
+                            <a:schemeClr val="dk1"/>
+                          </a:solidFill>
+                          <a:latin typeface="Candara" panose="020E0502030303020204" pitchFamily="34" charset="0"/>
+                          <a:ea typeface="+mn-ea"/>
+                          <a:cs typeface="+mn-cs"/>
+                        </a:rPr>
+                        <a:t>Minor rest: one hour of rest, recover fatigue, all light sources lit before the rest began are extinguished.</a:t>
+                      </a:r>
+                    </a:p>
+                    <a:p>
+                      <a:endParaRPr lang="en-US" sz="1000" b="0" kern="1200" dirty="0">
+                        <a:solidFill>
+                          <a:schemeClr val="dk1"/>
+                        </a:solidFill>
+                        <a:latin typeface="Candara" panose="020E0502030303020204" pitchFamily="34" charset="0"/>
+                        <a:ea typeface="+mn-ea"/>
+                        <a:cs typeface="+mn-cs"/>
+                      </a:endParaRPr>
+                    </a:p>
+                    <a:p>
+                      <a:r>
+                        <a:rPr lang="en-US" sz="1000" b="0" kern="1200" dirty="0">
+                          <a:solidFill>
+                            <a:schemeClr val="dk1"/>
+                          </a:solidFill>
+                          <a:latin typeface="Candara" panose="020E0502030303020204" pitchFamily="34" charset="0"/>
+                          <a:ea typeface="+mn-ea"/>
+                          <a:cs typeface="+mn-cs"/>
+                        </a:rPr>
+                        <a:t>Major rest: make camp, all light sources lit before the rest began are extinguished, eat one unit of food (optional), rest for six to ten hours, recover Fatigue and Burn, recover injuries if food was eaten, all light sources lit before rest began are extinguished.</a:t>
+                      </a:r>
+                    </a:p>
+                    <a:p>
+                      <a:endParaRPr lang="en-US" sz="1000" b="0" kern="1200" dirty="0">
+                        <a:solidFill>
+                          <a:schemeClr val="dk1"/>
+                        </a:solidFill>
+                        <a:latin typeface="Candara" panose="020E0502030303020204" pitchFamily="34" charset="0"/>
+                        <a:ea typeface="+mn-ea"/>
+                        <a:cs typeface="+mn-cs"/>
+                      </a:endParaRPr>
+                    </a:p>
+                    <a:p>
+                      <a:r>
+                        <a:rPr lang="en-US" sz="1000" b="0" kern="1200" dirty="0">
+                          <a:solidFill>
+                            <a:schemeClr val="dk1"/>
+                          </a:solidFill>
+                          <a:latin typeface="Candara" panose="020E0502030303020204" pitchFamily="34" charset="0"/>
+                          <a:ea typeface="+mn-ea"/>
+                          <a:cs typeface="+mn-cs"/>
+                        </a:rPr>
+                        <a:t>Injury recovery: three separate injuries each heal by 1. Critical injuries count as two choices.</a:t>
+                      </a:r>
+                      <a:endParaRPr lang="en-US" dirty="0"/>
+                    </a:p>
+                  </a:txBody>
+                  <a:tcPr>
+                    <a:lnTlToBr w="12700" cmpd="sng">
+                      <a:noFill/>
+                      <a:prstDash val="solid"/>
+                    </a:lnTlToBr>
+                    <a:lnBlToTr w="12700" cmpd="sng">
+                      <a:noFill/>
+                      <a:prstDash val="solid"/>
+                    </a:lnBlToTr>
+                    <a:solidFill>
+                      <a:schemeClr val="bg1"/>
+                    </a:solidFill>
+                  </a:tcPr>
+                </a:tc>
+                <a:tc rowSpan="11" gridSpan="4">
+                  <a:txBody>
+                    <a:bodyPr/>
+                    <a:lstStyle/>
+                    <a:p>
+                      <a:pPr algn="ctr"/>
+                      <a:r>
+                        <a:rPr lang="en-US" sz="1600" b="1" kern="1200" dirty="0">
+                          <a:solidFill>
+                            <a:schemeClr val="dk1"/>
+                          </a:solidFill>
+                          <a:latin typeface="Centaur" panose="02030504050205020304" pitchFamily="18" charset="0"/>
+                          <a:ea typeface="+mn-ea"/>
+                          <a:cs typeface="+mn-cs"/>
+                        </a:rPr>
+                        <a:t>Rest and recovery</a:t>
+                      </a:r>
+                    </a:p>
+                    <a:p>
+                      <a:r>
+                        <a:rPr lang="en-US" sz="1000" b="1" kern="1200" dirty="0">
+                          <a:solidFill>
+                            <a:schemeClr val="dk1"/>
+                          </a:solidFill>
+                          <a:latin typeface="Candara" panose="020E0502030303020204" pitchFamily="34" charset="0"/>
+                          <a:ea typeface="+mn-ea"/>
+                          <a:cs typeface="+mn-cs"/>
+                        </a:rPr>
+                        <a:t>Minor rest:</a:t>
+                      </a:r>
+                      <a:r>
+                        <a:rPr lang="en-US" sz="1000" b="0" kern="1200" dirty="0">
+                          <a:solidFill>
+                            <a:schemeClr val="dk1"/>
+                          </a:solidFill>
+                          <a:latin typeface="Candara" panose="020E0502030303020204" pitchFamily="34" charset="0"/>
+                          <a:ea typeface="+mn-ea"/>
+                          <a:cs typeface="+mn-cs"/>
+                        </a:rPr>
+                        <a:t> one hour of rest, recover Fatigue, extinguish all light sources lit before the rest began.</a:t>
+                      </a:r>
+                    </a:p>
+                    <a:p>
+                      <a:endParaRPr lang="en-US" sz="1000" b="0" kern="1200" dirty="0">
+                        <a:solidFill>
+                          <a:schemeClr val="dk1"/>
+                        </a:solidFill>
+                        <a:latin typeface="Candara" panose="020E0502030303020204" pitchFamily="34" charset="0"/>
+                        <a:ea typeface="+mn-ea"/>
+                        <a:cs typeface="+mn-cs"/>
+                      </a:endParaRPr>
+                    </a:p>
+                    <a:p>
+                      <a:r>
+                        <a:rPr lang="en-US" sz="1000" b="1" kern="1200" dirty="0">
+                          <a:solidFill>
+                            <a:schemeClr val="dk1"/>
+                          </a:solidFill>
+                          <a:latin typeface="Candara" panose="020E0502030303020204" pitchFamily="34" charset="0"/>
+                          <a:ea typeface="+mn-ea"/>
+                          <a:cs typeface="+mn-cs"/>
+                        </a:rPr>
+                        <a:t>Major rest:</a:t>
+                      </a:r>
+                      <a:r>
+                        <a:rPr lang="en-US" sz="1000" b="0" kern="1200" dirty="0">
+                          <a:solidFill>
+                            <a:schemeClr val="dk1"/>
+                          </a:solidFill>
+                          <a:latin typeface="Candara" panose="020E0502030303020204" pitchFamily="34" charset="0"/>
+                          <a:ea typeface="+mn-ea"/>
+                          <a:cs typeface="+mn-cs"/>
+                        </a:rPr>
+                        <a:t> make camp, extinguish all light sources lit before the rest began, eat one unit of food (optional), rest for six to ten hours, recover Fatigue and Burn, recover injuries if food was eaten, extinguish all light sources lit during the rest.</a:t>
+                      </a:r>
+                    </a:p>
+                    <a:p>
+                      <a:endParaRPr lang="en-US" sz="1000" b="0" kern="1200" dirty="0">
+                        <a:solidFill>
+                          <a:schemeClr val="dk1"/>
+                        </a:solidFill>
+                        <a:latin typeface="Candara" panose="020E0502030303020204" pitchFamily="34" charset="0"/>
+                        <a:ea typeface="+mn-ea"/>
+                        <a:cs typeface="+mn-cs"/>
+                      </a:endParaRPr>
+                    </a:p>
+                    <a:p>
+                      <a:r>
+                        <a:rPr lang="en-US" sz="1000" b="1" kern="1200" dirty="0">
+                          <a:solidFill>
+                            <a:schemeClr val="dk1"/>
+                          </a:solidFill>
+                          <a:latin typeface="Candara" panose="020E0502030303020204" pitchFamily="34" charset="0"/>
+                          <a:ea typeface="+mn-ea"/>
+                          <a:cs typeface="+mn-cs"/>
+                        </a:rPr>
+                        <a:t>Injury recovery:</a:t>
+                      </a:r>
+                      <a:r>
+                        <a:rPr lang="en-US" sz="1000" b="0" kern="1200" dirty="0">
+                          <a:solidFill>
+                            <a:schemeClr val="dk1"/>
+                          </a:solidFill>
+                          <a:latin typeface="Candara" panose="020E0502030303020204" pitchFamily="34" charset="0"/>
+                          <a:ea typeface="+mn-ea"/>
+                          <a:cs typeface="+mn-cs"/>
+                        </a:rPr>
+                        <a:t> three separate injuries each heal by 1. Pre-recovery critical injuries count as two choices.</a:t>
+                      </a:r>
+                      <a:endParaRPr lang="en-US" sz="1000" dirty="0">
+                        <a:latin typeface="Candara" panose="020E0502030303020204" pitchFamily="34" charset="0"/>
+                      </a:endParaRPr>
+                    </a:p>
+                  </a:txBody>
+                  <a:tcPr>
+                    <a:lnB w="12700" cap="flat" cmpd="sng" algn="ctr">
+                      <a:noFill/>
+                      <a:prstDash val="solid"/>
+                      <a:round/>
+                      <a:headEnd type="none" w="med" len="med"/>
+                      <a:tailEnd type="none" w="med" len="med"/>
+                    </a:lnB>
+                    <a:lnTlToBr w="12700" cmpd="sng">
+                      <a:noFill/>
+                      <a:prstDash val="solid"/>
+                    </a:lnTlToBr>
+                    <a:lnBlToTr w="12700" cmpd="sng">
+                      <a:noFill/>
+                      <a:prstDash val="solid"/>
+                    </a:lnBlToTr>
+                    <a:solidFill>
+                      <a:schemeClr val="bg1"/>
+                    </a:solidFill>
+                  </a:tcPr>
+                </a:tc>
+                <a:tc rowSpan="11" hMerge="1">
+                  <a:txBody>
+                    <a:bodyPr/>
+                    <a:lstStyle/>
+                    <a:p>
+                      <a:pPr algn="ctr"/>
+                      <a:r>
+                        <a:rPr lang="en-US" sz="1600" b="1" kern="1200" dirty="0">
+                          <a:solidFill>
+                            <a:schemeClr val="dk1"/>
+                          </a:solidFill>
+                          <a:latin typeface="Centaur" panose="02030504050205020304" pitchFamily="18" charset="0"/>
+                          <a:ea typeface="+mn-ea"/>
+                          <a:cs typeface="+mn-cs"/>
+                        </a:rPr>
+                        <a:t>Adventuring schedule</a:t>
+                      </a:r>
+                    </a:p>
+                    <a:p>
+                      <a:r>
+                        <a:rPr lang="en-US" sz="1000" b="0" kern="1200" dirty="0">
+                          <a:solidFill>
+                            <a:schemeClr val="dk1"/>
+                          </a:solidFill>
+                          <a:latin typeface="Candara" panose="020E0502030303020204" pitchFamily="34" charset="0"/>
+                          <a:ea typeface="+mn-ea"/>
+                          <a:cs typeface="+mn-cs"/>
+                        </a:rPr>
+                        <a:t>Minor rest: one hour of rest, recover fatigue, all light sources lit before the rest began are extinguished.</a:t>
+                      </a:r>
+                    </a:p>
+                    <a:p>
+                      <a:endParaRPr lang="en-US" sz="1000" b="0" kern="1200" dirty="0">
+                        <a:solidFill>
+                          <a:schemeClr val="dk1"/>
+                        </a:solidFill>
+                        <a:latin typeface="Candara" panose="020E0502030303020204" pitchFamily="34" charset="0"/>
+                        <a:ea typeface="+mn-ea"/>
+                        <a:cs typeface="+mn-cs"/>
+                      </a:endParaRPr>
+                    </a:p>
+                    <a:p>
+                      <a:r>
+                        <a:rPr lang="en-US" sz="1000" b="0" kern="1200" dirty="0">
+                          <a:solidFill>
+                            <a:schemeClr val="dk1"/>
+                          </a:solidFill>
+                          <a:latin typeface="Candara" panose="020E0502030303020204" pitchFamily="34" charset="0"/>
+                          <a:ea typeface="+mn-ea"/>
+                          <a:cs typeface="+mn-cs"/>
+                        </a:rPr>
+                        <a:t>Major rest: make camp, all light sources lit before the rest began are extinguished, eat one unit of food (optional), rest for six to ten hours, recover Fatigue and Burn, recover injuries if food was eaten, all light sources lit before rest began are extinguished.</a:t>
+                      </a:r>
+                    </a:p>
+                    <a:p>
+                      <a:endParaRPr lang="en-US" sz="1000" b="0" kern="1200" dirty="0">
+                        <a:solidFill>
+                          <a:schemeClr val="dk1"/>
+                        </a:solidFill>
+                        <a:latin typeface="Candara" panose="020E0502030303020204" pitchFamily="34" charset="0"/>
+                        <a:ea typeface="+mn-ea"/>
+                        <a:cs typeface="+mn-cs"/>
+                      </a:endParaRPr>
+                    </a:p>
+                    <a:p>
+                      <a:r>
+                        <a:rPr lang="en-US" sz="1000" b="0" kern="1200" dirty="0">
+                          <a:solidFill>
+                            <a:schemeClr val="dk1"/>
+                          </a:solidFill>
+                          <a:latin typeface="Candara" panose="020E0502030303020204" pitchFamily="34" charset="0"/>
+                          <a:ea typeface="+mn-ea"/>
+                          <a:cs typeface="+mn-cs"/>
+                        </a:rPr>
+                        <a:t>Injury recovery: three separate injuries each heal by 1. Critical injuries count as two choices.</a:t>
+                      </a:r>
+                      <a:endParaRPr lang="en-US" dirty="0"/>
+                    </a:p>
+                  </a:txBody>
+                  <a:tcPr>
+                    <a:lnB w="12700" cap="flat" cmpd="sng" algn="ctr">
+                      <a:solidFill>
+                        <a:schemeClr val="tx1"/>
+                      </a:solidFill>
+                      <a:prstDash val="solid"/>
+                      <a:round/>
+                      <a:headEnd type="none" w="med" len="med"/>
+                      <a:tailEnd type="none" w="med" len="med"/>
+                    </a:lnB>
+                    <a:lnTlToBr w="12700" cmpd="sng">
+                      <a:noFill/>
+                      <a:prstDash val="solid"/>
+                    </a:lnTlToBr>
+                    <a:lnBlToTr w="12700" cmpd="sng">
+                      <a:noFill/>
+                      <a:prstDash val="solid"/>
+                    </a:lnBlToTr>
+                    <a:solidFill>
+                      <a:schemeClr val="bg1"/>
+                    </a:solidFill>
+                  </a:tcPr>
+                </a:tc>
+                <a:tc rowSpan="11" hMerge="1">
+                  <a:txBody>
+                    <a:bodyPr/>
+                    <a:lstStyle/>
+                    <a:p>
                       <a:endParaRPr lang="en-US"/>
                     </a:p>
                   </a:txBody>
                   <a:tcPr/>
                 </a:tc>
-                <a:tc hMerge="1">
-                  <a:txBody>
-                    <a:bodyPr/>
-                    <a:lstStyle/>
-                    <a:p>
-                      <a:endParaRPr lang="en-US"/>
-                    </a:p>
-                  </a:txBody>
-                  <a:tcPr/>
-                </a:tc>
-                <a:tc hMerge="1">
-                  <a:txBody>
-                    <a:bodyPr/>
-                    <a:lstStyle/>
-                    <a:p>
-                      <a:endParaRPr lang="en-US"/>
-                    </a:p>
-                  </a:txBody>
-                  <a:tcPr/>
-                </a:tc>
-                <a:tc>
+                <a:tc rowSpan="11" hMerge="1">
                   <a:txBody>
                     <a:bodyPr/>
                     <a:lstStyle/>
@@ -20463,7 +21241,7 @@
                     </a:solidFill>
                   </a:tcPr>
                 </a:tc>
-                <a:tc>
+                <a:tc rowSpan="2">
                   <a:txBody>
                     <a:bodyPr/>
                     <a:lstStyle/>
@@ -20485,8 +21263,28 @@
                   </a:ext>
                 </a:extLst>
               </a:tr>
-              <a:tr h="388620">
-                <a:tc>
+              <a:tr h="0">
+                <a:tc vMerge="1">
+                  <a:txBody>
+                    <a:bodyPr/>
+                    <a:lstStyle/>
+                    <a:p>
+                      <a:endParaRPr lang="en-US"/>
+                    </a:p>
+                  </a:txBody>
+                  <a:tcPr/>
+                </a:tc>
+                <a:tc vMerge="1">
+                  <a:txBody>
+                    <a:bodyPr/>
+                    <a:lstStyle/>
+                    <a:p>
+                      <a:endParaRPr lang="en-US"/>
+                    </a:p>
+                  </a:txBody>
+                  <a:tcPr/>
+                </a:tc>
+                <a:tc rowSpan="2" gridSpan="5">
                   <a:txBody>
                     <a:bodyPr/>
                     <a:lstStyle/>
@@ -20496,13 +21294,155 @@
                       </a:endParaRPr>
                     </a:p>
                   </a:txBody>
+                  <a:tcPr anchor="b">
+                    <a:lnL w="12700" cmpd="sng">
+                      <a:noFill/>
+                    </a:lnL>
+                    <a:lnT w="12700" cap="flat" cmpd="sng" algn="ctr">
+                      <a:solidFill>
+                        <a:schemeClr val="tx1"/>
+                      </a:solidFill>
+                      <a:prstDash val="solid"/>
+                      <a:round/>
+                      <a:headEnd type="none" w="med" len="med"/>
+                      <a:tailEnd type="none" w="med" len="med"/>
+                    </a:lnT>
+                    <a:lnB w="12700" cap="flat" cmpd="sng" algn="ctr">
+                      <a:solidFill>
+                        <a:schemeClr val="tx1"/>
+                      </a:solidFill>
+                      <a:prstDash val="solid"/>
+                      <a:round/>
+                      <a:headEnd type="none" w="med" len="med"/>
+                      <a:tailEnd type="none" w="med" len="med"/>
+                    </a:lnB>
+                    <a:lnTlToBr w="12700" cmpd="sng">
+                      <a:noFill/>
+                      <a:prstDash val="solid"/>
+                    </a:lnTlToBr>
+                    <a:lnBlToTr w="12700" cmpd="sng">
+                      <a:noFill/>
+                      <a:prstDash val="solid"/>
+                    </a:lnBlToTr>
+                    <a:solidFill>
+                      <a:schemeClr val="bg1"/>
+                    </a:solidFill>
+                  </a:tcPr>
+                </a:tc>
+                <a:tc rowSpan="2" hMerge="1">
+                  <a:txBody>
+                    <a:bodyPr/>
+                    <a:lstStyle/>
+                    <a:p>
+                      <a:endParaRPr lang="en-US"/>
+                    </a:p>
+                  </a:txBody>
+                  <a:tcPr/>
+                </a:tc>
+                <a:tc rowSpan="2" hMerge="1">
+                  <a:txBody>
+                    <a:bodyPr/>
+                    <a:lstStyle/>
+                    <a:p>
+                      <a:endParaRPr lang="en-US"/>
+                    </a:p>
+                  </a:txBody>
+                  <a:tcPr/>
+                </a:tc>
+                <a:tc rowSpan="2" hMerge="1">
+                  <a:txBody>
+                    <a:bodyPr/>
+                    <a:lstStyle/>
+                    <a:p>
+                      <a:endParaRPr lang="en-US"/>
+                    </a:p>
+                  </a:txBody>
+                  <a:tcPr/>
+                </a:tc>
+                <a:tc rowSpan="2" hMerge="1">
+                  <a:txBody>
+                    <a:bodyPr/>
+                    <a:lstStyle/>
+                    <a:p>
+                      <a:endParaRPr lang="en-US"/>
+                    </a:p>
+                  </a:txBody>
+                  <a:tcPr/>
+                </a:tc>
+                <a:tc gridSpan="4" vMerge="1">
+                  <a:txBody>
+                    <a:bodyPr/>
+                    <a:lstStyle/>
+                    <a:p>
+                      <a:endParaRPr lang="en-US"/>
+                    </a:p>
+                  </a:txBody>
+                  <a:tcPr/>
+                </a:tc>
+                <a:tc hMerge="1" vMerge="1">
+                  <a:txBody>
+                    <a:bodyPr/>
+                    <a:lstStyle/>
+                    <a:p>
+                      <a:endParaRPr lang="en-US"/>
+                    </a:p>
+                  </a:txBody>
+                  <a:tcPr/>
+                </a:tc>
+                <a:tc hMerge="1" vMerge="1">
+                  <a:txBody>
+                    <a:bodyPr/>
+                    <a:lstStyle/>
+                    <a:p>
+                      <a:endParaRPr lang="en-US"/>
+                    </a:p>
+                  </a:txBody>
+                  <a:tcPr/>
+                </a:tc>
+                <a:tc hMerge="1" vMerge="1">
+                  <a:txBody>
+                    <a:bodyPr/>
+                    <a:lstStyle/>
+                    <a:p>
+                      <a:endParaRPr lang="en-US"/>
+                    </a:p>
+                  </a:txBody>
+                  <a:tcPr/>
+                </a:tc>
+                <a:tc vMerge="1">
+                  <a:txBody>
+                    <a:bodyPr/>
+                    <a:lstStyle/>
+                    <a:p>
+                      <a:endParaRPr lang="en-US"/>
+                    </a:p>
+                  </a:txBody>
+                  <a:tcPr/>
+                </a:tc>
+                <a:extLst>
+                  <a:ext uri="{0D108BD9-81ED-4DB2-BD59-A6C34878D82A}">
+                    <a16:rowId xmlns:a16="http://schemas.microsoft.com/office/drawing/2014/main" val="101900729"/>
+                  </a:ext>
+                </a:extLst>
+              </a:tr>
+              <a:tr h="259080">
+                <a:tc rowSpan="2">
+                  <a:txBody>
+                    <a:bodyPr/>
+                    <a:lstStyle/>
+                    <a:p>
+                      <a:endParaRPr lang="en-US" sz="1000" dirty="0">
+                        <a:latin typeface="Candara" panose="020E0502030303020204" pitchFamily="34" charset="0"/>
+                      </a:endParaRPr>
+                    </a:p>
+                  </a:txBody>
                   <a:tcPr>
                     <a:solidFill>
                       <a:schemeClr val="bg1"/>
                     </a:solidFill>
                   </a:tcPr>
                 </a:tc>
-                <a:tc rowSpan="2">
+                <a:tc rowSpan="4">
                   <a:txBody>
                     <a:bodyPr/>
                     <a:lstStyle/>
@@ -20540,7 +21480,7 @@
                     </a:solidFill>
                   </a:tcPr>
                 </a:tc>
-                <a:tc gridSpan="7">
+                <a:tc gridSpan="5" vMerge="1">
                   <a:txBody>
                     <a:bodyPr/>
                     <a:lstStyle/>
@@ -20585,7 +21525,7 @@
                     </a:solidFill>
                   </a:tcPr>
                 </a:tc>
-                <a:tc hMerge="1">
+                <a:tc hMerge="1" vMerge="1">
                   <a:txBody>
                     <a:bodyPr/>
                     <a:lstStyle/>
@@ -20595,7 +21535,7 @@
                   </a:txBody>
                   <a:tcPr/>
                 </a:tc>
-                <a:tc hMerge="1">
+                <a:tc hMerge="1" vMerge="1">
                   <a:txBody>
                     <a:bodyPr/>
                     <a:lstStyle/>
@@ -20627,7 +21567,7 @@
                     </a:solidFill>
                   </a:tcPr>
                 </a:tc>
-                <a:tc hMerge="1">
+                <a:tc hMerge="1" vMerge="1">
                   <a:txBody>
                     <a:bodyPr/>
                     <a:lstStyle/>
@@ -20659,7 +21599,7 @@
                     </a:solidFill>
                   </a:tcPr>
                 </a:tc>
-                <a:tc hMerge="1">
+                <a:tc hMerge="1" vMerge="1">
                   <a:txBody>
                     <a:bodyPr/>
                     <a:lstStyle/>
@@ -20669,7 +21609,49 @@
                   </a:txBody>
                   <a:tcPr/>
                 </a:tc>
-                <a:tc hMerge="1">
+                <a:tc gridSpan="4" vMerge="1">
+                  <a:txBody>
+                    <a:bodyPr/>
+                    <a:lstStyle/>
+                    <a:p>
+                      <a:endParaRPr lang="en-US" sz="1000" dirty="0">
+                        <a:latin typeface="Candara" panose="020E0502030303020204" pitchFamily="34" charset="0"/>
+                      </a:endParaRPr>
+                    </a:p>
+                  </a:txBody>
+                  <a:tcPr anchor="b">
+                    <a:lnT w="12700" cap="flat" cmpd="sng" algn="ctr">
+                      <a:solidFill>
+                        <a:schemeClr val="tx1"/>
+                      </a:solidFill>
+                      <a:prstDash val="solid"/>
+                      <a:round/>
+                      <a:headEnd type="none" w="med" len="med"/>
+                      <a:tailEnd type="none" w="med" len="med"/>
+                    </a:lnT>
+                    <a:lnB w="12700" cap="flat" cmpd="sng" algn="ctr">
+                      <a:solidFill>
+                        <a:schemeClr val="tx1"/>
+                      </a:solidFill>
+                      <a:prstDash val="solid"/>
+                      <a:round/>
+                      <a:headEnd type="none" w="med" len="med"/>
+                      <a:tailEnd type="none" w="med" len="med"/>
+                    </a:lnB>
+                    <a:lnTlToBr w="12700" cmpd="sng">
+                      <a:noFill/>
+                      <a:prstDash val="solid"/>
+                    </a:lnTlToBr>
+                    <a:lnBlToTr w="12700" cmpd="sng">
+                      <a:noFill/>
+                      <a:prstDash val="solid"/>
+                    </a:lnBlToTr>
+                    <a:solidFill>
+                      <a:schemeClr val="bg1"/>
+                    </a:solidFill>
+                  </a:tcPr>
+                </a:tc>
+                <a:tc hMerge="1" vMerge="1">
                   <a:txBody>
                     <a:bodyPr/>
                     <a:lstStyle/>
@@ -20679,7 +21661,7 @@
                   </a:txBody>
                   <a:tcPr/>
                 </a:tc>
-                <a:tc hMerge="1">
+                <a:tc hMerge="1" vMerge="1">
                   <a:txBody>
                     <a:bodyPr/>
                     <a:lstStyle/>
@@ -20689,7 +21671,7 @@
                   </a:txBody>
                   <a:tcPr/>
                 </a:tc>
-                <a:tc>
+                <a:tc hMerge="1" vMerge="1">
                   <a:txBody>
                     <a:bodyPr/>
                     <a:lstStyle/>
@@ -20706,7 +21688,7 @@
                     </a:solidFill>
                   </a:tcPr>
                 </a:tc>
-                <a:tc>
+                <a:tc rowSpan="2">
                   <a:txBody>
                     <a:bodyPr/>
                     <a:lstStyle/>
@@ -20728,8 +21710,170 @@
                   </a:ext>
                 </a:extLst>
               </a:tr>
-              <a:tr h="388620">
-                <a:tc>
+              <a:tr h="129540">
+                <a:tc vMerge="1">
+                  <a:txBody>
+                    <a:bodyPr/>
+                    <a:lstStyle/>
+                    <a:p>
+                      <a:endParaRPr lang="en-US"/>
+                    </a:p>
+                  </a:txBody>
+                  <a:tcPr/>
+                </a:tc>
+                <a:tc vMerge="1">
+                  <a:txBody>
+                    <a:bodyPr/>
+                    <a:lstStyle/>
+                    <a:p>
+                      <a:endParaRPr lang="en-US"/>
+                    </a:p>
+                  </a:txBody>
+                  <a:tcPr/>
+                </a:tc>
+                <a:tc rowSpan="2" gridSpan="5">
+                  <a:txBody>
+                    <a:bodyPr/>
+                    <a:lstStyle/>
+                    <a:p>
+                      <a:endParaRPr lang="en-US" sz="1000" dirty="0">
+                        <a:latin typeface="Candara" panose="020E0502030303020204" pitchFamily="34" charset="0"/>
+                      </a:endParaRPr>
+                    </a:p>
+                  </a:txBody>
+                  <a:tcPr anchor="b">
+                    <a:lnL w="12700" cmpd="sng">
+                      <a:noFill/>
+                    </a:lnL>
+                    <a:lnT w="12700" cap="flat" cmpd="sng" algn="ctr">
+                      <a:solidFill>
+                        <a:schemeClr val="tx1"/>
+                      </a:solidFill>
+                      <a:prstDash val="solid"/>
+                      <a:round/>
+                      <a:headEnd type="none" w="med" len="med"/>
+                      <a:tailEnd type="none" w="med" len="med"/>
+                    </a:lnT>
+                    <a:lnB w="12700" cap="flat" cmpd="sng" algn="ctr">
+                      <a:solidFill>
+                        <a:schemeClr val="tx1"/>
+                      </a:solidFill>
+                      <a:prstDash val="solid"/>
+                      <a:round/>
+                      <a:headEnd type="none" w="med" len="med"/>
+                      <a:tailEnd type="none" w="med" len="med"/>
+                    </a:lnB>
+                    <a:lnTlToBr w="12700" cmpd="sng">
+                      <a:noFill/>
+                      <a:prstDash val="solid"/>
+                    </a:lnTlToBr>
+                    <a:lnBlToTr w="12700" cmpd="sng">
+                      <a:noFill/>
+                      <a:prstDash val="solid"/>
+                    </a:lnBlToTr>
+                    <a:solidFill>
+                      <a:schemeClr val="bg1"/>
+                    </a:solidFill>
+                  </a:tcPr>
+                </a:tc>
+                <a:tc rowSpan="2" hMerge="1">
+                  <a:txBody>
+                    <a:bodyPr/>
+                    <a:lstStyle/>
+                    <a:p>
+                      <a:endParaRPr lang="en-US"/>
+                    </a:p>
+                  </a:txBody>
+                  <a:tcPr/>
+                </a:tc>
+                <a:tc rowSpan="2" hMerge="1">
+                  <a:txBody>
+                    <a:bodyPr/>
+                    <a:lstStyle/>
+                    <a:p>
+                      <a:endParaRPr lang="en-US"/>
+                    </a:p>
+                  </a:txBody>
+                  <a:tcPr/>
+                </a:tc>
+                <a:tc rowSpan="2" hMerge="1">
+                  <a:txBody>
+                    <a:bodyPr/>
+                    <a:lstStyle/>
+                    <a:p>
+                      <a:endParaRPr lang="en-US"/>
+                    </a:p>
+                  </a:txBody>
+                  <a:tcPr/>
+                </a:tc>
+                <a:tc rowSpan="2" hMerge="1">
+                  <a:txBody>
+                    <a:bodyPr/>
+                    <a:lstStyle/>
+                    <a:p>
+                      <a:endParaRPr lang="en-US"/>
+                    </a:p>
+                  </a:txBody>
+                  <a:tcPr/>
+                </a:tc>
+                <a:tc gridSpan="4" vMerge="1">
+                  <a:txBody>
+                    <a:bodyPr/>
+                    <a:lstStyle/>
+                    <a:p>
+                      <a:endParaRPr lang="en-US"/>
+                    </a:p>
+                  </a:txBody>
+                  <a:tcPr/>
+                </a:tc>
+                <a:tc hMerge="1" vMerge="1">
+                  <a:txBody>
+                    <a:bodyPr/>
+                    <a:lstStyle/>
+                    <a:p>
+                      <a:endParaRPr lang="en-US"/>
+                    </a:p>
+                  </a:txBody>
+                  <a:tcPr/>
+                </a:tc>
+                <a:tc hMerge="1" vMerge="1">
+                  <a:txBody>
+                    <a:bodyPr/>
+                    <a:lstStyle/>
+                    <a:p>
+                      <a:endParaRPr lang="en-US"/>
+                    </a:p>
+                  </a:txBody>
+                  <a:tcPr/>
+                </a:tc>
+                <a:tc hMerge="1" vMerge="1">
+                  <a:txBody>
+                    <a:bodyPr/>
+                    <a:lstStyle/>
+                    <a:p>
+                      <a:endParaRPr lang="en-US"/>
+                    </a:p>
+                  </a:txBody>
+                  <a:tcPr/>
+                </a:tc>
+                <a:tc vMerge="1">
+                  <a:txBody>
+                    <a:bodyPr/>
+                    <a:lstStyle/>
+                    <a:p>
+                      <a:endParaRPr lang="en-US"/>
+                    </a:p>
+                  </a:txBody>
+                  <a:tcPr/>
+                </a:tc>
+                <a:extLst>
+                  <a:ext uri="{0D108BD9-81ED-4DB2-BD59-A6C34878D82A}">
+                    <a16:rowId xmlns:a16="http://schemas.microsoft.com/office/drawing/2014/main" val="3501839563"/>
+                  </a:ext>
+                </a:extLst>
+              </a:tr>
+              <a:tr h="194310">
+                <a:tc rowSpan="2">
                   <a:txBody>
                     <a:bodyPr/>
                     <a:lstStyle/>
@@ -20765,7 +21909,7 @@
                     </a:solidFill>
                   </a:tcPr>
                 </a:tc>
-                <a:tc gridSpan="7">
+                <a:tc gridSpan="5" vMerge="1">
                   <a:txBody>
                     <a:bodyPr/>
                     <a:lstStyle/>
@@ -20810,7 +21954,7 @@
                     </a:solidFill>
                   </a:tcPr>
                 </a:tc>
-                <a:tc hMerge="1">
+                <a:tc hMerge="1" vMerge="1">
                   <a:txBody>
                     <a:bodyPr/>
                     <a:lstStyle/>
@@ -20820,7 +21964,7 @@
                   </a:txBody>
                   <a:tcPr/>
                 </a:tc>
-                <a:tc hMerge="1">
+                <a:tc hMerge="1" vMerge="1">
                   <a:txBody>
                     <a:bodyPr/>
                     <a:lstStyle/>
@@ -20852,7 +21996,7 @@
                     </a:solidFill>
                   </a:tcPr>
                 </a:tc>
-                <a:tc hMerge="1">
+                <a:tc hMerge="1" vMerge="1">
                   <a:txBody>
                     <a:bodyPr/>
                     <a:lstStyle/>
@@ -20884,7 +22028,7 @@
                     </a:solidFill>
                   </a:tcPr>
                 </a:tc>
-                <a:tc hMerge="1">
+                <a:tc hMerge="1" vMerge="1">
                   <a:txBody>
                     <a:bodyPr/>
                     <a:lstStyle/>
@@ -20894,7 +22038,49 @@
                   </a:txBody>
                   <a:tcPr/>
                 </a:tc>
-                <a:tc hMerge="1">
+                <a:tc gridSpan="4" vMerge="1">
+                  <a:txBody>
+                    <a:bodyPr/>
+                    <a:lstStyle/>
+                    <a:p>
+                      <a:endParaRPr lang="en-US" sz="1000" dirty="0">
+                        <a:latin typeface="Candara" panose="020E0502030303020204" pitchFamily="34" charset="0"/>
+                      </a:endParaRPr>
+                    </a:p>
+                  </a:txBody>
+                  <a:tcPr anchor="b">
+                    <a:lnT w="12700" cap="flat" cmpd="sng" algn="ctr">
+                      <a:solidFill>
+                        <a:schemeClr val="tx1"/>
+                      </a:solidFill>
+                      <a:prstDash val="solid"/>
+                      <a:round/>
+                      <a:headEnd type="none" w="med" len="med"/>
+                      <a:tailEnd type="none" w="med" len="med"/>
+                    </a:lnT>
+                    <a:lnB w="12700" cap="flat" cmpd="sng" algn="ctr">
+                      <a:solidFill>
+                        <a:schemeClr val="tx1"/>
+                      </a:solidFill>
+                      <a:prstDash val="solid"/>
+                      <a:round/>
+                      <a:headEnd type="none" w="med" len="med"/>
+                      <a:tailEnd type="none" w="med" len="med"/>
+                    </a:lnB>
+                    <a:lnTlToBr w="12700" cmpd="sng">
+                      <a:noFill/>
+                      <a:prstDash val="solid"/>
+                    </a:lnTlToBr>
+                    <a:lnBlToTr w="12700" cmpd="sng">
+                      <a:noFill/>
+                      <a:prstDash val="solid"/>
+                    </a:lnBlToTr>
+                    <a:solidFill>
+                      <a:schemeClr val="bg1"/>
+                    </a:solidFill>
+                  </a:tcPr>
+                </a:tc>
+                <a:tc hMerge="1" vMerge="1">
                   <a:txBody>
                     <a:bodyPr/>
                     <a:lstStyle/>
@@ -20904,7 +22090,7 @@
                   </a:txBody>
                   <a:tcPr/>
                 </a:tc>
-                <a:tc hMerge="1">
+                <a:tc hMerge="1" vMerge="1">
                   <a:txBody>
                     <a:bodyPr/>
                     <a:lstStyle/>
@@ -20914,7 +22100,7 @@
                   </a:txBody>
                   <a:tcPr/>
                 </a:tc>
-                <a:tc>
+                <a:tc hMerge="1" vMerge="1">
                   <a:txBody>
                     <a:bodyPr/>
                     <a:lstStyle/>
@@ -20931,7 +22117,7 @@
                     </a:solidFill>
                   </a:tcPr>
                 </a:tc>
-                <a:tc>
+                <a:tc rowSpan="2">
                   <a:txBody>
                     <a:bodyPr/>
                     <a:lstStyle/>
@@ -20953,8 +22139,170 @@
                   </a:ext>
                 </a:extLst>
               </a:tr>
-              <a:tr h="388620">
-                <a:tc>
+              <a:tr h="194310">
+                <a:tc vMerge="1">
+                  <a:txBody>
+                    <a:bodyPr/>
+                    <a:lstStyle/>
+                    <a:p>
+                      <a:endParaRPr lang="en-US"/>
+                    </a:p>
+                  </a:txBody>
+                  <a:tcPr/>
+                </a:tc>
+                <a:tc vMerge="1">
+                  <a:txBody>
+                    <a:bodyPr/>
+                    <a:lstStyle/>
+                    <a:p>
+                      <a:endParaRPr lang="en-US"/>
+                    </a:p>
+                  </a:txBody>
+                  <a:tcPr/>
+                </a:tc>
+                <a:tc rowSpan="2" gridSpan="5">
+                  <a:txBody>
+                    <a:bodyPr/>
+                    <a:lstStyle/>
+                    <a:p>
+                      <a:endParaRPr lang="en-US" sz="1000" dirty="0">
+                        <a:latin typeface="Candara" panose="020E0502030303020204" pitchFamily="34" charset="0"/>
+                      </a:endParaRPr>
+                    </a:p>
+                  </a:txBody>
+                  <a:tcPr anchor="b">
+                    <a:lnL w="12700" cmpd="sng">
+                      <a:noFill/>
+                    </a:lnL>
+                    <a:lnT w="12700" cap="flat" cmpd="sng" algn="ctr">
+                      <a:solidFill>
+                        <a:schemeClr val="tx1"/>
+                      </a:solidFill>
+                      <a:prstDash val="solid"/>
+                      <a:round/>
+                      <a:headEnd type="none" w="med" len="med"/>
+                      <a:tailEnd type="none" w="med" len="med"/>
+                    </a:lnT>
+                    <a:lnB w="12700" cap="flat" cmpd="sng" algn="ctr">
+                      <a:solidFill>
+                        <a:schemeClr val="tx1"/>
+                      </a:solidFill>
+                      <a:prstDash val="solid"/>
+                      <a:round/>
+                      <a:headEnd type="none" w="med" len="med"/>
+                      <a:tailEnd type="none" w="med" len="med"/>
+                    </a:lnB>
+                    <a:lnTlToBr w="12700" cmpd="sng">
+                      <a:noFill/>
+                      <a:prstDash val="solid"/>
+                    </a:lnTlToBr>
+                    <a:lnBlToTr w="12700" cmpd="sng">
+                      <a:noFill/>
+                      <a:prstDash val="solid"/>
+                    </a:lnBlToTr>
+                    <a:solidFill>
+                      <a:schemeClr val="bg1"/>
+                    </a:solidFill>
+                  </a:tcPr>
+                </a:tc>
+                <a:tc rowSpan="2" hMerge="1">
+                  <a:txBody>
+                    <a:bodyPr/>
+                    <a:lstStyle/>
+                    <a:p>
+                      <a:endParaRPr lang="en-US"/>
+                    </a:p>
+                  </a:txBody>
+                  <a:tcPr/>
+                </a:tc>
+                <a:tc rowSpan="2" hMerge="1">
+                  <a:txBody>
+                    <a:bodyPr/>
+                    <a:lstStyle/>
+                    <a:p>
+                      <a:endParaRPr lang="en-US"/>
+                    </a:p>
+                  </a:txBody>
+                  <a:tcPr/>
+                </a:tc>
+                <a:tc rowSpan="2" hMerge="1">
+                  <a:txBody>
+                    <a:bodyPr/>
+                    <a:lstStyle/>
+                    <a:p>
+                      <a:endParaRPr lang="en-US"/>
+                    </a:p>
+                  </a:txBody>
+                  <a:tcPr/>
+                </a:tc>
+                <a:tc rowSpan="2" hMerge="1">
+                  <a:txBody>
+                    <a:bodyPr/>
+                    <a:lstStyle/>
+                    <a:p>
+                      <a:endParaRPr lang="en-US"/>
+                    </a:p>
+                  </a:txBody>
+                  <a:tcPr/>
+                </a:tc>
+                <a:tc gridSpan="4" vMerge="1">
+                  <a:txBody>
+                    <a:bodyPr/>
+                    <a:lstStyle/>
+                    <a:p>
+                      <a:endParaRPr lang="en-US"/>
+                    </a:p>
+                  </a:txBody>
+                  <a:tcPr/>
+                </a:tc>
+                <a:tc hMerge="1" vMerge="1">
+                  <a:txBody>
+                    <a:bodyPr/>
+                    <a:lstStyle/>
+                    <a:p>
+                      <a:endParaRPr lang="en-US"/>
+                    </a:p>
+                  </a:txBody>
+                  <a:tcPr/>
+                </a:tc>
+                <a:tc hMerge="1" vMerge="1">
+                  <a:txBody>
+                    <a:bodyPr/>
+                    <a:lstStyle/>
+                    <a:p>
+                      <a:endParaRPr lang="en-US"/>
+                    </a:p>
+                  </a:txBody>
+                  <a:tcPr/>
+                </a:tc>
+                <a:tc hMerge="1" vMerge="1">
+                  <a:txBody>
+                    <a:bodyPr/>
+                    <a:lstStyle/>
+                    <a:p>
+                      <a:endParaRPr lang="en-US"/>
+                    </a:p>
+                  </a:txBody>
+                  <a:tcPr/>
+                </a:tc>
+                <a:tc vMerge="1">
+                  <a:txBody>
+                    <a:bodyPr/>
+                    <a:lstStyle/>
+                    <a:p>
+                      <a:endParaRPr lang="en-US"/>
+                    </a:p>
+                  </a:txBody>
+                  <a:tcPr/>
+                </a:tc>
+                <a:extLst>
+                  <a:ext uri="{0D108BD9-81ED-4DB2-BD59-A6C34878D82A}">
+                    <a16:rowId xmlns:a16="http://schemas.microsoft.com/office/drawing/2014/main" val="3177285981"/>
+                  </a:ext>
+                </a:extLst>
+              </a:tr>
+              <a:tr h="129540">
+                <a:tc rowSpan="2">
                   <a:txBody>
                     <a:bodyPr/>
                     <a:lstStyle/>
@@ -20970,7 +22318,7 @@
                     </a:solidFill>
                   </a:tcPr>
                 </a:tc>
-                <a:tc rowSpan="2">
+                <a:tc rowSpan="4">
                   <a:txBody>
                     <a:bodyPr/>
                     <a:lstStyle/>
@@ -21024,7 +22372,7 @@
                     </a:solidFill>
                   </a:tcPr>
                 </a:tc>
-                <a:tc gridSpan="7">
+                <a:tc gridSpan="5" vMerge="1">
                   <a:txBody>
                     <a:bodyPr/>
                     <a:lstStyle/>
@@ -21069,7 +22417,7 @@
                     </a:solidFill>
                   </a:tcPr>
                 </a:tc>
-                <a:tc hMerge="1">
+                <a:tc hMerge="1" vMerge="1">
                   <a:txBody>
                     <a:bodyPr/>
                     <a:lstStyle/>
@@ -21079,7 +22427,7 @@
                   </a:txBody>
                   <a:tcPr/>
                 </a:tc>
-                <a:tc hMerge="1">
+                <a:tc hMerge="1" vMerge="1">
                   <a:txBody>
                     <a:bodyPr/>
                     <a:lstStyle/>
@@ -21111,7 +22459,7 @@
                     </a:solidFill>
                   </a:tcPr>
                 </a:tc>
-                <a:tc hMerge="1">
+                <a:tc hMerge="1" vMerge="1">
                   <a:txBody>
                     <a:bodyPr/>
                     <a:lstStyle/>
@@ -21143,7 +22491,7 @@
                     </a:solidFill>
                   </a:tcPr>
                 </a:tc>
-                <a:tc hMerge="1">
+                <a:tc hMerge="1" vMerge="1">
                   <a:txBody>
                     <a:bodyPr/>
                     <a:lstStyle/>
@@ -21153,7 +22501,49 @@
                   </a:txBody>
                   <a:tcPr/>
                 </a:tc>
-                <a:tc hMerge="1">
+                <a:tc gridSpan="4" vMerge="1">
+                  <a:txBody>
+                    <a:bodyPr/>
+                    <a:lstStyle/>
+                    <a:p>
+                      <a:endParaRPr lang="en-US" sz="1000" dirty="0">
+                        <a:latin typeface="Candara" panose="020E0502030303020204" pitchFamily="34" charset="0"/>
+                      </a:endParaRPr>
+                    </a:p>
+                  </a:txBody>
+                  <a:tcPr anchor="b">
+                    <a:lnT w="12700" cap="flat" cmpd="sng" algn="ctr">
+                      <a:solidFill>
+                        <a:schemeClr val="tx1"/>
+                      </a:solidFill>
+                      <a:prstDash val="solid"/>
+                      <a:round/>
+                      <a:headEnd type="none" w="med" len="med"/>
+                      <a:tailEnd type="none" w="med" len="med"/>
+                    </a:lnT>
+                    <a:lnB w="12700" cap="flat" cmpd="sng" algn="ctr">
+                      <a:solidFill>
+                        <a:schemeClr val="tx1"/>
+                      </a:solidFill>
+                      <a:prstDash val="solid"/>
+                      <a:round/>
+                      <a:headEnd type="none" w="med" len="med"/>
+                      <a:tailEnd type="none" w="med" len="med"/>
+                    </a:lnB>
+                    <a:lnTlToBr w="12700" cmpd="sng">
+                      <a:noFill/>
+                      <a:prstDash val="solid"/>
+                    </a:lnTlToBr>
+                    <a:lnBlToTr w="12700" cmpd="sng">
+                      <a:noFill/>
+                      <a:prstDash val="solid"/>
+                    </a:lnBlToTr>
+                    <a:solidFill>
+                      <a:schemeClr val="bg1"/>
+                    </a:solidFill>
+                  </a:tcPr>
+                </a:tc>
+                <a:tc hMerge="1" vMerge="1">
                   <a:txBody>
                     <a:bodyPr/>
                     <a:lstStyle/>
@@ -21163,7 +22553,7 @@
                   </a:txBody>
                   <a:tcPr/>
                 </a:tc>
-                <a:tc hMerge="1">
+                <a:tc hMerge="1" vMerge="1">
                   <a:txBody>
                     <a:bodyPr/>
                     <a:lstStyle/>
@@ -21173,24 +22563,24 @@
                   </a:txBody>
                   <a:tcPr/>
                 </a:tc>
-                <a:tc>
+                <a:tc hMerge="1" vMerge="1">
                   <a:txBody>
                     <a:bodyPr/>
                     <a:lstStyle/>
                     <a:p>
                       <a:pPr algn="ctr"/>
-                      <a:endParaRPr lang="en-US" sz="1000">
-                        <a:latin typeface="Candara" panose="020E0502030303020204" pitchFamily="34" charset="0"/>
-                      </a:endParaRPr>
-                    </a:p>
-                  </a:txBody>
-                  <a:tcPr anchor="b">
-                    <a:solidFill>
-                      <a:schemeClr val="bg1"/>
-                    </a:solidFill>
-                  </a:tcPr>
-                </a:tc>
-                <a:tc>
+                      <a:endParaRPr lang="en-US" sz="1000" dirty="0">
+                        <a:latin typeface="Candara" panose="020E0502030303020204" pitchFamily="34" charset="0"/>
+                      </a:endParaRPr>
+                    </a:p>
+                  </a:txBody>
+                  <a:tcPr anchor="b">
+                    <a:solidFill>
+                      <a:schemeClr val="bg1"/>
+                    </a:solidFill>
+                  </a:tcPr>
+                </a:tc>
+                <a:tc rowSpan="2">
                   <a:txBody>
                     <a:bodyPr/>
                     <a:lstStyle/>
@@ -21212,8 +22602,170 @@
                   </a:ext>
                 </a:extLst>
               </a:tr>
-              <a:tr h="388620">
-                <a:tc>
+              <a:tr h="259080">
+                <a:tc vMerge="1">
+                  <a:txBody>
+                    <a:bodyPr/>
+                    <a:lstStyle/>
+                    <a:p>
+                      <a:endParaRPr lang="en-US"/>
+                    </a:p>
+                  </a:txBody>
+                  <a:tcPr/>
+                </a:tc>
+                <a:tc vMerge="1">
+                  <a:txBody>
+                    <a:bodyPr/>
+                    <a:lstStyle/>
+                    <a:p>
+                      <a:endParaRPr lang="en-US"/>
+                    </a:p>
+                  </a:txBody>
+                  <a:tcPr/>
+                </a:tc>
+                <a:tc rowSpan="2" gridSpan="5">
+                  <a:txBody>
+                    <a:bodyPr/>
+                    <a:lstStyle/>
+                    <a:p>
+                      <a:endParaRPr lang="en-US" sz="1000" dirty="0">
+                        <a:latin typeface="Candara" panose="020E0502030303020204" pitchFamily="34" charset="0"/>
+                      </a:endParaRPr>
+                    </a:p>
+                  </a:txBody>
+                  <a:tcPr anchor="b">
+                    <a:lnL w="12700" cmpd="sng">
+                      <a:noFill/>
+                    </a:lnL>
+                    <a:lnT w="12700" cap="flat" cmpd="sng" algn="ctr">
+                      <a:solidFill>
+                        <a:schemeClr val="tx1"/>
+                      </a:solidFill>
+                      <a:prstDash val="solid"/>
+                      <a:round/>
+                      <a:headEnd type="none" w="med" len="med"/>
+                      <a:tailEnd type="none" w="med" len="med"/>
+                    </a:lnT>
+                    <a:lnB w="12700" cap="flat" cmpd="sng" algn="ctr">
+                      <a:solidFill>
+                        <a:schemeClr val="tx1"/>
+                      </a:solidFill>
+                      <a:prstDash val="solid"/>
+                      <a:round/>
+                      <a:headEnd type="none" w="med" len="med"/>
+                      <a:tailEnd type="none" w="med" len="med"/>
+                    </a:lnB>
+                    <a:lnTlToBr w="12700" cmpd="sng">
+                      <a:noFill/>
+                      <a:prstDash val="solid"/>
+                    </a:lnTlToBr>
+                    <a:lnBlToTr w="12700" cmpd="sng">
+                      <a:noFill/>
+                      <a:prstDash val="solid"/>
+                    </a:lnBlToTr>
+                    <a:solidFill>
+                      <a:schemeClr val="bg1"/>
+                    </a:solidFill>
+                  </a:tcPr>
+                </a:tc>
+                <a:tc rowSpan="2" hMerge="1">
+                  <a:txBody>
+                    <a:bodyPr/>
+                    <a:lstStyle/>
+                    <a:p>
+                      <a:endParaRPr lang="en-US"/>
+                    </a:p>
+                  </a:txBody>
+                  <a:tcPr/>
+                </a:tc>
+                <a:tc rowSpan="2" hMerge="1">
+                  <a:txBody>
+                    <a:bodyPr/>
+                    <a:lstStyle/>
+                    <a:p>
+                      <a:endParaRPr lang="en-US"/>
+                    </a:p>
+                  </a:txBody>
+                  <a:tcPr/>
+                </a:tc>
+                <a:tc rowSpan="2" hMerge="1">
+                  <a:txBody>
+                    <a:bodyPr/>
+                    <a:lstStyle/>
+                    <a:p>
+                      <a:endParaRPr lang="en-US"/>
+                    </a:p>
+                  </a:txBody>
+                  <a:tcPr/>
+                </a:tc>
+                <a:tc rowSpan="2" hMerge="1">
+                  <a:txBody>
+                    <a:bodyPr/>
+                    <a:lstStyle/>
+                    <a:p>
+                      <a:endParaRPr lang="en-US"/>
+                    </a:p>
+                  </a:txBody>
+                  <a:tcPr/>
+                </a:tc>
+                <a:tc gridSpan="4" vMerge="1">
+                  <a:txBody>
+                    <a:bodyPr/>
+                    <a:lstStyle/>
+                    <a:p>
+                      <a:endParaRPr lang="en-US"/>
+                    </a:p>
+                  </a:txBody>
+                  <a:tcPr/>
+                </a:tc>
+                <a:tc hMerge="1" vMerge="1">
+                  <a:txBody>
+                    <a:bodyPr/>
+                    <a:lstStyle/>
+                    <a:p>
+                      <a:endParaRPr lang="en-US"/>
+                    </a:p>
+                  </a:txBody>
+                  <a:tcPr/>
+                </a:tc>
+                <a:tc hMerge="1" vMerge="1">
+                  <a:txBody>
+                    <a:bodyPr/>
+                    <a:lstStyle/>
+                    <a:p>
+                      <a:endParaRPr lang="en-US"/>
+                    </a:p>
+                  </a:txBody>
+                  <a:tcPr/>
+                </a:tc>
+                <a:tc hMerge="1" vMerge="1">
+                  <a:txBody>
+                    <a:bodyPr/>
+                    <a:lstStyle/>
+                    <a:p>
+                      <a:endParaRPr lang="en-US"/>
+                    </a:p>
+                  </a:txBody>
+                  <a:tcPr/>
+                </a:tc>
+                <a:tc vMerge="1">
+                  <a:txBody>
+                    <a:bodyPr/>
+                    <a:lstStyle/>
+                    <a:p>
+                      <a:endParaRPr lang="en-US"/>
+                    </a:p>
+                  </a:txBody>
+                  <a:tcPr/>
+                </a:tc>
+                <a:extLst>
+                  <a:ext uri="{0D108BD9-81ED-4DB2-BD59-A6C34878D82A}">
+                    <a16:rowId xmlns:a16="http://schemas.microsoft.com/office/drawing/2014/main" val="2083989976"/>
+                  </a:ext>
+                </a:extLst>
+              </a:tr>
+              <a:tr h="0">
+                <a:tc rowSpan="2">
                   <a:txBody>
                     <a:bodyPr/>
                     <a:lstStyle/>
@@ -21249,7 +22801,7 @@
                     </a:solidFill>
                   </a:tcPr>
                 </a:tc>
-                <a:tc gridSpan="7">
+                <a:tc gridSpan="5" vMerge="1">
                   <a:txBody>
                     <a:bodyPr/>
                     <a:lstStyle/>
@@ -21294,7 +22846,7 @@
                     </a:solidFill>
                   </a:tcPr>
                 </a:tc>
-                <a:tc hMerge="1">
+                <a:tc hMerge="1" vMerge="1">
                   <a:txBody>
                     <a:bodyPr/>
                     <a:lstStyle/>
@@ -21304,7 +22856,7 @@
                   </a:txBody>
                   <a:tcPr/>
                 </a:tc>
-                <a:tc hMerge="1">
+                <a:tc hMerge="1" vMerge="1">
                   <a:txBody>
                     <a:bodyPr/>
                     <a:lstStyle/>
@@ -21336,7 +22888,7 @@
                     </a:solidFill>
                   </a:tcPr>
                 </a:tc>
-                <a:tc hMerge="1">
+                <a:tc hMerge="1" vMerge="1">
                   <a:txBody>
                     <a:bodyPr/>
                     <a:lstStyle/>
@@ -21368,7 +22920,7 @@
                     </a:solidFill>
                   </a:tcPr>
                 </a:tc>
-                <a:tc hMerge="1">
+                <a:tc hMerge="1" vMerge="1">
                   <a:txBody>
                     <a:bodyPr/>
                     <a:lstStyle/>
@@ -21378,7 +22930,49 @@
                   </a:txBody>
                   <a:tcPr/>
                 </a:tc>
-                <a:tc hMerge="1">
+                <a:tc gridSpan="4" vMerge="1">
+                  <a:txBody>
+                    <a:bodyPr/>
+                    <a:lstStyle/>
+                    <a:p>
+                      <a:endParaRPr lang="en-US" sz="1000" dirty="0">
+                        <a:latin typeface="Candara" panose="020E0502030303020204" pitchFamily="34" charset="0"/>
+                      </a:endParaRPr>
+                    </a:p>
+                  </a:txBody>
+                  <a:tcPr anchor="b">
+                    <a:lnT w="12700" cap="flat" cmpd="sng" algn="ctr">
+                      <a:solidFill>
+                        <a:schemeClr val="tx1"/>
+                      </a:solidFill>
+                      <a:prstDash val="solid"/>
+                      <a:round/>
+                      <a:headEnd type="none" w="med" len="med"/>
+                      <a:tailEnd type="none" w="med" len="med"/>
+                    </a:lnT>
+                    <a:lnB w="12700" cap="flat" cmpd="sng" algn="ctr">
+                      <a:solidFill>
+                        <a:schemeClr val="tx1"/>
+                      </a:solidFill>
+                      <a:prstDash val="solid"/>
+                      <a:round/>
+                      <a:headEnd type="none" w="med" len="med"/>
+                      <a:tailEnd type="none" w="med" len="med"/>
+                    </a:lnB>
+                    <a:lnTlToBr w="12700" cmpd="sng">
+                      <a:noFill/>
+                      <a:prstDash val="solid"/>
+                    </a:lnTlToBr>
+                    <a:lnBlToTr w="12700" cmpd="sng">
+                      <a:noFill/>
+                      <a:prstDash val="solid"/>
+                    </a:lnBlToTr>
+                    <a:solidFill>
+                      <a:schemeClr val="bg1"/>
+                    </a:solidFill>
+                  </a:tcPr>
+                </a:tc>
+                <a:tc hMerge="1" vMerge="1">
                   <a:txBody>
                     <a:bodyPr/>
                     <a:lstStyle/>
@@ -21388,7 +22982,7 @@
                   </a:txBody>
                   <a:tcPr/>
                 </a:tc>
-                <a:tc hMerge="1">
+                <a:tc hMerge="1" vMerge="1">
                   <a:txBody>
                     <a:bodyPr/>
                     <a:lstStyle/>
@@ -21398,24 +22992,24 @@
                   </a:txBody>
                   <a:tcPr/>
                 </a:tc>
-                <a:tc>
+                <a:tc hMerge="1" vMerge="1">
                   <a:txBody>
                     <a:bodyPr/>
                     <a:lstStyle/>
                     <a:p>
                       <a:pPr algn="ctr"/>
-                      <a:endParaRPr lang="en-US" sz="1000">
-                        <a:latin typeface="Candara" panose="020E0502030303020204" pitchFamily="34" charset="0"/>
-                      </a:endParaRPr>
-                    </a:p>
-                  </a:txBody>
-                  <a:tcPr anchor="b">
-                    <a:solidFill>
-                      <a:schemeClr val="bg1"/>
-                    </a:solidFill>
-                  </a:tcPr>
-                </a:tc>
-                <a:tc>
+                      <a:endParaRPr lang="en-US" sz="1000" dirty="0">
+                        <a:latin typeface="Candara" panose="020E0502030303020204" pitchFamily="34" charset="0"/>
+                      </a:endParaRPr>
+                    </a:p>
+                  </a:txBody>
+                  <a:tcPr anchor="b">
+                    <a:solidFill>
+                      <a:schemeClr val="bg1"/>
+                    </a:solidFill>
+                  </a:tcPr>
+                </a:tc>
+                <a:tc rowSpan="2">
                   <a:txBody>
                     <a:bodyPr/>
                     <a:lstStyle/>
@@ -21437,6 +23031,168 @@
                   </a:ext>
                 </a:extLst>
               </a:tr>
+              <a:tr h="323850">
+                <a:tc vMerge="1">
+                  <a:txBody>
+                    <a:bodyPr/>
+                    <a:lstStyle/>
+                    <a:p>
+                      <a:endParaRPr lang="en-US"/>
+                    </a:p>
+                  </a:txBody>
+                  <a:tcPr/>
+                </a:tc>
+                <a:tc vMerge="1">
+                  <a:txBody>
+                    <a:bodyPr/>
+                    <a:lstStyle/>
+                    <a:p>
+                      <a:endParaRPr lang="en-US"/>
+                    </a:p>
+                  </a:txBody>
+                  <a:tcPr/>
+                </a:tc>
+                <a:tc gridSpan="5">
+                  <a:txBody>
+                    <a:bodyPr/>
+                    <a:lstStyle/>
+                    <a:p>
+                      <a:endParaRPr lang="en-US" sz="1000" dirty="0">
+                        <a:latin typeface="Candara" panose="020E0502030303020204" pitchFamily="34" charset="0"/>
+                      </a:endParaRPr>
+                    </a:p>
+                  </a:txBody>
+                  <a:tcPr anchor="b">
+                    <a:lnL w="12700" cmpd="sng">
+                      <a:noFill/>
+                    </a:lnL>
+                    <a:lnT w="12700" cap="flat" cmpd="sng" algn="ctr">
+                      <a:solidFill>
+                        <a:schemeClr val="tx1"/>
+                      </a:solidFill>
+                      <a:prstDash val="solid"/>
+                      <a:round/>
+                      <a:headEnd type="none" w="med" len="med"/>
+                      <a:tailEnd type="none" w="med" len="med"/>
+                    </a:lnT>
+                    <a:lnB w="12700" cap="flat" cmpd="sng" algn="ctr">
+                      <a:solidFill>
+                        <a:schemeClr val="tx1"/>
+                      </a:solidFill>
+                      <a:prstDash val="solid"/>
+                      <a:round/>
+                      <a:headEnd type="none" w="med" len="med"/>
+                      <a:tailEnd type="none" w="med" len="med"/>
+                    </a:lnB>
+                    <a:lnTlToBr w="12700" cmpd="sng">
+                      <a:noFill/>
+                      <a:prstDash val="solid"/>
+                    </a:lnTlToBr>
+                    <a:lnBlToTr w="12700" cmpd="sng">
+                      <a:noFill/>
+                      <a:prstDash val="solid"/>
+                    </a:lnBlToTr>
+                    <a:solidFill>
+                      <a:schemeClr val="bg1"/>
+                    </a:solidFill>
+                  </a:tcPr>
+                </a:tc>
+                <a:tc hMerge="1">
+                  <a:txBody>
+                    <a:bodyPr/>
+                    <a:lstStyle/>
+                    <a:p>
+                      <a:endParaRPr lang="en-US"/>
+                    </a:p>
+                  </a:txBody>
+                  <a:tcPr/>
+                </a:tc>
+                <a:tc hMerge="1">
+                  <a:txBody>
+                    <a:bodyPr/>
+                    <a:lstStyle/>
+                    <a:p>
+                      <a:endParaRPr lang="en-US"/>
+                    </a:p>
+                  </a:txBody>
+                  <a:tcPr/>
+                </a:tc>
+                <a:tc hMerge="1">
+                  <a:txBody>
+                    <a:bodyPr/>
+                    <a:lstStyle/>
+                    <a:p>
+                      <a:endParaRPr lang="en-US"/>
+                    </a:p>
+                  </a:txBody>
+                  <a:tcPr/>
+                </a:tc>
+                <a:tc hMerge="1">
+                  <a:txBody>
+                    <a:bodyPr/>
+                    <a:lstStyle/>
+                    <a:p>
+                      <a:endParaRPr lang="en-US"/>
+                    </a:p>
+                  </a:txBody>
+                  <a:tcPr/>
+                </a:tc>
+                <a:tc gridSpan="4" vMerge="1">
+                  <a:txBody>
+                    <a:bodyPr/>
+                    <a:lstStyle/>
+                    <a:p>
+                      <a:endParaRPr lang="en-US"/>
+                    </a:p>
+                  </a:txBody>
+                  <a:tcPr/>
+                </a:tc>
+                <a:tc hMerge="1" vMerge="1">
+                  <a:txBody>
+                    <a:bodyPr/>
+                    <a:lstStyle/>
+                    <a:p>
+                      <a:endParaRPr lang="en-US"/>
+                    </a:p>
+                  </a:txBody>
+                  <a:tcPr/>
+                </a:tc>
+                <a:tc hMerge="1" vMerge="1">
+                  <a:txBody>
+                    <a:bodyPr/>
+                    <a:lstStyle/>
+                    <a:p>
+                      <a:endParaRPr lang="en-US"/>
+                    </a:p>
+                  </a:txBody>
+                  <a:tcPr/>
+                </a:tc>
+                <a:tc hMerge="1" vMerge="1">
+                  <a:txBody>
+                    <a:bodyPr/>
+                    <a:lstStyle/>
+                    <a:p>
+                      <a:endParaRPr lang="en-US"/>
+                    </a:p>
+                  </a:txBody>
+                  <a:tcPr/>
+                </a:tc>
+                <a:tc vMerge="1">
+                  <a:txBody>
+                    <a:bodyPr/>
+                    <a:lstStyle/>
+                    <a:p>
+                      <a:endParaRPr lang="en-US"/>
+                    </a:p>
+                  </a:txBody>
+                  <a:tcPr/>
+                </a:tc>
+                <a:extLst>
+                  <a:ext uri="{0D108BD9-81ED-4DB2-BD59-A6C34878D82A}">
+                    <a16:rowId xmlns:a16="http://schemas.microsoft.com/office/drawing/2014/main" val="3522792652"/>
+                  </a:ext>
+                </a:extLst>
+              </a:tr>
               <a:tr h="388620">
                 <a:tc>
                   <a:txBody>
@@ -21470,12 +23226,12 @@
                     </a:solidFill>
                   </a:tcPr>
                 </a:tc>
-                <a:tc gridSpan="2">
-                  <a:txBody>
-                    <a:bodyPr/>
-                    <a:lstStyle/>
-                    <a:p>
-                      <a:endParaRPr lang="en-US" sz="1000">
+                <a:tc gridSpan="5">
+                  <a:txBody>
+                    <a:bodyPr/>
+                    <a:lstStyle/>
+                    <a:p>
+                      <a:endParaRPr lang="en-US" sz="1000" dirty="0">
                         <a:latin typeface="Candara" panose="020E0502030303020204" pitchFamily="34" charset="0"/>
                       </a:endParaRPr>
                     </a:p>
@@ -21505,12 +23261,12 @@
                   </a:txBody>
                   <a:tcPr/>
                 </a:tc>
-                <a:tc>
-                  <a:txBody>
-                    <a:bodyPr/>
-                    <a:lstStyle/>
-                    <a:p>
-                      <a:endParaRPr lang="en-US" sz="1000">
+                <a:tc hMerge="1">
+                  <a:txBody>
+                    <a:bodyPr/>
+                    <a:lstStyle/>
+                    <a:p>
+                      <a:endParaRPr lang="en-US" sz="1000" dirty="0">
                         <a:latin typeface="Candara" panose="020E0502030303020204" pitchFamily="34" charset="0"/>
                       </a:endParaRPr>
                     </a:p>
@@ -21530,12 +23286,12 @@
                     </a:solidFill>
                   </a:tcPr>
                 </a:tc>
-                <a:tc gridSpan="4">
-                  <a:txBody>
-                    <a:bodyPr/>
-                    <a:lstStyle/>
-                    <a:p>
-                      <a:endParaRPr lang="en-US" sz="1000">
+                <a:tc hMerge="1">
+                  <a:txBody>
+                    <a:bodyPr/>
+                    <a:lstStyle/>
+                    <a:p>
+                      <a:endParaRPr lang="en-US" sz="1000" dirty="0">
                         <a:latin typeface="Candara" panose="020E0502030303020204" pitchFamily="34" charset="0"/>
                       </a:endParaRPr>
                     </a:p>
@@ -21565,7 +23321,32 @@
                   </a:txBody>
                   <a:tcPr/>
                 </a:tc>
-                <a:tc hMerge="1">
+                <a:tc gridSpan="4" vMerge="1">
+                  <a:txBody>
+                    <a:bodyPr/>
+                    <a:lstStyle/>
+                    <a:p>
+                      <a:endParaRPr lang="en-US" sz="1000" dirty="0">
+                        <a:latin typeface="Candara" panose="020E0502030303020204" pitchFamily="34" charset="0"/>
+                      </a:endParaRPr>
+                    </a:p>
+                  </a:txBody>
+                  <a:tcPr>
+                    <a:lnT w="12700" cap="flat" cmpd="sng" algn="ctr">
+                      <a:solidFill>
+                        <a:schemeClr val="tx1"/>
+                      </a:solidFill>
+                      <a:prstDash val="solid"/>
+                      <a:round/>
+                      <a:headEnd type="none" w="med" len="med"/>
+                      <a:tailEnd type="none" w="med" len="med"/>
+                    </a:lnT>
+                    <a:solidFill>
+                      <a:schemeClr val="bg1"/>
+                    </a:solidFill>
+                  </a:tcPr>
+                </a:tc>
+                <a:tc hMerge="1" vMerge="1">
                   <a:txBody>
                     <a:bodyPr/>
                     <a:lstStyle/>
@@ -21575,7 +23356,7 @@
                   </a:txBody>
                   <a:tcPr/>
                 </a:tc>
-                <a:tc hMerge="1">
+                <a:tc hMerge="1" vMerge="1">
                   <a:txBody>
                     <a:bodyPr/>
                     <a:lstStyle/>
@@ -21585,12 +23366,12 @@
                   </a:txBody>
                   <a:tcPr/>
                 </a:tc>
-                <a:tc>
-                  <a:txBody>
-                    <a:bodyPr/>
-                    <a:lstStyle/>
-                    <a:p>
-                      <a:endParaRPr lang="en-US" sz="1000">
+                <a:tc hMerge="1" vMerge="1">
+                  <a:txBody>
+                    <a:bodyPr/>
+                    <a:lstStyle/>
+                    <a:p>
+                      <a:endParaRPr lang="en-US" sz="1000" dirty="0">
                         <a:latin typeface="Candara" panose="020E0502030303020204" pitchFamily="34" charset="0"/>
                       </a:endParaRPr>
                     </a:p>

</xml_diff>

<commit_message>
Added Burn to character sheet.
</commit_message>
<xml_diff>
--- a/Ikaros CS.pptx
+++ b/Ikaros CS.pptx
@@ -116,7 +116,7 @@
 <file path=ppt/revisionInfo.xml><?xml version="1.0" encoding="utf-8"?>
 <p1510:revInfo xmlns:a="http://schemas.openxmlformats.org/drawingml/2006/main" xmlns:r="http://schemas.openxmlformats.org/officeDocument/2006/relationships" xmlns:p1510="http://schemas.microsoft.com/office/powerpoint/2015/10/main">
   <p1510:revLst>
-    <p1510:client id="{A72746DB-4E80-4EE8-A51F-7126717A5AEE}" v="20" dt="2022-03-03T07:43:16.883"/>
+    <p1510:client id="{F257421A-10DB-43AC-9EB6-C5FAF75E1F58}" v="1" dt="2022-05-27T06:00:07.106"/>
   </p1510:revLst>
 </p1510:revInfo>
 </file>
@@ -166,6 +166,228 @@
           <pc:docMk/>
           <pc:sldMk cId="537560059" sldId="258"/>
         </pc:sldMkLst>
+      </pc:sldChg>
+    </pc:docChg>
+  </pc:docChgLst>
+  <pc:docChgLst>
+    <pc:chgData name="Julia Pitts" userId="6e51b823a05a2cc0" providerId="LiveId" clId="{A72746DB-4E80-4EE8-A51F-7126717A5AEE}"/>
+    <pc:docChg chg="undo custSel modSld">
+      <pc:chgData name="Julia Pitts" userId="6e51b823a05a2cc0" providerId="LiveId" clId="{A72746DB-4E80-4EE8-A51F-7126717A5AEE}" dt="2022-03-03T07:43:08.059" v="862" actId="14734"/>
+      <pc:docMkLst>
+        <pc:docMk/>
+      </pc:docMkLst>
+      <pc:sldChg chg="modSp mod">
+        <pc:chgData name="Julia Pitts" userId="6e51b823a05a2cc0" providerId="LiveId" clId="{A72746DB-4E80-4EE8-A51F-7126717A5AEE}" dt="2022-03-03T07:29:59.647" v="47" actId="122"/>
+        <pc:sldMkLst>
+          <pc:docMk/>
+          <pc:sldMk cId="1783378883" sldId="256"/>
+        </pc:sldMkLst>
+        <pc:graphicFrameChg chg="modGraphic">
+          <ac:chgData name="Julia Pitts" userId="6e51b823a05a2cc0" providerId="LiveId" clId="{A72746DB-4E80-4EE8-A51F-7126717A5AEE}" dt="2022-03-03T07:29:59.647" v="47" actId="122"/>
+          <ac:graphicFrameMkLst>
+            <pc:docMk/>
+            <pc:sldMk cId="1783378883" sldId="256"/>
+            <ac:graphicFrameMk id="6" creationId="{789FCB90-6945-4AC5-A88D-469FE3C21635}"/>
+          </ac:graphicFrameMkLst>
+        </pc:graphicFrameChg>
+      </pc:sldChg>
+      <pc:sldChg chg="modSp mod">
+        <pc:chgData name="Julia Pitts" userId="6e51b823a05a2cc0" providerId="LiveId" clId="{A72746DB-4E80-4EE8-A51F-7126717A5AEE}" dt="2022-03-03T07:43:08.059" v="862" actId="14734"/>
+        <pc:sldMkLst>
+          <pc:docMk/>
+          <pc:sldMk cId="1661469233" sldId="257"/>
+        </pc:sldMkLst>
+        <pc:graphicFrameChg chg="mod modGraphic">
+          <ac:chgData name="Julia Pitts" userId="6e51b823a05a2cc0" providerId="LiveId" clId="{A72746DB-4E80-4EE8-A51F-7126717A5AEE}" dt="2022-03-03T07:43:08.059" v="862" actId="14734"/>
+          <ac:graphicFrameMkLst>
+            <pc:docMk/>
+            <pc:sldMk cId="1661469233" sldId="257"/>
+            <ac:graphicFrameMk id="4" creationId="{54C5A4E1-B718-4E81-9087-7EFA5BA1AE72}"/>
+          </ac:graphicFrameMkLst>
+        </pc:graphicFrameChg>
+      </pc:sldChg>
+    </pc:docChg>
+  </pc:docChgLst>
+  <pc:docChgLst>
+    <pc:chgData name="Julia Pitts" userId="6e51b823a05a2cc0" providerId="LiveId" clId="{9B3FF46D-E548-4432-8909-7EC7385D47FF}"/>
+    <pc:docChg chg="modSld">
+      <pc:chgData name="Julia Pitts" userId="6e51b823a05a2cc0" providerId="LiveId" clId="{9B3FF46D-E548-4432-8909-7EC7385D47FF}" dt="2021-01-27T03:18:48.650" v="15"/>
+      <pc:docMkLst>
+        <pc:docMk/>
+      </pc:docMkLst>
+      <pc:sldChg chg="modSp mod">
+        <pc:chgData name="Julia Pitts" userId="6e51b823a05a2cc0" providerId="LiveId" clId="{9B3FF46D-E548-4432-8909-7EC7385D47FF}" dt="2021-01-27T03:18:48.650" v="15"/>
+        <pc:sldMkLst>
+          <pc:docMk/>
+          <pc:sldMk cId="1783378883" sldId="256"/>
+        </pc:sldMkLst>
+        <pc:graphicFrameChg chg="mod modGraphic">
+          <ac:chgData name="Julia Pitts" userId="6e51b823a05a2cc0" providerId="LiveId" clId="{9B3FF46D-E548-4432-8909-7EC7385D47FF}" dt="2021-01-27T03:18:48.650" v="15"/>
+          <ac:graphicFrameMkLst>
+            <pc:docMk/>
+            <pc:sldMk cId="1783378883" sldId="256"/>
+            <ac:graphicFrameMk id="6" creationId="{789FCB90-6945-4AC5-A88D-469FE3C21635}"/>
+          </ac:graphicFrameMkLst>
+        </pc:graphicFrameChg>
+      </pc:sldChg>
+    </pc:docChg>
+  </pc:docChgLst>
+  <pc:docChgLst>
+    <pc:chgData name="Julia Pitts" userId="6e51b823a05a2cc0" providerId="LiveId" clId="{ACA3D82D-48D7-47D0-848A-7740168756B9}"/>
+    <pc:docChg chg="modSld">
+      <pc:chgData name="Julia Pitts" userId="6e51b823a05a2cc0" providerId="LiveId" clId="{ACA3D82D-48D7-47D0-848A-7740168756B9}" dt="2021-04-17T03:14:41.568" v="71" actId="20577"/>
+      <pc:docMkLst>
+        <pc:docMk/>
+      </pc:docMkLst>
+      <pc:sldChg chg="modSp mod">
+        <pc:chgData name="Julia Pitts" userId="6e51b823a05a2cc0" providerId="LiveId" clId="{ACA3D82D-48D7-47D0-848A-7740168756B9}" dt="2021-04-17T03:14:41.568" v="71" actId="20577"/>
+        <pc:sldMkLst>
+          <pc:docMk/>
+          <pc:sldMk cId="1783378883" sldId="256"/>
+        </pc:sldMkLst>
+        <pc:graphicFrameChg chg="modGraphic">
+          <ac:chgData name="Julia Pitts" userId="6e51b823a05a2cc0" providerId="LiveId" clId="{ACA3D82D-48D7-47D0-848A-7740168756B9}" dt="2021-04-17T03:14:41.568" v="71" actId="20577"/>
+          <ac:graphicFrameMkLst>
+            <pc:docMk/>
+            <pc:sldMk cId="1783378883" sldId="256"/>
+            <ac:graphicFrameMk id="6" creationId="{789FCB90-6945-4AC5-A88D-469FE3C21635}"/>
+          </ac:graphicFrameMkLst>
+        </pc:graphicFrameChg>
+      </pc:sldChg>
+    </pc:docChg>
+  </pc:docChgLst>
+  <pc:docChgLst>
+    <pc:chgData name="Julia Pitts" userId="6e51b823a05a2cc0" providerId="LiveId" clId="{F257421A-10DB-43AC-9EB6-C5FAF75E1F58}"/>
+    <pc:docChg chg="undo custSel modSld">
+      <pc:chgData name="Julia Pitts" userId="6e51b823a05a2cc0" providerId="LiveId" clId="{F257421A-10DB-43AC-9EB6-C5FAF75E1F58}" dt="2022-05-27T06:01:44.297" v="46" actId="207"/>
+      <pc:docMkLst>
+        <pc:docMk/>
+      </pc:docMkLst>
+      <pc:sldChg chg="modSp mod">
+        <pc:chgData name="Julia Pitts" userId="6e51b823a05a2cc0" providerId="LiveId" clId="{F257421A-10DB-43AC-9EB6-C5FAF75E1F58}" dt="2022-05-27T06:01:44.297" v="46" actId="207"/>
+        <pc:sldMkLst>
+          <pc:docMk/>
+          <pc:sldMk cId="1783378883" sldId="256"/>
+        </pc:sldMkLst>
+        <pc:graphicFrameChg chg="mod modGraphic">
+          <ac:chgData name="Julia Pitts" userId="6e51b823a05a2cc0" providerId="LiveId" clId="{F257421A-10DB-43AC-9EB6-C5FAF75E1F58}" dt="2022-05-27T06:01:44.297" v="46" actId="207"/>
+          <ac:graphicFrameMkLst>
+            <pc:docMk/>
+            <pc:sldMk cId="1783378883" sldId="256"/>
+            <ac:graphicFrameMk id="6" creationId="{789FCB90-6945-4AC5-A88D-469FE3C21635}"/>
+          </ac:graphicFrameMkLst>
+        </pc:graphicFrameChg>
+      </pc:sldChg>
+    </pc:docChg>
+  </pc:docChgLst>
+  <pc:docChgLst>
+    <pc:chgData name="Julia Pitts" userId="6e51b823a05a2cc0" providerId="LiveId" clId="{C97A6D9C-BE04-4B14-9C06-10E95202842D}"/>
+    <pc:docChg chg="undo custSel modSld">
+      <pc:chgData name="Julia Pitts" userId="6e51b823a05a2cc0" providerId="LiveId" clId="{C97A6D9C-BE04-4B14-9C06-10E95202842D}" dt="2021-12-23T20:52:36.117" v="6" actId="255"/>
+      <pc:docMkLst>
+        <pc:docMk/>
+      </pc:docMkLst>
+      <pc:sldChg chg="modSp mod">
+        <pc:chgData name="Julia Pitts" userId="6e51b823a05a2cc0" providerId="LiveId" clId="{C97A6D9C-BE04-4B14-9C06-10E95202842D}" dt="2021-12-23T20:52:36.117" v="6" actId="255"/>
+        <pc:sldMkLst>
+          <pc:docMk/>
+          <pc:sldMk cId="1783378883" sldId="256"/>
+        </pc:sldMkLst>
+        <pc:graphicFrameChg chg="mod modGraphic">
+          <ac:chgData name="Julia Pitts" userId="6e51b823a05a2cc0" providerId="LiveId" clId="{C97A6D9C-BE04-4B14-9C06-10E95202842D}" dt="2021-12-23T20:52:36.117" v="6" actId="255"/>
+          <ac:graphicFrameMkLst>
+            <pc:docMk/>
+            <pc:sldMk cId="1783378883" sldId="256"/>
+            <ac:graphicFrameMk id="6" creationId="{789FCB90-6945-4AC5-A88D-469FE3C21635}"/>
+          </ac:graphicFrameMkLst>
+        </pc:graphicFrameChg>
+      </pc:sldChg>
+    </pc:docChg>
+  </pc:docChgLst>
+  <pc:docChgLst>
+    <pc:chgData name="Julia Pitts" userId="6e51b823a05a2cc0" providerId="LiveId" clId="{ECFE9DAB-BAC8-4821-9D4E-285646DB0673}"/>
+    <pc:docChg chg="undo custSel modSld">
+      <pc:chgData name="Julia Pitts" userId="6e51b823a05a2cc0" providerId="LiveId" clId="{ECFE9DAB-BAC8-4821-9D4E-285646DB0673}" dt="2021-04-15T19:57:32.353" v="28" actId="20577"/>
+      <pc:docMkLst>
+        <pc:docMk/>
+      </pc:docMkLst>
+      <pc:sldChg chg="modSp mod">
+        <pc:chgData name="Julia Pitts" userId="6e51b823a05a2cc0" providerId="LiveId" clId="{ECFE9DAB-BAC8-4821-9D4E-285646DB0673}" dt="2021-04-15T19:57:32.353" v="28" actId="20577"/>
+        <pc:sldMkLst>
+          <pc:docMk/>
+          <pc:sldMk cId="1783378883" sldId="256"/>
+        </pc:sldMkLst>
+        <pc:graphicFrameChg chg="mod modGraphic">
+          <ac:chgData name="Julia Pitts" userId="6e51b823a05a2cc0" providerId="LiveId" clId="{ECFE9DAB-BAC8-4821-9D4E-285646DB0673}" dt="2021-04-15T19:57:32.353" v="28" actId="20577"/>
+          <ac:graphicFrameMkLst>
+            <pc:docMk/>
+            <pc:sldMk cId="1783378883" sldId="256"/>
+            <ac:graphicFrameMk id="6" creationId="{789FCB90-6945-4AC5-A88D-469FE3C21635}"/>
+          </ac:graphicFrameMkLst>
+        </pc:graphicFrameChg>
+      </pc:sldChg>
+    </pc:docChg>
+  </pc:docChgLst>
+  <pc:docChgLst>
+    <pc:chgData name="Julia Pitts" userId="6e51b823a05a2cc0" providerId="LiveId" clId="{2E85E893-1888-44A8-8BBB-2DE966A930F3}"/>
+    <pc:docChg chg="modSld">
+      <pc:chgData name="Julia Pitts" userId="6e51b823a05a2cc0" providerId="LiveId" clId="{2E85E893-1888-44A8-8BBB-2DE966A930F3}" dt="2021-04-25T01:24:07.307" v="44" actId="20577"/>
+      <pc:docMkLst>
+        <pc:docMk/>
+      </pc:docMkLst>
+      <pc:sldChg chg="modSp mod">
+        <pc:chgData name="Julia Pitts" userId="6e51b823a05a2cc0" providerId="LiveId" clId="{2E85E893-1888-44A8-8BBB-2DE966A930F3}" dt="2021-04-25T01:24:07.307" v="44" actId="20577"/>
+        <pc:sldMkLst>
+          <pc:docMk/>
+          <pc:sldMk cId="1783378883" sldId="256"/>
+        </pc:sldMkLst>
+        <pc:graphicFrameChg chg="mod modGraphic">
+          <ac:chgData name="Julia Pitts" userId="6e51b823a05a2cc0" providerId="LiveId" clId="{2E85E893-1888-44A8-8BBB-2DE966A930F3}" dt="2021-04-25T01:24:07.307" v="44" actId="20577"/>
+          <ac:graphicFrameMkLst>
+            <pc:docMk/>
+            <pc:sldMk cId="1783378883" sldId="256"/>
+            <ac:graphicFrameMk id="6" creationId="{789FCB90-6945-4AC5-A88D-469FE3C21635}"/>
+          </ac:graphicFrameMkLst>
+        </pc:graphicFrameChg>
+      </pc:sldChg>
+    </pc:docChg>
+  </pc:docChgLst>
+  <pc:docChgLst>
+    <pc:chgData name="Julia Pitts" userId="6e51b823a05a2cc0" providerId="LiveId" clId="{190486AC-D65C-4F84-9F2A-5EBFF0C4E6C4}"/>
+    <pc:docChg chg="undo redo custSel modSld">
+      <pc:chgData name="Julia Pitts" userId="6e51b823a05a2cc0" providerId="LiveId" clId="{190486AC-D65C-4F84-9F2A-5EBFF0C4E6C4}" dt="2021-03-24T05:51:42.188" v="44"/>
+      <pc:docMkLst>
+        <pc:docMk/>
+      </pc:docMkLst>
+      <pc:sldChg chg="modSp mod">
+        <pc:chgData name="Julia Pitts" userId="6e51b823a05a2cc0" providerId="LiveId" clId="{190486AC-D65C-4F84-9F2A-5EBFF0C4E6C4}" dt="2021-03-24T05:42:12.495" v="40" actId="14100"/>
+        <pc:sldMkLst>
+          <pc:docMk/>
+          <pc:sldMk cId="1783378883" sldId="256"/>
+        </pc:sldMkLst>
+        <pc:graphicFrameChg chg="mod modGraphic">
+          <ac:chgData name="Julia Pitts" userId="6e51b823a05a2cc0" providerId="LiveId" clId="{190486AC-D65C-4F84-9F2A-5EBFF0C4E6C4}" dt="2021-03-24T05:42:12.495" v="40" actId="14100"/>
+          <ac:graphicFrameMkLst>
+            <pc:docMk/>
+            <pc:sldMk cId="1783378883" sldId="256"/>
+            <ac:graphicFrameMk id="6" creationId="{789FCB90-6945-4AC5-A88D-469FE3C21635}"/>
+          </ac:graphicFrameMkLst>
+        </pc:graphicFrameChg>
+      </pc:sldChg>
+      <pc:sldChg chg="modSp mod">
+        <pc:chgData name="Julia Pitts" userId="6e51b823a05a2cc0" providerId="LiveId" clId="{190486AC-D65C-4F84-9F2A-5EBFF0C4E6C4}" dt="2021-03-24T05:51:42.188" v="44"/>
+        <pc:sldMkLst>
+          <pc:docMk/>
+          <pc:sldMk cId="1661469233" sldId="257"/>
+        </pc:sldMkLst>
+        <pc:graphicFrameChg chg="mod modGraphic">
+          <ac:chgData name="Julia Pitts" userId="6e51b823a05a2cc0" providerId="LiveId" clId="{190486AC-D65C-4F84-9F2A-5EBFF0C4E6C4}" dt="2021-03-24T05:51:42.188" v="44"/>
+          <ac:graphicFrameMkLst>
+            <pc:docMk/>
+            <pc:sldMk cId="1661469233" sldId="257"/>
+            <ac:graphicFrameMk id="4" creationId="{54C5A4E1-B718-4E81-9087-7EFA5BA1AE72}"/>
+          </ac:graphicFrameMkLst>
+        </pc:graphicFrameChg>
       </pc:sldChg>
     </pc:docChg>
   </pc:docChgLst>
@@ -249,180 +471,6 @@
     </pc:docChg>
   </pc:docChgLst>
   <pc:docChgLst>
-    <pc:chgData name="Julia Pitts" userId="6e51b823a05a2cc0" providerId="LiveId" clId="{ACA3D82D-48D7-47D0-848A-7740168756B9}"/>
-    <pc:docChg chg="modSld">
-      <pc:chgData name="Julia Pitts" userId="6e51b823a05a2cc0" providerId="LiveId" clId="{ACA3D82D-48D7-47D0-848A-7740168756B9}" dt="2021-04-17T03:14:41.568" v="71" actId="20577"/>
-      <pc:docMkLst>
-        <pc:docMk/>
-      </pc:docMkLst>
-      <pc:sldChg chg="modSp mod">
-        <pc:chgData name="Julia Pitts" userId="6e51b823a05a2cc0" providerId="LiveId" clId="{ACA3D82D-48D7-47D0-848A-7740168756B9}" dt="2021-04-17T03:14:41.568" v="71" actId="20577"/>
-        <pc:sldMkLst>
-          <pc:docMk/>
-          <pc:sldMk cId="1783378883" sldId="256"/>
-        </pc:sldMkLst>
-        <pc:graphicFrameChg chg="modGraphic">
-          <ac:chgData name="Julia Pitts" userId="6e51b823a05a2cc0" providerId="LiveId" clId="{ACA3D82D-48D7-47D0-848A-7740168756B9}" dt="2021-04-17T03:14:41.568" v="71" actId="20577"/>
-          <ac:graphicFrameMkLst>
-            <pc:docMk/>
-            <pc:sldMk cId="1783378883" sldId="256"/>
-            <ac:graphicFrameMk id="6" creationId="{789FCB90-6945-4AC5-A88D-469FE3C21635}"/>
-          </ac:graphicFrameMkLst>
-        </pc:graphicFrameChg>
-      </pc:sldChg>
-    </pc:docChg>
-  </pc:docChgLst>
-  <pc:docChgLst>
-    <pc:chgData name="Julia Pitts" userId="6e51b823a05a2cc0" providerId="LiveId" clId="{9B3FF46D-E548-4432-8909-7EC7385D47FF}"/>
-    <pc:docChg chg="modSld">
-      <pc:chgData name="Julia Pitts" userId="6e51b823a05a2cc0" providerId="LiveId" clId="{9B3FF46D-E548-4432-8909-7EC7385D47FF}" dt="2021-01-27T03:18:48.650" v="15"/>
-      <pc:docMkLst>
-        <pc:docMk/>
-      </pc:docMkLst>
-      <pc:sldChg chg="modSp mod">
-        <pc:chgData name="Julia Pitts" userId="6e51b823a05a2cc0" providerId="LiveId" clId="{9B3FF46D-E548-4432-8909-7EC7385D47FF}" dt="2021-01-27T03:18:48.650" v="15"/>
-        <pc:sldMkLst>
-          <pc:docMk/>
-          <pc:sldMk cId="1783378883" sldId="256"/>
-        </pc:sldMkLst>
-        <pc:graphicFrameChg chg="mod modGraphic">
-          <ac:chgData name="Julia Pitts" userId="6e51b823a05a2cc0" providerId="LiveId" clId="{9B3FF46D-E548-4432-8909-7EC7385D47FF}" dt="2021-01-27T03:18:48.650" v="15"/>
-          <ac:graphicFrameMkLst>
-            <pc:docMk/>
-            <pc:sldMk cId="1783378883" sldId="256"/>
-            <ac:graphicFrameMk id="6" creationId="{789FCB90-6945-4AC5-A88D-469FE3C21635}"/>
-          </ac:graphicFrameMkLst>
-        </pc:graphicFrameChg>
-      </pc:sldChg>
-    </pc:docChg>
-  </pc:docChgLst>
-  <pc:docChgLst>
-    <pc:chgData name="Julia Pitts" userId="6e51b823a05a2cc0" providerId="LiveId" clId="{A72746DB-4E80-4EE8-A51F-7126717A5AEE}"/>
-    <pc:docChg chg="undo custSel modSld">
-      <pc:chgData name="Julia Pitts" userId="6e51b823a05a2cc0" providerId="LiveId" clId="{A72746DB-4E80-4EE8-A51F-7126717A5AEE}" dt="2022-03-03T07:43:08.059" v="862" actId="14734"/>
-      <pc:docMkLst>
-        <pc:docMk/>
-      </pc:docMkLst>
-      <pc:sldChg chg="modSp mod">
-        <pc:chgData name="Julia Pitts" userId="6e51b823a05a2cc0" providerId="LiveId" clId="{A72746DB-4E80-4EE8-A51F-7126717A5AEE}" dt="2022-03-03T07:29:59.647" v="47" actId="122"/>
-        <pc:sldMkLst>
-          <pc:docMk/>
-          <pc:sldMk cId="1783378883" sldId="256"/>
-        </pc:sldMkLst>
-        <pc:graphicFrameChg chg="modGraphic">
-          <ac:chgData name="Julia Pitts" userId="6e51b823a05a2cc0" providerId="LiveId" clId="{A72746DB-4E80-4EE8-A51F-7126717A5AEE}" dt="2022-03-03T07:29:59.647" v="47" actId="122"/>
-          <ac:graphicFrameMkLst>
-            <pc:docMk/>
-            <pc:sldMk cId="1783378883" sldId="256"/>
-            <ac:graphicFrameMk id="6" creationId="{789FCB90-6945-4AC5-A88D-469FE3C21635}"/>
-          </ac:graphicFrameMkLst>
-        </pc:graphicFrameChg>
-      </pc:sldChg>
-      <pc:sldChg chg="modSp mod">
-        <pc:chgData name="Julia Pitts" userId="6e51b823a05a2cc0" providerId="LiveId" clId="{A72746DB-4E80-4EE8-A51F-7126717A5AEE}" dt="2022-03-03T07:43:08.059" v="862" actId="14734"/>
-        <pc:sldMkLst>
-          <pc:docMk/>
-          <pc:sldMk cId="1661469233" sldId="257"/>
-        </pc:sldMkLst>
-        <pc:graphicFrameChg chg="mod modGraphic">
-          <ac:chgData name="Julia Pitts" userId="6e51b823a05a2cc0" providerId="LiveId" clId="{A72746DB-4E80-4EE8-A51F-7126717A5AEE}" dt="2022-03-03T07:43:08.059" v="862" actId="14734"/>
-          <ac:graphicFrameMkLst>
-            <pc:docMk/>
-            <pc:sldMk cId="1661469233" sldId="257"/>
-            <ac:graphicFrameMk id="4" creationId="{54C5A4E1-B718-4E81-9087-7EFA5BA1AE72}"/>
-          </ac:graphicFrameMkLst>
-        </pc:graphicFrameChg>
-      </pc:sldChg>
-    </pc:docChg>
-  </pc:docChgLst>
-  <pc:docChgLst>
-    <pc:chgData name="Julia Pitts" userId="6e51b823a05a2cc0" providerId="LiveId" clId="{C97A6D9C-BE04-4B14-9C06-10E95202842D}"/>
-    <pc:docChg chg="undo custSel modSld">
-      <pc:chgData name="Julia Pitts" userId="6e51b823a05a2cc0" providerId="LiveId" clId="{C97A6D9C-BE04-4B14-9C06-10E95202842D}" dt="2021-12-23T20:52:36.117" v="6" actId="255"/>
-      <pc:docMkLst>
-        <pc:docMk/>
-      </pc:docMkLst>
-      <pc:sldChg chg="modSp mod">
-        <pc:chgData name="Julia Pitts" userId="6e51b823a05a2cc0" providerId="LiveId" clId="{C97A6D9C-BE04-4B14-9C06-10E95202842D}" dt="2021-12-23T20:52:36.117" v="6" actId="255"/>
-        <pc:sldMkLst>
-          <pc:docMk/>
-          <pc:sldMk cId="1783378883" sldId="256"/>
-        </pc:sldMkLst>
-        <pc:graphicFrameChg chg="mod modGraphic">
-          <ac:chgData name="Julia Pitts" userId="6e51b823a05a2cc0" providerId="LiveId" clId="{C97A6D9C-BE04-4B14-9C06-10E95202842D}" dt="2021-12-23T20:52:36.117" v="6" actId="255"/>
-          <ac:graphicFrameMkLst>
-            <pc:docMk/>
-            <pc:sldMk cId="1783378883" sldId="256"/>
-            <ac:graphicFrameMk id="6" creationId="{789FCB90-6945-4AC5-A88D-469FE3C21635}"/>
-          </ac:graphicFrameMkLst>
-        </pc:graphicFrameChg>
-      </pc:sldChg>
-    </pc:docChg>
-  </pc:docChgLst>
-  <pc:docChgLst>
-    <pc:chgData name="Julia Pitts" userId="6e51b823a05a2cc0" providerId="LiveId" clId="{ECFE9DAB-BAC8-4821-9D4E-285646DB0673}"/>
-    <pc:docChg chg="undo custSel modSld">
-      <pc:chgData name="Julia Pitts" userId="6e51b823a05a2cc0" providerId="LiveId" clId="{ECFE9DAB-BAC8-4821-9D4E-285646DB0673}" dt="2021-04-15T19:57:32.353" v="28" actId="20577"/>
-      <pc:docMkLst>
-        <pc:docMk/>
-      </pc:docMkLst>
-      <pc:sldChg chg="modSp mod">
-        <pc:chgData name="Julia Pitts" userId="6e51b823a05a2cc0" providerId="LiveId" clId="{ECFE9DAB-BAC8-4821-9D4E-285646DB0673}" dt="2021-04-15T19:57:32.353" v="28" actId="20577"/>
-        <pc:sldMkLst>
-          <pc:docMk/>
-          <pc:sldMk cId="1783378883" sldId="256"/>
-        </pc:sldMkLst>
-        <pc:graphicFrameChg chg="mod modGraphic">
-          <ac:chgData name="Julia Pitts" userId="6e51b823a05a2cc0" providerId="LiveId" clId="{ECFE9DAB-BAC8-4821-9D4E-285646DB0673}" dt="2021-04-15T19:57:32.353" v="28" actId="20577"/>
-          <ac:graphicFrameMkLst>
-            <pc:docMk/>
-            <pc:sldMk cId="1783378883" sldId="256"/>
-            <ac:graphicFrameMk id="6" creationId="{789FCB90-6945-4AC5-A88D-469FE3C21635}"/>
-          </ac:graphicFrameMkLst>
-        </pc:graphicFrameChg>
-      </pc:sldChg>
-    </pc:docChg>
-  </pc:docChgLst>
-  <pc:docChgLst>
-    <pc:chgData name="Julia Pitts" userId="6e51b823a05a2cc0" providerId="LiveId" clId="{190486AC-D65C-4F84-9F2A-5EBFF0C4E6C4}"/>
-    <pc:docChg chg="undo redo custSel modSld">
-      <pc:chgData name="Julia Pitts" userId="6e51b823a05a2cc0" providerId="LiveId" clId="{190486AC-D65C-4F84-9F2A-5EBFF0C4E6C4}" dt="2021-03-24T05:51:42.188" v="44"/>
-      <pc:docMkLst>
-        <pc:docMk/>
-      </pc:docMkLst>
-      <pc:sldChg chg="modSp mod">
-        <pc:chgData name="Julia Pitts" userId="6e51b823a05a2cc0" providerId="LiveId" clId="{190486AC-D65C-4F84-9F2A-5EBFF0C4E6C4}" dt="2021-03-24T05:42:12.495" v="40" actId="14100"/>
-        <pc:sldMkLst>
-          <pc:docMk/>
-          <pc:sldMk cId="1783378883" sldId="256"/>
-        </pc:sldMkLst>
-        <pc:graphicFrameChg chg="mod modGraphic">
-          <ac:chgData name="Julia Pitts" userId="6e51b823a05a2cc0" providerId="LiveId" clId="{190486AC-D65C-4F84-9F2A-5EBFF0C4E6C4}" dt="2021-03-24T05:42:12.495" v="40" actId="14100"/>
-          <ac:graphicFrameMkLst>
-            <pc:docMk/>
-            <pc:sldMk cId="1783378883" sldId="256"/>
-            <ac:graphicFrameMk id="6" creationId="{789FCB90-6945-4AC5-A88D-469FE3C21635}"/>
-          </ac:graphicFrameMkLst>
-        </pc:graphicFrameChg>
-      </pc:sldChg>
-      <pc:sldChg chg="modSp mod">
-        <pc:chgData name="Julia Pitts" userId="6e51b823a05a2cc0" providerId="LiveId" clId="{190486AC-D65C-4F84-9F2A-5EBFF0C4E6C4}" dt="2021-03-24T05:51:42.188" v="44"/>
-        <pc:sldMkLst>
-          <pc:docMk/>
-          <pc:sldMk cId="1661469233" sldId="257"/>
-        </pc:sldMkLst>
-        <pc:graphicFrameChg chg="mod modGraphic">
-          <ac:chgData name="Julia Pitts" userId="6e51b823a05a2cc0" providerId="LiveId" clId="{190486AC-D65C-4F84-9F2A-5EBFF0C4E6C4}" dt="2021-03-24T05:51:42.188" v="44"/>
-          <ac:graphicFrameMkLst>
-            <pc:docMk/>
-            <pc:sldMk cId="1661469233" sldId="257"/>
-            <ac:graphicFrameMk id="4" creationId="{54C5A4E1-B718-4E81-9087-7EFA5BA1AE72}"/>
-          </ac:graphicFrameMkLst>
-        </pc:graphicFrameChg>
-      </pc:sldChg>
-    </pc:docChg>
-  </pc:docChgLst>
-  <pc:docChgLst>
     <pc:chgData name="Julia Pitts" userId="6e51b823a05a2cc0" providerId="Windows Live" clId="Web-{20C3A756-D1B7-4342-95C8-AA622C5C49D1}"/>
     <pc:docChg chg="modSld">
       <pc:chgData name="Julia Pitts" userId="6e51b823a05a2cc0" providerId="Windows Live" clId="Web-{20C3A756-D1B7-4342-95C8-AA622C5C49D1}" dt="2021-03-24T04:37:40.569" v="260"/>
@@ -456,30 +504,6 @@
             <pc:docMk/>
             <pc:sldMk cId="1661469233" sldId="257"/>
             <ac:graphicFrameMk id="4" creationId="{54C5A4E1-B718-4E81-9087-7EFA5BA1AE72}"/>
-          </ac:graphicFrameMkLst>
-        </pc:graphicFrameChg>
-      </pc:sldChg>
-    </pc:docChg>
-  </pc:docChgLst>
-  <pc:docChgLst>
-    <pc:chgData name="Julia Pitts" userId="6e51b823a05a2cc0" providerId="LiveId" clId="{2E85E893-1888-44A8-8BBB-2DE966A930F3}"/>
-    <pc:docChg chg="modSld">
-      <pc:chgData name="Julia Pitts" userId="6e51b823a05a2cc0" providerId="LiveId" clId="{2E85E893-1888-44A8-8BBB-2DE966A930F3}" dt="2021-04-25T01:24:07.307" v="44" actId="20577"/>
-      <pc:docMkLst>
-        <pc:docMk/>
-      </pc:docMkLst>
-      <pc:sldChg chg="modSp mod">
-        <pc:chgData name="Julia Pitts" userId="6e51b823a05a2cc0" providerId="LiveId" clId="{2E85E893-1888-44A8-8BBB-2DE966A930F3}" dt="2021-04-25T01:24:07.307" v="44" actId="20577"/>
-        <pc:sldMkLst>
-          <pc:docMk/>
-          <pc:sldMk cId="1783378883" sldId="256"/>
-        </pc:sldMkLst>
-        <pc:graphicFrameChg chg="mod modGraphic">
-          <ac:chgData name="Julia Pitts" userId="6e51b823a05a2cc0" providerId="LiveId" clId="{2E85E893-1888-44A8-8BBB-2DE966A930F3}" dt="2021-04-25T01:24:07.307" v="44" actId="20577"/>
-          <ac:graphicFrameMkLst>
-            <pc:docMk/>
-            <pc:sldMk cId="1783378883" sldId="256"/>
-            <ac:graphicFrameMk id="6" creationId="{789FCB90-6945-4AC5-A88D-469FE3C21635}"/>
           </ac:graphicFrameMkLst>
         </pc:graphicFrameChg>
       </pc:sldChg>
@@ -657,7 +681,7 @@
           <a:p>
             <a:fld id="{08882BDC-A680-4764-9A15-E4D7289376AF}" type="datetimeFigureOut">
               <a:rPr lang="en-US" smtClean="0"/>
-              <a:t>3/2/2022</a:t>
+              <a:t>5/26/2022</a:t>
             </a:fld>
             <a:endParaRPr lang="en-US"/>
           </a:p>
@@ -967,7 +991,7 @@
           <a:p>
             <a:fld id="{08882BDC-A680-4764-9A15-E4D7289376AF}" type="datetimeFigureOut">
               <a:rPr lang="en-US" smtClean="0"/>
-              <a:t>3/2/2022</a:t>
+              <a:t>5/26/2022</a:t>
             </a:fld>
             <a:endParaRPr lang="en-US"/>
           </a:p>
@@ -1188,7 +1212,7 @@
           <a:p>
             <a:fld id="{08882BDC-A680-4764-9A15-E4D7289376AF}" type="datetimeFigureOut">
               <a:rPr lang="en-US" smtClean="0"/>
-              <a:t>3/2/2022</a:t>
+              <a:t>5/26/2022</a:t>
             </a:fld>
             <a:endParaRPr lang="en-US"/>
           </a:p>
@@ -1478,7 +1502,7 @@
           <a:p>
             <a:fld id="{08882BDC-A680-4764-9A15-E4D7289376AF}" type="datetimeFigureOut">
               <a:rPr lang="en-US" smtClean="0"/>
-              <a:t>3/2/2022</a:t>
+              <a:t>5/26/2022</a:t>
             </a:fld>
             <a:endParaRPr lang="en-US"/>
           </a:p>
@@ -1931,7 +1955,7 @@
           <a:p>
             <a:fld id="{08882BDC-A680-4764-9A15-E4D7289376AF}" type="datetimeFigureOut">
               <a:rPr lang="en-US" smtClean="0"/>
-              <a:t>3/2/2022</a:t>
+              <a:t>5/26/2022</a:t>
             </a:fld>
             <a:endParaRPr lang="en-US"/>
           </a:p>
@@ -2506,7 +2530,7 @@
           <a:p>
             <a:fld id="{08882BDC-A680-4764-9A15-E4D7289376AF}" type="datetimeFigureOut">
               <a:rPr lang="en-US" smtClean="0"/>
-              <a:t>3/2/2022</a:t>
+              <a:t>5/26/2022</a:t>
             </a:fld>
             <a:endParaRPr lang="en-US"/>
           </a:p>
@@ -3354,7 +3378,7 @@
           <a:p>
             <a:fld id="{08882BDC-A680-4764-9A15-E4D7289376AF}" type="datetimeFigureOut">
               <a:rPr lang="en-US" smtClean="0"/>
-              <a:t>3/2/2022</a:t>
+              <a:t>5/26/2022</a:t>
             </a:fld>
             <a:endParaRPr lang="en-US"/>
           </a:p>
@@ -3557,7 +3581,7 @@
           <a:p>
             <a:fld id="{08882BDC-A680-4764-9A15-E4D7289376AF}" type="datetimeFigureOut">
               <a:rPr lang="en-US" smtClean="0"/>
-              <a:t>3/2/2022</a:t>
+              <a:t>5/26/2022</a:t>
             </a:fld>
             <a:endParaRPr lang="en-US"/>
           </a:p>
@@ -3769,7 +3793,7 @@
           <a:p>
             <a:fld id="{08882BDC-A680-4764-9A15-E4D7289376AF}" type="datetimeFigureOut">
               <a:rPr lang="en-US" smtClean="0"/>
-              <a:t>3/2/2022</a:t>
+              <a:t>5/26/2022</a:t>
             </a:fld>
             <a:endParaRPr lang="en-US"/>
           </a:p>
@@ -3972,7 +3996,7 @@
           <a:p>
             <a:fld id="{08882BDC-A680-4764-9A15-E4D7289376AF}" type="datetimeFigureOut">
               <a:rPr lang="en-US" smtClean="0"/>
-              <a:t>3/2/2022</a:t>
+              <a:t>5/26/2022</a:t>
             </a:fld>
             <a:endParaRPr lang="en-US"/>
           </a:p>
@@ -4251,7 +4275,7 @@
           <a:p>
             <a:fld id="{08882BDC-A680-4764-9A15-E4D7289376AF}" type="datetimeFigureOut">
               <a:rPr lang="en-US" smtClean="0"/>
-              <a:t>3/2/2022</a:t>
+              <a:t>5/26/2022</a:t>
             </a:fld>
             <a:endParaRPr lang="en-US"/>
           </a:p>
@@ -4515,7 +4539,7 @@
           <a:p>
             <a:fld id="{08882BDC-A680-4764-9A15-E4D7289376AF}" type="datetimeFigureOut">
               <a:rPr lang="en-US" smtClean="0"/>
-              <a:t>3/2/2022</a:t>
+              <a:t>5/26/2022</a:t>
             </a:fld>
             <a:endParaRPr lang="en-US"/>
           </a:p>
@@ -4927,7 +4951,7 @@
           <a:p>
             <a:fld id="{08882BDC-A680-4764-9A15-E4D7289376AF}" type="datetimeFigureOut">
               <a:rPr lang="en-US" smtClean="0"/>
-              <a:t>3/2/2022</a:t>
+              <a:t>5/26/2022</a:t>
             </a:fld>
             <a:endParaRPr lang="en-US"/>
           </a:p>
@@ -5074,7 +5098,7 @@
           <a:p>
             <a:fld id="{08882BDC-A680-4764-9A15-E4D7289376AF}" type="datetimeFigureOut">
               <a:rPr lang="en-US" smtClean="0"/>
-              <a:t>3/2/2022</a:t>
+              <a:t>5/26/2022</a:t>
             </a:fld>
             <a:endParaRPr lang="en-US"/>
           </a:p>
@@ -5199,7 +5223,7 @@
           <a:p>
             <a:fld id="{08882BDC-A680-4764-9A15-E4D7289376AF}" type="datetimeFigureOut">
               <a:rPr lang="en-US" smtClean="0"/>
-              <a:t>3/2/2022</a:t>
+              <a:t>5/26/2022</a:t>
             </a:fld>
             <a:endParaRPr lang="en-US"/>
           </a:p>
@@ -5476,7 +5500,7 @@
           <a:p>
             <a:fld id="{08882BDC-A680-4764-9A15-E4D7289376AF}" type="datetimeFigureOut">
               <a:rPr lang="en-US" smtClean="0"/>
-              <a:t>3/2/2022</a:t>
+              <a:t>5/26/2022</a:t>
             </a:fld>
             <a:endParaRPr lang="en-US"/>
           </a:p>
@@ -5786,7 +5810,7 @@
           <a:p>
             <a:fld id="{08882BDC-A680-4764-9A15-E4D7289376AF}" type="datetimeFigureOut">
               <a:rPr lang="en-US" smtClean="0"/>
-              <a:t>3/2/2022</a:t>
+              <a:t>5/26/2022</a:t>
             </a:fld>
             <a:endParaRPr lang="en-US"/>
           </a:p>
@@ -6037,7 +6061,7 @@
           <a:p>
             <a:fld id="{08882BDC-A680-4764-9A15-E4D7289376AF}" type="datetimeFigureOut">
               <a:rPr lang="en-US" smtClean="0"/>
-              <a:t>3/2/2022</a:t>
+              <a:t>5/26/2022</a:t>
             </a:fld>
             <a:endParaRPr lang="en-US"/>
           </a:p>
@@ -6504,7 +6528,7 @@
           <p:nvPr>
             <p:extLst>
               <p:ext uri="{D42A27DB-BD31-4B8C-83A1-F6EECF244321}">
-                <p14:modId xmlns:p14="http://schemas.microsoft.com/office/powerpoint/2010/main" val="3843742725"/>
+                <p14:modId xmlns:p14="http://schemas.microsoft.com/office/powerpoint/2010/main" val="3867616674"/>
               </p:ext>
             </p:extLst>
           </p:nvPr>
@@ -13208,14 +13232,31 @@
                     </a:solidFill>
                   </a:tcPr>
                 </a:tc>
-                <a:tc gridSpan="3">
-                  <a:txBody>
-                    <a:bodyPr/>
-                    <a:lstStyle/>
-                    <a:p>
-                      <a:endParaRPr lang="en-US" sz="1000" dirty="0">
-                        <a:latin typeface="Candara" panose="020E0502030303020204" pitchFamily="34" charset="0"/>
-                      </a:endParaRPr>
+                <a:tc gridSpan="4">
+                  <a:txBody>
+                    <a:bodyPr/>
+                    <a:lstStyle/>
+                    <a:p>
+                      <a:r>
+                        <a:rPr lang="en-US" sz="1000" kern="1200" dirty="0">
+                          <a:solidFill>
+                            <a:schemeClr val="tx1"/>
+                          </a:solidFill>
+                          <a:latin typeface="Candara" panose="020E0502030303020204" pitchFamily="34" charset="0"/>
+                          <a:ea typeface="+mn-ea"/>
+                          <a:cs typeface="+mn-cs"/>
+                        </a:rPr>
+                        <a:t>Burn (if applicable)</a:t>
+                      </a:r>
+                      <a:r>
+                        <a:rPr lang="en-US" sz="1000" dirty="0">
+                          <a:solidFill>
+                            <a:schemeClr val="tx1"/>
+                          </a:solidFill>
+                          <a:latin typeface="Candara" panose="020E0502030303020204" pitchFamily="34" charset="0"/>
+                        </a:rPr>
+                        <a:t>:</a:t>
+                      </a:r>
                     </a:p>
                   </a:txBody>
                   <a:tcPr anchor="b">
@@ -13307,7 +13348,7 @@
                     </a:solidFill>
                   </a:tcPr>
                 </a:tc>
-                <a:tc>
+                <a:tc hMerge="1">
                   <a:txBody>
                     <a:bodyPr/>
                     <a:lstStyle/>

</xml_diff>

<commit_message>
Changed coin bulk scaling from 250 to 500.
</commit_message>
<xml_diff>
--- a/Ikaros CS.pptx
+++ b/Ikaros CS.pptx
@@ -259,7 +259,7 @@
   <pc:docChgLst>
     <pc:chgData name="Julia Pitts" userId="6e51b823a05a2cc0" providerId="LiveId" clId="{F257421A-10DB-43AC-9EB6-C5FAF75E1F58}"/>
     <pc:docChg chg="undo custSel modSld">
-      <pc:chgData name="Julia Pitts" userId="6e51b823a05a2cc0" providerId="LiveId" clId="{F257421A-10DB-43AC-9EB6-C5FAF75E1F58}" dt="2022-05-27T06:01:44.297" v="46" actId="207"/>
+      <pc:chgData name="Julia Pitts" userId="6e51b823a05a2cc0" providerId="LiveId" clId="{F257421A-10DB-43AC-9EB6-C5FAF75E1F58}" dt="2022-05-27T06:06:07.160" v="52" actId="20577"/>
       <pc:docMkLst>
         <pc:docMk/>
       </pc:docMkLst>
@@ -275,6 +275,21 @@
             <pc:docMk/>
             <pc:sldMk cId="1783378883" sldId="256"/>
             <ac:graphicFrameMk id="6" creationId="{789FCB90-6945-4AC5-A88D-469FE3C21635}"/>
+          </ac:graphicFrameMkLst>
+        </pc:graphicFrameChg>
+      </pc:sldChg>
+      <pc:sldChg chg="modSp mod">
+        <pc:chgData name="Julia Pitts" userId="6e51b823a05a2cc0" providerId="LiveId" clId="{F257421A-10DB-43AC-9EB6-C5FAF75E1F58}" dt="2022-05-27T06:06:07.160" v="52" actId="20577"/>
+        <pc:sldMkLst>
+          <pc:docMk/>
+          <pc:sldMk cId="1661469233" sldId="257"/>
+        </pc:sldMkLst>
+        <pc:graphicFrameChg chg="modGraphic">
+          <ac:chgData name="Julia Pitts" userId="6e51b823a05a2cc0" providerId="LiveId" clId="{F257421A-10DB-43AC-9EB6-C5FAF75E1F58}" dt="2022-05-27T06:06:07.160" v="52" actId="20577"/>
+          <ac:graphicFrameMkLst>
+            <pc:docMk/>
+            <pc:sldMk cId="1661469233" sldId="257"/>
+            <ac:graphicFrameMk id="4" creationId="{54C5A4E1-B718-4E81-9087-7EFA5BA1AE72}"/>
           </ac:graphicFrameMkLst>
         </pc:graphicFrameChg>
       </pc:sldChg>
@@ -15868,7 +15883,7 @@
           <p:nvPr>
             <p:extLst>
               <p:ext uri="{D42A27DB-BD31-4B8C-83A1-F6EECF244321}">
-                <p14:modId xmlns:p14="http://schemas.microsoft.com/office/powerpoint/2010/main" val="718383503"/>
+                <p14:modId xmlns:p14="http://schemas.microsoft.com/office/powerpoint/2010/main" val="2070124695"/>
               </p:ext>
             </p:extLst>
           </p:nvPr>
@@ -16578,7 +16593,19 @@
                         <a:rPr lang="en-US" sz="1000" dirty="0">
                           <a:latin typeface="Candara" panose="020E0502030303020204" pitchFamily="34" charset="0"/>
                         </a:rPr>
-                        <a:t>First 250 cash is free, 1 Bulk per 250 (rounded up) after.</a:t>
+                        <a:t>First 500 cash is free, 1 Bulk </a:t>
+                      </a:r>
+                      <a:r>
+                        <a:rPr lang="en-US" sz="1000">
+                          <a:latin typeface="Candara" panose="020E0502030303020204" pitchFamily="34" charset="0"/>
+                        </a:rPr>
+                        <a:t>per 500 </a:t>
+                      </a:r>
+                      <a:r>
+                        <a:rPr lang="en-US" sz="1000" dirty="0">
+                          <a:latin typeface="Candara" panose="020E0502030303020204" pitchFamily="34" charset="0"/>
+                        </a:rPr>
+                        <a:t>(rounded up) after.</a:t>
                       </a:r>
                     </a:p>
                   </a:txBody>

</xml_diff>